<commit_message>
support first controller only in multi-controller job file(for mvp)
</commit_message>
<xml_diff>
--- a/backend/resources/pptAssets/HybridApplicationMonitoringUseCase_template.pptx
+++ b/backend/resources/pptAssets/HybridApplicationMonitoringUseCase_template.pptx
@@ -293,7 +293,7 @@
           <a:p>
             <a:fld id="{702657A2-7B7A-174B-A542-3B4C9FC943CD}" type="datetimeFigureOut">
               <a:rPr lang="en-US" smtClean="0"/>
-              <a:t>4/7/23</a:t>
+              <a:t>4/14/23</a:t>
             </a:fld>
             <a:endParaRPr lang="en-US"/>
           </a:p>
@@ -2886,7 +2886,7 @@
           </a:ln>
           <a:extLst>
             <a:ext uri="{FAA26D3D-D897-4be2-8F04-BA451C77F1D7}">
-              <ma14:placeholderFlag xmlns:ma14="http://schemas.microsoft.com/office/mac/drawingml/2011/main" xmlns="" val="1"/>
+              <ma14:placeholderFlag xmlns="" xmlns:ma14="http://schemas.microsoft.com/office/mac/drawingml/2011/main" val="1"/>
             </a:ext>
           </a:extLst>
         </p:spPr>
@@ -4900,7 +4900,7 @@
           </a:ln>
           <a:extLst>
             <a:ext uri="{FAA26D3D-D897-4be2-8F04-BA451C77F1D7}">
-              <ma14:placeholderFlag xmlns:ma14="http://schemas.microsoft.com/office/mac/drawingml/2011/main" xmlns="" val="1"/>
+              <ma14:placeholderFlag xmlns="" xmlns:ma14="http://schemas.microsoft.com/office/mac/drawingml/2011/main" val="1"/>
             </a:ext>
           </a:extLst>
         </p:spPr>
@@ -5619,7 +5619,7 @@
           </a:ln>
           <a:extLst>
             <a:ext uri="{FAA26D3D-D897-4be2-8F04-BA451C77F1D7}">
-              <ma14:placeholderFlag xmlns:ma14="http://schemas.microsoft.com/office/mac/drawingml/2011/main" xmlns="" val="1"/>
+              <ma14:placeholderFlag xmlns="" xmlns:ma14="http://schemas.microsoft.com/office/mac/drawingml/2011/main" val="1"/>
             </a:ext>
           </a:extLst>
         </p:spPr>
@@ -7117,7 +7117,7 @@
               </a14:hiddenLine>
             </a:ext>
             <a:ext uri="{FAA26D3D-D897-4be2-8F04-BA451C77F1D7}">
-              <ma14:placeholderFlag xmlns:ma14="http://schemas.microsoft.com/office/mac/drawingml/2011/main" xmlns="" val="1"/>
+              <ma14:placeholderFlag xmlns="" xmlns:ma14="http://schemas.microsoft.com/office/mac/drawingml/2011/main" val="1"/>
             </a:ext>
           </a:extLst>
         </p:spPr>
@@ -7365,7 +7365,7 @@
               </a14:hiddenLine>
             </a:ext>
             <a:ext uri="{FAA26D3D-D897-4be2-8F04-BA451C77F1D7}">
-              <ma14:placeholderFlag xmlns:ma14="http://schemas.microsoft.com/office/mac/drawingml/2011/main" xmlns="" val="1"/>
+              <ma14:placeholderFlag xmlns="" xmlns:ma14="http://schemas.microsoft.com/office/mac/drawingml/2011/main" val="1"/>
             </a:ext>
           </a:extLst>
         </p:spPr>
@@ -7634,7 +7634,7 @@
               </a14:hiddenLine>
             </a:ext>
             <a:ext uri="{FAA26D3D-D897-4be2-8F04-BA451C77F1D7}">
-              <ma14:placeholderFlag xmlns="" xmlns:ma14="http://schemas.microsoft.com/office/mac/drawingml/2011/main" val="1"/>
+              <ma14:placeholderFlag xmlns:ma14="http://schemas.microsoft.com/office/mac/drawingml/2011/main" xmlns="" val="1"/>
             </a:ext>
           </a:extLst>
         </p:spPr>
@@ -8064,14 +8064,14 @@
           </a:ln>
           <a:extLst>
             <a:ext uri="{909E8E84-426E-40dd-AFC4-6F175D3DCCD1}">
-              <a14:hiddenFill xmlns:a14="http://schemas.microsoft.com/office/drawing/2010/main" xmlns="">
+              <a14:hiddenFill xmlns="" xmlns:a14="http://schemas.microsoft.com/office/drawing/2010/main">
                 <a:solidFill>
                   <a:srgbClr val="FFFFFF"/>
                 </a:solidFill>
               </a14:hiddenFill>
             </a:ext>
             <a:ext uri="{91240B29-F687-4f45-9708-019B960494DF}">
-              <a14:hiddenLine xmlns:a14="http://schemas.microsoft.com/office/drawing/2010/main" xmlns="" w="9525">
+              <a14:hiddenLine xmlns="" xmlns:a14="http://schemas.microsoft.com/office/drawing/2010/main" w="9525">
                 <a:solidFill>
                   <a:srgbClr val="000000"/>
                 </a:solidFill>
@@ -10042,7 +10042,7 @@
           </a:ln>
           <a:extLst>
             <a:ext uri="{FAA26D3D-D897-4be2-8F04-BA451C77F1D7}">
-              <ma14:placeholderFlag xmlns:ma14="http://schemas.microsoft.com/office/mac/drawingml/2011/main" xmlns="" val="1"/>
+              <ma14:placeholderFlag xmlns="" xmlns:ma14="http://schemas.microsoft.com/office/mac/drawingml/2011/main" val="1"/>
             </a:ext>
           </a:extLst>
         </p:spPr>
@@ -11718,7 +11718,7 @@
           </a:ln>
           <a:extLst>
             <a:ext uri="{FAA26D3D-D897-4be2-8F04-BA451C77F1D7}">
-              <ma14:placeholderFlag xmlns:ma14="http://schemas.microsoft.com/office/mac/drawingml/2011/main" xmlns="" val="1"/>
+              <ma14:placeholderFlag xmlns="" xmlns:ma14="http://schemas.microsoft.com/office/mac/drawingml/2011/main" val="1"/>
             </a:ext>
           </a:extLst>
         </p:spPr>
@@ -12312,7 +12312,7 @@
           </a:ln>
           <a:extLst>
             <a:ext uri="{FAA26D3D-D897-4be2-8F04-BA451C77F1D7}">
-              <ma14:placeholderFlag xmlns:ma14="http://schemas.microsoft.com/office/mac/drawingml/2011/main" xmlns="" val="1"/>
+              <ma14:placeholderFlag xmlns="" xmlns:ma14="http://schemas.microsoft.com/office/mac/drawingml/2011/main" val="1"/>
             </a:ext>
           </a:extLst>
         </p:spPr>
@@ -12677,7 +12677,7 @@
           </a:ln>
           <a:extLst>
             <a:ext uri="{FAA26D3D-D897-4be2-8F04-BA451C77F1D7}">
-              <ma14:placeholderFlag xmlns:ma14="http://schemas.microsoft.com/office/mac/drawingml/2011/main" xmlns="" val="1"/>
+              <ma14:placeholderFlag xmlns="" xmlns:ma14="http://schemas.microsoft.com/office/mac/drawingml/2011/main" val="1"/>
             </a:ext>
           </a:extLst>
         </p:spPr>
@@ -13321,7 +13321,7 @@
           </a:ln>
           <a:extLst>
             <a:ext uri="{FAA26D3D-D897-4be2-8F04-BA451C77F1D7}">
-              <ma14:placeholderFlag xmlns:ma14="http://schemas.microsoft.com/office/mac/drawingml/2011/main" xmlns="" val="1"/>
+              <ma14:placeholderFlag xmlns="" xmlns:ma14="http://schemas.microsoft.com/office/mac/drawingml/2011/main" val="1"/>
             </a:ext>
           </a:extLst>
         </p:spPr>
@@ -13568,7 +13568,7 @@
           </a:ln>
           <a:extLst>
             <a:ext uri="{FAA26D3D-D897-4be2-8F04-BA451C77F1D7}">
-              <ma14:placeholderFlag xmlns:ma14="http://schemas.microsoft.com/office/mac/drawingml/2011/main" xmlns="" val="1"/>
+              <ma14:placeholderFlag xmlns="" xmlns:ma14="http://schemas.microsoft.com/office/mac/drawingml/2011/main" val="1"/>
             </a:ext>
           </a:extLst>
         </p:spPr>
@@ -16247,7 +16247,7 @@
           </a:ln>
           <a:extLst>
             <a:ext uri="{FAA26D3D-D897-4be2-8F04-BA451C77F1D7}">
-              <ma14:placeholderFlag xmlns:ma14="http://schemas.microsoft.com/office/mac/drawingml/2011/main" xmlns="" val="1"/>
+              <ma14:placeholderFlag xmlns="" xmlns:ma14="http://schemas.microsoft.com/office/mac/drawingml/2011/main" val="1"/>
             </a:ext>
           </a:extLst>
         </p:spPr>
@@ -16966,7 +16966,7 @@
           </a:ln>
           <a:extLst>
             <a:ext uri="{FAA26D3D-D897-4be2-8F04-BA451C77F1D7}">
-              <ma14:placeholderFlag xmlns:ma14="http://schemas.microsoft.com/office/mac/drawingml/2011/main" xmlns="" val="1"/>
+              <ma14:placeholderFlag xmlns="" xmlns:ma14="http://schemas.microsoft.com/office/mac/drawingml/2011/main" val="1"/>
             </a:ext>
           </a:extLst>
         </p:spPr>
@@ -18082,7 +18082,7 @@
               </a14:hiddenLine>
             </a:ext>
             <a:ext uri="{FAA26D3D-D897-4be2-8F04-BA451C77F1D7}">
-              <ma14:placeholderFlag xmlns:ma14="http://schemas.microsoft.com/office/mac/drawingml/2011/main" xmlns="" val="1"/>
+              <ma14:placeholderFlag xmlns="" xmlns:ma14="http://schemas.microsoft.com/office/mac/drawingml/2011/main" val="1"/>
             </a:ext>
           </a:extLst>
         </p:spPr>
@@ -18351,7 +18351,7 @@
               </a14:hiddenLine>
             </a:ext>
             <a:ext uri="{FAA26D3D-D897-4be2-8F04-BA451C77F1D7}">
-              <ma14:placeholderFlag xmlns="" xmlns:ma14="http://schemas.microsoft.com/office/mac/drawingml/2011/main" val="1"/>
+              <ma14:placeholderFlag xmlns:ma14="http://schemas.microsoft.com/office/mac/drawingml/2011/main" xmlns="" val="1"/>
             </a:ext>
           </a:extLst>
         </p:spPr>
@@ -21900,7 +21900,7 @@
               </a14:hiddenLine>
             </a:ext>
             <a:ext uri="{FAA26D3D-D897-4be2-8F04-BA451C77F1D7}">
-              <ma14:placeholderFlag xmlns:ma14="http://schemas.microsoft.com/office/mac/drawingml/2011/main" xmlns="" val="1"/>
+              <ma14:placeholderFlag xmlns="" xmlns:ma14="http://schemas.microsoft.com/office/mac/drawingml/2011/main" val="1"/>
             </a:ext>
           </a:extLst>
         </p:spPr>
@@ -24476,7 +24476,7 @@
               </a14:hiddenLine>
             </a:ext>
             <a:ext uri="{FAA26D3D-D897-4be2-8F04-BA451C77F1D7}">
-              <ma14:placeholderFlag xmlns:ma14="http://schemas.microsoft.com/office/mac/drawingml/2011/main" xmlns="" val="1"/>
+              <ma14:placeholderFlag xmlns="" xmlns:ma14="http://schemas.microsoft.com/office/mac/drawingml/2011/main" val="1"/>
             </a:ext>
           </a:extLst>
         </p:spPr>
@@ -25983,7 +25983,7 @@
           </a:ln>
           <a:extLst>
             <a:ext uri="{FAA26D3D-D897-4be2-8F04-BA451C77F1D7}">
-              <ma14:placeholderFlag xmlns:ma14="http://schemas.microsoft.com/office/mac/drawingml/2011/main" xmlns="" val="1"/>
+              <ma14:placeholderFlag xmlns="" xmlns:ma14="http://schemas.microsoft.com/office/mac/drawingml/2011/main" val="1"/>
             </a:ext>
           </a:extLst>
         </p:spPr>
@@ -27116,7 +27116,7 @@
           </a:ln>
           <a:extLst>
             <a:ext uri="{FAA26D3D-D897-4be2-8F04-BA451C77F1D7}">
-              <ma14:placeholderFlag xmlns:ma14="http://schemas.microsoft.com/office/mac/drawingml/2011/main" xmlns="" val="1"/>
+              <ma14:placeholderFlag xmlns="" xmlns:ma14="http://schemas.microsoft.com/office/mac/drawingml/2011/main" val="1"/>
             </a:ext>
           </a:extLst>
         </p:spPr>
@@ -27710,7 +27710,7 @@
           </a:ln>
           <a:extLst>
             <a:ext uri="{FAA26D3D-D897-4be2-8F04-BA451C77F1D7}">
-              <ma14:placeholderFlag xmlns:ma14="http://schemas.microsoft.com/office/mac/drawingml/2011/main" xmlns="" val="1"/>
+              <ma14:placeholderFlag xmlns="" xmlns:ma14="http://schemas.microsoft.com/office/mac/drawingml/2011/main" val="1"/>
             </a:ext>
           </a:extLst>
         </p:spPr>
@@ -28369,7 +28369,7 @@
           </a:ln>
           <a:extLst>
             <a:ext uri="{FAA26D3D-D897-4be2-8F04-BA451C77F1D7}">
-              <ma14:placeholderFlag xmlns:ma14="http://schemas.microsoft.com/office/mac/drawingml/2011/main" xmlns="" val="1"/>
+              <ma14:placeholderFlag xmlns="" xmlns:ma14="http://schemas.microsoft.com/office/mac/drawingml/2011/main" val="1"/>
             </a:ext>
           </a:extLst>
         </p:spPr>
@@ -29013,7 +29013,7 @@
           </a:ln>
           <a:extLst>
             <a:ext uri="{FAA26D3D-D897-4be2-8F04-BA451C77F1D7}">
-              <ma14:placeholderFlag xmlns:ma14="http://schemas.microsoft.com/office/mac/drawingml/2011/main" xmlns="" val="1"/>
+              <ma14:placeholderFlag xmlns="" xmlns:ma14="http://schemas.microsoft.com/office/mac/drawingml/2011/main" val="1"/>
             </a:ext>
           </a:extLst>
         </p:spPr>
@@ -29260,7 +29260,7 @@
           </a:ln>
           <a:extLst>
             <a:ext uri="{FAA26D3D-D897-4be2-8F04-BA451C77F1D7}">
-              <ma14:placeholderFlag xmlns:ma14="http://schemas.microsoft.com/office/mac/drawingml/2011/main" xmlns="" val="1"/>
+              <ma14:placeholderFlag xmlns="" xmlns:ma14="http://schemas.microsoft.com/office/mac/drawingml/2011/main" val="1"/>
             </a:ext>
           </a:extLst>
         </p:spPr>
@@ -31274,7 +31274,7 @@
           </a:ln>
           <a:extLst>
             <a:ext uri="{FAA26D3D-D897-4be2-8F04-BA451C77F1D7}">
-              <ma14:placeholderFlag xmlns:ma14="http://schemas.microsoft.com/office/mac/drawingml/2011/main" xmlns="" val="1"/>
+              <ma14:placeholderFlag xmlns="" xmlns:ma14="http://schemas.microsoft.com/office/mac/drawingml/2011/main" val="1"/>
             </a:ext>
           </a:extLst>
         </p:spPr>
@@ -31993,7 +31993,7 @@
           </a:ln>
           <a:extLst>
             <a:ext uri="{FAA26D3D-D897-4be2-8F04-BA451C77F1D7}">
-              <ma14:placeholderFlag xmlns:ma14="http://schemas.microsoft.com/office/mac/drawingml/2011/main" xmlns="" val="1"/>
+              <ma14:placeholderFlag xmlns="" xmlns:ma14="http://schemas.microsoft.com/office/mac/drawingml/2011/main" val="1"/>
             </a:ext>
           </a:extLst>
         </p:spPr>
@@ -33425,7 +33425,7 @@
               </a14:hiddenLine>
             </a:ext>
             <a:ext uri="{FAA26D3D-D897-4be2-8F04-BA451C77F1D7}">
-              <ma14:placeholderFlag xmlns="" xmlns:ma14="http://schemas.microsoft.com/office/mac/drawingml/2011/main" val="1"/>
+              <ma14:placeholderFlag xmlns:ma14="http://schemas.microsoft.com/office/mac/drawingml/2011/main" xmlns="" val="1"/>
             </a:ext>
           </a:extLst>
         </p:spPr>
@@ -33863,7 +33863,7 @@
               </a14:hiddenLine>
             </a:ext>
             <a:ext uri="{FAA26D3D-D897-4be2-8F04-BA451C77F1D7}">
-              <ma14:placeholderFlag xmlns:ma14="http://schemas.microsoft.com/office/mac/drawingml/2011/main" xmlns="" val="1"/>
+              <ma14:placeholderFlag xmlns="" xmlns:ma14="http://schemas.microsoft.com/office/mac/drawingml/2011/main" val="1"/>
             </a:ext>
           </a:extLst>
         </p:spPr>
@@ -36561,7 +36561,7 @@
               </a14:hiddenLine>
             </a:ext>
             <a:ext uri="{FAA26D3D-D897-4be2-8F04-BA451C77F1D7}">
-              <ma14:placeholderFlag xmlns:ma14="http://schemas.microsoft.com/office/mac/drawingml/2011/main" xmlns="" val="1"/>
+              <ma14:placeholderFlag xmlns="" xmlns:ma14="http://schemas.microsoft.com/office/mac/drawingml/2011/main" val="1"/>
             </a:ext>
           </a:extLst>
         </p:spPr>
@@ -40940,7 +40940,7 @@
           </a:ln>
           <a:extLst>
             <a:ext uri="{FAA26D3D-D897-4be2-8F04-BA451C77F1D7}">
-              <ma14:placeholderFlag xmlns:ma14="http://schemas.microsoft.com/office/mac/drawingml/2011/main" xmlns="" val="1"/>
+              <ma14:placeholderFlag xmlns="" xmlns:ma14="http://schemas.microsoft.com/office/mac/drawingml/2011/main" val="1"/>
             </a:ext>
           </a:extLst>
         </p:spPr>
@@ -42073,7 +42073,7 @@
           </a:ln>
           <a:extLst>
             <a:ext uri="{FAA26D3D-D897-4be2-8F04-BA451C77F1D7}">
-              <ma14:placeholderFlag xmlns:ma14="http://schemas.microsoft.com/office/mac/drawingml/2011/main" xmlns="" val="1"/>
+              <ma14:placeholderFlag xmlns="" xmlns:ma14="http://schemas.microsoft.com/office/mac/drawingml/2011/main" val="1"/>
             </a:ext>
           </a:extLst>
         </p:spPr>
@@ -42667,7 +42667,7 @@
           </a:ln>
           <a:extLst>
             <a:ext uri="{FAA26D3D-D897-4be2-8F04-BA451C77F1D7}">
-              <ma14:placeholderFlag xmlns:ma14="http://schemas.microsoft.com/office/mac/drawingml/2011/main" xmlns="" val="1"/>
+              <ma14:placeholderFlag xmlns="" xmlns:ma14="http://schemas.microsoft.com/office/mac/drawingml/2011/main" val="1"/>
             </a:ext>
           </a:extLst>
         </p:spPr>
@@ -43032,7 +43032,7 @@
           </a:ln>
           <a:extLst>
             <a:ext uri="{FAA26D3D-D897-4be2-8F04-BA451C77F1D7}">
-              <ma14:placeholderFlag xmlns:ma14="http://schemas.microsoft.com/office/mac/drawingml/2011/main" xmlns="" val="1"/>
+              <ma14:placeholderFlag xmlns="" xmlns:ma14="http://schemas.microsoft.com/office/mac/drawingml/2011/main" val="1"/>
             </a:ext>
           </a:extLst>
         </p:spPr>
@@ -43676,7 +43676,7 @@
           </a:ln>
           <a:extLst>
             <a:ext uri="{FAA26D3D-D897-4be2-8F04-BA451C77F1D7}">
-              <ma14:placeholderFlag xmlns:ma14="http://schemas.microsoft.com/office/mac/drawingml/2011/main" xmlns="" val="1"/>
+              <ma14:placeholderFlag xmlns="" xmlns:ma14="http://schemas.microsoft.com/office/mac/drawingml/2011/main" val="1"/>
             </a:ext>
           </a:extLst>
         </p:spPr>
@@ -46363,35 +46363,46 @@
           <a:lstStyle/>
           <a:p>
             <a:r>
-              <a:rPr lang="en-US" sz="3200" i="1" dirty="0">
+              <a:rPr lang="en-US" sz="2400" dirty="0"/>
+              <a:t>Pitstop: </a:t>
+            </a:r>
+            <a:r>
+              <a:rPr lang="en-US" sz="2400" i="1" u="sng" dirty="0">
                 <a:solidFill>
                   <a:schemeClr val="bg2">
                     <a:lumMod val="65000"/>
                   </a:schemeClr>
                 </a:solidFill>
               </a:rPr>
-              <a:t>Engage </a:t>
+              <a:t>Engage</a:t>
             </a:r>
             <a:r>
-              <a:rPr lang="en-US" sz="3200" dirty="0">
+              <a:rPr lang="en-US" sz="2400" i="1" dirty="0">
                 <a:solidFill>
                   <a:schemeClr val="bg2">
                     <a:lumMod val="65000"/>
                   </a:schemeClr>
                 </a:solidFill>
               </a:rPr>
-              <a:t>failed health check </a:t>
+              <a:t> </a:t>
             </a:r>
             <a:r>
-              <a:rPr lang="en-US" sz="3200" u="sng" dirty="0">
+              <a:rPr lang="en-US" sz="2400" dirty="0">
                 <a:solidFill>
                   <a:schemeClr val="bg2">
                     <a:lumMod val="65000"/>
                   </a:schemeClr>
                 </a:solidFill>
               </a:rPr>
-              <a:t>recommendations</a:t>
+              <a:t>has failed health check best-practices</a:t>
             </a:r>
+            <a:endParaRPr lang="en-US" sz="2400" u="sng" dirty="0">
+              <a:solidFill>
+                <a:schemeClr val="bg2">
+                  <a:lumMod val="65000"/>
+                </a:schemeClr>
+              </a:solidFill>
+            </a:endParaRPr>
           </a:p>
         </p:txBody>
       </p:sp>
@@ -46477,21 +46488,25 @@
           <a:lstStyle/>
           <a:p>
             <a:r>
-              <a:rPr lang="en-US" sz="4250" dirty="0"/>
+              <a:rPr lang="en-US" sz="2400" dirty="0"/>
               <a:t>Hybrid Application Monitoring </a:t>
             </a:r>
             <a:br>
-              <a:rPr lang="en-US" sz="4250" dirty="0"/>
+              <a:rPr lang="en-US" sz="2400" dirty="0"/>
             </a:br>
             <a:r>
-              <a:rPr lang="en-US" sz="3600" i="1" dirty="0">
+              <a:rPr lang="en-US" sz="2400" dirty="0"/>
+              <a:t>Pitstop: </a:t>
+            </a:r>
+            <a:r>
+              <a:rPr lang="en-US" sz="2400" i="1" dirty="0">
                 <a:solidFill>
                   <a:schemeClr val="bg2">
                     <a:lumMod val="65000"/>
                   </a:schemeClr>
                 </a:solidFill>
               </a:rPr>
-              <a:t>Baseline Journey - Adopt</a:t>
+              <a:t>Adopt</a:t>
             </a:r>
           </a:p>
         </p:txBody>
@@ -46578,35 +46593,46 @@
           <a:lstStyle/>
           <a:p>
             <a:r>
-              <a:rPr lang="en-US" sz="3200" i="1" dirty="0">
+              <a:rPr lang="en-US" sz="2400" dirty="0"/>
+              <a:t>Pitstop: </a:t>
+            </a:r>
+            <a:r>
+              <a:rPr lang="en-US" sz="2400" i="1" u="sng" dirty="0">
                 <a:solidFill>
                   <a:schemeClr val="bg2">
                     <a:lumMod val="65000"/>
                   </a:schemeClr>
                 </a:solidFill>
               </a:rPr>
-              <a:t>Adopt </a:t>
+              <a:t>Adopt</a:t>
             </a:r>
             <a:r>
-              <a:rPr lang="en-US" sz="3200" dirty="0">
+              <a:rPr lang="en-US" sz="2400" i="1" dirty="0">
                 <a:solidFill>
                   <a:schemeClr val="bg2">
                     <a:lumMod val="65000"/>
                   </a:schemeClr>
                 </a:solidFill>
               </a:rPr>
-              <a:t>failed health check </a:t>
+              <a:t> </a:t>
             </a:r>
             <a:r>
-              <a:rPr lang="en-US" sz="3200" u="sng" dirty="0">
+              <a:rPr lang="en-US" sz="2400" dirty="0">
                 <a:solidFill>
                   <a:schemeClr val="bg2">
                     <a:lumMod val="65000"/>
                   </a:schemeClr>
                 </a:solidFill>
               </a:rPr>
-              <a:t>recommendations</a:t>
+              <a:t>has failed health check best-practices</a:t>
             </a:r>
+            <a:endParaRPr lang="en-US" sz="2400" u="sng" dirty="0">
+              <a:solidFill>
+                <a:schemeClr val="bg2">
+                  <a:lumMod val="65000"/>
+                </a:schemeClr>
+              </a:solidFill>
+            </a:endParaRPr>
           </a:p>
         </p:txBody>
       </p:sp>
@@ -46692,21 +46718,25 @@
           <a:lstStyle/>
           <a:p>
             <a:r>
-              <a:rPr lang="en-US" sz="4250" dirty="0"/>
+              <a:rPr lang="en-US" sz="2400" dirty="0"/>
               <a:t>Hybrid Application Monitoring </a:t>
             </a:r>
             <a:br>
-              <a:rPr lang="en-US" sz="4250" dirty="0"/>
+              <a:rPr lang="en-US" sz="2400" dirty="0"/>
             </a:br>
             <a:r>
-              <a:rPr lang="en-US" sz="3600" i="1" dirty="0">
+              <a:rPr lang="en-US" sz="2400" dirty="0"/>
+              <a:t>Pitstop: </a:t>
+            </a:r>
+            <a:r>
+              <a:rPr lang="en-US" sz="2400" i="1" dirty="0">
                 <a:solidFill>
                   <a:schemeClr val="bg2">
                     <a:lumMod val="65000"/>
                   </a:schemeClr>
                 </a:solidFill>
               </a:rPr>
-              <a:t>Baseline Journey - Optimize</a:t>
+              <a:t>Optimize</a:t>
             </a:r>
           </a:p>
         </p:txBody>
@@ -46793,35 +46823,46 @@
           <a:lstStyle/>
           <a:p>
             <a:r>
-              <a:rPr lang="en-US" sz="3200" i="1" dirty="0">
+              <a:rPr lang="en-US" sz="2400" dirty="0"/>
+              <a:t>Pitstop: </a:t>
+            </a:r>
+            <a:r>
+              <a:rPr lang="en-US" sz="2400" i="1" u="sng" dirty="0">
                 <a:solidFill>
                   <a:schemeClr val="bg2">
                     <a:lumMod val="65000"/>
                   </a:schemeClr>
                 </a:solidFill>
               </a:rPr>
-              <a:t>Optimize </a:t>
+              <a:t>Optimize</a:t>
             </a:r>
             <a:r>
-              <a:rPr lang="en-US" sz="3200" dirty="0">
+              <a:rPr lang="en-US" sz="2400" i="1" dirty="0">
                 <a:solidFill>
                   <a:schemeClr val="bg2">
                     <a:lumMod val="65000"/>
                   </a:schemeClr>
                 </a:solidFill>
               </a:rPr>
-              <a:t>failed health check </a:t>
+              <a:t> </a:t>
             </a:r>
             <a:r>
-              <a:rPr lang="en-US" sz="3200" u="sng" dirty="0">
+              <a:rPr lang="en-US" sz="2400" dirty="0">
                 <a:solidFill>
                   <a:schemeClr val="bg2">
                     <a:lumMod val="65000"/>
                   </a:schemeClr>
                 </a:solidFill>
               </a:rPr>
-              <a:t>recommendations</a:t>
+              <a:t>has failed health check best-practices</a:t>
             </a:r>
+            <a:endParaRPr lang="en-US" sz="2400" u="sng" dirty="0">
+              <a:solidFill>
+                <a:schemeClr val="bg2">
+                  <a:lumMod val="65000"/>
+                </a:schemeClr>
+              </a:solidFill>
+            </a:endParaRPr>
           </a:p>
         </p:txBody>
       </p:sp>
@@ -47003,21 +47044,25 @@
           <a:lstStyle/>
           <a:p>
             <a:r>
-              <a:rPr lang="en-US" sz="4250" dirty="0"/>
+              <a:rPr lang="en-US" sz="2400" dirty="0"/>
               <a:t>Hybrid Application Monitoring </a:t>
             </a:r>
             <a:br>
-              <a:rPr lang="en-US" sz="4250" dirty="0"/>
+              <a:rPr lang="en-US" sz="2400" dirty="0"/>
             </a:br>
             <a:r>
-              <a:rPr lang="en-US" sz="3600" i="1" dirty="0">
+              <a:rPr lang="en-US" sz="2400" dirty="0"/>
+              <a:t>Pitstop: </a:t>
+            </a:r>
+            <a:r>
+              <a:rPr lang="en-US" sz="2400" i="1" dirty="0">
                 <a:solidFill>
                   <a:schemeClr val="bg2">
                     <a:lumMod val="65000"/>
                   </a:schemeClr>
                 </a:solidFill>
               </a:rPr>
-              <a:t>Baseline Journey – Onboard</a:t>
+              <a:t>Onboard</a:t>
             </a:r>
           </a:p>
         </p:txBody>
@@ -47104,35 +47149,46 @@
           <a:lstStyle/>
           <a:p>
             <a:r>
-              <a:rPr lang="en-US" sz="3200" i="1" dirty="0">
+              <a:rPr lang="en-US" sz="2400" dirty="0"/>
+              <a:t>Pitstop: </a:t>
+            </a:r>
+            <a:r>
+              <a:rPr lang="en-US" sz="2400" i="1" u="sng" dirty="0">
                 <a:solidFill>
                   <a:schemeClr val="bg2">
                     <a:lumMod val="65000"/>
                   </a:schemeClr>
                 </a:solidFill>
               </a:rPr>
-              <a:t>Onboard </a:t>
+              <a:t>Onboard</a:t>
             </a:r>
             <a:r>
-              <a:rPr lang="en-US" sz="3200" dirty="0">
+              <a:rPr lang="en-US" sz="2400" i="1" dirty="0">
                 <a:solidFill>
                   <a:schemeClr val="bg2">
                     <a:lumMod val="65000"/>
                   </a:schemeClr>
                 </a:solidFill>
               </a:rPr>
-              <a:t>failed health check </a:t>
+              <a:t> </a:t>
             </a:r>
             <a:r>
-              <a:rPr lang="en-US" sz="3200" u="sng" dirty="0">
+              <a:rPr lang="en-US" sz="2400" dirty="0">
                 <a:solidFill>
                   <a:schemeClr val="bg2">
                     <a:lumMod val="65000"/>
                   </a:schemeClr>
                 </a:solidFill>
               </a:rPr>
-              <a:t>recommendations</a:t>
+              <a:t>has failed health check best-practices</a:t>
             </a:r>
+            <a:endParaRPr lang="en-US" sz="2400" u="sng" dirty="0">
+              <a:solidFill>
+                <a:schemeClr val="bg2">
+                  <a:lumMod val="65000"/>
+                </a:schemeClr>
+              </a:solidFill>
+            </a:endParaRPr>
           </a:p>
         </p:txBody>
       </p:sp>
@@ -47218,21 +47274,25 @@
           <a:lstStyle/>
           <a:p>
             <a:r>
-              <a:rPr lang="en-US" sz="4250" dirty="0"/>
+              <a:rPr lang="en-US" sz="2400" dirty="0"/>
               <a:t>Hybrid Application Monitoring </a:t>
             </a:r>
             <a:br>
-              <a:rPr lang="en-US" sz="4250" dirty="0"/>
+              <a:rPr lang="en-US" sz="2400" dirty="0"/>
             </a:br>
             <a:r>
-              <a:rPr lang="en-US" sz="3600" i="1" dirty="0">
+              <a:rPr lang="en-US" sz="2400" dirty="0"/>
+              <a:t>Pitstop: </a:t>
+            </a:r>
+            <a:r>
+              <a:rPr lang="en-US" sz="2400" i="1" dirty="0">
                 <a:solidFill>
                   <a:schemeClr val="bg2">
                     <a:lumMod val="65000"/>
                   </a:schemeClr>
                 </a:solidFill>
               </a:rPr>
-              <a:t>Baseline Journey - Implement</a:t>
+              <a:t>Implement</a:t>
             </a:r>
           </a:p>
         </p:txBody>
@@ -47319,35 +47379,46 @@
           <a:lstStyle/>
           <a:p>
             <a:r>
-              <a:rPr lang="en-US" sz="3200" i="1" dirty="0">
+              <a:rPr lang="en-US" sz="2400" dirty="0"/>
+              <a:t>Pitstop: </a:t>
+            </a:r>
+            <a:r>
+              <a:rPr lang="en-US" sz="2400" i="1" u="sng" dirty="0">
                 <a:solidFill>
                   <a:schemeClr val="bg2">
                     <a:lumMod val="65000"/>
                   </a:schemeClr>
                 </a:solidFill>
               </a:rPr>
-              <a:t>Implement </a:t>
+              <a:t>Implement</a:t>
             </a:r>
             <a:r>
-              <a:rPr lang="en-US" sz="3200" dirty="0">
+              <a:rPr lang="en-US" sz="2400" i="1" dirty="0">
                 <a:solidFill>
                   <a:schemeClr val="bg2">
                     <a:lumMod val="65000"/>
                   </a:schemeClr>
                 </a:solidFill>
               </a:rPr>
-              <a:t>failed health check </a:t>
+              <a:t> </a:t>
             </a:r>
             <a:r>
-              <a:rPr lang="en-US" sz="3200" u="sng" dirty="0">
+              <a:rPr lang="en-US" sz="2400" dirty="0">
                 <a:solidFill>
                   <a:schemeClr val="bg2">
                     <a:lumMod val="65000"/>
                   </a:schemeClr>
                 </a:solidFill>
               </a:rPr>
-              <a:t>recommendations</a:t>
+              <a:t>has failed health check best-practices</a:t>
             </a:r>
+            <a:endParaRPr lang="en-US" sz="2400" u="sng" dirty="0">
+              <a:solidFill>
+                <a:schemeClr val="bg2">
+                  <a:lumMod val="65000"/>
+                </a:schemeClr>
+              </a:solidFill>
+            </a:endParaRPr>
           </a:p>
         </p:txBody>
       </p:sp>
@@ -47433,21 +47504,25 @@
           <a:lstStyle/>
           <a:p>
             <a:r>
-              <a:rPr lang="en-US" sz="4250" dirty="0"/>
+              <a:rPr lang="en-US" sz="2400" dirty="0"/>
               <a:t>Hybrid Application Monitoring </a:t>
             </a:r>
             <a:br>
-              <a:rPr lang="en-US" sz="4250" dirty="0"/>
+              <a:rPr lang="en-US" sz="2400" dirty="0"/>
             </a:br>
             <a:r>
-              <a:rPr lang="en-US" sz="3600" i="1" dirty="0">
+              <a:rPr lang="en-US" sz="2400" dirty="0"/>
+              <a:t>Pitstop: </a:t>
+            </a:r>
+            <a:r>
+              <a:rPr lang="en-US" sz="2400" i="1" dirty="0">
                 <a:solidFill>
                   <a:schemeClr val="bg2">
                     <a:lumMod val="65000"/>
                   </a:schemeClr>
                 </a:solidFill>
               </a:rPr>
-              <a:t>Baseline Journey - Use</a:t>
+              <a:t>Use</a:t>
             </a:r>
           </a:p>
         </p:txBody>
@@ -47534,35 +47609,46 @@
           <a:lstStyle/>
           <a:p>
             <a:r>
-              <a:rPr lang="en-US" sz="3200" i="1" dirty="0">
+              <a:rPr lang="en-US" sz="2400" dirty="0"/>
+              <a:t>Pitstop: </a:t>
+            </a:r>
+            <a:r>
+              <a:rPr lang="en-US" sz="2400" i="1" u="sng" dirty="0">
                 <a:solidFill>
                   <a:schemeClr val="bg2">
                     <a:lumMod val="65000"/>
                   </a:schemeClr>
                 </a:solidFill>
               </a:rPr>
-              <a:t>Use </a:t>
+              <a:t>Use</a:t>
             </a:r>
             <a:r>
-              <a:rPr lang="en-US" sz="3200" dirty="0">
+              <a:rPr lang="en-US" sz="2400" i="1" dirty="0">
                 <a:solidFill>
                   <a:schemeClr val="bg2">
                     <a:lumMod val="65000"/>
                   </a:schemeClr>
                 </a:solidFill>
               </a:rPr>
-              <a:t>failed health check </a:t>
+              <a:t> </a:t>
             </a:r>
             <a:r>
-              <a:rPr lang="en-US" sz="3200" u="sng" dirty="0">
+              <a:rPr lang="en-US" sz="2400" dirty="0">
                 <a:solidFill>
                   <a:schemeClr val="bg2">
                     <a:lumMod val="65000"/>
                   </a:schemeClr>
                 </a:solidFill>
               </a:rPr>
-              <a:t>recommendations</a:t>
+              <a:t>has failed health check best-practices</a:t>
             </a:r>
+            <a:endParaRPr lang="en-US" sz="2400" u="sng" dirty="0">
+              <a:solidFill>
+                <a:schemeClr val="bg2">
+                  <a:lumMod val="65000"/>
+                </a:schemeClr>
+              </a:solidFill>
+            </a:endParaRPr>
           </a:p>
         </p:txBody>
       </p:sp>
@@ -47648,21 +47734,25 @@
           <a:lstStyle/>
           <a:p>
             <a:r>
-              <a:rPr lang="en-US" sz="4250" dirty="0"/>
+              <a:rPr lang="en-US" sz="2400" dirty="0"/>
               <a:t>Hybrid Application Monitoring </a:t>
             </a:r>
             <a:br>
-              <a:rPr lang="en-US" sz="4250" dirty="0"/>
+              <a:rPr lang="en-US" sz="2400" dirty="0"/>
             </a:br>
             <a:r>
-              <a:rPr lang="en-US" sz="3600" i="1" dirty="0">
+              <a:rPr lang="en-US" sz="2400" dirty="0"/>
+              <a:t>Pitstop: </a:t>
+            </a:r>
+            <a:r>
+              <a:rPr lang="en-US" sz="2400" i="1" dirty="0">
                 <a:solidFill>
                   <a:schemeClr val="bg2">
                     <a:lumMod val="65000"/>
                   </a:schemeClr>
                 </a:solidFill>
               </a:rPr>
-              <a:t>Baseline Journey - Engage</a:t>
+              <a:t>Engage</a:t>
             </a:r>
           </a:p>
         </p:txBody>
@@ -48867,6 +48957,15 @@
 </file>
 
 <file path=customXml/item1.xml><?xml version="1.0" encoding="utf-8"?>
+<?mso-contentType ?>
+<FormTemplates xmlns="http://schemas.microsoft.com/sharepoint/v3/contenttype/forms">
+  <Display>DocumentLibraryForm</Display>
+  <Edit>DocumentLibraryForm</Edit>
+  <New>DocumentLibraryForm</New>
+</FormTemplates>
+</file>
+
+<file path=customXml/item2.xml><?xml version="1.0" encoding="utf-8"?>
 <ct:contentTypeSchema xmlns:ct="http://schemas.microsoft.com/office/2006/metadata/contentType" xmlns:ma="http://schemas.microsoft.com/office/2006/metadata/properties/metaAttributes" ct:_="" ma:_="" ma:contentTypeName="Document" ma:contentTypeID="0x01010016638FBC164A6C4987893577CA81BDCE" ma:contentTypeVersion="12" ma:contentTypeDescription="Create a new document." ma:contentTypeScope="" ma:versionID="ad216d817d9e9210cab45cf1c00ab7cf">
   <xsd:schema xmlns:xsd="http://www.w3.org/2001/XMLSchema" xmlns:xs="http://www.w3.org/2001/XMLSchema" xmlns:p="http://schemas.microsoft.com/office/2006/metadata/properties" xmlns:ns2="c068e80e-f499-4ba4-b97d-8eb81f7bf0a4" xmlns:ns3="d78665ad-f783-4f30-b3cb-b870e5173973" targetNamespace="http://schemas.microsoft.com/office/2006/metadata/properties" ma:root="true" ma:fieldsID="b03d820719e6014dead3958bf2973f6f" ns2:_="" ns3:_="">
     <xsd:import namespace="c068e80e-f499-4ba4-b97d-8eb81f7bf0a4"/>
@@ -49083,15 +49182,6 @@
 </ct:contentTypeSchema>
 </file>
 
-<file path=customXml/item2.xml><?xml version="1.0" encoding="utf-8"?>
-<?mso-contentType ?>
-<FormTemplates xmlns="http://schemas.microsoft.com/sharepoint/v3/contenttype/forms">
-  <Display>DocumentLibraryForm</Display>
-  <Edit>DocumentLibraryForm</Edit>
-  <New>DocumentLibraryForm</New>
-</FormTemplates>
-</file>
-
 <file path=customXml/item3.xml><?xml version="1.0" encoding="utf-8"?>
 <p:properties xmlns:p="http://schemas.microsoft.com/office/2006/metadata/properties" xmlns:xsi="http://www.w3.org/2001/XMLSchema-instance" xmlns:pc="http://schemas.microsoft.com/office/infopath/2007/PartnerControls">
   <documentManagement>
@@ -49111,6 +49201,14 @@
 </file>
 
 <file path=customXml/itemProps1.xml><?xml version="1.0" encoding="utf-8"?>
+<ds:datastoreItem xmlns:ds="http://schemas.openxmlformats.org/officeDocument/2006/customXml" ds:itemID="{2D849882-45D9-49DF-83E9-35AEA65C5DA4}">
+  <ds:schemaRefs>
+    <ds:schemaRef ds:uri="http://schemas.microsoft.com/sharepoint/v3/contenttype/forms"/>
+  </ds:schemaRefs>
+</ds:datastoreItem>
+</file>
+
+<file path=customXml/itemProps2.xml><?xml version="1.0" encoding="utf-8"?>
 <ds:datastoreItem xmlns:ds="http://schemas.openxmlformats.org/officeDocument/2006/customXml" ds:itemID="{BFF5C609-47B2-4E38-98DE-50447A64B0AF}">
   <ds:schemaRefs>
     <ds:schemaRef ds:uri="http://schemas.microsoft.com/office/2006/metadata/contentType"/>
@@ -49125,14 +49223,6 @@
     <ds:schemaRef ds:uri="http://purl.org/dc/elements/1.1/"/>
     <ds:schemaRef ds:uri="http://purl.org/dc/terms/"/>
     <ds:schemaRef ds:uri="http://schemas.microsoft.com/internal/obd"/>
-  </ds:schemaRefs>
-</ds:datastoreItem>
-</file>
-
-<file path=customXml/itemProps2.xml><?xml version="1.0" encoding="utf-8"?>
-<ds:datastoreItem xmlns:ds="http://schemas.openxmlformats.org/officeDocument/2006/customXml" ds:itemID="{2D849882-45D9-49DF-83E9-35AEA65C5DA4}">
-  <ds:schemaRefs>
-    <ds:schemaRef ds:uri="http://schemas.microsoft.com/sharepoint/v3/contenttype/forms"/>
   </ds:schemaRefs>
 </ds:datastoreItem>
 </file>

</xml_diff>

<commit_message>
finalized remediation steps for report, fixed test, prepping for new release
</commit_message>
<xml_diff>
--- a/backend/resources/pptAssets/HybridApplicationMonitoringUseCase_template.pptx
+++ b/backend/resources/pptAssets/HybridApplicationMonitoringUseCase_template.pptx
@@ -293,7 +293,7 @@
           <a:p>
             <a:fld id="{702657A2-7B7A-174B-A542-3B4C9FC943CD}" type="datetimeFigureOut">
               <a:rPr lang="en-US" smtClean="0"/>
-              <a:t>4/14/23</a:t>
+              <a:t>4/20/23</a:t>
             </a:fld>
             <a:endParaRPr lang="en-US"/>
           </a:p>
@@ -2886,7 +2886,7 @@
           </a:ln>
           <a:extLst>
             <a:ext uri="{FAA26D3D-D897-4be2-8F04-BA451C77F1D7}">
-              <ma14:placeholderFlag xmlns="" xmlns:ma14="http://schemas.microsoft.com/office/mac/drawingml/2011/main" val="1"/>
+              <ma14:placeholderFlag xmlns:ma14="http://schemas.microsoft.com/office/mac/drawingml/2011/main" xmlns="" val="1"/>
             </a:ext>
           </a:extLst>
         </p:spPr>
@@ -4900,7 +4900,7 @@
           </a:ln>
           <a:extLst>
             <a:ext uri="{FAA26D3D-D897-4be2-8F04-BA451C77F1D7}">
-              <ma14:placeholderFlag xmlns="" xmlns:ma14="http://schemas.microsoft.com/office/mac/drawingml/2011/main" val="1"/>
+              <ma14:placeholderFlag xmlns:ma14="http://schemas.microsoft.com/office/mac/drawingml/2011/main" xmlns="" val="1"/>
             </a:ext>
           </a:extLst>
         </p:spPr>
@@ -5619,7 +5619,7 @@
           </a:ln>
           <a:extLst>
             <a:ext uri="{FAA26D3D-D897-4be2-8F04-BA451C77F1D7}">
-              <ma14:placeholderFlag xmlns="" xmlns:ma14="http://schemas.microsoft.com/office/mac/drawingml/2011/main" val="1"/>
+              <ma14:placeholderFlag xmlns:ma14="http://schemas.microsoft.com/office/mac/drawingml/2011/main" xmlns="" val="1"/>
             </a:ext>
           </a:extLst>
         </p:spPr>
@@ -7117,7 +7117,7 @@
               </a14:hiddenLine>
             </a:ext>
             <a:ext uri="{FAA26D3D-D897-4be2-8F04-BA451C77F1D7}">
-              <ma14:placeholderFlag xmlns="" xmlns:ma14="http://schemas.microsoft.com/office/mac/drawingml/2011/main" val="1"/>
+              <ma14:placeholderFlag xmlns:ma14="http://schemas.microsoft.com/office/mac/drawingml/2011/main" xmlns="" val="1"/>
             </a:ext>
           </a:extLst>
         </p:spPr>
@@ -7365,7 +7365,7 @@
               </a14:hiddenLine>
             </a:ext>
             <a:ext uri="{FAA26D3D-D897-4be2-8F04-BA451C77F1D7}">
-              <ma14:placeholderFlag xmlns="" xmlns:ma14="http://schemas.microsoft.com/office/mac/drawingml/2011/main" val="1"/>
+              <ma14:placeholderFlag xmlns:ma14="http://schemas.microsoft.com/office/mac/drawingml/2011/main" xmlns="" val="1"/>
             </a:ext>
           </a:extLst>
         </p:spPr>
@@ -7634,7 +7634,7 @@
               </a14:hiddenLine>
             </a:ext>
             <a:ext uri="{FAA26D3D-D897-4be2-8F04-BA451C77F1D7}">
-              <ma14:placeholderFlag xmlns:ma14="http://schemas.microsoft.com/office/mac/drawingml/2011/main" xmlns="" val="1"/>
+              <ma14:placeholderFlag xmlns="" xmlns:ma14="http://schemas.microsoft.com/office/mac/drawingml/2011/main" val="1"/>
             </a:ext>
           </a:extLst>
         </p:spPr>
@@ -8064,14 +8064,14 @@
           </a:ln>
           <a:extLst>
             <a:ext uri="{909E8E84-426E-40dd-AFC4-6F175D3DCCD1}">
-              <a14:hiddenFill xmlns="" xmlns:a14="http://schemas.microsoft.com/office/drawing/2010/main">
+              <a14:hiddenFill xmlns:a14="http://schemas.microsoft.com/office/drawing/2010/main" xmlns="">
                 <a:solidFill>
                   <a:srgbClr val="FFFFFF"/>
                 </a:solidFill>
               </a14:hiddenFill>
             </a:ext>
             <a:ext uri="{91240B29-F687-4f45-9708-019B960494DF}">
-              <a14:hiddenLine xmlns="" xmlns:a14="http://schemas.microsoft.com/office/drawing/2010/main" w="9525">
+              <a14:hiddenLine xmlns:a14="http://schemas.microsoft.com/office/drawing/2010/main" xmlns="" w="9525">
                 <a:solidFill>
                   <a:srgbClr val="000000"/>
                 </a:solidFill>
@@ -10042,7 +10042,7 @@
           </a:ln>
           <a:extLst>
             <a:ext uri="{FAA26D3D-D897-4be2-8F04-BA451C77F1D7}">
-              <ma14:placeholderFlag xmlns="" xmlns:ma14="http://schemas.microsoft.com/office/mac/drawingml/2011/main" val="1"/>
+              <ma14:placeholderFlag xmlns:ma14="http://schemas.microsoft.com/office/mac/drawingml/2011/main" xmlns="" val="1"/>
             </a:ext>
           </a:extLst>
         </p:spPr>
@@ -11718,7 +11718,7 @@
           </a:ln>
           <a:extLst>
             <a:ext uri="{FAA26D3D-D897-4be2-8F04-BA451C77F1D7}">
-              <ma14:placeholderFlag xmlns="" xmlns:ma14="http://schemas.microsoft.com/office/mac/drawingml/2011/main" val="1"/>
+              <ma14:placeholderFlag xmlns:ma14="http://schemas.microsoft.com/office/mac/drawingml/2011/main" xmlns="" val="1"/>
             </a:ext>
           </a:extLst>
         </p:spPr>
@@ -12312,7 +12312,7 @@
           </a:ln>
           <a:extLst>
             <a:ext uri="{FAA26D3D-D897-4be2-8F04-BA451C77F1D7}">
-              <ma14:placeholderFlag xmlns="" xmlns:ma14="http://schemas.microsoft.com/office/mac/drawingml/2011/main" val="1"/>
+              <ma14:placeholderFlag xmlns:ma14="http://schemas.microsoft.com/office/mac/drawingml/2011/main" xmlns="" val="1"/>
             </a:ext>
           </a:extLst>
         </p:spPr>
@@ -12677,7 +12677,7 @@
           </a:ln>
           <a:extLst>
             <a:ext uri="{FAA26D3D-D897-4be2-8F04-BA451C77F1D7}">
-              <ma14:placeholderFlag xmlns="" xmlns:ma14="http://schemas.microsoft.com/office/mac/drawingml/2011/main" val="1"/>
+              <ma14:placeholderFlag xmlns:ma14="http://schemas.microsoft.com/office/mac/drawingml/2011/main" xmlns="" val="1"/>
             </a:ext>
           </a:extLst>
         </p:spPr>
@@ -13321,7 +13321,7 @@
           </a:ln>
           <a:extLst>
             <a:ext uri="{FAA26D3D-D897-4be2-8F04-BA451C77F1D7}">
-              <ma14:placeholderFlag xmlns="" xmlns:ma14="http://schemas.microsoft.com/office/mac/drawingml/2011/main" val="1"/>
+              <ma14:placeholderFlag xmlns:ma14="http://schemas.microsoft.com/office/mac/drawingml/2011/main" xmlns="" val="1"/>
             </a:ext>
           </a:extLst>
         </p:spPr>
@@ -13568,7 +13568,7 @@
           </a:ln>
           <a:extLst>
             <a:ext uri="{FAA26D3D-D897-4be2-8F04-BA451C77F1D7}">
-              <ma14:placeholderFlag xmlns="" xmlns:ma14="http://schemas.microsoft.com/office/mac/drawingml/2011/main" val="1"/>
+              <ma14:placeholderFlag xmlns:ma14="http://schemas.microsoft.com/office/mac/drawingml/2011/main" xmlns="" val="1"/>
             </a:ext>
           </a:extLst>
         </p:spPr>
@@ -16247,7 +16247,7 @@
           </a:ln>
           <a:extLst>
             <a:ext uri="{FAA26D3D-D897-4be2-8F04-BA451C77F1D7}">
-              <ma14:placeholderFlag xmlns="" xmlns:ma14="http://schemas.microsoft.com/office/mac/drawingml/2011/main" val="1"/>
+              <ma14:placeholderFlag xmlns:ma14="http://schemas.microsoft.com/office/mac/drawingml/2011/main" xmlns="" val="1"/>
             </a:ext>
           </a:extLst>
         </p:spPr>
@@ -16966,7 +16966,7 @@
           </a:ln>
           <a:extLst>
             <a:ext uri="{FAA26D3D-D897-4be2-8F04-BA451C77F1D7}">
-              <ma14:placeholderFlag xmlns="" xmlns:ma14="http://schemas.microsoft.com/office/mac/drawingml/2011/main" val="1"/>
+              <ma14:placeholderFlag xmlns:ma14="http://schemas.microsoft.com/office/mac/drawingml/2011/main" xmlns="" val="1"/>
             </a:ext>
           </a:extLst>
         </p:spPr>
@@ -18082,7 +18082,7 @@
               </a14:hiddenLine>
             </a:ext>
             <a:ext uri="{FAA26D3D-D897-4be2-8F04-BA451C77F1D7}">
-              <ma14:placeholderFlag xmlns="" xmlns:ma14="http://schemas.microsoft.com/office/mac/drawingml/2011/main" val="1"/>
+              <ma14:placeholderFlag xmlns:ma14="http://schemas.microsoft.com/office/mac/drawingml/2011/main" xmlns="" val="1"/>
             </a:ext>
           </a:extLst>
         </p:spPr>
@@ -18351,7 +18351,7 @@
               </a14:hiddenLine>
             </a:ext>
             <a:ext uri="{FAA26D3D-D897-4be2-8F04-BA451C77F1D7}">
-              <ma14:placeholderFlag xmlns:ma14="http://schemas.microsoft.com/office/mac/drawingml/2011/main" xmlns="" val="1"/>
+              <ma14:placeholderFlag xmlns="" xmlns:ma14="http://schemas.microsoft.com/office/mac/drawingml/2011/main" val="1"/>
             </a:ext>
           </a:extLst>
         </p:spPr>
@@ -21900,7 +21900,7 @@
               </a14:hiddenLine>
             </a:ext>
             <a:ext uri="{FAA26D3D-D897-4be2-8F04-BA451C77F1D7}">
-              <ma14:placeholderFlag xmlns="" xmlns:ma14="http://schemas.microsoft.com/office/mac/drawingml/2011/main" val="1"/>
+              <ma14:placeholderFlag xmlns:ma14="http://schemas.microsoft.com/office/mac/drawingml/2011/main" xmlns="" val="1"/>
             </a:ext>
           </a:extLst>
         </p:spPr>
@@ -24476,7 +24476,7 @@
               </a14:hiddenLine>
             </a:ext>
             <a:ext uri="{FAA26D3D-D897-4be2-8F04-BA451C77F1D7}">
-              <ma14:placeholderFlag xmlns="" xmlns:ma14="http://schemas.microsoft.com/office/mac/drawingml/2011/main" val="1"/>
+              <ma14:placeholderFlag xmlns:ma14="http://schemas.microsoft.com/office/mac/drawingml/2011/main" xmlns="" val="1"/>
             </a:ext>
           </a:extLst>
         </p:spPr>
@@ -25983,7 +25983,7 @@
           </a:ln>
           <a:extLst>
             <a:ext uri="{FAA26D3D-D897-4be2-8F04-BA451C77F1D7}">
-              <ma14:placeholderFlag xmlns="" xmlns:ma14="http://schemas.microsoft.com/office/mac/drawingml/2011/main" val="1"/>
+              <ma14:placeholderFlag xmlns:ma14="http://schemas.microsoft.com/office/mac/drawingml/2011/main" xmlns="" val="1"/>
             </a:ext>
           </a:extLst>
         </p:spPr>
@@ -27116,7 +27116,7 @@
           </a:ln>
           <a:extLst>
             <a:ext uri="{FAA26D3D-D897-4be2-8F04-BA451C77F1D7}">
-              <ma14:placeholderFlag xmlns="" xmlns:ma14="http://schemas.microsoft.com/office/mac/drawingml/2011/main" val="1"/>
+              <ma14:placeholderFlag xmlns:ma14="http://schemas.microsoft.com/office/mac/drawingml/2011/main" xmlns="" val="1"/>
             </a:ext>
           </a:extLst>
         </p:spPr>
@@ -27710,7 +27710,7 @@
           </a:ln>
           <a:extLst>
             <a:ext uri="{FAA26D3D-D897-4be2-8F04-BA451C77F1D7}">
-              <ma14:placeholderFlag xmlns="" xmlns:ma14="http://schemas.microsoft.com/office/mac/drawingml/2011/main" val="1"/>
+              <ma14:placeholderFlag xmlns:ma14="http://schemas.microsoft.com/office/mac/drawingml/2011/main" xmlns="" val="1"/>
             </a:ext>
           </a:extLst>
         </p:spPr>
@@ -28369,7 +28369,7 @@
           </a:ln>
           <a:extLst>
             <a:ext uri="{FAA26D3D-D897-4be2-8F04-BA451C77F1D7}">
-              <ma14:placeholderFlag xmlns="" xmlns:ma14="http://schemas.microsoft.com/office/mac/drawingml/2011/main" val="1"/>
+              <ma14:placeholderFlag xmlns:ma14="http://schemas.microsoft.com/office/mac/drawingml/2011/main" xmlns="" val="1"/>
             </a:ext>
           </a:extLst>
         </p:spPr>
@@ -29013,7 +29013,7 @@
           </a:ln>
           <a:extLst>
             <a:ext uri="{FAA26D3D-D897-4be2-8F04-BA451C77F1D7}">
-              <ma14:placeholderFlag xmlns="" xmlns:ma14="http://schemas.microsoft.com/office/mac/drawingml/2011/main" val="1"/>
+              <ma14:placeholderFlag xmlns:ma14="http://schemas.microsoft.com/office/mac/drawingml/2011/main" xmlns="" val="1"/>
             </a:ext>
           </a:extLst>
         </p:spPr>
@@ -29260,7 +29260,7 @@
           </a:ln>
           <a:extLst>
             <a:ext uri="{FAA26D3D-D897-4be2-8F04-BA451C77F1D7}">
-              <ma14:placeholderFlag xmlns="" xmlns:ma14="http://schemas.microsoft.com/office/mac/drawingml/2011/main" val="1"/>
+              <ma14:placeholderFlag xmlns:ma14="http://schemas.microsoft.com/office/mac/drawingml/2011/main" xmlns="" val="1"/>
             </a:ext>
           </a:extLst>
         </p:spPr>
@@ -31274,7 +31274,7 @@
           </a:ln>
           <a:extLst>
             <a:ext uri="{FAA26D3D-D897-4be2-8F04-BA451C77F1D7}">
-              <ma14:placeholderFlag xmlns="" xmlns:ma14="http://schemas.microsoft.com/office/mac/drawingml/2011/main" val="1"/>
+              <ma14:placeholderFlag xmlns:ma14="http://schemas.microsoft.com/office/mac/drawingml/2011/main" xmlns="" val="1"/>
             </a:ext>
           </a:extLst>
         </p:spPr>
@@ -31993,7 +31993,7 @@
           </a:ln>
           <a:extLst>
             <a:ext uri="{FAA26D3D-D897-4be2-8F04-BA451C77F1D7}">
-              <ma14:placeholderFlag xmlns="" xmlns:ma14="http://schemas.microsoft.com/office/mac/drawingml/2011/main" val="1"/>
+              <ma14:placeholderFlag xmlns:ma14="http://schemas.microsoft.com/office/mac/drawingml/2011/main" xmlns="" val="1"/>
             </a:ext>
           </a:extLst>
         </p:spPr>
@@ -33425,7 +33425,7 @@
               </a14:hiddenLine>
             </a:ext>
             <a:ext uri="{FAA26D3D-D897-4be2-8F04-BA451C77F1D7}">
-              <ma14:placeholderFlag xmlns:ma14="http://schemas.microsoft.com/office/mac/drawingml/2011/main" xmlns="" val="1"/>
+              <ma14:placeholderFlag xmlns="" xmlns:ma14="http://schemas.microsoft.com/office/mac/drawingml/2011/main" val="1"/>
             </a:ext>
           </a:extLst>
         </p:spPr>
@@ -33863,7 +33863,7 @@
               </a14:hiddenLine>
             </a:ext>
             <a:ext uri="{FAA26D3D-D897-4be2-8F04-BA451C77F1D7}">
-              <ma14:placeholderFlag xmlns="" xmlns:ma14="http://schemas.microsoft.com/office/mac/drawingml/2011/main" val="1"/>
+              <ma14:placeholderFlag xmlns:ma14="http://schemas.microsoft.com/office/mac/drawingml/2011/main" xmlns="" val="1"/>
             </a:ext>
           </a:extLst>
         </p:spPr>
@@ -36561,7 +36561,7 @@
               </a14:hiddenLine>
             </a:ext>
             <a:ext uri="{FAA26D3D-D897-4be2-8F04-BA451C77F1D7}">
-              <ma14:placeholderFlag xmlns="" xmlns:ma14="http://schemas.microsoft.com/office/mac/drawingml/2011/main" val="1"/>
+              <ma14:placeholderFlag xmlns:ma14="http://schemas.microsoft.com/office/mac/drawingml/2011/main" xmlns="" val="1"/>
             </a:ext>
           </a:extLst>
         </p:spPr>
@@ -40940,7 +40940,7 @@
           </a:ln>
           <a:extLst>
             <a:ext uri="{FAA26D3D-D897-4be2-8F04-BA451C77F1D7}">
-              <ma14:placeholderFlag xmlns="" xmlns:ma14="http://schemas.microsoft.com/office/mac/drawingml/2011/main" val="1"/>
+              <ma14:placeholderFlag xmlns:ma14="http://schemas.microsoft.com/office/mac/drawingml/2011/main" xmlns="" val="1"/>
             </a:ext>
           </a:extLst>
         </p:spPr>
@@ -42073,7 +42073,7 @@
           </a:ln>
           <a:extLst>
             <a:ext uri="{FAA26D3D-D897-4be2-8F04-BA451C77F1D7}">
-              <ma14:placeholderFlag xmlns="" xmlns:ma14="http://schemas.microsoft.com/office/mac/drawingml/2011/main" val="1"/>
+              <ma14:placeholderFlag xmlns:ma14="http://schemas.microsoft.com/office/mac/drawingml/2011/main" xmlns="" val="1"/>
             </a:ext>
           </a:extLst>
         </p:spPr>
@@ -42667,7 +42667,7 @@
           </a:ln>
           <a:extLst>
             <a:ext uri="{FAA26D3D-D897-4be2-8F04-BA451C77F1D7}">
-              <ma14:placeholderFlag xmlns="" xmlns:ma14="http://schemas.microsoft.com/office/mac/drawingml/2011/main" val="1"/>
+              <ma14:placeholderFlag xmlns:ma14="http://schemas.microsoft.com/office/mac/drawingml/2011/main" xmlns="" val="1"/>
             </a:ext>
           </a:extLst>
         </p:spPr>
@@ -43032,7 +43032,7 @@
           </a:ln>
           <a:extLst>
             <a:ext uri="{FAA26D3D-D897-4be2-8F04-BA451C77F1D7}">
-              <ma14:placeholderFlag xmlns="" xmlns:ma14="http://schemas.microsoft.com/office/mac/drawingml/2011/main" val="1"/>
+              <ma14:placeholderFlag xmlns:ma14="http://schemas.microsoft.com/office/mac/drawingml/2011/main" xmlns="" val="1"/>
             </a:ext>
           </a:extLst>
         </p:spPr>
@@ -43676,7 +43676,7 @@
           </a:ln>
           <a:extLst>
             <a:ext uri="{FAA26D3D-D897-4be2-8F04-BA451C77F1D7}">
-              <ma14:placeholderFlag xmlns="" xmlns:ma14="http://schemas.microsoft.com/office/mac/drawingml/2011/main" val="1"/>
+              <ma14:placeholderFlag xmlns:ma14="http://schemas.microsoft.com/office/mac/drawingml/2011/main" xmlns="" val="1"/>
             </a:ext>
           </a:extLst>
         </p:spPr>
@@ -47180,7 +47180,17 @@
                   </a:schemeClr>
                 </a:solidFill>
               </a:rPr>
-              <a:t>has failed health check best-practices</a:t>
+              <a:t>resources </a:t>
+            </a:r>
+            <a:r>
+              <a:rPr lang="en-US" sz="2400">
+                <a:solidFill>
+                  <a:schemeClr val="bg2">
+                    <a:lumMod val="65000"/>
+                  </a:schemeClr>
+                </a:solidFill>
+              </a:rPr>
+              <a:t>and documents</a:t>
             </a:r>
             <a:endParaRPr lang="en-US" sz="2400" u="sng" dirty="0">
               <a:solidFill>
@@ -48957,12 +48967,21 @@
 </file>
 
 <file path=customXml/item1.xml><?xml version="1.0" encoding="utf-8"?>
-<?mso-contentType ?>
-<FormTemplates xmlns="http://schemas.microsoft.com/sharepoint/v3/contenttype/forms">
-  <Display>DocumentLibraryForm</Display>
-  <Edit>DocumentLibraryForm</Edit>
-  <New>DocumentLibraryForm</New>
-</FormTemplates>
+<p:properties xmlns:p="http://schemas.microsoft.com/office/2006/metadata/properties" xmlns:xsi="http://www.w3.org/2001/XMLSchema-instance" xmlns:pc="http://schemas.microsoft.com/office/infopath/2007/PartnerControls">
+  <documentManagement>
+    <TaxCatchAll xmlns="d78665ad-f783-4f30-b3cb-b870e5173973" xsi:nil="true"/>
+    <lcf76f155ced4ddcb4097134ff3c332f xmlns="c068e80e-f499-4ba4-b97d-8eb81f7bf0a4">
+      <Terms xmlns="http://schemas.microsoft.com/office/infopath/2007/PartnerControls"/>
+    </lcf76f155ced4ddcb4097134ff3c332f>
+    <SharedWithUsers xmlns="d78665ad-f783-4f30-b3cb-b870e5173973">
+      <UserInfo>
+        <DisplayName>Christine Sumner (chsumner)</DisplayName>
+        <AccountId>229</AccountId>
+        <AccountType/>
+      </UserInfo>
+    </SharedWithUsers>
+  </documentManagement>
+</p:properties>
 </file>
 
 <file path=customXml/item2.xml><?xml version="1.0" encoding="utf-8"?>
@@ -49183,27 +49202,29 @@
 </file>
 
 <file path=customXml/item3.xml><?xml version="1.0" encoding="utf-8"?>
-<p:properties xmlns:p="http://schemas.microsoft.com/office/2006/metadata/properties" xmlns:xsi="http://www.w3.org/2001/XMLSchema-instance" xmlns:pc="http://schemas.microsoft.com/office/infopath/2007/PartnerControls">
-  <documentManagement>
-    <TaxCatchAll xmlns="d78665ad-f783-4f30-b3cb-b870e5173973" xsi:nil="true"/>
-    <lcf76f155ced4ddcb4097134ff3c332f xmlns="c068e80e-f499-4ba4-b97d-8eb81f7bf0a4">
-      <Terms xmlns="http://schemas.microsoft.com/office/infopath/2007/PartnerControls"/>
-    </lcf76f155ced4ddcb4097134ff3c332f>
-    <SharedWithUsers xmlns="d78665ad-f783-4f30-b3cb-b870e5173973">
-      <UserInfo>
-        <DisplayName>Christine Sumner (chsumner)</DisplayName>
-        <AccountId>229</AccountId>
-        <AccountType/>
-      </UserInfo>
-    </SharedWithUsers>
-  </documentManagement>
-</p:properties>
+<?mso-contentType ?>
+<FormTemplates xmlns="http://schemas.microsoft.com/sharepoint/v3/contenttype/forms">
+  <Display>DocumentLibraryForm</Display>
+  <Edit>DocumentLibraryForm</Edit>
+  <New>DocumentLibraryForm</New>
+</FormTemplates>
 </file>
 
 <file path=customXml/itemProps1.xml><?xml version="1.0" encoding="utf-8"?>
-<ds:datastoreItem xmlns:ds="http://schemas.openxmlformats.org/officeDocument/2006/customXml" ds:itemID="{2D849882-45D9-49DF-83E9-35AEA65C5DA4}">
+<ds:datastoreItem xmlns:ds="http://schemas.openxmlformats.org/officeDocument/2006/customXml" ds:itemID="{B2A938C6-D422-428A-8901-D36A71A3A66F}">
   <ds:schemaRefs>
-    <ds:schemaRef ds:uri="http://schemas.microsoft.com/sharepoint/v3/contenttype/forms"/>
+    <ds:schemaRef ds:uri="http://purl.org/dc/elements/1.1/"/>
+    <ds:schemaRef ds:uri="http://schemas.microsoft.com/office/2006/metadata/properties"/>
+    <ds:schemaRef ds:uri="http://schemas.microsoft.com/office/infopath/2007/PartnerControls"/>
+    <ds:schemaRef ds:uri="180b1fcd-839f-4a26-858f-c876bd57a246"/>
+    <ds:schemaRef ds:uri="http://schemas.microsoft.com/office/2006/documentManagement/types"/>
+    <ds:schemaRef ds:uri="http://www.w3.org/XML/1998/namespace"/>
+    <ds:schemaRef ds:uri="http://purl.org/dc/dcmitype/"/>
+    <ds:schemaRef ds:uri="http://schemas.openxmlformats.org/package/2006/metadata/core-properties"/>
+    <ds:schemaRef ds:uri="73ca1fc6-0d46-4993-8256-3326399461c5"/>
+    <ds:schemaRef ds:uri="http://purl.org/dc/terms/"/>
+    <ds:schemaRef ds:uri="d78665ad-f783-4f30-b3cb-b870e5173973"/>
+    <ds:schemaRef ds:uri="c068e80e-f499-4ba4-b97d-8eb81f7bf0a4"/>
   </ds:schemaRefs>
 </ds:datastoreItem>
 </file>
@@ -49228,20 +49249,9 @@
 </file>
 
 <file path=customXml/itemProps3.xml><?xml version="1.0" encoding="utf-8"?>
-<ds:datastoreItem xmlns:ds="http://schemas.openxmlformats.org/officeDocument/2006/customXml" ds:itemID="{B2A938C6-D422-428A-8901-D36A71A3A66F}">
+<ds:datastoreItem xmlns:ds="http://schemas.openxmlformats.org/officeDocument/2006/customXml" ds:itemID="{2D849882-45D9-49DF-83E9-35AEA65C5DA4}">
   <ds:schemaRefs>
-    <ds:schemaRef ds:uri="http://purl.org/dc/elements/1.1/"/>
-    <ds:schemaRef ds:uri="http://schemas.microsoft.com/office/2006/metadata/properties"/>
-    <ds:schemaRef ds:uri="http://schemas.microsoft.com/office/infopath/2007/PartnerControls"/>
-    <ds:schemaRef ds:uri="180b1fcd-839f-4a26-858f-c876bd57a246"/>
-    <ds:schemaRef ds:uri="http://schemas.microsoft.com/office/2006/documentManagement/types"/>
-    <ds:schemaRef ds:uri="http://www.w3.org/XML/1998/namespace"/>
-    <ds:schemaRef ds:uri="http://purl.org/dc/dcmitype/"/>
-    <ds:schemaRef ds:uri="http://schemas.openxmlformats.org/package/2006/metadata/core-properties"/>
-    <ds:schemaRef ds:uri="73ca1fc6-0d46-4993-8256-3326399461c5"/>
-    <ds:schemaRef ds:uri="http://purl.org/dc/terms/"/>
-    <ds:schemaRef ds:uri="d78665ad-f783-4f30-b3cb-b870e5173973"/>
-    <ds:schemaRef ds:uri="c068e80e-f499-4ba4-b97d-8eb81f7bf0a4"/>
+    <ds:schemaRef ds:uri="http://schemas.microsoft.com/sharepoint/v3/contenttype/forms"/>
   </ds:schemaRefs>
 </ds:datastoreItem>
 </file>
</xml_diff>

<commit_message>
markup racetrack with visual pass/fail checkmarks for aesthetics
</commit_message>
<xml_diff>
--- a/backend/resources/pptAssets/HybridApplicationMonitoringUseCase_template.pptx
+++ b/backend/resources/pptAssets/HybridApplicationMonitoringUseCase_template.pptx
@@ -293,7 +293,7 @@
           <a:p>
             <a:fld id="{702657A2-7B7A-174B-A542-3B4C9FC943CD}" type="datetimeFigureOut">
               <a:rPr lang="en-US" smtClean="0"/>
-              <a:t>4/20/23</a:t>
+              <a:t>4/21/23</a:t>
             </a:fld>
             <a:endParaRPr lang="en-US"/>
           </a:p>
@@ -2886,7 +2886,7 @@
           </a:ln>
           <a:extLst>
             <a:ext uri="{FAA26D3D-D897-4be2-8F04-BA451C77F1D7}">
-              <ma14:placeholderFlag xmlns:ma14="http://schemas.microsoft.com/office/mac/drawingml/2011/main" xmlns="" val="1"/>
+              <ma14:placeholderFlag xmlns="" xmlns:ma14="http://schemas.microsoft.com/office/mac/drawingml/2011/main" val="1"/>
             </a:ext>
           </a:extLst>
         </p:spPr>
@@ -4900,7 +4900,7 @@
           </a:ln>
           <a:extLst>
             <a:ext uri="{FAA26D3D-D897-4be2-8F04-BA451C77F1D7}">
-              <ma14:placeholderFlag xmlns:ma14="http://schemas.microsoft.com/office/mac/drawingml/2011/main" xmlns="" val="1"/>
+              <ma14:placeholderFlag xmlns="" xmlns:ma14="http://schemas.microsoft.com/office/mac/drawingml/2011/main" val="1"/>
             </a:ext>
           </a:extLst>
         </p:spPr>
@@ -5619,7 +5619,7 @@
           </a:ln>
           <a:extLst>
             <a:ext uri="{FAA26D3D-D897-4be2-8F04-BA451C77F1D7}">
-              <ma14:placeholderFlag xmlns:ma14="http://schemas.microsoft.com/office/mac/drawingml/2011/main" xmlns="" val="1"/>
+              <ma14:placeholderFlag xmlns="" xmlns:ma14="http://schemas.microsoft.com/office/mac/drawingml/2011/main" val="1"/>
             </a:ext>
           </a:extLst>
         </p:spPr>
@@ -7117,7 +7117,7 @@
               </a14:hiddenLine>
             </a:ext>
             <a:ext uri="{FAA26D3D-D897-4be2-8F04-BA451C77F1D7}">
-              <ma14:placeholderFlag xmlns:ma14="http://schemas.microsoft.com/office/mac/drawingml/2011/main" xmlns="" val="1"/>
+              <ma14:placeholderFlag xmlns="" xmlns:ma14="http://schemas.microsoft.com/office/mac/drawingml/2011/main" val="1"/>
             </a:ext>
           </a:extLst>
         </p:spPr>
@@ -7365,7 +7365,7 @@
               </a14:hiddenLine>
             </a:ext>
             <a:ext uri="{FAA26D3D-D897-4be2-8F04-BA451C77F1D7}">
-              <ma14:placeholderFlag xmlns:ma14="http://schemas.microsoft.com/office/mac/drawingml/2011/main" xmlns="" val="1"/>
+              <ma14:placeholderFlag xmlns="" xmlns:ma14="http://schemas.microsoft.com/office/mac/drawingml/2011/main" val="1"/>
             </a:ext>
           </a:extLst>
         </p:spPr>
@@ -7634,7 +7634,7 @@
               </a14:hiddenLine>
             </a:ext>
             <a:ext uri="{FAA26D3D-D897-4be2-8F04-BA451C77F1D7}">
-              <ma14:placeholderFlag xmlns="" xmlns:ma14="http://schemas.microsoft.com/office/mac/drawingml/2011/main" val="1"/>
+              <ma14:placeholderFlag xmlns:ma14="http://schemas.microsoft.com/office/mac/drawingml/2011/main" xmlns="" val="1"/>
             </a:ext>
           </a:extLst>
         </p:spPr>
@@ -8064,14 +8064,14 @@
           </a:ln>
           <a:extLst>
             <a:ext uri="{909E8E84-426E-40dd-AFC4-6F175D3DCCD1}">
-              <a14:hiddenFill xmlns:a14="http://schemas.microsoft.com/office/drawing/2010/main" xmlns="">
+              <a14:hiddenFill xmlns="" xmlns:a14="http://schemas.microsoft.com/office/drawing/2010/main">
                 <a:solidFill>
                   <a:srgbClr val="FFFFFF"/>
                 </a:solidFill>
               </a14:hiddenFill>
             </a:ext>
             <a:ext uri="{91240B29-F687-4f45-9708-019B960494DF}">
-              <a14:hiddenLine xmlns:a14="http://schemas.microsoft.com/office/drawing/2010/main" xmlns="" w="9525">
+              <a14:hiddenLine xmlns="" xmlns:a14="http://schemas.microsoft.com/office/drawing/2010/main" w="9525">
                 <a:solidFill>
                   <a:srgbClr val="000000"/>
                 </a:solidFill>
@@ -10042,7 +10042,7 @@
           </a:ln>
           <a:extLst>
             <a:ext uri="{FAA26D3D-D897-4be2-8F04-BA451C77F1D7}">
-              <ma14:placeholderFlag xmlns:ma14="http://schemas.microsoft.com/office/mac/drawingml/2011/main" xmlns="" val="1"/>
+              <ma14:placeholderFlag xmlns="" xmlns:ma14="http://schemas.microsoft.com/office/mac/drawingml/2011/main" val="1"/>
             </a:ext>
           </a:extLst>
         </p:spPr>
@@ -11718,7 +11718,7 @@
           </a:ln>
           <a:extLst>
             <a:ext uri="{FAA26D3D-D897-4be2-8F04-BA451C77F1D7}">
-              <ma14:placeholderFlag xmlns:ma14="http://schemas.microsoft.com/office/mac/drawingml/2011/main" xmlns="" val="1"/>
+              <ma14:placeholderFlag xmlns="" xmlns:ma14="http://schemas.microsoft.com/office/mac/drawingml/2011/main" val="1"/>
             </a:ext>
           </a:extLst>
         </p:spPr>
@@ -12312,7 +12312,7 @@
           </a:ln>
           <a:extLst>
             <a:ext uri="{FAA26D3D-D897-4be2-8F04-BA451C77F1D7}">
-              <ma14:placeholderFlag xmlns:ma14="http://schemas.microsoft.com/office/mac/drawingml/2011/main" xmlns="" val="1"/>
+              <ma14:placeholderFlag xmlns="" xmlns:ma14="http://schemas.microsoft.com/office/mac/drawingml/2011/main" val="1"/>
             </a:ext>
           </a:extLst>
         </p:spPr>
@@ -12677,7 +12677,7 @@
           </a:ln>
           <a:extLst>
             <a:ext uri="{FAA26D3D-D897-4be2-8F04-BA451C77F1D7}">
-              <ma14:placeholderFlag xmlns:ma14="http://schemas.microsoft.com/office/mac/drawingml/2011/main" xmlns="" val="1"/>
+              <ma14:placeholderFlag xmlns="" xmlns:ma14="http://schemas.microsoft.com/office/mac/drawingml/2011/main" val="1"/>
             </a:ext>
           </a:extLst>
         </p:spPr>
@@ -13321,7 +13321,7 @@
           </a:ln>
           <a:extLst>
             <a:ext uri="{FAA26D3D-D897-4be2-8F04-BA451C77F1D7}">
-              <ma14:placeholderFlag xmlns:ma14="http://schemas.microsoft.com/office/mac/drawingml/2011/main" xmlns="" val="1"/>
+              <ma14:placeholderFlag xmlns="" xmlns:ma14="http://schemas.microsoft.com/office/mac/drawingml/2011/main" val="1"/>
             </a:ext>
           </a:extLst>
         </p:spPr>
@@ -13568,7 +13568,7 @@
           </a:ln>
           <a:extLst>
             <a:ext uri="{FAA26D3D-D897-4be2-8F04-BA451C77F1D7}">
-              <ma14:placeholderFlag xmlns:ma14="http://schemas.microsoft.com/office/mac/drawingml/2011/main" xmlns="" val="1"/>
+              <ma14:placeholderFlag xmlns="" xmlns:ma14="http://schemas.microsoft.com/office/mac/drawingml/2011/main" val="1"/>
             </a:ext>
           </a:extLst>
         </p:spPr>
@@ -16247,7 +16247,7 @@
           </a:ln>
           <a:extLst>
             <a:ext uri="{FAA26D3D-D897-4be2-8F04-BA451C77F1D7}">
-              <ma14:placeholderFlag xmlns:ma14="http://schemas.microsoft.com/office/mac/drawingml/2011/main" xmlns="" val="1"/>
+              <ma14:placeholderFlag xmlns="" xmlns:ma14="http://schemas.microsoft.com/office/mac/drawingml/2011/main" val="1"/>
             </a:ext>
           </a:extLst>
         </p:spPr>
@@ -16966,7 +16966,7 @@
           </a:ln>
           <a:extLst>
             <a:ext uri="{FAA26D3D-D897-4be2-8F04-BA451C77F1D7}">
-              <ma14:placeholderFlag xmlns:ma14="http://schemas.microsoft.com/office/mac/drawingml/2011/main" xmlns="" val="1"/>
+              <ma14:placeholderFlag xmlns="" xmlns:ma14="http://schemas.microsoft.com/office/mac/drawingml/2011/main" val="1"/>
             </a:ext>
           </a:extLst>
         </p:spPr>
@@ -18082,7 +18082,7 @@
               </a14:hiddenLine>
             </a:ext>
             <a:ext uri="{FAA26D3D-D897-4be2-8F04-BA451C77F1D7}">
-              <ma14:placeholderFlag xmlns:ma14="http://schemas.microsoft.com/office/mac/drawingml/2011/main" xmlns="" val="1"/>
+              <ma14:placeholderFlag xmlns="" xmlns:ma14="http://schemas.microsoft.com/office/mac/drawingml/2011/main" val="1"/>
             </a:ext>
           </a:extLst>
         </p:spPr>
@@ -18351,7 +18351,7 @@
               </a14:hiddenLine>
             </a:ext>
             <a:ext uri="{FAA26D3D-D897-4be2-8F04-BA451C77F1D7}">
-              <ma14:placeholderFlag xmlns="" xmlns:ma14="http://schemas.microsoft.com/office/mac/drawingml/2011/main" val="1"/>
+              <ma14:placeholderFlag xmlns:ma14="http://schemas.microsoft.com/office/mac/drawingml/2011/main" xmlns="" val="1"/>
             </a:ext>
           </a:extLst>
         </p:spPr>
@@ -21900,7 +21900,7 @@
               </a14:hiddenLine>
             </a:ext>
             <a:ext uri="{FAA26D3D-D897-4be2-8F04-BA451C77F1D7}">
-              <ma14:placeholderFlag xmlns:ma14="http://schemas.microsoft.com/office/mac/drawingml/2011/main" xmlns="" val="1"/>
+              <ma14:placeholderFlag xmlns="" xmlns:ma14="http://schemas.microsoft.com/office/mac/drawingml/2011/main" val="1"/>
             </a:ext>
           </a:extLst>
         </p:spPr>
@@ -24476,7 +24476,7 @@
               </a14:hiddenLine>
             </a:ext>
             <a:ext uri="{FAA26D3D-D897-4be2-8F04-BA451C77F1D7}">
-              <ma14:placeholderFlag xmlns:ma14="http://schemas.microsoft.com/office/mac/drawingml/2011/main" xmlns="" val="1"/>
+              <ma14:placeholderFlag xmlns="" xmlns:ma14="http://schemas.microsoft.com/office/mac/drawingml/2011/main" val="1"/>
             </a:ext>
           </a:extLst>
         </p:spPr>
@@ -25983,7 +25983,7 @@
           </a:ln>
           <a:extLst>
             <a:ext uri="{FAA26D3D-D897-4be2-8F04-BA451C77F1D7}">
-              <ma14:placeholderFlag xmlns:ma14="http://schemas.microsoft.com/office/mac/drawingml/2011/main" xmlns="" val="1"/>
+              <ma14:placeholderFlag xmlns="" xmlns:ma14="http://schemas.microsoft.com/office/mac/drawingml/2011/main" val="1"/>
             </a:ext>
           </a:extLst>
         </p:spPr>
@@ -27116,7 +27116,7 @@
           </a:ln>
           <a:extLst>
             <a:ext uri="{FAA26D3D-D897-4be2-8F04-BA451C77F1D7}">
-              <ma14:placeholderFlag xmlns:ma14="http://schemas.microsoft.com/office/mac/drawingml/2011/main" xmlns="" val="1"/>
+              <ma14:placeholderFlag xmlns="" xmlns:ma14="http://schemas.microsoft.com/office/mac/drawingml/2011/main" val="1"/>
             </a:ext>
           </a:extLst>
         </p:spPr>
@@ -27710,7 +27710,7 @@
           </a:ln>
           <a:extLst>
             <a:ext uri="{FAA26D3D-D897-4be2-8F04-BA451C77F1D7}">
-              <ma14:placeholderFlag xmlns:ma14="http://schemas.microsoft.com/office/mac/drawingml/2011/main" xmlns="" val="1"/>
+              <ma14:placeholderFlag xmlns="" xmlns:ma14="http://schemas.microsoft.com/office/mac/drawingml/2011/main" val="1"/>
             </a:ext>
           </a:extLst>
         </p:spPr>
@@ -28369,7 +28369,7 @@
           </a:ln>
           <a:extLst>
             <a:ext uri="{FAA26D3D-D897-4be2-8F04-BA451C77F1D7}">
-              <ma14:placeholderFlag xmlns:ma14="http://schemas.microsoft.com/office/mac/drawingml/2011/main" xmlns="" val="1"/>
+              <ma14:placeholderFlag xmlns="" xmlns:ma14="http://schemas.microsoft.com/office/mac/drawingml/2011/main" val="1"/>
             </a:ext>
           </a:extLst>
         </p:spPr>
@@ -29013,7 +29013,7 @@
           </a:ln>
           <a:extLst>
             <a:ext uri="{FAA26D3D-D897-4be2-8F04-BA451C77F1D7}">
-              <ma14:placeholderFlag xmlns:ma14="http://schemas.microsoft.com/office/mac/drawingml/2011/main" xmlns="" val="1"/>
+              <ma14:placeholderFlag xmlns="" xmlns:ma14="http://schemas.microsoft.com/office/mac/drawingml/2011/main" val="1"/>
             </a:ext>
           </a:extLst>
         </p:spPr>
@@ -29260,7 +29260,7 @@
           </a:ln>
           <a:extLst>
             <a:ext uri="{FAA26D3D-D897-4be2-8F04-BA451C77F1D7}">
-              <ma14:placeholderFlag xmlns:ma14="http://schemas.microsoft.com/office/mac/drawingml/2011/main" xmlns="" val="1"/>
+              <ma14:placeholderFlag xmlns="" xmlns:ma14="http://schemas.microsoft.com/office/mac/drawingml/2011/main" val="1"/>
             </a:ext>
           </a:extLst>
         </p:spPr>
@@ -31274,7 +31274,7 @@
           </a:ln>
           <a:extLst>
             <a:ext uri="{FAA26D3D-D897-4be2-8F04-BA451C77F1D7}">
-              <ma14:placeholderFlag xmlns:ma14="http://schemas.microsoft.com/office/mac/drawingml/2011/main" xmlns="" val="1"/>
+              <ma14:placeholderFlag xmlns="" xmlns:ma14="http://schemas.microsoft.com/office/mac/drawingml/2011/main" val="1"/>
             </a:ext>
           </a:extLst>
         </p:spPr>
@@ -31993,7 +31993,7 @@
           </a:ln>
           <a:extLst>
             <a:ext uri="{FAA26D3D-D897-4be2-8F04-BA451C77F1D7}">
-              <ma14:placeholderFlag xmlns:ma14="http://schemas.microsoft.com/office/mac/drawingml/2011/main" xmlns="" val="1"/>
+              <ma14:placeholderFlag xmlns="" xmlns:ma14="http://schemas.microsoft.com/office/mac/drawingml/2011/main" val="1"/>
             </a:ext>
           </a:extLst>
         </p:spPr>
@@ -33425,7 +33425,7 @@
               </a14:hiddenLine>
             </a:ext>
             <a:ext uri="{FAA26D3D-D897-4be2-8F04-BA451C77F1D7}">
-              <ma14:placeholderFlag xmlns="" xmlns:ma14="http://schemas.microsoft.com/office/mac/drawingml/2011/main" val="1"/>
+              <ma14:placeholderFlag xmlns:ma14="http://schemas.microsoft.com/office/mac/drawingml/2011/main" xmlns="" val="1"/>
             </a:ext>
           </a:extLst>
         </p:spPr>
@@ -33863,7 +33863,7 @@
               </a14:hiddenLine>
             </a:ext>
             <a:ext uri="{FAA26D3D-D897-4be2-8F04-BA451C77F1D7}">
-              <ma14:placeholderFlag xmlns:ma14="http://schemas.microsoft.com/office/mac/drawingml/2011/main" xmlns="" val="1"/>
+              <ma14:placeholderFlag xmlns="" xmlns:ma14="http://schemas.microsoft.com/office/mac/drawingml/2011/main" val="1"/>
             </a:ext>
           </a:extLst>
         </p:spPr>
@@ -36561,7 +36561,7 @@
               </a14:hiddenLine>
             </a:ext>
             <a:ext uri="{FAA26D3D-D897-4be2-8F04-BA451C77F1D7}">
-              <ma14:placeholderFlag xmlns:ma14="http://schemas.microsoft.com/office/mac/drawingml/2011/main" xmlns="" val="1"/>
+              <ma14:placeholderFlag xmlns="" xmlns:ma14="http://schemas.microsoft.com/office/mac/drawingml/2011/main" val="1"/>
             </a:ext>
           </a:extLst>
         </p:spPr>
@@ -40940,7 +40940,7 @@
           </a:ln>
           <a:extLst>
             <a:ext uri="{FAA26D3D-D897-4be2-8F04-BA451C77F1D7}">
-              <ma14:placeholderFlag xmlns:ma14="http://schemas.microsoft.com/office/mac/drawingml/2011/main" xmlns="" val="1"/>
+              <ma14:placeholderFlag xmlns="" xmlns:ma14="http://schemas.microsoft.com/office/mac/drawingml/2011/main" val="1"/>
             </a:ext>
           </a:extLst>
         </p:spPr>
@@ -42073,7 +42073,7 @@
           </a:ln>
           <a:extLst>
             <a:ext uri="{FAA26D3D-D897-4be2-8F04-BA451C77F1D7}">
-              <ma14:placeholderFlag xmlns:ma14="http://schemas.microsoft.com/office/mac/drawingml/2011/main" xmlns="" val="1"/>
+              <ma14:placeholderFlag xmlns="" xmlns:ma14="http://schemas.microsoft.com/office/mac/drawingml/2011/main" val="1"/>
             </a:ext>
           </a:extLst>
         </p:spPr>
@@ -42667,7 +42667,7 @@
           </a:ln>
           <a:extLst>
             <a:ext uri="{FAA26D3D-D897-4be2-8F04-BA451C77F1D7}">
-              <ma14:placeholderFlag xmlns:ma14="http://schemas.microsoft.com/office/mac/drawingml/2011/main" xmlns="" val="1"/>
+              <ma14:placeholderFlag xmlns="" xmlns:ma14="http://schemas.microsoft.com/office/mac/drawingml/2011/main" val="1"/>
             </a:ext>
           </a:extLst>
         </p:spPr>
@@ -43032,7 +43032,7 @@
           </a:ln>
           <a:extLst>
             <a:ext uri="{FAA26D3D-D897-4be2-8F04-BA451C77F1D7}">
-              <ma14:placeholderFlag xmlns:ma14="http://schemas.microsoft.com/office/mac/drawingml/2011/main" xmlns="" val="1"/>
+              <ma14:placeholderFlag xmlns="" xmlns:ma14="http://schemas.microsoft.com/office/mac/drawingml/2011/main" val="1"/>
             </a:ext>
           </a:extLst>
         </p:spPr>
@@ -43676,7 +43676,7 @@
           </a:ln>
           <a:extLst>
             <a:ext uri="{FAA26D3D-D897-4be2-8F04-BA451C77F1D7}">
-              <ma14:placeholderFlag xmlns:ma14="http://schemas.microsoft.com/office/mac/drawingml/2011/main" xmlns="" val="1"/>
+              <ma14:placeholderFlag xmlns="" xmlns:ma14="http://schemas.microsoft.com/office/mac/drawingml/2011/main" val="1"/>
             </a:ext>
           </a:extLst>
         </p:spPr>
@@ -46984,14 +46984,320 @@
         </p:blipFill>
         <p:spPr>
           <a:xfrm>
-            <a:off x="2301736" y="1408610"/>
-            <a:ext cx="7588527" cy="3789342"/>
+            <a:off x="1079223" y="1012418"/>
+            <a:ext cx="9678882" cy="4833164"/>
           </a:xfrm>
           <a:prstGeom prst="rect">
             <a:avLst/>
           </a:prstGeom>
         </p:spPr>
       </p:pic>
+      <p:sp>
+        <p:nvSpPr>
+          <p:cNvPr id="9" name="onboard">
+            <a:extLst>
+              <a:ext uri="{FF2B5EF4-FFF2-40B4-BE49-F238E27FC236}">
+                <a16:creationId xmlns:a16="http://schemas.microsoft.com/office/drawing/2014/main" id="{BF24A7DF-BCC3-16FE-78C3-BAA51DF80EDF}"/>
+              </a:ext>
+            </a:extLst>
+          </p:cNvPr>
+          <p:cNvSpPr/>
+          <p:nvPr/>
+        </p:nvSpPr>
+        <p:spPr>
+          <a:xfrm>
+            <a:off x="6774603" y="4601817"/>
+            <a:ext cx="198783" cy="218661"/>
+          </a:xfrm>
+          <a:prstGeom prst="rect">
+            <a:avLst/>
+          </a:prstGeom>
+          <a:noFill/>
+          <a:ln>
+            <a:noFill/>
+          </a:ln>
+          <a:effectLst/>
+        </p:spPr>
+        <p:style>
+          <a:lnRef idx="2">
+            <a:schemeClr val="accent1">
+              <a:shade val="50000"/>
+            </a:schemeClr>
+          </a:lnRef>
+          <a:fillRef idx="1">
+            <a:schemeClr val="accent1"/>
+          </a:fillRef>
+          <a:effectRef idx="0">
+            <a:schemeClr val="accent1"/>
+          </a:effectRef>
+          <a:fontRef idx="minor">
+            <a:schemeClr val="lt1"/>
+          </a:fontRef>
+        </p:style>
+        <p:txBody>
+          <a:bodyPr rtlCol="0" anchor="ctr"/>
+          <a:lstStyle/>
+          <a:p>
+            <a:pPr algn="ctr"/>
+            <a:endParaRPr lang="en-US" dirty="0"/>
+          </a:p>
+        </p:txBody>
+      </p:sp>
+      <p:sp>
+        <p:nvSpPr>
+          <p:cNvPr id="10" name="implement">
+            <a:extLst>
+              <a:ext uri="{FF2B5EF4-FFF2-40B4-BE49-F238E27FC236}">
+                <a16:creationId xmlns:a16="http://schemas.microsoft.com/office/drawing/2014/main" id="{E2E46277-3C02-B94E-1343-DECE87E5D105}"/>
+              </a:ext>
+            </a:extLst>
+          </p:cNvPr>
+          <p:cNvSpPr/>
+          <p:nvPr/>
+        </p:nvSpPr>
+        <p:spPr>
+          <a:xfrm>
+            <a:off x="7467601" y="4719572"/>
+            <a:ext cx="198783" cy="218661"/>
+          </a:xfrm>
+          <a:prstGeom prst="rect">
+            <a:avLst/>
+          </a:prstGeom>
+          <a:noFill/>
+          <a:ln>
+            <a:noFill/>
+          </a:ln>
+          <a:effectLst/>
+        </p:spPr>
+        <p:style>
+          <a:lnRef idx="2">
+            <a:schemeClr val="accent1">
+              <a:shade val="50000"/>
+            </a:schemeClr>
+          </a:lnRef>
+          <a:fillRef idx="1">
+            <a:schemeClr val="accent1"/>
+          </a:fillRef>
+          <a:effectRef idx="0">
+            <a:schemeClr val="accent1"/>
+          </a:effectRef>
+          <a:fontRef idx="minor">
+            <a:schemeClr val="lt1"/>
+          </a:fontRef>
+        </p:style>
+        <p:txBody>
+          <a:bodyPr rtlCol="0" anchor="ctr"/>
+          <a:lstStyle/>
+          <a:p>
+            <a:pPr algn="ctr"/>
+            <a:endParaRPr lang="en-US" dirty="0"/>
+          </a:p>
+        </p:txBody>
+      </p:sp>
+      <p:sp>
+        <p:nvSpPr>
+          <p:cNvPr id="11" name="use">
+            <a:extLst>
+              <a:ext uri="{FF2B5EF4-FFF2-40B4-BE49-F238E27FC236}">
+                <a16:creationId xmlns:a16="http://schemas.microsoft.com/office/drawing/2014/main" id="{F142D7AB-3BF8-C785-87BA-C35ACB6989A3}"/>
+              </a:ext>
+            </a:extLst>
+          </p:cNvPr>
+          <p:cNvSpPr/>
+          <p:nvPr/>
+        </p:nvSpPr>
+        <p:spPr>
+          <a:xfrm>
+            <a:off x="7997010" y="4502622"/>
+            <a:ext cx="198783" cy="218661"/>
+          </a:xfrm>
+          <a:prstGeom prst="rect">
+            <a:avLst/>
+          </a:prstGeom>
+          <a:noFill/>
+          <a:ln>
+            <a:noFill/>
+          </a:ln>
+          <a:effectLst/>
+        </p:spPr>
+        <p:style>
+          <a:lnRef idx="2">
+            <a:schemeClr val="accent1">
+              <a:shade val="50000"/>
+            </a:schemeClr>
+          </a:lnRef>
+          <a:fillRef idx="1">
+            <a:schemeClr val="accent1"/>
+          </a:fillRef>
+          <a:effectRef idx="0">
+            <a:schemeClr val="accent1"/>
+          </a:effectRef>
+          <a:fontRef idx="minor">
+            <a:schemeClr val="lt1"/>
+          </a:fontRef>
+        </p:style>
+        <p:txBody>
+          <a:bodyPr rtlCol="0" anchor="ctr"/>
+          <a:lstStyle/>
+          <a:p>
+            <a:pPr algn="ctr"/>
+            <a:endParaRPr lang="en-US" dirty="0"/>
+          </a:p>
+        </p:txBody>
+      </p:sp>
+      <p:sp>
+        <p:nvSpPr>
+          <p:cNvPr id="12" name="engage">
+            <a:extLst>
+              <a:ext uri="{FF2B5EF4-FFF2-40B4-BE49-F238E27FC236}">
+                <a16:creationId xmlns:a16="http://schemas.microsoft.com/office/drawing/2014/main" id="{3B863E63-6B1B-6B19-5B9F-69B764267259}"/>
+              </a:ext>
+            </a:extLst>
+          </p:cNvPr>
+          <p:cNvSpPr/>
+          <p:nvPr/>
+        </p:nvSpPr>
+        <p:spPr>
+          <a:xfrm>
+            <a:off x="8384482" y="4135759"/>
+            <a:ext cx="198783" cy="218661"/>
+          </a:xfrm>
+          <a:prstGeom prst="rect">
+            <a:avLst/>
+          </a:prstGeom>
+          <a:noFill/>
+          <a:ln>
+            <a:noFill/>
+          </a:ln>
+          <a:effectLst/>
+        </p:spPr>
+        <p:style>
+          <a:lnRef idx="2">
+            <a:schemeClr val="accent1">
+              <a:shade val="50000"/>
+            </a:schemeClr>
+          </a:lnRef>
+          <a:fillRef idx="1">
+            <a:schemeClr val="accent1"/>
+          </a:fillRef>
+          <a:effectRef idx="0">
+            <a:schemeClr val="accent1"/>
+          </a:effectRef>
+          <a:fontRef idx="minor">
+            <a:schemeClr val="lt1"/>
+          </a:fontRef>
+        </p:style>
+        <p:txBody>
+          <a:bodyPr rtlCol="0" anchor="ctr"/>
+          <a:lstStyle/>
+          <a:p>
+            <a:pPr algn="ctr"/>
+            <a:endParaRPr lang="en-US" dirty="0"/>
+          </a:p>
+        </p:txBody>
+      </p:sp>
+      <p:sp>
+        <p:nvSpPr>
+          <p:cNvPr id="13" name="adopt">
+            <a:extLst>
+              <a:ext uri="{FF2B5EF4-FFF2-40B4-BE49-F238E27FC236}">
+                <a16:creationId xmlns:a16="http://schemas.microsoft.com/office/drawing/2014/main" id="{2C3A9A40-7DA7-1F77-A03A-8355517DFA24}"/>
+              </a:ext>
+            </a:extLst>
+          </p:cNvPr>
+          <p:cNvSpPr/>
+          <p:nvPr/>
+        </p:nvSpPr>
+        <p:spPr>
+          <a:xfrm>
+            <a:off x="8536269" y="3544132"/>
+            <a:ext cx="198783" cy="218661"/>
+          </a:xfrm>
+          <a:prstGeom prst="rect">
+            <a:avLst/>
+          </a:prstGeom>
+          <a:noFill/>
+          <a:ln>
+            <a:noFill/>
+          </a:ln>
+          <a:effectLst/>
+        </p:spPr>
+        <p:style>
+          <a:lnRef idx="2">
+            <a:schemeClr val="accent1">
+              <a:shade val="50000"/>
+            </a:schemeClr>
+          </a:lnRef>
+          <a:fillRef idx="1">
+            <a:schemeClr val="accent1"/>
+          </a:fillRef>
+          <a:effectRef idx="0">
+            <a:schemeClr val="accent1"/>
+          </a:effectRef>
+          <a:fontRef idx="minor">
+            <a:schemeClr val="lt1"/>
+          </a:fontRef>
+        </p:style>
+        <p:txBody>
+          <a:bodyPr rtlCol="0" anchor="ctr"/>
+          <a:lstStyle/>
+          <a:p>
+            <a:pPr algn="ctr"/>
+            <a:endParaRPr lang="en-US" dirty="0"/>
+          </a:p>
+        </p:txBody>
+      </p:sp>
+      <p:sp>
+        <p:nvSpPr>
+          <p:cNvPr id="14" name="optimize">
+            <a:extLst>
+              <a:ext uri="{FF2B5EF4-FFF2-40B4-BE49-F238E27FC236}">
+                <a16:creationId xmlns:a16="http://schemas.microsoft.com/office/drawing/2014/main" id="{B76DC9F7-99F8-AC70-EBAF-902ACA7BA6F2}"/>
+              </a:ext>
+            </a:extLst>
+          </p:cNvPr>
+          <p:cNvSpPr/>
+          <p:nvPr/>
+        </p:nvSpPr>
+        <p:spPr>
+          <a:xfrm>
+            <a:off x="8436878" y="3171168"/>
+            <a:ext cx="198783" cy="218661"/>
+          </a:xfrm>
+          <a:prstGeom prst="rect">
+            <a:avLst/>
+          </a:prstGeom>
+          <a:noFill/>
+          <a:ln>
+            <a:noFill/>
+          </a:ln>
+          <a:effectLst/>
+        </p:spPr>
+        <p:style>
+          <a:lnRef idx="2">
+            <a:schemeClr val="accent1">
+              <a:shade val="50000"/>
+            </a:schemeClr>
+          </a:lnRef>
+          <a:fillRef idx="1">
+            <a:schemeClr val="accent1"/>
+          </a:fillRef>
+          <a:effectRef idx="0">
+            <a:schemeClr val="accent1"/>
+          </a:effectRef>
+          <a:fontRef idx="minor">
+            <a:schemeClr val="lt1"/>
+          </a:fontRef>
+        </p:style>
+        <p:txBody>
+          <a:bodyPr rtlCol="0" anchor="ctr"/>
+          <a:lstStyle/>
+          <a:p>
+            <a:pPr algn="ctr"/>
+            <a:endParaRPr lang="en-US" dirty="0"/>
+          </a:p>
+        </p:txBody>
+      </p:sp>
     </p:spTree>
     <p:extLst>
       <p:ext uri="{BB962C8B-B14F-4D97-AF65-F5344CB8AC3E}">
@@ -48985,6 +49291,15 @@
 </file>
 
 <file path=customXml/item2.xml><?xml version="1.0" encoding="utf-8"?>
+<?mso-contentType ?>
+<FormTemplates xmlns="http://schemas.microsoft.com/sharepoint/v3/contenttype/forms">
+  <Display>DocumentLibraryForm</Display>
+  <Edit>DocumentLibraryForm</Edit>
+  <New>DocumentLibraryForm</New>
+</FormTemplates>
+</file>
+
+<file path=customXml/item3.xml><?xml version="1.0" encoding="utf-8"?>
 <ct:contentTypeSchema xmlns:ct="http://schemas.microsoft.com/office/2006/metadata/contentType" xmlns:ma="http://schemas.microsoft.com/office/2006/metadata/properties/metaAttributes" ct:_="" ma:_="" ma:contentTypeName="Document" ma:contentTypeID="0x01010016638FBC164A6C4987893577CA81BDCE" ma:contentTypeVersion="12" ma:contentTypeDescription="Create a new document." ma:contentTypeScope="" ma:versionID="ad216d817d9e9210cab45cf1c00ab7cf">
   <xsd:schema xmlns:xsd="http://www.w3.org/2001/XMLSchema" xmlns:xs="http://www.w3.org/2001/XMLSchema" xmlns:p="http://schemas.microsoft.com/office/2006/metadata/properties" xmlns:ns2="c068e80e-f499-4ba4-b97d-8eb81f7bf0a4" xmlns:ns3="d78665ad-f783-4f30-b3cb-b870e5173973" targetNamespace="http://schemas.microsoft.com/office/2006/metadata/properties" ma:root="true" ma:fieldsID="b03d820719e6014dead3958bf2973f6f" ns2:_="" ns3:_="">
     <xsd:import namespace="c068e80e-f499-4ba4-b97d-8eb81f7bf0a4"/>
@@ -49201,15 +49516,6 @@
 </ct:contentTypeSchema>
 </file>
 
-<file path=customXml/item3.xml><?xml version="1.0" encoding="utf-8"?>
-<?mso-contentType ?>
-<FormTemplates xmlns="http://schemas.microsoft.com/sharepoint/v3/contenttype/forms">
-  <Display>DocumentLibraryForm</Display>
-  <Edit>DocumentLibraryForm</Edit>
-  <New>DocumentLibraryForm</New>
-</FormTemplates>
-</file>
-
 <file path=customXml/itemProps1.xml><?xml version="1.0" encoding="utf-8"?>
 <ds:datastoreItem xmlns:ds="http://schemas.openxmlformats.org/officeDocument/2006/customXml" ds:itemID="{B2A938C6-D422-428A-8901-D36A71A3A66F}">
   <ds:schemaRefs>
@@ -49230,6 +49536,14 @@
 </file>
 
 <file path=customXml/itemProps2.xml><?xml version="1.0" encoding="utf-8"?>
+<ds:datastoreItem xmlns:ds="http://schemas.openxmlformats.org/officeDocument/2006/customXml" ds:itemID="{2D849882-45D9-49DF-83E9-35AEA65C5DA4}">
+  <ds:schemaRefs>
+    <ds:schemaRef ds:uri="http://schemas.microsoft.com/sharepoint/v3/contenttype/forms"/>
+  </ds:schemaRefs>
+</ds:datastoreItem>
+</file>
+
+<file path=customXml/itemProps3.xml><?xml version="1.0" encoding="utf-8"?>
 <ds:datastoreItem xmlns:ds="http://schemas.openxmlformats.org/officeDocument/2006/customXml" ds:itemID="{BFF5C609-47B2-4E38-98DE-50447A64B0AF}">
   <ds:schemaRefs>
     <ds:schemaRef ds:uri="http://schemas.microsoft.com/office/2006/metadata/contentType"/>
@@ -49246,12 +49560,4 @@
     <ds:schemaRef ds:uri="http://schemas.microsoft.com/internal/obd"/>
   </ds:schemaRefs>
 </ds:datastoreItem>
-</file>
-
-<file path=customXml/itemProps3.xml><?xml version="1.0" encoding="utf-8"?>
-<ds:datastoreItem xmlns:ds="http://schemas.openxmlformats.org/officeDocument/2006/customXml" ds:itemID="{2D849882-45D9-49DF-83E9-35AEA65C5DA4}">
-  <ds:schemaRefs>
-    <ds:schemaRef ds:uri="http://schemas.microsoft.com/sharepoint/v3/contenttype/forms"/>
-  </ds:schemaRefs>
-</ds:datastoreItem>
 </file>
</xml_diff>

<commit_message>
fix tooltip and exit logic text
</commit_message>
<xml_diff>
--- a/backend/resources/pptAssets/HybridApplicationMonitoringUseCase_template.pptx
+++ b/backend/resources/pptAssets/HybridApplicationMonitoringUseCase_template.pptx
@@ -293,7 +293,7 @@
           <a:p>
             <a:fld id="{702657A2-7B7A-174B-A542-3B4C9FC943CD}" type="datetimeFigureOut">
               <a:rPr lang="en-US" smtClean="0"/>
-              <a:t>4/21/23</a:t>
+              <a:t>5/3/23</a:t>
             </a:fld>
             <a:endParaRPr lang="en-US"/>
           </a:p>
@@ -2886,7 +2886,7 @@
           </a:ln>
           <a:extLst>
             <a:ext uri="{FAA26D3D-D897-4be2-8F04-BA451C77F1D7}">
-              <ma14:placeholderFlag xmlns="" xmlns:ma14="http://schemas.microsoft.com/office/mac/drawingml/2011/main" val="1"/>
+              <ma14:placeholderFlag xmlns:ma14="http://schemas.microsoft.com/office/mac/drawingml/2011/main" xmlns="" val="1"/>
             </a:ext>
           </a:extLst>
         </p:spPr>
@@ -4900,7 +4900,7 @@
           </a:ln>
           <a:extLst>
             <a:ext uri="{FAA26D3D-D897-4be2-8F04-BA451C77F1D7}">
-              <ma14:placeholderFlag xmlns="" xmlns:ma14="http://schemas.microsoft.com/office/mac/drawingml/2011/main" val="1"/>
+              <ma14:placeholderFlag xmlns:ma14="http://schemas.microsoft.com/office/mac/drawingml/2011/main" xmlns="" val="1"/>
             </a:ext>
           </a:extLst>
         </p:spPr>
@@ -5619,7 +5619,7 @@
           </a:ln>
           <a:extLst>
             <a:ext uri="{FAA26D3D-D897-4be2-8F04-BA451C77F1D7}">
-              <ma14:placeholderFlag xmlns="" xmlns:ma14="http://schemas.microsoft.com/office/mac/drawingml/2011/main" val="1"/>
+              <ma14:placeholderFlag xmlns:ma14="http://schemas.microsoft.com/office/mac/drawingml/2011/main" xmlns="" val="1"/>
             </a:ext>
           </a:extLst>
         </p:spPr>
@@ -7117,7 +7117,7 @@
               </a14:hiddenLine>
             </a:ext>
             <a:ext uri="{FAA26D3D-D897-4be2-8F04-BA451C77F1D7}">
-              <ma14:placeholderFlag xmlns="" xmlns:ma14="http://schemas.microsoft.com/office/mac/drawingml/2011/main" val="1"/>
+              <ma14:placeholderFlag xmlns:ma14="http://schemas.microsoft.com/office/mac/drawingml/2011/main" xmlns="" val="1"/>
             </a:ext>
           </a:extLst>
         </p:spPr>
@@ -7365,7 +7365,7 @@
               </a14:hiddenLine>
             </a:ext>
             <a:ext uri="{FAA26D3D-D897-4be2-8F04-BA451C77F1D7}">
-              <ma14:placeholderFlag xmlns="" xmlns:ma14="http://schemas.microsoft.com/office/mac/drawingml/2011/main" val="1"/>
+              <ma14:placeholderFlag xmlns:ma14="http://schemas.microsoft.com/office/mac/drawingml/2011/main" xmlns="" val="1"/>
             </a:ext>
           </a:extLst>
         </p:spPr>
@@ -7634,7 +7634,7 @@
               </a14:hiddenLine>
             </a:ext>
             <a:ext uri="{FAA26D3D-D897-4be2-8F04-BA451C77F1D7}">
-              <ma14:placeholderFlag xmlns:ma14="http://schemas.microsoft.com/office/mac/drawingml/2011/main" xmlns="" val="1"/>
+              <ma14:placeholderFlag xmlns="" xmlns:ma14="http://schemas.microsoft.com/office/mac/drawingml/2011/main" val="1"/>
             </a:ext>
           </a:extLst>
         </p:spPr>
@@ -8064,14 +8064,14 @@
           </a:ln>
           <a:extLst>
             <a:ext uri="{909E8E84-426E-40dd-AFC4-6F175D3DCCD1}">
-              <a14:hiddenFill xmlns="" xmlns:a14="http://schemas.microsoft.com/office/drawing/2010/main">
+              <a14:hiddenFill xmlns:a14="http://schemas.microsoft.com/office/drawing/2010/main" xmlns="">
                 <a:solidFill>
                   <a:srgbClr val="FFFFFF"/>
                 </a:solidFill>
               </a14:hiddenFill>
             </a:ext>
             <a:ext uri="{91240B29-F687-4f45-9708-019B960494DF}">
-              <a14:hiddenLine xmlns="" xmlns:a14="http://schemas.microsoft.com/office/drawing/2010/main" w="9525">
+              <a14:hiddenLine xmlns:a14="http://schemas.microsoft.com/office/drawing/2010/main" xmlns="" w="9525">
                 <a:solidFill>
                   <a:srgbClr val="000000"/>
                 </a:solidFill>
@@ -10042,7 +10042,7 @@
           </a:ln>
           <a:extLst>
             <a:ext uri="{FAA26D3D-D897-4be2-8F04-BA451C77F1D7}">
-              <ma14:placeholderFlag xmlns="" xmlns:ma14="http://schemas.microsoft.com/office/mac/drawingml/2011/main" val="1"/>
+              <ma14:placeholderFlag xmlns:ma14="http://schemas.microsoft.com/office/mac/drawingml/2011/main" xmlns="" val="1"/>
             </a:ext>
           </a:extLst>
         </p:spPr>
@@ -11718,7 +11718,7 @@
           </a:ln>
           <a:extLst>
             <a:ext uri="{FAA26D3D-D897-4be2-8F04-BA451C77F1D7}">
-              <ma14:placeholderFlag xmlns="" xmlns:ma14="http://schemas.microsoft.com/office/mac/drawingml/2011/main" val="1"/>
+              <ma14:placeholderFlag xmlns:ma14="http://schemas.microsoft.com/office/mac/drawingml/2011/main" xmlns="" val="1"/>
             </a:ext>
           </a:extLst>
         </p:spPr>
@@ -12312,7 +12312,7 @@
           </a:ln>
           <a:extLst>
             <a:ext uri="{FAA26D3D-D897-4be2-8F04-BA451C77F1D7}">
-              <ma14:placeholderFlag xmlns="" xmlns:ma14="http://schemas.microsoft.com/office/mac/drawingml/2011/main" val="1"/>
+              <ma14:placeholderFlag xmlns:ma14="http://schemas.microsoft.com/office/mac/drawingml/2011/main" xmlns="" val="1"/>
             </a:ext>
           </a:extLst>
         </p:spPr>
@@ -12677,7 +12677,7 @@
           </a:ln>
           <a:extLst>
             <a:ext uri="{FAA26D3D-D897-4be2-8F04-BA451C77F1D7}">
-              <ma14:placeholderFlag xmlns="" xmlns:ma14="http://schemas.microsoft.com/office/mac/drawingml/2011/main" val="1"/>
+              <ma14:placeholderFlag xmlns:ma14="http://schemas.microsoft.com/office/mac/drawingml/2011/main" xmlns="" val="1"/>
             </a:ext>
           </a:extLst>
         </p:spPr>
@@ -13321,7 +13321,7 @@
           </a:ln>
           <a:extLst>
             <a:ext uri="{FAA26D3D-D897-4be2-8F04-BA451C77F1D7}">
-              <ma14:placeholderFlag xmlns="" xmlns:ma14="http://schemas.microsoft.com/office/mac/drawingml/2011/main" val="1"/>
+              <ma14:placeholderFlag xmlns:ma14="http://schemas.microsoft.com/office/mac/drawingml/2011/main" xmlns="" val="1"/>
             </a:ext>
           </a:extLst>
         </p:spPr>
@@ -13568,7 +13568,7 @@
           </a:ln>
           <a:extLst>
             <a:ext uri="{FAA26D3D-D897-4be2-8F04-BA451C77F1D7}">
-              <ma14:placeholderFlag xmlns="" xmlns:ma14="http://schemas.microsoft.com/office/mac/drawingml/2011/main" val="1"/>
+              <ma14:placeholderFlag xmlns:ma14="http://schemas.microsoft.com/office/mac/drawingml/2011/main" xmlns="" val="1"/>
             </a:ext>
           </a:extLst>
         </p:spPr>
@@ -16247,7 +16247,7 @@
           </a:ln>
           <a:extLst>
             <a:ext uri="{FAA26D3D-D897-4be2-8F04-BA451C77F1D7}">
-              <ma14:placeholderFlag xmlns="" xmlns:ma14="http://schemas.microsoft.com/office/mac/drawingml/2011/main" val="1"/>
+              <ma14:placeholderFlag xmlns:ma14="http://schemas.microsoft.com/office/mac/drawingml/2011/main" xmlns="" val="1"/>
             </a:ext>
           </a:extLst>
         </p:spPr>
@@ -16966,7 +16966,7 @@
           </a:ln>
           <a:extLst>
             <a:ext uri="{FAA26D3D-D897-4be2-8F04-BA451C77F1D7}">
-              <ma14:placeholderFlag xmlns="" xmlns:ma14="http://schemas.microsoft.com/office/mac/drawingml/2011/main" val="1"/>
+              <ma14:placeholderFlag xmlns:ma14="http://schemas.microsoft.com/office/mac/drawingml/2011/main" xmlns="" val="1"/>
             </a:ext>
           </a:extLst>
         </p:spPr>
@@ -18082,7 +18082,7 @@
               </a14:hiddenLine>
             </a:ext>
             <a:ext uri="{FAA26D3D-D897-4be2-8F04-BA451C77F1D7}">
-              <ma14:placeholderFlag xmlns="" xmlns:ma14="http://schemas.microsoft.com/office/mac/drawingml/2011/main" val="1"/>
+              <ma14:placeholderFlag xmlns:ma14="http://schemas.microsoft.com/office/mac/drawingml/2011/main" xmlns="" val="1"/>
             </a:ext>
           </a:extLst>
         </p:spPr>
@@ -18351,7 +18351,7 @@
               </a14:hiddenLine>
             </a:ext>
             <a:ext uri="{FAA26D3D-D897-4be2-8F04-BA451C77F1D7}">
-              <ma14:placeholderFlag xmlns:ma14="http://schemas.microsoft.com/office/mac/drawingml/2011/main" xmlns="" val="1"/>
+              <ma14:placeholderFlag xmlns="" xmlns:ma14="http://schemas.microsoft.com/office/mac/drawingml/2011/main" val="1"/>
             </a:ext>
           </a:extLst>
         </p:spPr>
@@ -21900,7 +21900,7 @@
               </a14:hiddenLine>
             </a:ext>
             <a:ext uri="{FAA26D3D-D897-4be2-8F04-BA451C77F1D7}">
-              <ma14:placeholderFlag xmlns="" xmlns:ma14="http://schemas.microsoft.com/office/mac/drawingml/2011/main" val="1"/>
+              <ma14:placeholderFlag xmlns:ma14="http://schemas.microsoft.com/office/mac/drawingml/2011/main" xmlns="" val="1"/>
             </a:ext>
           </a:extLst>
         </p:spPr>
@@ -24476,7 +24476,7 @@
               </a14:hiddenLine>
             </a:ext>
             <a:ext uri="{FAA26D3D-D897-4be2-8F04-BA451C77F1D7}">
-              <ma14:placeholderFlag xmlns="" xmlns:ma14="http://schemas.microsoft.com/office/mac/drawingml/2011/main" val="1"/>
+              <ma14:placeholderFlag xmlns:ma14="http://schemas.microsoft.com/office/mac/drawingml/2011/main" xmlns="" val="1"/>
             </a:ext>
           </a:extLst>
         </p:spPr>
@@ -25983,7 +25983,7 @@
           </a:ln>
           <a:extLst>
             <a:ext uri="{FAA26D3D-D897-4be2-8F04-BA451C77F1D7}">
-              <ma14:placeholderFlag xmlns="" xmlns:ma14="http://schemas.microsoft.com/office/mac/drawingml/2011/main" val="1"/>
+              <ma14:placeholderFlag xmlns:ma14="http://schemas.microsoft.com/office/mac/drawingml/2011/main" xmlns="" val="1"/>
             </a:ext>
           </a:extLst>
         </p:spPr>
@@ -27116,7 +27116,7 @@
           </a:ln>
           <a:extLst>
             <a:ext uri="{FAA26D3D-D897-4be2-8F04-BA451C77F1D7}">
-              <ma14:placeholderFlag xmlns="" xmlns:ma14="http://schemas.microsoft.com/office/mac/drawingml/2011/main" val="1"/>
+              <ma14:placeholderFlag xmlns:ma14="http://schemas.microsoft.com/office/mac/drawingml/2011/main" xmlns="" val="1"/>
             </a:ext>
           </a:extLst>
         </p:spPr>
@@ -27710,7 +27710,7 @@
           </a:ln>
           <a:extLst>
             <a:ext uri="{FAA26D3D-D897-4be2-8F04-BA451C77F1D7}">
-              <ma14:placeholderFlag xmlns="" xmlns:ma14="http://schemas.microsoft.com/office/mac/drawingml/2011/main" val="1"/>
+              <ma14:placeholderFlag xmlns:ma14="http://schemas.microsoft.com/office/mac/drawingml/2011/main" xmlns="" val="1"/>
             </a:ext>
           </a:extLst>
         </p:spPr>
@@ -28369,7 +28369,7 @@
           </a:ln>
           <a:extLst>
             <a:ext uri="{FAA26D3D-D897-4be2-8F04-BA451C77F1D7}">
-              <ma14:placeholderFlag xmlns="" xmlns:ma14="http://schemas.microsoft.com/office/mac/drawingml/2011/main" val="1"/>
+              <ma14:placeholderFlag xmlns:ma14="http://schemas.microsoft.com/office/mac/drawingml/2011/main" xmlns="" val="1"/>
             </a:ext>
           </a:extLst>
         </p:spPr>
@@ -29013,7 +29013,7 @@
           </a:ln>
           <a:extLst>
             <a:ext uri="{FAA26D3D-D897-4be2-8F04-BA451C77F1D7}">
-              <ma14:placeholderFlag xmlns="" xmlns:ma14="http://schemas.microsoft.com/office/mac/drawingml/2011/main" val="1"/>
+              <ma14:placeholderFlag xmlns:ma14="http://schemas.microsoft.com/office/mac/drawingml/2011/main" xmlns="" val="1"/>
             </a:ext>
           </a:extLst>
         </p:spPr>
@@ -29260,7 +29260,7 @@
           </a:ln>
           <a:extLst>
             <a:ext uri="{FAA26D3D-D897-4be2-8F04-BA451C77F1D7}">
-              <ma14:placeholderFlag xmlns="" xmlns:ma14="http://schemas.microsoft.com/office/mac/drawingml/2011/main" val="1"/>
+              <ma14:placeholderFlag xmlns:ma14="http://schemas.microsoft.com/office/mac/drawingml/2011/main" xmlns="" val="1"/>
             </a:ext>
           </a:extLst>
         </p:spPr>
@@ -31274,7 +31274,7 @@
           </a:ln>
           <a:extLst>
             <a:ext uri="{FAA26D3D-D897-4be2-8F04-BA451C77F1D7}">
-              <ma14:placeholderFlag xmlns="" xmlns:ma14="http://schemas.microsoft.com/office/mac/drawingml/2011/main" val="1"/>
+              <ma14:placeholderFlag xmlns:ma14="http://schemas.microsoft.com/office/mac/drawingml/2011/main" xmlns="" val="1"/>
             </a:ext>
           </a:extLst>
         </p:spPr>
@@ -31993,7 +31993,7 @@
           </a:ln>
           <a:extLst>
             <a:ext uri="{FAA26D3D-D897-4be2-8F04-BA451C77F1D7}">
-              <ma14:placeholderFlag xmlns="" xmlns:ma14="http://schemas.microsoft.com/office/mac/drawingml/2011/main" val="1"/>
+              <ma14:placeholderFlag xmlns:ma14="http://schemas.microsoft.com/office/mac/drawingml/2011/main" xmlns="" val="1"/>
             </a:ext>
           </a:extLst>
         </p:spPr>
@@ -33425,7 +33425,7 @@
               </a14:hiddenLine>
             </a:ext>
             <a:ext uri="{FAA26D3D-D897-4be2-8F04-BA451C77F1D7}">
-              <ma14:placeholderFlag xmlns:ma14="http://schemas.microsoft.com/office/mac/drawingml/2011/main" xmlns="" val="1"/>
+              <ma14:placeholderFlag xmlns="" xmlns:ma14="http://schemas.microsoft.com/office/mac/drawingml/2011/main" val="1"/>
             </a:ext>
           </a:extLst>
         </p:spPr>
@@ -33863,7 +33863,7 @@
               </a14:hiddenLine>
             </a:ext>
             <a:ext uri="{FAA26D3D-D897-4be2-8F04-BA451C77F1D7}">
-              <ma14:placeholderFlag xmlns="" xmlns:ma14="http://schemas.microsoft.com/office/mac/drawingml/2011/main" val="1"/>
+              <ma14:placeholderFlag xmlns:ma14="http://schemas.microsoft.com/office/mac/drawingml/2011/main" xmlns="" val="1"/>
             </a:ext>
           </a:extLst>
         </p:spPr>
@@ -36561,7 +36561,7 @@
               </a14:hiddenLine>
             </a:ext>
             <a:ext uri="{FAA26D3D-D897-4be2-8F04-BA451C77F1D7}">
-              <ma14:placeholderFlag xmlns="" xmlns:ma14="http://schemas.microsoft.com/office/mac/drawingml/2011/main" val="1"/>
+              <ma14:placeholderFlag xmlns:ma14="http://schemas.microsoft.com/office/mac/drawingml/2011/main" xmlns="" val="1"/>
             </a:ext>
           </a:extLst>
         </p:spPr>
@@ -40940,7 +40940,7 @@
           </a:ln>
           <a:extLst>
             <a:ext uri="{FAA26D3D-D897-4be2-8F04-BA451C77F1D7}">
-              <ma14:placeholderFlag xmlns="" xmlns:ma14="http://schemas.microsoft.com/office/mac/drawingml/2011/main" val="1"/>
+              <ma14:placeholderFlag xmlns:ma14="http://schemas.microsoft.com/office/mac/drawingml/2011/main" xmlns="" val="1"/>
             </a:ext>
           </a:extLst>
         </p:spPr>
@@ -42073,7 +42073,7 @@
           </a:ln>
           <a:extLst>
             <a:ext uri="{FAA26D3D-D897-4be2-8F04-BA451C77F1D7}">
-              <ma14:placeholderFlag xmlns="" xmlns:ma14="http://schemas.microsoft.com/office/mac/drawingml/2011/main" val="1"/>
+              <ma14:placeholderFlag xmlns:ma14="http://schemas.microsoft.com/office/mac/drawingml/2011/main" xmlns="" val="1"/>
             </a:ext>
           </a:extLst>
         </p:spPr>
@@ -42667,7 +42667,7 @@
           </a:ln>
           <a:extLst>
             <a:ext uri="{FAA26D3D-D897-4be2-8F04-BA451C77F1D7}">
-              <ma14:placeholderFlag xmlns="" xmlns:ma14="http://schemas.microsoft.com/office/mac/drawingml/2011/main" val="1"/>
+              <ma14:placeholderFlag xmlns:ma14="http://schemas.microsoft.com/office/mac/drawingml/2011/main" xmlns="" val="1"/>
             </a:ext>
           </a:extLst>
         </p:spPr>
@@ -43032,7 +43032,7 @@
           </a:ln>
           <a:extLst>
             <a:ext uri="{FAA26D3D-D897-4be2-8F04-BA451C77F1D7}">
-              <ma14:placeholderFlag xmlns="" xmlns:ma14="http://schemas.microsoft.com/office/mac/drawingml/2011/main" val="1"/>
+              <ma14:placeholderFlag xmlns:ma14="http://schemas.microsoft.com/office/mac/drawingml/2011/main" xmlns="" val="1"/>
             </a:ext>
           </a:extLst>
         </p:spPr>
@@ -43676,7 +43676,7 @@
           </a:ln>
           <a:extLst>
             <a:ext uri="{FAA26D3D-D897-4be2-8F04-BA451C77F1D7}">
-              <ma14:placeholderFlag xmlns="" xmlns:ma14="http://schemas.microsoft.com/office/mac/drawingml/2011/main" val="1"/>
+              <ma14:placeholderFlag xmlns:ma14="http://schemas.microsoft.com/office/mac/drawingml/2011/main" xmlns="" val="1"/>
             </a:ext>
           </a:extLst>
         </p:spPr>
@@ -46541,6 +46541,50 @@
           </a:prstGeom>
         </p:spPr>
       </p:pic>
+      <p:sp>
+        <p:nvSpPr>
+          <p:cNvPr id="5" name="TextBox 4">
+            <a:extLst>
+              <a:ext uri="{FF2B5EF4-FFF2-40B4-BE49-F238E27FC236}">
+                <a16:creationId xmlns:a16="http://schemas.microsoft.com/office/drawing/2014/main" id="{85B72566-DFAF-8188-7BE9-D10802F31119}"/>
+              </a:ext>
+            </a:extLst>
+          </p:cNvPr>
+          <p:cNvSpPr txBox="1"/>
+          <p:nvPr/>
+        </p:nvSpPr>
+        <p:spPr>
+          <a:xfrm>
+            <a:off x="9073680" y="6077191"/>
+            <a:ext cx="2948243" cy="215444"/>
+          </a:xfrm>
+          <a:prstGeom prst="rect">
+            <a:avLst/>
+          </a:prstGeom>
+          <a:noFill/>
+        </p:spPr>
+        <p:txBody>
+          <a:bodyPr wrap="none" lIns="91440" tIns="45720" rIns="91440" bIns="45720" rtlCol="0">
+            <a:spAutoFit/>
+          </a:bodyPr>
+          <a:lstStyle/>
+          <a:p>
+            <a:pPr algn="l"/>
+            <a:r>
+              <a:rPr lang="en-US" sz="800" dirty="0">
+                <a:latin typeface="+mn-lt"/>
+              </a:rPr>
+              <a:t>*** see the next page for feedback on health checks </a:t>
+            </a:r>
+            <a:r>
+              <a:rPr lang="en-US" sz="800" u="sng" dirty="0">
+                <a:latin typeface="+mn-lt"/>
+              </a:rPr>
+              <a:t>best practices</a:t>
+            </a:r>
+          </a:p>
+        </p:txBody>
+      </p:sp>
     </p:spTree>
     <p:extLst>
       <p:ext uri="{BB962C8B-B14F-4D97-AF65-F5344CB8AC3E}">
@@ -46771,6 +46815,50 @@
           </a:prstGeom>
         </p:spPr>
       </p:pic>
+      <p:sp>
+        <p:nvSpPr>
+          <p:cNvPr id="5" name="TextBox 4">
+            <a:extLst>
+              <a:ext uri="{FF2B5EF4-FFF2-40B4-BE49-F238E27FC236}">
+                <a16:creationId xmlns:a16="http://schemas.microsoft.com/office/drawing/2014/main" id="{8AC95FE3-C927-E8C7-2281-2142FB8FACB9}"/>
+              </a:ext>
+            </a:extLst>
+          </p:cNvPr>
+          <p:cNvSpPr txBox="1"/>
+          <p:nvPr/>
+        </p:nvSpPr>
+        <p:spPr>
+          <a:xfrm>
+            <a:off x="9073680" y="6077191"/>
+            <a:ext cx="2948243" cy="215444"/>
+          </a:xfrm>
+          <a:prstGeom prst="rect">
+            <a:avLst/>
+          </a:prstGeom>
+          <a:noFill/>
+        </p:spPr>
+        <p:txBody>
+          <a:bodyPr wrap="none" lIns="91440" tIns="45720" rIns="91440" bIns="45720" rtlCol="0">
+            <a:spAutoFit/>
+          </a:bodyPr>
+          <a:lstStyle/>
+          <a:p>
+            <a:pPr algn="l"/>
+            <a:r>
+              <a:rPr lang="en-US" sz="800" dirty="0">
+                <a:latin typeface="+mn-lt"/>
+              </a:rPr>
+              <a:t>*** see the next page for feedback on health checks </a:t>
+            </a:r>
+            <a:r>
+              <a:rPr lang="en-US" sz="800" u="sng" dirty="0">
+                <a:latin typeface="+mn-lt"/>
+              </a:rPr>
+              <a:t>best practices</a:t>
+            </a:r>
+          </a:p>
+        </p:txBody>
+      </p:sp>
     </p:spTree>
     <p:extLst>
       <p:ext uri="{BB962C8B-B14F-4D97-AF65-F5344CB8AC3E}">
@@ -47403,6 +47491,50 @@
           </a:prstGeom>
         </p:spPr>
       </p:pic>
+      <p:sp>
+        <p:nvSpPr>
+          <p:cNvPr id="4" name="TextBox 3">
+            <a:extLst>
+              <a:ext uri="{FF2B5EF4-FFF2-40B4-BE49-F238E27FC236}">
+                <a16:creationId xmlns:a16="http://schemas.microsoft.com/office/drawing/2014/main" id="{6FB3AE06-CD10-6301-2E59-5CC1B050A54D}"/>
+              </a:ext>
+            </a:extLst>
+          </p:cNvPr>
+          <p:cNvSpPr txBox="1"/>
+          <p:nvPr/>
+        </p:nvSpPr>
+        <p:spPr>
+          <a:xfrm>
+            <a:off x="9073680" y="6077191"/>
+            <a:ext cx="2948243" cy="215444"/>
+          </a:xfrm>
+          <a:prstGeom prst="rect">
+            <a:avLst/>
+          </a:prstGeom>
+          <a:noFill/>
+        </p:spPr>
+        <p:txBody>
+          <a:bodyPr wrap="none" lIns="91440" tIns="45720" rIns="91440" bIns="45720" rtlCol="0">
+            <a:spAutoFit/>
+          </a:bodyPr>
+          <a:lstStyle/>
+          <a:p>
+            <a:pPr algn="l"/>
+            <a:r>
+              <a:rPr lang="en-US" sz="800" dirty="0">
+                <a:latin typeface="+mn-lt"/>
+              </a:rPr>
+              <a:t>*** see the next page for feedback on health checks </a:t>
+            </a:r>
+            <a:r>
+              <a:rPr lang="en-US" sz="800" u="sng" dirty="0">
+                <a:latin typeface="+mn-lt"/>
+              </a:rPr>
+              <a:t>best practices</a:t>
+            </a:r>
+          </a:p>
+        </p:txBody>
+      </p:sp>
     </p:spTree>
     <p:extLst>
       <p:ext uri="{BB962C8B-B14F-4D97-AF65-F5344CB8AC3E}">
@@ -47643,6 +47775,50 @@
           </a:prstGeom>
         </p:spPr>
       </p:pic>
+      <p:sp>
+        <p:nvSpPr>
+          <p:cNvPr id="5" name="TextBox 4">
+            <a:extLst>
+              <a:ext uri="{FF2B5EF4-FFF2-40B4-BE49-F238E27FC236}">
+                <a16:creationId xmlns:a16="http://schemas.microsoft.com/office/drawing/2014/main" id="{3ABA37A8-EDAD-637D-4E63-050B2904681B}"/>
+              </a:ext>
+            </a:extLst>
+          </p:cNvPr>
+          <p:cNvSpPr txBox="1"/>
+          <p:nvPr/>
+        </p:nvSpPr>
+        <p:spPr>
+          <a:xfrm>
+            <a:off x="9073680" y="6077191"/>
+            <a:ext cx="2948243" cy="215444"/>
+          </a:xfrm>
+          <a:prstGeom prst="rect">
+            <a:avLst/>
+          </a:prstGeom>
+          <a:noFill/>
+        </p:spPr>
+        <p:txBody>
+          <a:bodyPr wrap="none" lIns="91440" tIns="45720" rIns="91440" bIns="45720" rtlCol="0">
+            <a:spAutoFit/>
+          </a:bodyPr>
+          <a:lstStyle/>
+          <a:p>
+            <a:pPr algn="l"/>
+            <a:r>
+              <a:rPr lang="en-US" sz="800" dirty="0">
+                <a:latin typeface="+mn-lt"/>
+              </a:rPr>
+              <a:t>*** see the next page for feedback on health checks </a:t>
+            </a:r>
+            <a:r>
+              <a:rPr lang="en-US" sz="800" u="sng" dirty="0">
+                <a:latin typeface="+mn-lt"/>
+              </a:rPr>
+              <a:t>best practices</a:t>
+            </a:r>
+          </a:p>
+        </p:txBody>
+      </p:sp>
     </p:spTree>
     <p:extLst>
       <p:ext uri="{BB962C8B-B14F-4D97-AF65-F5344CB8AC3E}">
@@ -47873,6 +48049,50 @@
           </a:prstGeom>
         </p:spPr>
       </p:pic>
+      <p:sp>
+        <p:nvSpPr>
+          <p:cNvPr id="5" name="TextBox 4">
+            <a:extLst>
+              <a:ext uri="{FF2B5EF4-FFF2-40B4-BE49-F238E27FC236}">
+                <a16:creationId xmlns:a16="http://schemas.microsoft.com/office/drawing/2014/main" id="{F89E61C4-44A8-FB71-60FD-FEF531078E87}"/>
+              </a:ext>
+            </a:extLst>
+          </p:cNvPr>
+          <p:cNvSpPr txBox="1"/>
+          <p:nvPr/>
+        </p:nvSpPr>
+        <p:spPr>
+          <a:xfrm>
+            <a:off x="9073680" y="6077191"/>
+            <a:ext cx="2948243" cy="215444"/>
+          </a:xfrm>
+          <a:prstGeom prst="rect">
+            <a:avLst/>
+          </a:prstGeom>
+          <a:noFill/>
+        </p:spPr>
+        <p:txBody>
+          <a:bodyPr wrap="none" lIns="91440" tIns="45720" rIns="91440" bIns="45720" rtlCol="0">
+            <a:spAutoFit/>
+          </a:bodyPr>
+          <a:lstStyle/>
+          <a:p>
+            <a:pPr algn="l"/>
+            <a:r>
+              <a:rPr lang="en-US" sz="800" dirty="0">
+                <a:latin typeface="+mn-lt"/>
+              </a:rPr>
+              <a:t>*** see the next page for feedback on health checks </a:t>
+            </a:r>
+            <a:r>
+              <a:rPr lang="en-US" sz="800" u="sng" dirty="0">
+                <a:latin typeface="+mn-lt"/>
+              </a:rPr>
+              <a:t>best practices</a:t>
+            </a:r>
+          </a:p>
+        </p:txBody>
+      </p:sp>
     </p:spTree>
     <p:extLst>
       <p:ext uri="{BB962C8B-B14F-4D97-AF65-F5344CB8AC3E}">
@@ -48103,6 +48323,50 @@
           </a:prstGeom>
         </p:spPr>
       </p:pic>
+      <p:sp>
+        <p:nvSpPr>
+          <p:cNvPr id="5" name="TextBox 4">
+            <a:extLst>
+              <a:ext uri="{FF2B5EF4-FFF2-40B4-BE49-F238E27FC236}">
+                <a16:creationId xmlns:a16="http://schemas.microsoft.com/office/drawing/2014/main" id="{60AD8280-2AE6-A913-8BA7-DD65D7A433C5}"/>
+              </a:ext>
+            </a:extLst>
+          </p:cNvPr>
+          <p:cNvSpPr txBox="1"/>
+          <p:nvPr/>
+        </p:nvSpPr>
+        <p:spPr>
+          <a:xfrm>
+            <a:off x="9073680" y="6077191"/>
+            <a:ext cx="2948243" cy="215444"/>
+          </a:xfrm>
+          <a:prstGeom prst="rect">
+            <a:avLst/>
+          </a:prstGeom>
+          <a:noFill/>
+        </p:spPr>
+        <p:txBody>
+          <a:bodyPr wrap="none" lIns="91440" tIns="45720" rIns="91440" bIns="45720" rtlCol="0">
+            <a:spAutoFit/>
+          </a:bodyPr>
+          <a:lstStyle/>
+          <a:p>
+            <a:pPr algn="l"/>
+            <a:r>
+              <a:rPr lang="en-US" sz="800" dirty="0">
+                <a:latin typeface="+mn-lt"/>
+              </a:rPr>
+              <a:t>*** see the next page for feedback on health checks </a:t>
+            </a:r>
+            <a:r>
+              <a:rPr lang="en-US" sz="800" u="sng" dirty="0">
+                <a:latin typeface="+mn-lt"/>
+              </a:rPr>
+              <a:t>best practices</a:t>
+            </a:r>
+          </a:p>
+        </p:txBody>
+      </p:sp>
     </p:spTree>
     <p:extLst>
       <p:ext uri="{BB962C8B-B14F-4D97-AF65-F5344CB8AC3E}">
@@ -49273,33 +49537,6 @@
 </file>
 
 <file path=customXml/item1.xml><?xml version="1.0" encoding="utf-8"?>
-<p:properties xmlns:p="http://schemas.microsoft.com/office/2006/metadata/properties" xmlns:xsi="http://www.w3.org/2001/XMLSchema-instance" xmlns:pc="http://schemas.microsoft.com/office/infopath/2007/PartnerControls">
-  <documentManagement>
-    <TaxCatchAll xmlns="d78665ad-f783-4f30-b3cb-b870e5173973" xsi:nil="true"/>
-    <lcf76f155ced4ddcb4097134ff3c332f xmlns="c068e80e-f499-4ba4-b97d-8eb81f7bf0a4">
-      <Terms xmlns="http://schemas.microsoft.com/office/infopath/2007/PartnerControls"/>
-    </lcf76f155ced4ddcb4097134ff3c332f>
-    <SharedWithUsers xmlns="d78665ad-f783-4f30-b3cb-b870e5173973">
-      <UserInfo>
-        <DisplayName>Christine Sumner (chsumner)</DisplayName>
-        <AccountId>229</AccountId>
-        <AccountType/>
-      </UserInfo>
-    </SharedWithUsers>
-  </documentManagement>
-</p:properties>
-</file>
-
-<file path=customXml/item2.xml><?xml version="1.0" encoding="utf-8"?>
-<?mso-contentType ?>
-<FormTemplates xmlns="http://schemas.microsoft.com/sharepoint/v3/contenttype/forms">
-  <Display>DocumentLibraryForm</Display>
-  <Edit>DocumentLibraryForm</Edit>
-  <New>DocumentLibraryForm</New>
-</FormTemplates>
-</file>
-
-<file path=customXml/item3.xml><?xml version="1.0" encoding="utf-8"?>
 <ct:contentTypeSchema xmlns:ct="http://schemas.microsoft.com/office/2006/metadata/contentType" xmlns:ma="http://schemas.microsoft.com/office/2006/metadata/properties/metaAttributes" ct:_="" ma:_="" ma:contentTypeName="Document" ma:contentTypeID="0x01010016638FBC164A6C4987893577CA81BDCE" ma:contentTypeVersion="12" ma:contentTypeDescription="Create a new document." ma:contentTypeScope="" ma:versionID="ad216d817d9e9210cab45cf1c00ab7cf">
   <xsd:schema xmlns:xsd="http://www.w3.org/2001/XMLSchema" xmlns:xs="http://www.w3.org/2001/XMLSchema" xmlns:p="http://schemas.microsoft.com/office/2006/metadata/properties" xmlns:ns2="c068e80e-f499-4ba4-b97d-8eb81f7bf0a4" xmlns:ns3="d78665ad-f783-4f30-b3cb-b870e5173973" targetNamespace="http://schemas.microsoft.com/office/2006/metadata/properties" ma:root="true" ma:fieldsID="b03d820719e6014dead3958bf2973f6f" ns2:_="" ns3:_="">
     <xsd:import namespace="c068e80e-f499-4ba4-b97d-8eb81f7bf0a4"/>
@@ -49516,7 +49753,61 @@
 </ct:contentTypeSchema>
 </file>
 
+<file path=customXml/item2.xml><?xml version="1.0" encoding="utf-8"?>
+<?mso-contentType ?>
+<FormTemplates xmlns="http://schemas.microsoft.com/sharepoint/v3/contenttype/forms">
+  <Display>DocumentLibraryForm</Display>
+  <Edit>DocumentLibraryForm</Edit>
+  <New>DocumentLibraryForm</New>
+</FormTemplates>
+</file>
+
+<file path=customXml/item3.xml><?xml version="1.0" encoding="utf-8"?>
+<p:properties xmlns:p="http://schemas.microsoft.com/office/2006/metadata/properties" xmlns:xsi="http://www.w3.org/2001/XMLSchema-instance" xmlns:pc="http://schemas.microsoft.com/office/infopath/2007/PartnerControls">
+  <documentManagement>
+    <TaxCatchAll xmlns="d78665ad-f783-4f30-b3cb-b870e5173973" xsi:nil="true"/>
+    <lcf76f155ced4ddcb4097134ff3c332f xmlns="c068e80e-f499-4ba4-b97d-8eb81f7bf0a4">
+      <Terms xmlns="http://schemas.microsoft.com/office/infopath/2007/PartnerControls"/>
+    </lcf76f155ced4ddcb4097134ff3c332f>
+    <SharedWithUsers xmlns="d78665ad-f783-4f30-b3cb-b870e5173973">
+      <UserInfo>
+        <DisplayName>Christine Sumner (chsumner)</DisplayName>
+        <AccountId>229</AccountId>
+        <AccountType/>
+      </UserInfo>
+    </SharedWithUsers>
+  </documentManagement>
+</p:properties>
+</file>
+
 <file path=customXml/itemProps1.xml><?xml version="1.0" encoding="utf-8"?>
+<ds:datastoreItem xmlns:ds="http://schemas.openxmlformats.org/officeDocument/2006/customXml" ds:itemID="{BFF5C609-47B2-4E38-98DE-50447A64B0AF}">
+  <ds:schemaRefs>
+    <ds:schemaRef ds:uri="http://schemas.microsoft.com/office/2006/metadata/contentType"/>
+    <ds:schemaRef ds:uri="http://schemas.microsoft.com/office/2006/metadata/properties/metaAttributes"/>
+    <ds:schemaRef ds:uri="http://www.w3.org/2001/XMLSchema"/>
+    <ds:schemaRef ds:uri="http://schemas.microsoft.com/office/2006/metadata/properties"/>
+    <ds:schemaRef ds:uri="c068e80e-f499-4ba4-b97d-8eb81f7bf0a4"/>
+    <ds:schemaRef ds:uri="d78665ad-f783-4f30-b3cb-b870e5173973"/>
+    <ds:schemaRef ds:uri="http://schemas.microsoft.com/office/2006/documentManagement/types"/>
+    <ds:schemaRef ds:uri="http://schemas.microsoft.com/office/infopath/2007/PartnerControls"/>
+    <ds:schemaRef ds:uri="http://schemas.openxmlformats.org/package/2006/metadata/core-properties"/>
+    <ds:schemaRef ds:uri="http://purl.org/dc/elements/1.1/"/>
+    <ds:schemaRef ds:uri="http://purl.org/dc/terms/"/>
+    <ds:schemaRef ds:uri="http://schemas.microsoft.com/internal/obd"/>
+  </ds:schemaRefs>
+</ds:datastoreItem>
+</file>
+
+<file path=customXml/itemProps2.xml><?xml version="1.0" encoding="utf-8"?>
+<ds:datastoreItem xmlns:ds="http://schemas.openxmlformats.org/officeDocument/2006/customXml" ds:itemID="{2D849882-45D9-49DF-83E9-35AEA65C5DA4}">
+  <ds:schemaRefs>
+    <ds:schemaRef ds:uri="http://schemas.microsoft.com/sharepoint/v3/contenttype/forms"/>
+  </ds:schemaRefs>
+</ds:datastoreItem>
+</file>
+
+<file path=customXml/itemProps3.xml><?xml version="1.0" encoding="utf-8"?>
 <ds:datastoreItem xmlns:ds="http://schemas.openxmlformats.org/officeDocument/2006/customXml" ds:itemID="{B2A938C6-D422-428A-8901-D36A71A3A66F}">
   <ds:schemaRefs>
     <ds:schemaRef ds:uri="http://purl.org/dc/elements/1.1/"/>
@@ -49533,31 +49824,4 @@
     <ds:schemaRef ds:uri="c068e80e-f499-4ba4-b97d-8eb81f7bf0a4"/>
   </ds:schemaRefs>
 </ds:datastoreItem>
-</file>
-
-<file path=customXml/itemProps2.xml><?xml version="1.0" encoding="utf-8"?>
-<ds:datastoreItem xmlns:ds="http://schemas.openxmlformats.org/officeDocument/2006/customXml" ds:itemID="{2D849882-45D9-49DF-83E9-35AEA65C5DA4}">
-  <ds:schemaRefs>
-    <ds:schemaRef ds:uri="http://schemas.microsoft.com/sharepoint/v3/contenttype/forms"/>
-  </ds:schemaRefs>
-</ds:datastoreItem>
-</file>
-
-<file path=customXml/itemProps3.xml><?xml version="1.0" encoding="utf-8"?>
-<ds:datastoreItem xmlns:ds="http://schemas.openxmlformats.org/officeDocument/2006/customXml" ds:itemID="{BFF5C609-47B2-4E38-98DE-50447A64B0AF}">
-  <ds:schemaRefs>
-    <ds:schemaRef ds:uri="http://schemas.microsoft.com/office/2006/metadata/contentType"/>
-    <ds:schemaRef ds:uri="http://schemas.microsoft.com/office/2006/metadata/properties/metaAttributes"/>
-    <ds:schemaRef ds:uri="http://www.w3.org/2001/XMLSchema"/>
-    <ds:schemaRef ds:uri="http://schemas.microsoft.com/office/2006/metadata/properties"/>
-    <ds:schemaRef ds:uri="c068e80e-f499-4ba4-b97d-8eb81f7bf0a4"/>
-    <ds:schemaRef ds:uri="d78665ad-f783-4f30-b3cb-b870e5173973"/>
-    <ds:schemaRef ds:uri="http://schemas.microsoft.com/office/2006/documentManagement/types"/>
-    <ds:schemaRef ds:uri="http://schemas.microsoft.com/office/infopath/2007/PartnerControls"/>
-    <ds:schemaRef ds:uri="http://schemas.openxmlformats.org/package/2006/metadata/core-properties"/>
-    <ds:schemaRef ds:uri="http://purl.org/dc/elements/1.1/"/>
-    <ds:schemaRef ds:uri="http://purl.org/dc/terms/"/>
-    <ds:schemaRef ds:uri="http://schemas.microsoft.com/internal/obd"/>
-  </ds:schemaRefs>
-</ds:datastoreItem>
 </file>
</xml_diff>

<commit_message>
cosmetic changes and fix to an exit logic
</commit_message>
<xml_diff>
--- a/backend/resources/pptAssets/HybridApplicationMonitoringUseCase_template.pptx
+++ b/backend/resources/pptAssets/HybridApplicationMonitoringUseCase_template.pptx
@@ -293,7 +293,7 @@
           <a:p>
             <a:fld id="{702657A2-7B7A-174B-A542-3B4C9FC943CD}" type="datetimeFigureOut">
               <a:rPr lang="en-US" smtClean="0"/>
-              <a:t>4/21/23</a:t>
+              <a:t>5/3/23</a:t>
             </a:fld>
             <a:endParaRPr lang="en-US"/>
           </a:p>
@@ -2886,7 +2886,7 @@
           </a:ln>
           <a:extLst>
             <a:ext uri="{FAA26D3D-D897-4be2-8F04-BA451C77F1D7}">
-              <ma14:placeholderFlag xmlns="" xmlns:ma14="http://schemas.microsoft.com/office/mac/drawingml/2011/main" val="1"/>
+              <ma14:placeholderFlag xmlns:ma14="http://schemas.microsoft.com/office/mac/drawingml/2011/main" xmlns="" val="1"/>
             </a:ext>
           </a:extLst>
         </p:spPr>
@@ -4900,7 +4900,7 @@
           </a:ln>
           <a:extLst>
             <a:ext uri="{FAA26D3D-D897-4be2-8F04-BA451C77F1D7}">
-              <ma14:placeholderFlag xmlns="" xmlns:ma14="http://schemas.microsoft.com/office/mac/drawingml/2011/main" val="1"/>
+              <ma14:placeholderFlag xmlns:ma14="http://schemas.microsoft.com/office/mac/drawingml/2011/main" xmlns="" val="1"/>
             </a:ext>
           </a:extLst>
         </p:spPr>
@@ -5619,7 +5619,7 @@
           </a:ln>
           <a:extLst>
             <a:ext uri="{FAA26D3D-D897-4be2-8F04-BA451C77F1D7}">
-              <ma14:placeholderFlag xmlns="" xmlns:ma14="http://schemas.microsoft.com/office/mac/drawingml/2011/main" val="1"/>
+              <ma14:placeholderFlag xmlns:ma14="http://schemas.microsoft.com/office/mac/drawingml/2011/main" xmlns="" val="1"/>
             </a:ext>
           </a:extLst>
         </p:spPr>
@@ -7117,7 +7117,7 @@
               </a14:hiddenLine>
             </a:ext>
             <a:ext uri="{FAA26D3D-D897-4be2-8F04-BA451C77F1D7}">
-              <ma14:placeholderFlag xmlns="" xmlns:ma14="http://schemas.microsoft.com/office/mac/drawingml/2011/main" val="1"/>
+              <ma14:placeholderFlag xmlns:ma14="http://schemas.microsoft.com/office/mac/drawingml/2011/main" xmlns="" val="1"/>
             </a:ext>
           </a:extLst>
         </p:spPr>
@@ -7365,7 +7365,7 @@
               </a14:hiddenLine>
             </a:ext>
             <a:ext uri="{FAA26D3D-D897-4be2-8F04-BA451C77F1D7}">
-              <ma14:placeholderFlag xmlns="" xmlns:ma14="http://schemas.microsoft.com/office/mac/drawingml/2011/main" val="1"/>
+              <ma14:placeholderFlag xmlns:ma14="http://schemas.microsoft.com/office/mac/drawingml/2011/main" xmlns="" val="1"/>
             </a:ext>
           </a:extLst>
         </p:spPr>
@@ -7634,7 +7634,7 @@
               </a14:hiddenLine>
             </a:ext>
             <a:ext uri="{FAA26D3D-D897-4be2-8F04-BA451C77F1D7}">
-              <ma14:placeholderFlag xmlns:ma14="http://schemas.microsoft.com/office/mac/drawingml/2011/main" xmlns="" val="1"/>
+              <ma14:placeholderFlag xmlns="" xmlns:ma14="http://schemas.microsoft.com/office/mac/drawingml/2011/main" val="1"/>
             </a:ext>
           </a:extLst>
         </p:spPr>
@@ -8064,14 +8064,14 @@
           </a:ln>
           <a:extLst>
             <a:ext uri="{909E8E84-426E-40dd-AFC4-6F175D3DCCD1}">
-              <a14:hiddenFill xmlns="" xmlns:a14="http://schemas.microsoft.com/office/drawing/2010/main">
+              <a14:hiddenFill xmlns:a14="http://schemas.microsoft.com/office/drawing/2010/main" xmlns="">
                 <a:solidFill>
                   <a:srgbClr val="FFFFFF"/>
                 </a:solidFill>
               </a14:hiddenFill>
             </a:ext>
             <a:ext uri="{91240B29-F687-4f45-9708-019B960494DF}">
-              <a14:hiddenLine xmlns="" xmlns:a14="http://schemas.microsoft.com/office/drawing/2010/main" w="9525">
+              <a14:hiddenLine xmlns:a14="http://schemas.microsoft.com/office/drawing/2010/main" xmlns="" w="9525">
                 <a:solidFill>
                   <a:srgbClr val="000000"/>
                 </a:solidFill>
@@ -10042,7 +10042,7 @@
           </a:ln>
           <a:extLst>
             <a:ext uri="{FAA26D3D-D897-4be2-8F04-BA451C77F1D7}">
-              <ma14:placeholderFlag xmlns="" xmlns:ma14="http://schemas.microsoft.com/office/mac/drawingml/2011/main" val="1"/>
+              <ma14:placeholderFlag xmlns:ma14="http://schemas.microsoft.com/office/mac/drawingml/2011/main" xmlns="" val="1"/>
             </a:ext>
           </a:extLst>
         </p:spPr>
@@ -11718,7 +11718,7 @@
           </a:ln>
           <a:extLst>
             <a:ext uri="{FAA26D3D-D897-4be2-8F04-BA451C77F1D7}">
-              <ma14:placeholderFlag xmlns="" xmlns:ma14="http://schemas.microsoft.com/office/mac/drawingml/2011/main" val="1"/>
+              <ma14:placeholderFlag xmlns:ma14="http://schemas.microsoft.com/office/mac/drawingml/2011/main" xmlns="" val="1"/>
             </a:ext>
           </a:extLst>
         </p:spPr>
@@ -12312,7 +12312,7 @@
           </a:ln>
           <a:extLst>
             <a:ext uri="{FAA26D3D-D897-4be2-8F04-BA451C77F1D7}">
-              <ma14:placeholderFlag xmlns="" xmlns:ma14="http://schemas.microsoft.com/office/mac/drawingml/2011/main" val="1"/>
+              <ma14:placeholderFlag xmlns:ma14="http://schemas.microsoft.com/office/mac/drawingml/2011/main" xmlns="" val="1"/>
             </a:ext>
           </a:extLst>
         </p:spPr>
@@ -12677,7 +12677,7 @@
           </a:ln>
           <a:extLst>
             <a:ext uri="{FAA26D3D-D897-4be2-8F04-BA451C77F1D7}">
-              <ma14:placeholderFlag xmlns="" xmlns:ma14="http://schemas.microsoft.com/office/mac/drawingml/2011/main" val="1"/>
+              <ma14:placeholderFlag xmlns:ma14="http://schemas.microsoft.com/office/mac/drawingml/2011/main" xmlns="" val="1"/>
             </a:ext>
           </a:extLst>
         </p:spPr>
@@ -13321,7 +13321,7 @@
           </a:ln>
           <a:extLst>
             <a:ext uri="{FAA26D3D-D897-4be2-8F04-BA451C77F1D7}">
-              <ma14:placeholderFlag xmlns="" xmlns:ma14="http://schemas.microsoft.com/office/mac/drawingml/2011/main" val="1"/>
+              <ma14:placeholderFlag xmlns:ma14="http://schemas.microsoft.com/office/mac/drawingml/2011/main" xmlns="" val="1"/>
             </a:ext>
           </a:extLst>
         </p:spPr>
@@ -13568,7 +13568,7 @@
           </a:ln>
           <a:extLst>
             <a:ext uri="{FAA26D3D-D897-4be2-8F04-BA451C77F1D7}">
-              <ma14:placeholderFlag xmlns="" xmlns:ma14="http://schemas.microsoft.com/office/mac/drawingml/2011/main" val="1"/>
+              <ma14:placeholderFlag xmlns:ma14="http://schemas.microsoft.com/office/mac/drawingml/2011/main" xmlns="" val="1"/>
             </a:ext>
           </a:extLst>
         </p:spPr>
@@ -16247,7 +16247,7 @@
           </a:ln>
           <a:extLst>
             <a:ext uri="{FAA26D3D-D897-4be2-8F04-BA451C77F1D7}">
-              <ma14:placeholderFlag xmlns="" xmlns:ma14="http://schemas.microsoft.com/office/mac/drawingml/2011/main" val="1"/>
+              <ma14:placeholderFlag xmlns:ma14="http://schemas.microsoft.com/office/mac/drawingml/2011/main" xmlns="" val="1"/>
             </a:ext>
           </a:extLst>
         </p:spPr>
@@ -16966,7 +16966,7 @@
           </a:ln>
           <a:extLst>
             <a:ext uri="{FAA26D3D-D897-4be2-8F04-BA451C77F1D7}">
-              <ma14:placeholderFlag xmlns="" xmlns:ma14="http://schemas.microsoft.com/office/mac/drawingml/2011/main" val="1"/>
+              <ma14:placeholderFlag xmlns:ma14="http://schemas.microsoft.com/office/mac/drawingml/2011/main" xmlns="" val="1"/>
             </a:ext>
           </a:extLst>
         </p:spPr>
@@ -18082,7 +18082,7 @@
               </a14:hiddenLine>
             </a:ext>
             <a:ext uri="{FAA26D3D-D897-4be2-8F04-BA451C77F1D7}">
-              <ma14:placeholderFlag xmlns="" xmlns:ma14="http://schemas.microsoft.com/office/mac/drawingml/2011/main" val="1"/>
+              <ma14:placeholderFlag xmlns:ma14="http://schemas.microsoft.com/office/mac/drawingml/2011/main" xmlns="" val="1"/>
             </a:ext>
           </a:extLst>
         </p:spPr>
@@ -18351,7 +18351,7 @@
               </a14:hiddenLine>
             </a:ext>
             <a:ext uri="{FAA26D3D-D897-4be2-8F04-BA451C77F1D7}">
-              <ma14:placeholderFlag xmlns:ma14="http://schemas.microsoft.com/office/mac/drawingml/2011/main" xmlns="" val="1"/>
+              <ma14:placeholderFlag xmlns="" xmlns:ma14="http://schemas.microsoft.com/office/mac/drawingml/2011/main" val="1"/>
             </a:ext>
           </a:extLst>
         </p:spPr>
@@ -21900,7 +21900,7 @@
               </a14:hiddenLine>
             </a:ext>
             <a:ext uri="{FAA26D3D-D897-4be2-8F04-BA451C77F1D7}">
-              <ma14:placeholderFlag xmlns="" xmlns:ma14="http://schemas.microsoft.com/office/mac/drawingml/2011/main" val="1"/>
+              <ma14:placeholderFlag xmlns:ma14="http://schemas.microsoft.com/office/mac/drawingml/2011/main" xmlns="" val="1"/>
             </a:ext>
           </a:extLst>
         </p:spPr>
@@ -24476,7 +24476,7 @@
               </a14:hiddenLine>
             </a:ext>
             <a:ext uri="{FAA26D3D-D897-4be2-8F04-BA451C77F1D7}">
-              <ma14:placeholderFlag xmlns="" xmlns:ma14="http://schemas.microsoft.com/office/mac/drawingml/2011/main" val="1"/>
+              <ma14:placeholderFlag xmlns:ma14="http://schemas.microsoft.com/office/mac/drawingml/2011/main" xmlns="" val="1"/>
             </a:ext>
           </a:extLst>
         </p:spPr>
@@ -25983,7 +25983,7 @@
           </a:ln>
           <a:extLst>
             <a:ext uri="{FAA26D3D-D897-4be2-8F04-BA451C77F1D7}">
-              <ma14:placeholderFlag xmlns="" xmlns:ma14="http://schemas.microsoft.com/office/mac/drawingml/2011/main" val="1"/>
+              <ma14:placeholderFlag xmlns:ma14="http://schemas.microsoft.com/office/mac/drawingml/2011/main" xmlns="" val="1"/>
             </a:ext>
           </a:extLst>
         </p:spPr>
@@ -27116,7 +27116,7 @@
           </a:ln>
           <a:extLst>
             <a:ext uri="{FAA26D3D-D897-4be2-8F04-BA451C77F1D7}">
-              <ma14:placeholderFlag xmlns="" xmlns:ma14="http://schemas.microsoft.com/office/mac/drawingml/2011/main" val="1"/>
+              <ma14:placeholderFlag xmlns:ma14="http://schemas.microsoft.com/office/mac/drawingml/2011/main" xmlns="" val="1"/>
             </a:ext>
           </a:extLst>
         </p:spPr>
@@ -27710,7 +27710,7 @@
           </a:ln>
           <a:extLst>
             <a:ext uri="{FAA26D3D-D897-4be2-8F04-BA451C77F1D7}">
-              <ma14:placeholderFlag xmlns="" xmlns:ma14="http://schemas.microsoft.com/office/mac/drawingml/2011/main" val="1"/>
+              <ma14:placeholderFlag xmlns:ma14="http://schemas.microsoft.com/office/mac/drawingml/2011/main" xmlns="" val="1"/>
             </a:ext>
           </a:extLst>
         </p:spPr>
@@ -28369,7 +28369,7 @@
           </a:ln>
           <a:extLst>
             <a:ext uri="{FAA26D3D-D897-4be2-8F04-BA451C77F1D7}">
-              <ma14:placeholderFlag xmlns="" xmlns:ma14="http://schemas.microsoft.com/office/mac/drawingml/2011/main" val="1"/>
+              <ma14:placeholderFlag xmlns:ma14="http://schemas.microsoft.com/office/mac/drawingml/2011/main" xmlns="" val="1"/>
             </a:ext>
           </a:extLst>
         </p:spPr>
@@ -29013,7 +29013,7 @@
           </a:ln>
           <a:extLst>
             <a:ext uri="{FAA26D3D-D897-4be2-8F04-BA451C77F1D7}">
-              <ma14:placeholderFlag xmlns="" xmlns:ma14="http://schemas.microsoft.com/office/mac/drawingml/2011/main" val="1"/>
+              <ma14:placeholderFlag xmlns:ma14="http://schemas.microsoft.com/office/mac/drawingml/2011/main" xmlns="" val="1"/>
             </a:ext>
           </a:extLst>
         </p:spPr>
@@ -29260,7 +29260,7 @@
           </a:ln>
           <a:extLst>
             <a:ext uri="{FAA26D3D-D897-4be2-8F04-BA451C77F1D7}">
-              <ma14:placeholderFlag xmlns="" xmlns:ma14="http://schemas.microsoft.com/office/mac/drawingml/2011/main" val="1"/>
+              <ma14:placeholderFlag xmlns:ma14="http://schemas.microsoft.com/office/mac/drawingml/2011/main" xmlns="" val="1"/>
             </a:ext>
           </a:extLst>
         </p:spPr>
@@ -31274,7 +31274,7 @@
           </a:ln>
           <a:extLst>
             <a:ext uri="{FAA26D3D-D897-4be2-8F04-BA451C77F1D7}">
-              <ma14:placeholderFlag xmlns="" xmlns:ma14="http://schemas.microsoft.com/office/mac/drawingml/2011/main" val="1"/>
+              <ma14:placeholderFlag xmlns:ma14="http://schemas.microsoft.com/office/mac/drawingml/2011/main" xmlns="" val="1"/>
             </a:ext>
           </a:extLst>
         </p:spPr>
@@ -31993,7 +31993,7 @@
           </a:ln>
           <a:extLst>
             <a:ext uri="{FAA26D3D-D897-4be2-8F04-BA451C77F1D7}">
-              <ma14:placeholderFlag xmlns="" xmlns:ma14="http://schemas.microsoft.com/office/mac/drawingml/2011/main" val="1"/>
+              <ma14:placeholderFlag xmlns:ma14="http://schemas.microsoft.com/office/mac/drawingml/2011/main" xmlns="" val="1"/>
             </a:ext>
           </a:extLst>
         </p:spPr>
@@ -33425,7 +33425,7 @@
               </a14:hiddenLine>
             </a:ext>
             <a:ext uri="{FAA26D3D-D897-4be2-8F04-BA451C77F1D7}">
-              <ma14:placeholderFlag xmlns:ma14="http://schemas.microsoft.com/office/mac/drawingml/2011/main" xmlns="" val="1"/>
+              <ma14:placeholderFlag xmlns="" xmlns:ma14="http://schemas.microsoft.com/office/mac/drawingml/2011/main" val="1"/>
             </a:ext>
           </a:extLst>
         </p:spPr>
@@ -33863,7 +33863,7 @@
               </a14:hiddenLine>
             </a:ext>
             <a:ext uri="{FAA26D3D-D897-4be2-8F04-BA451C77F1D7}">
-              <ma14:placeholderFlag xmlns="" xmlns:ma14="http://schemas.microsoft.com/office/mac/drawingml/2011/main" val="1"/>
+              <ma14:placeholderFlag xmlns:ma14="http://schemas.microsoft.com/office/mac/drawingml/2011/main" xmlns="" val="1"/>
             </a:ext>
           </a:extLst>
         </p:spPr>
@@ -36561,7 +36561,7 @@
               </a14:hiddenLine>
             </a:ext>
             <a:ext uri="{FAA26D3D-D897-4be2-8F04-BA451C77F1D7}">
-              <ma14:placeholderFlag xmlns="" xmlns:ma14="http://schemas.microsoft.com/office/mac/drawingml/2011/main" val="1"/>
+              <ma14:placeholderFlag xmlns:ma14="http://schemas.microsoft.com/office/mac/drawingml/2011/main" xmlns="" val="1"/>
             </a:ext>
           </a:extLst>
         </p:spPr>
@@ -40940,7 +40940,7 @@
           </a:ln>
           <a:extLst>
             <a:ext uri="{FAA26D3D-D897-4be2-8F04-BA451C77F1D7}">
-              <ma14:placeholderFlag xmlns="" xmlns:ma14="http://schemas.microsoft.com/office/mac/drawingml/2011/main" val="1"/>
+              <ma14:placeholderFlag xmlns:ma14="http://schemas.microsoft.com/office/mac/drawingml/2011/main" xmlns="" val="1"/>
             </a:ext>
           </a:extLst>
         </p:spPr>
@@ -42073,7 +42073,7 @@
           </a:ln>
           <a:extLst>
             <a:ext uri="{FAA26D3D-D897-4be2-8F04-BA451C77F1D7}">
-              <ma14:placeholderFlag xmlns="" xmlns:ma14="http://schemas.microsoft.com/office/mac/drawingml/2011/main" val="1"/>
+              <ma14:placeholderFlag xmlns:ma14="http://schemas.microsoft.com/office/mac/drawingml/2011/main" xmlns="" val="1"/>
             </a:ext>
           </a:extLst>
         </p:spPr>
@@ -42667,7 +42667,7 @@
           </a:ln>
           <a:extLst>
             <a:ext uri="{FAA26D3D-D897-4be2-8F04-BA451C77F1D7}">
-              <ma14:placeholderFlag xmlns="" xmlns:ma14="http://schemas.microsoft.com/office/mac/drawingml/2011/main" val="1"/>
+              <ma14:placeholderFlag xmlns:ma14="http://schemas.microsoft.com/office/mac/drawingml/2011/main" xmlns="" val="1"/>
             </a:ext>
           </a:extLst>
         </p:spPr>
@@ -43032,7 +43032,7 @@
           </a:ln>
           <a:extLst>
             <a:ext uri="{FAA26D3D-D897-4be2-8F04-BA451C77F1D7}">
-              <ma14:placeholderFlag xmlns="" xmlns:ma14="http://schemas.microsoft.com/office/mac/drawingml/2011/main" val="1"/>
+              <ma14:placeholderFlag xmlns:ma14="http://schemas.microsoft.com/office/mac/drawingml/2011/main" xmlns="" val="1"/>
             </a:ext>
           </a:extLst>
         </p:spPr>
@@ -43676,7 +43676,7 @@
           </a:ln>
           <a:extLst>
             <a:ext uri="{FAA26D3D-D897-4be2-8F04-BA451C77F1D7}">
-              <ma14:placeholderFlag xmlns="" xmlns:ma14="http://schemas.microsoft.com/office/mac/drawingml/2011/main" val="1"/>
+              <ma14:placeholderFlag xmlns:ma14="http://schemas.microsoft.com/office/mac/drawingml/2011/main" xmlns="" val="1"/>
             </a:ext>
           </a:extLst>
         </p:spPr>
@@ -46541,6 +46541,50 @@
           </a:prstGeom>
         </p:spPr>
       </p:pic>
+      <p:sp>
+        <p:nvSpPr>
+          <p:cNvPr id="5" name="TextBox 4">
+            <a:extLst>
+              <a:ext uri="{FF2B5EF4-FFF2-40B4-BE49-F238E27FC236}">
+                <a16:creationId xmlns:a16="http://schemas.microsoft.com/office/drawing/2014/main" id="{85B72566-DFAF-8188-7BE9-D10802F31119}"/>
+              </a:ext>
+            </a:extLst>
+          </p:cNvPr>
+          <p:cNvSpPr txBox="1"/>
+          <p:nvPr/>
+        </p:nvSpPr>
+        <p:spPr>
+          <a:xfrm>
+            <a:off x="9073680" y="6077191"/>
+            <a:ext cx="2948243" cy="215444"/>
+          </a:xfrm>
+          <a:prstGeom prst="rect">
+            <a:avLst/>
+          </a:prstGeom>
+          <a:noFill/>
+        </p:spPr>
+        <p:txBody>
+          <a:bodyPr wrap="none" lIns="91440" tIns="45720" rIns="91440" bIns="45720" rtlCol="0">
+            <a:spAutoFit/>
+          </a:bodyPr>
+          <a:lstStyle/>
+          <a:p>
+            <a:pPr algn="l"/>
+            <a:r>
+              <a:rPr lang="en-US" sz="800" dirty="0">
+                <a:latin typeface="+mn-lt"/>
+              </a:rPr>
+              <a:t>*** see the next page for feedback on health checks </a:t>
+            </a:r>
+            <a:r>
+              <a:rPr lang="en-US" sz="800" u="sng" dirty="0">
+                <a:latin typeface="+mn-lt"/>
+              </a:rPr>
+              <a:t>best practices</a:t>
+            </a:r>
+          </a:p>
+        </p:txBody>
+      </p:sp>
     </p:spTree>
     <p:extLst>
       <p:ext uri="{BB962C8B-B14F-4D97-AF65-F5344CB8AC3E}">
@@ -46771,6 +46815,50 @@
           </a:prstGeom>
         </p:spPr>
       </p:pic>
+      <p:sp>
+        <p:nvSpPr>
+          <p:cNvPr id="5" name="TextBox 4">
+            <a:extLst>
+              <a:ext uri="{FF2B5EF4-FFF2-40B4-BE49-F238E27FC236}">
+                <a16:creationId xmlns:a16="http://schemas.microsoft.com/office/drawing/2014/main" id="{8AC95FE3-C927-E8C7-2281-2142FB8FACB9}"/>
+              </a:ext>
+            </a:extLst>
+          </p:cNvPr>
+          <p:cNvSpPr txBox="1"/>
+          <p:nvPr/>
+        </p:nvSpPr>
+        <p:spPr>
+          <a:xfrm>
+            <a:off x="9073680" y="6077191"/>
+            <a:ext cx="2948243" cy="215444"/>
+          </a:xfrm>
+          <a:prstGeom prst="rect">
+            <a:avLst/>
+          </a:prstGeom>
+          <a:noFill/>
+        </p:spPr>
+        <p:txBody>
+          <a:bodyPr wrap="none" lIns="91440" tIns="45720" rIns="91440" bIns="45720" rtlCol="0">
+            <a:spAutoFit/>
+          </a:bodyPr>
+          <a:lstStyle/>
+          <a:p>
+            <a:pPr algn="l"/>
+            <a:r>
+              <a:rPr lang="en-US" sz="800" dirty="0">
+                <a:latin typeface="+mn-lt"/>
+              </a:rPr>
+              <a:t>*** see the next page for feedback on health checks </a:t>
+            </a:r>
+            <a:r>
+              <a:rPr lang="en-US" sz="800" u="sng" dirty="0">
+                <a:latin typeface="+mn-lt"/>
+              </a:rPr>
+              <a:t>best practices</a:t>
+            </a:r>
+          </a:p>
+        </p:txBody>
+      </p:sp>
     </p:spTree>
     <p:extLst>
       <p:ext uri="{BB962C8B-B14F-4D97-AF65-F5344CB8AC3E}">
@@ -47403,6 +47491,50 @@
           </a:prstGeom>
         </p:spPr>
       </p:pic>
+      <p:sp>
+        <p:nvSpPr>
+          <p:cNvPr id="4" name="TextBox 3">
+            <a:extLst>
+              <a:ext uri="{FF2B5EF4-FFF2-40B4-BE49-F238E27FC236}">
+                <a16:creationId xmlns:a16="http://schemas.microsoft.com/office/drawing/2014/main" id="{6FB3AE06-CD10-6301-2E59-5CC1B050A54D}"/>
+              </a:ext>
+            </a:extLst>
+          </p:cNvPr>
+          <p:cNvSpPr txBox="1"/>
+          <p:nvPr/>
+        </p:nvSpPr>
+        <p:spPr>
+          <a:xfrm>
+            <a:off x="9073680" y="6077191"/>
+            <a:ext cx="2948243" cy="215444"/>
+          </a:xfrm>
+          <a:prstGeom prst="rect">
+            <a:avLst/>
+          </a:prstGeom>
+          <a:noFill/>
+        </p:spPr>
+        <p:txBody>
+          <a:bodyPr wrap="none" lIns="91440" tIns="45720" rIns="91440" bIns="45720" rtlCol="0">
+            <a:spAutoFit/>
+          </a:bodyPr>
+          <a:lstStyle/>
+          <a:p>
+            <a:pPr algn="l"/>
+            <a:r>
+              <a:rPr lang="en-US" sz="800" dirty="0">
+                <a:latin typeface="+mn-lt"/>
+              </a:rPr>
+              <a:t>*** see the next page for feedback on health checks </a:t>
+            </a:r>
+            <a:r>
+              <a:rPr lang="en-US" sz="800" u="sng" dirty="0">
+                <a:latin typeface="+mn-lt"/>
+              </a:rPr>
+              <a:t>best practices</a:t>
+            </a:r>
+          </a:p>
+        </p:txBody>
+      </p:sp>
     </p:spTree>
     <p:extLst>
       <p:ext uri="{BB962C8B-B14F-4D97-AF65-F5344CB8AC3E}">
@@ -47643,6 +47775,50 @@
           </a:prstGeom>
         </p:spPr>
       </p:pic>
+      <p:sp>
+        <p:nvSpPr>
+          <p:cNvPr id="5" name="TextBox 4">
+            <a:extLst>
+              <a:ext uri="{FF2B5EF4-FFF2-40B4-BE49-F238E27FC236}">
+                <a16:creationId xmlns:a16="http://schemas.microsoft.com/office/drawing/2014/main" id="{3ABA37A8-EDAD-637D-4E63-050B2904681B}"/>
+              </a:ext>
+            </a:extLst>
+          </p:cNvPr>
+          <p:cNvSpPr txBox="1"/>
+          <p:nvPr/>
+        </p:nvSpPr>
+        <p:spPr>
+          <a:xfrm>
+            <a:off x="9073680" y="6077191"/>
+            <a:ext cx="2948243" cy="215444"/>
+          </a:xfrm>
+          <a:prstGeom prst="rect">
+            <a:avLst/>
+          </a:prstGeom>
+          <a:noFill/>
+        </p:spPr>
+        <p:txBody>
+          <a:bodyPr wrap="none" lIns="91440" tIns="45720" rIns="91440" bIns="45720" rtlCol="0">
+            <a:spAutoFit/>
+          </a:bodyPr>
+          <a:lstStyle/>
+          <a:p>
+            <a:pPr algn="l"/>
+            <a:r>
+              <a:rPr lang="en-US" sz="800" dirty="0">
+                <a:latin typeface="+mn-lt"/>
+              </a:rPr>
+              <a:t>*** see the next page for feedback on health checks </a:t>
+            </a:r>
+            <a:r>
+              <a:rPr lang="en-US" sz="800" u="sng" dirty="0">
+                <a:latin typeface="+mn-lt"/>
+              </a:rPr>
+              <a:t>best practices</a:t>
+            </a:r>
+          </a:p>
+        </p:txBody>
+      </p:sp>
     </p:spTree>
     <p:extLst>
       <p:ext uri="{BB962C8B-B14F-4D97-AF65-F5344CB8AC3E}">
@@ -47873,6 +48049,50 @@
           </a:prstGeom>
         </p:spPr>
       </p:pic>
+      <p:sp>
+        <p:nvSpPr>
+          <p:cNvPr id="5" name="TextBox 4">
+            <a:extLst>
+              <a:ext uri="{FF2B5EF4-FFF2-40B4-BE49-F238E27FC236}">
+                <a16:creationId xmlns:a16="http://schemas.microsoft.com/office/drawing/2014/main" id="{F89E61C4-44A8-FB71-60FD-FEF531078E87}"/>
+              </a:ext>
+            </a:extLst>
+          </p:cNvPr>
+          <p:cNvSpPr txBox="1"/>
+          <p:nvPr/>
+        </p:nvSpPr>
+        <p:spPr>
+          <a:xfrm>
+            <a:off x="9073680" y="6077191"/>
+            <a:ext cx="2948243" cy="215444"/>
+          </a:xfrm>
+          <a:prstGeom prst="rect">
+            <a:avLst/>
+          </a:prstGeom>
+          <a:noFill/>
+        </p:spPr>
+        <p:txBody>
+          <a:bodyPr wrap="none" lIns="91440" tIns="45720" rIns="91440" bIns="45720" rtlCol="0">
+            <a:spAutoFit/>
+          </a:bodyPr>
+          <a:lstStyle/>
+          <a:p>
+            <a:pPr algn="l"/>
+            <a:r>
+              <a:rPr lang="en-US" sz="800" dirty="0">
+                <a:latin typeface="+mn-lt"/>
+              </a:rPr>
+              <a:t>*** see the next page for feedback on health checks </a:t>
+            </a:r>
+            <a:r>
+              <a:rPr lang="en-US" sz="800" u="sng" dirty="0">
+                <a:latin typeface="+mn-lt"/>
+              </a:rPr>
+              <a:t>best practices</a:t>
+            </a:r>
+          </a:p>
+        </p:txBody>
+      </p:sp>
     </p:spTree>
     <p:extLst>
       <p:ext uri="{BB962C8B-B14F-4D97-AF65-F5344CB8AC3E}">
@@ -48103,6 +48323,50 @@
           </a:prstGeom>
         </p:spPr>
       </p:pic>
+      <p:sp>
+        <p:nvSpPr>
+          <p:cNvPr id="5" name="TextBox 4">
+            <a:extLst>
+              <a:ext uri="{FF2B5EF4-FFF2-40B4-BE49-F238E27FC236}">
+                <a16:creationId xmlns:a16="http://schemas.microsoft.com/office/drawing/2014/main" id="{60AD8280-2AE6-A913-8BA7-DD65D7A433C5}"/>
+              </a:ext>
+            </a:extLst>
+          </p:cNvPr>
+          <p:cNvSpPr txBox="1"/>
+          <p:nvPr/>
+        </p:nvSpPr>
+        <p:spPr>
+          <a:xfrm>
+            <a:off x="9073680" y="6077191"/>
+            <a:ext cx="2948243" cy="215444"/>
+          </a:xfrm>
+          <a:prstGeom prst="rect">
+            <a:avLst/>
+          </a:prstGeom>
+          <a:noFill/>
+        </p:spPr>
+        <p:txBody>
+          <a:bodyPr wrap="none" lIns="91440" tIns="45720" rIns="91440" bIns="45720" rtlCol="0">
+            <a:spAutoFit/>
+          </a:bodyPr>
+          <a:lstStyle/>
+          <a:p>
+            <a:pPr algn="l"/>
+            <a:r>
+              <a:rPr lang="en-US" sz="800" dirty="0">
+                <a:latin typeface="+mn-lt"/>
+              </a:rPr>
+              <a:t>*** see the next page for feedback on health checks </a:t>
+            </a:r>
+            <a:r>
+              <a:rPr lang="en-US" sz="800" u="sng" dirty="0">
+                <a:latin typeface="+mn-lt"/>
+              </a:rPr>
+              <a:t>best practices</a:t>
+            </a:r>
+          </a:p>
+        </p:txBody>
+      </p:sp>
     </p:spTree>
     <p:extLst>
       <p:ext uri="{BB962C8B-B14F-4D97-AF65-F5344CB8AC3E}">
@@ -49273,33 +49537,6 @@
 </file>
 
 <file path=customXml/item1.xml><?xml version="1.0" encoding="utf-8"?>
-<p:properties xmlns:p="http://schemas.microsoft.com/office/2006/metadata/properties" xmlns:xsi="http://www.w3.org/2001/XMLSchema-instance" xmlns:pc="http://schemas.microsoft.com/office/infopath/2007/PartnerControls">
-  <documentManagement>
-    <TaxCatchAll xmlns="d78665ad-f783-4f30-b3cb-b870e5173973" xsi:nil="true"/>
-    <lcf76f155ced4ddcb4097134ff3c332f xmlns="c068e80e-f499-4ba4-b97d-8eb81f7bf0a4">
-      <Terms xmlns="http://schemas.microsoft.com/office/infopath/2007/PartnerControls"/>
-    </lcf76f155ced4ddcb4097134ff3c332f>
-    <SharedWithUsers xmlns="d78665ad-f783-4f30-b3cb-b870e5173973">
-      <UserInfo>
-        <DisplayName>Christine Sumner (chsumner)</DisplayName>
-        <AccountId>229</AccountId>
-        <AccountType/>
-      </UserInfo>
-    </SharedWithUsers>
-  </documentManagement>
-</p:properties>
-</file>
-
-<file path=customXml/item2.xml><?xml version="1.0" encoding="utf-8"?>
-<?mso-contentType ?>
-<FormTemplates xmlns="http://schemas.microsoft.com/sharepoint/v3/contenttype/forms">
-  <Display>DocumentLibraryForm</Display>
-  <Edit>DocumentLibraryForm</Edit>
-  <New>DocumentLibraryForm</New>
-</FormTemplates>
-</file>
-
-<file path=customXml/item3.xml><?xml version="1.0" encoding="utf-8"?>
 <ct:contentTypeSchema xmlns:ct="http://schemas.microsoft.com/office/2006/metadata/contentType" xmlns:ma="http://schemas.microsoft.com/office/2006/metadata/properties/metaAttributes" ct:_="" ma:_="" ma:contentTypeName="Document" ma:contentTypeID="0x01010016638FBC164A6C4987893577CA81BDCE" ma:contentTypeVersion="12" ma:contentTypeDescription="Create a new document." ma:contentTypeScope="" ma:versionID="ad216d817d9e9210cab45cf1c00ab7cf">
   <xsd:schema xmlns:xsd="http://www.w3.org/2001/XMLSchema" xmlns:xs="http://www.w3.org/2001/XMLSchema" xmlns:p="http://schemas.microsoft.com/office/2006/metadata/properties" xmlns:ns2="c068e80e-f499-4ba4-b97d-8eb81f7bf0a4" xmlns:ns3="d78665ad-f783-4f30-b3cb-b870e5173973" targetNamespace="http://schemas.microsoft.com/office/2006/metadata/properties" ma:root="true" ma:fieldsID="b03d820719e6014dead3958bf2973f6f" ns2:_="" ns3:_="">
     <xsd:import namespace="c068e80e-f499-4ba4-b97d-8eb81f7bf0a4"/>
@@ -49516,7 +49753,61 @@
 </ct:contentTypeSchema>
 </file>
 
+<file path=customXml/item2.xml><?xml version="1.0" encoding="utf-8"?>
+<?mso-contentType ?>
+<FormTemplates xmlns="http://schemas.microsoft.com/sharepoint/v3/contenttype/forms">
+  <Display>DocumentLibraryForm</Display>
+  <Edit>DocumentLibraryForm</Edit>
+  <New>DocumentLibraryForm</New>
+</FormTemplates>
+</file>
+
+<file path=customXml/item3.xml><?xml version="1.0" encoding="utf-8"?>
+<p:properties xmlns:p="http://schemas.microsoft.com/office/2006/metadata/properties" xmlns:xsi="http://www.w3.org/2001/XMLSchema-instance" xmlns:pc="http://schemas.microsoft.com/office/infopath/2007/PartnerControls">
+  <documentManagement>
+    <TaxCatchAll xmlns="d78665ad-f783-4f30-b3cb-b870e5173973" xsi:nil="true"/>
+    <lcf76f155ced4ddcb4097134ff3c332f xmlns="c068e80e-f499-4ba4-b97d-8eb81f7bf0a4">
+      <Terms xmlns="http://schemas.microsoft.com/office/infopath/2007/PartnerControls"/>
+    </lcf76f155ced4ddcb4097134ff3c332f>
+    <SharedWithUsers xmlns="d78665ad-f783-4f30-b3cb-b870e5173973">
+      <UserInfo>
+        <DisplayName>Christine Sumner (chsumner)</DisplayName>
+        <AccountId>229</AccountId>
+        <AccountType/>
+      </UserInfo>
+    </SharedWithUsers>
+  </documentManagement>
+</p:properties>
+</file>
+
 <file path=customXml/itemProps1.xml><?xml version="1.0" encoding="utf-8"?>
+<ds:datastoreItem xmlns:ds="http://schemas.openxmlformats.org/officeDocument/2006/customXml" ds:itemID="{BFF5C609-47B2-4E38-98DE-50447A64B0AF}">
+  <ds:schemaRefs>
+    <ds:schemaRef ds:uri="http://schemas.microsoft.com/office/2006/metadata/contentType"/>
+    <ds:schemaRef ds:uri="http://schemas.microsoft.com/office/2006/metadata/properties/metaAttributes"/>
+    <ds:schemaRef ds:uri="http://www.w3.org/2001/XMLSchema"/>
+    <ds:schemaRef ds:uri="http://schemas.microsoft.com/office/2006/metadata/properties"/>
+    <ds:schemaRef ds:uri="c068e80e-f499-4ba4-b97d-8eb81f7bf0a4"/>
+    <ds:schemaRef ds:uri="d78665ad-f783-4f30-b3cb-b870e5173973"/>
+    <ds:schemaRef ds:uri="http://schemas.microsoft.com/office/2006/documentManagement/types"/>
+    <ds:schemaRef ds:uri="http://schemas.microsoft.com/office/infopath/2007/PartnerControls"/>
+    <ds:schemaRef ds:uri="http://schemas.openxmlformats.org/package/2006/metadata/core-properties"/>
+    <ds:schemaRef ds:uri="http://purl.org/dc/elements/1.1/"/>
+    <ds:schemaRef ds:uri="http://purl.org/dc/terms/"/>
+    <ds:schemaRef ds:uri="http://schemas.microsoft.com/internal/obd"/>
+  </ds:schemaRefs>
+</ds:datastoreItem>
+</file>
+
+<file path=customXml/itemProps2.xml><?xml version="1.0" encoding="utf-8"?>
+<ds:datastoreItem xmlns:ds="http://schemas.openxmlformats.org/officeDocument/2006/customXml" ds:itemID="{2D849882-45D9-49DF-83E9-35AEA65C5DA4}">
+  <ds:schemaRefs>
+    <ds:schemaRef ds:uri="http://schemas.microsoft.com/sharepoint/v3/contenttype/forms"/>
+  </ds:schemaRefs>
+</ds:datastoreItem>
+</file>
+
+<file path=customXml/itemProps3.xml><?xml version="1.0" encoding="utf-8"?>
 <ds:datastoreItem xmlns:ds="http://schemas.openxmlformats.org/officeDocument/2006/customXml" ds:itemID="{B2A938C6-D422-428A-8901-D36A71A3A66F}">
   <ds:schemaRefs>
     <ds:schemaRef ds:uri="http://purl.org/dc/elements/1.1/"/>
@@ -49533,31 +49824,4 @@
     <ds:schemaRef ds:uri="c068e80e-f499-4ba4-b97d-8eb81f7bf0a4"/>
   </ds:schemaRefs>
 </ds:datastoreItem>
-</file>
-
-<file path=customXml/itemProps2.xml><?xml version="1.0" encoding="utf-8"?>
-<ds:datastoreItem xmlns:ds="http://schemas.openxmlformats.org/officeDocument/2006/customXml" ds:itemID="{2D849882-45D9-49DF-83E9-35AEA65C5DA4}">
-  <ds:schemaRefs>
-    <ds:schemaRef ds:uri="http://schemas.microsoft.com/sharepoint/v3/contenttype/forms"/>
-  </ds:schemaRefs>
-</ds:datastoreItem>
-</file>
-
-<file path=customXml/itemProps3.xml><?xml version="1.0" encoding="utf-8"?>
-<ds:datastoreItem xmlns:ds="http://schemas.openxmlformats.org/officeDocument/2006/customXml" ds:itemID="{BFF5C609-47B2-4E38-98DE-50447A64B0AF}">
-  <ds:schemaRefs>
-    <ds:schemaRef ds:uri="http://schemas.microsoft.com/office/2006/metadata/contentType"/>
-    <ds:schemaRef ds:uri="http://schemas.microsoft.com/office/2006/metadata/properties/metaAttributes"/>
-    <ds:schemaRef ds:uri="http://www.w3.org/2001/XMLSchema"/>
-    <ds:schemaRef ds:uri="http://schemas.microsoft.com/office/2006/metadata/properties"/>
-    <ds:schemaRef ds:uri="c068e80e-f499-4ba4-b97d-8eb81f7bf0a4"/>
-    <ds:schemaRef ds:uri="d78665ad-f783-4f30-b3cb-b870e5173973"/>
-    <ds:schemaRef ds:uri="http://schemas.microsoft.com/office/2006/documentManagement/types"/>
-    <ds:schemaRef ds:uri="http://schemas.microsoft.com/office/infopath/2007/PartnerControls"/>
-    <ds:schemaRef ds:uri="http://schemas.openxmlformats.org/package/2006/metadata/core-properties"/>
-    <ds:schemaRef ds:uri="http://purl.org/dc/elements/1.1/"/>
-    <ds:schemaRef ds:uri="http://purl.org/dc/terms/"/>
-    <ds:schemaRef ds:uri="http://schemas.microsoft.com/internal/obd"/>
-  </ds:schemaRefs>
-</ds:datastoreItem>
 </file>
</xml_diff>

<commit_message>
closed Appdynamics/config-assessment-tool#121 - Hybrid App Monitoring Health-check improvement - add secondary health checks
</commit_message>
<xml_diff>
--- a/backend/resources/pptAssets/HybridApplicationMonitoringUseCase_template.pptx
+++ b/backend/resources/pptAssets/HybridApplicationMonitoringUseCase_template.pptx
@@ -7,24 +7,30 @@
     <p:sldMasterId id="2147483869" r:id="rId6"/>
   </p:sldMasterIdLst>
   <p:notesMasterIdLst>
-    <p:notesMasterId r:id="rId22"/>
+    <p:notesMasterId r:id="rId28"/>
   </p:notesMasterIdLst>
   <p:sldIdLst>
     <p:sldId id="500" r:id="rId7"/>
     <p:sldId id="2142533203" r:id="rId8"/>
     <p:sldId id="2142533204" r:id="rId9"/>
     <p:sldId id="2142533211" r:id="rId10"/>
-    <p:sldId id="2142533205" r:id="rId11"/>
-    <p:sldId id="2142533212" r:id="rId12"/>
-    <p:sldId id="2142533206" r:id="rId13"/>
-    <p:sldId id="2142533213" r:id="rId14"/>
-    <p:sldId id="2142533207" r:id="rId15"/>
-    <p:sldId id="2142533214" r:id="rId16"/>
-    <p:sldId id="2142533208" r:id="rId17"/>
-    <p:sldId id="2142533215" r:id="rId18"/>
-    <p:sldId id="2142533209" r:id="rId19"/>
-    <p:sldId id="2142533216" r:id="rId20"/>
-    <p:sldId id="290" r:id="rId21"/>
+    <p:sldId id="2142533217" r:id="rId11"/>
+    <p:sldId id="2142533205" r:id="rId12"/>
+    <p:sldId id="2142533212" r:id="rId13"/>
+    <p:sldId id="2142533218" r:id="rId14"/>
+    <p:sldId id="2142533206" r:id="rId15"/>
+    <p:sldId id="2142533213" r:id="rId16"/>
+    <p:sldId id="2142533219" r:id="rId17"/>
+    <p:sldId id="2142533207" r:id="rId18"/>
+    <p:sldId id="2142533214" r:id="rId19"/>
+    <p:sldId id="2142533220" r:id="rId20"/>
+    <p:sldId id="2142533208" r:id="rId21"/>
+    <p:sldId id="2142533215" r:id="rId22"/>
+    <p:sldId id="2142533221" r:id="rId23"/>
+    <p:sldId id="2142533209" r:id="rId24"/>
+    <p:sldId id="2142533216" r:id="rId25"/>
+    <p:sldId id="2142533222" r:id="rId26"/>
+    <p:sldId id="290" r:id="rId27"/>
   </p:sldIdLst>
   <p:sldSz cx="12192000" cy="6858000"/>
   <p:notesSz cx="6858000" cy="9144000"/>
@@ -136,36 +142,42 @@
           <p14:sldIdLst>
             <p14:sldId id="2142533204"/>
             <p14:sldId id="2142533211"/>
+            <p14:sldId id="2142533217"/>
           </p14:sldIdLst>
         </p14:section>
         <p14:section name="Implement" id="{C9D6BEB2-5654-4E49-A520-CFA5B82DC996}">
           <p14:sldIdLst>
             <p14:sldId id="2142533205"/>
             <p14:sldId id="2142533212"/>
+            <p14:sldId id="2142533218"/>
           </p14:sldIdLst>
         </p14:section>
         <p14:section name="Use" id="{DF726D2A-B63E-DC49-AFAB-89735CBC81C5}">
           <p14:sldIdLst>
             <p14:sldId id="2142533206"/>
             <p14:sldId id="2142533213"/>
+            <p14:sldId id="2142533219"/>
           </p14:sldIdLst>
         </p14:section>
         <p14:section name="Engage" id="{7DC08C9C-A605-4F4E-9E48-9F8FB78341D2}">
           <p14:sldIdLst>
             <p14:sldId id="2142533207"/>
             <p14:sldId id="2142533214"/>
+            <p14:sldId id="2142533220"/>
           </p14:sldIdLst>
         </p14:section>
         <p14:section name="Adopt" id="{DA3DE0CE-60A9-9544-A6DD-3A3B4524C955}">
           <p14:sldIdLst>
             <p14:sldId id="2142533208"/>
             <p14:sldId id="2142533215"/>
+            <p14:sldId id="2142533221"/>
           </p14:sldIdLst>
         </p14:section>
         <p14:section name="Optimize" id="{1F9DEA62-2586-1D47-9AD6-98B9589BD6A6}">
           <p14:sldIdLst>
             <p14:sldId id="2142533209"/>
             <p14:sldId id="2142533216"/>
+            <p14:sldId id="2142533222"/>
           </p14:sldIdLst>
         </p14:section>
         <p14:section name="Recommendation" id="{7158982D-EDD8-AD4C-995D-4209A00D6863}">
@@ -293,7 +305,7 @@
           <a:p>
             <a:fld id="{702657A2-7B7A-174B-A542-3B4C9FC943CD}" type="datetimeFigureOut">
               <a:rPr lang="en-US" smtClean="0"/>
-              <a:t>5/3/23</a:t>
+              <a:t>6/12/23</a:t>
             </a:fld>
             <a:endParaRPr lang="en-US"/>
           </a:p>
@@ -718,7 +730,7 @@
     </p:spTree>
     <p:extLst>
       <p:ext uri="{BB962C8B-B14F-4D97-AF65-F5344CB8AC3E}">
-        <p14:creationId xmlns:p14="http://schemas.microsoft.com/office/powerpoint/2010/main" val="1382294296"/>
+        <p14:creationId xmlns:p14="http://schemas.microsoft.com/office/powerpoint/2010/main" val="468375408"/>
       </p:ext>
     </p:extLst>
   </p:cSld>
@@ -802,7 +814,7 @@
     </p:spTree>
     <p:extLst>
       <p:ext uri="{BB962C8B-B14F-4D97-AF65-F5344CB8AC3E}">
-        <p14:creationId xmlns:p14="http://schemas.microsoft.com/office/powerpoint/2010/main" val="865599475"/>
+        <p14:creationId xmlns:p14="http://schemas.microsoft.com/office/powerpoint/2010/main" val="417927094"/>
       </p:ext>
     </p:extLst>
   </p:cSld>
@@ -886,7 +898,7 @@
     </p:spTree>
     <p:extLst>
       <p:ext uri="{BB962C8B-B14F-4D97-AF65-F5344CB8AC3E}">
-        <p14:creationId xmlns:p14="http://schemas.microsoft.com/office/powerpoint/2010/main" val="1288233524"/>
+        <p14:creationId xmlns:p14="http://schemas.microsoft.com/office/powerpoint/2010/main" val="339463266"/>
       </p:ext>
     </p:extLst>
   </p:cSld>
@@ -970,7 +982,511 @@
     </p:spTree>
     <p:extLst>
       <p:ext uri="{BB962C8B-B14F-4D97-AF65-F5344CB8AC3E}">
+        <p14:creationId xmlns:p14="http://schemas.microsoft.com/office/powerpoint/2010/main" val="28975582"/>
+      </p:ext>
+    </p:extLst>
+  </p:cSld>
+  <p:clrMapOvr>
+    <a:masterClrMapping/>
+  </p:clrMapOvr>
+</p:notes>
+</file>
+
+<file path=ppt/notesSlides/notesSlide14.xml><?xml version="1.0" encoding="utf-8"?>
+<p:notes xmlns:a="http://schemas.openxmlformats.org/drawingml/2006/main" xmlns:r="http://schemas.openxmlformats.org/officeDocument/2006/relationships" xmlns:p="http://schemas.openxmlformats.org/presentationml/2006/main">
+  <p:cSld>
+    <p:spTree>
+      <p:nvGrpSpPr>
+        <p:cNvPr id="1" name=""/>
+        <p:cNvGrpSpPr/>
+        <p:nvPr/>
+      </p:nvGrpSpPr>
+      <p:grpSpPr>
+        <a:xfrm>
+          <a:off x="0" y="0"/>
+          <a:ext cx="0" cy="0"/>
+          <a:chOff x="0" y="0"/>
+          <a:chExt cx="0" cy="0"/>
+        </a:xfrm>
+      </p:grpSpPr>
+      <p:sp>
+        <p:nvSpPr>
+          <p:cNvPr id="2" name="Slide Image Placeholder 1"/>
+          <p:cNvSpPr>
+            <a:spLocks noGrp="1" noRot="1" noChangeAspect="1"/>
+          </p:cNvSpPr>
+          <p:nvPr>
+            <p:ph type="sldImg"/>
+          </p:nvPr>
+        </p:nvSpPr>
+        <p:spPr/>
+      </p:sp>
+      <p:sp>
+        <p:nvSpPr>
+          <p:cNvPr id="3" name="Notes Placeholder 2"/>
+          <p:cNvSpPr>
+            <a:spLocks noGrp="1"/>
+          </p:cNvSpPr>
+          <p:nvPr>
+            <p:ph type="body" idx="1"/>
+          </p:nvPr>
+        </p:nvSpPr>
+        <p:spPr/>
+        <p:txBody>
+          <a:bodyPr/>
+          <a:lstStyle/>
+          <a:p>
+            <a:endParaRPr lang="en-US"/>
+          </a:p>
+        </p:txBody>
+      </p:sp>
+      <p:sp>
+        <p:nvSpPr>
+          <p:cNvPr id="4" name="Slide Number Placeholder 3"/>
+          <p:cNvSpPr>
+            <a:spLocks noGrp="1"/>
+          </p:cNvSpPr>
+          <p:nvPr>
+            <p:ph type="sldNum" sz="quarter" idx="5"/>
+          </p:nvPr>
+        </p:nvSpPr>
+        <p:spPr/>
+        <p:txBody>
+          <a:bodyPr/>
+          <a:lstStyle/>
+          <a:p>
+            <a:fld id="{0E284FBC-5821-4D42-9B7E-1F47A272C6FC}" type="slidenum">
+              <a:rPr lang="en-US" smtClean="0"/>
+              <a:t>15</a:t>
+            </a:fld>
+            <a:endParaRPr lang="en-US"/>
+          </a:p>
+        </p:txBody>
+      </p:sp>
+    </p:spTree>
+    <p:extLst>
+      <p:ext uri="{BB962C8B-B14F-4D97-AF65-F5344CB8AC3E}">
+        <p14:creationId xmlns:p14="http://schemas.microsoft.com/office/powerpoint/2010/main" val="1382294296"/>
+      </p:ext>
+    </p:extLst>
+  </p:cSld>
+  <p:clrMapOvr>
+    <a:masterClrMapping/>
+  </p:clrMapOvr>
+</p:notes>
+</file>
+
+<file path=ppt/notesSlides/notesSlide15.xml><?xml version="1.0" encoding="utf-8"?>
+<p:notes xmlns:a="http://schemas.openxmlformats.org/drawingml/2006/main" xmlns:r="http://schemas.openxmlformats.org/officeDocument/2006/relationships" xmlns:p="http://schemas.openxmlformats.org/presentationml/2006/main">
+  <p:cSld>
+    <p:spTree>
+      <p:nvGrpSpPr>
+        <p:cNvPr id="1" name=""/>
+        <p:cNvGrpSpPr/>
+        <p:nvPr/>
+      </p:nvGrpSpPr>
+      <p:grpSpPr>
+        <a:xfrm>
+          <a:off x="0" y="0"/>
+          <a:ext cx="0" cy="0"/>
+          <a:chOff x="0" y="0"/>
+          <a:chExt cx="0" cy="0"/>
+        </a:xfrm>
+      </p:grpSpPr>
+      <p:sp>
+        <p:nvSpPr>
+          <p:cNvPr id="2" name="Slide Image Placeholder 1"/>
+          <p:cNvSpPr>
+            <a:spLocks noGrp="1" noRot="1" noChangeAspect="1"/>
+          </p:cNvSpPr>
+          <p:nvPr>
+            <p:ph type="sldImg"/>
+          </p:nvPr>
+        </p:nvSpPr>
+        <p:spPr/>
+      </p:sp>
+      <p:sp>
+        <p:nvSpPr>
+          <p:cNvPr id="3" name="Notes Placeholder 2"/>
+          <p:cNvSpPr>
+            <a:spLocks noGrp="1"/>
+          </p:cNvSpPr>
+          <p:nvPr>
+            <p:ph type="body" idx="1"/>
+          </p:nvPr>
+        </p:nvSpPr>
+        <p:spPr/>
+        <p:txBody>
+          <a:bodyPr/>
+          <a:lstStyle/>
+          <a:p>
+            <a:endParaRPr lang="en-US"/>
+          </a:p>
+        </p:txBody>
+      </p:sp>
+      <p:sp>
+        <p:nvSpPr>
+          <p:cNvPr id="4" name="Slide Number Placeholder 3"/>
+          <p:cNvSpPr>
+            <a:spLocks noGrp="1"/>
+          </p:cNvSpPr>
+          <p:nvPr>
+            <p:ph type="sldNum" sz="quarter" idx="5"/>
+          </p:nvPr>
+        </p:nvSpPr>
+        <p:spPr/>
+        <p:txBody>
+          <a:bodyPr/>
+          <a:lstStyle/>
+          <a:p>
+            <a:fld id="{0E284FBC-5821-4D42-9B7E-1F47A272C6FC}" type="slidenum">
+              <a:rPr lang="en-US" smtClean="0"/>
+              <a:t>16</a:t>
+            </a:fld>
+            <a:endParaRPr lang="en-US"/>
+          </a:p>
+        </p:txBody>
+      </p:sp>
+    </p:spTree>
+    <p:extLst>
+      <p:ext uri="{BB962C8B-B14F-4D97-AF65-F5344CB8AC3E}">
+        <p14:creationId xmlns:p14="http://schemas.microsoft.com/office/powerpoint/2010/main" val="865599475"/>
+      </p:ext>
+    </p:extLst>
+  </p:cSld>
+  <p:clrMapOvr>
+    <a:masterClrMapping/>
+  </p:clrMapOvr>
+</p:notes>
+</file>
+
+<file path=ppt/notesSlides/notesSlide16.xml><?xml version="1.0" encoding="utf-8"?>
+<p:notes xmlns:a="http://schemas.openxmlformats.org/drawingml/2006/main" xmlns:r="http://schemas.openxmlformats.org/officeDocument/2006/relationships" xmlns:p="http://schemas.openxmlformats.org/presentationml/2006/main">
+  <p:cSld>
+    <p:spTree>
+      <p:nvGrpSpPr>
+        <p:cNvPr id="1" name=""/>
+        <p:cNvGrpSpPr/>
+        <p:nvPr/>
+      </p:nvGrpSpPr>
+      <p:grpSpPr>
+        <a:xfrm>
+          <a:off x="0" y="0"/>
+          <a:ext cx="0" cy="0"/>
+          <a:chOff x="0" y="0"/>
+          <a:chExt cx="0" cy="0"/>
+        </a:xfrm>
+      </p:grpSpPr>
+      <p:sp>
+        <p:nvSpPr>
+          <p:cNvPr id="2" name="Slide Image Placeholder 1"/>
+          <p:cNvSpPr>
+            <a:spLocks noGrp="1" noRot="1" noChangeAspect="1"/>
+          </p:cNvSpPr>
+          <p:nvPr>
+            <p:ph type="sldImg"/>
+          </p:nvPr>
+        </p:nvSpPr>
+        <p:spPr/>
+      </p:sp>
+      <p:sp>
+        <p:nvSpPr>
+          <p:cNvPr id="3" name="Notes Placeholder 2"/>
+          <p:cNvSpPr>
+            <a:spLocks noGrp="1"/>
+          </p:cNvSpPr>
+          <p:nvPr>
+            <p:ph type="body" idx="1"/>
+          </p:nvPr>
+        </p:nvSpPr>
+        <p:spPr/>
+        <p:txBody>
+          <a:bodyPr/>
+          <a:lstStyle/>
+          <a:p>
+            <a:endParaRPr lang="en-US"/>
+          </a:p>
+        </p:txBody>
+      </p:sp>
+      <p:sp>
+        <p:nvSpPr>
+          <p:cNvPr id="4" name="Slide Number Placeholder 3"/>
+          <p:cNvSpPr>
+            <a:spLocks noGrp="1"/>
+          </p:cNvSpPr>
+          <p:nvPr>
+            <p:ph type="sldNum" sz="quarter" idx="5"/>
+          </p:nvPr>
+        </p:nvSpPr>
+        <p:spPr/>
+        <p:txBody>
+          <a:bodyPr/>
+          <a:lstStyle/>
+          <a:p>
+            <a:fld id="{0E284FBC-5821-4D42-9B7E-1F47A272C6FC}" type="slidenum">
+              <a:rPr lang="en-US" smtClean="0"/>
+              <a:t>17</a:t>
+            </a:fld>
+            <a:endParaRPr lang="en-US"/>
+          </a:p>
+        </p:txBody>
+      </p:sp>
+    </p:spTree>
+    <p:extLst>
+      <p:ext uri="{BB962C8B-B14F-4D97-AF65-F5344CB8AC3E}">
+        <p14:creationId xmlns:p14="http://schemas.microsoft.com/office/powerpoint/2010/main" val="1185824358"/>
+      </p:ext>
+    </p:extLst>
+  </p:cSld>
+  <p:clrMapOvr>
+    <a:masterClrMapping/>
+  </p:clrMapOvr>
+</p:notes>
+</file>
+
+<file path=ppt/notesSlides/notesSlide17.xml><?xml version="1.0" encoding="utf-8"?>
+<p:notes xmlns:a="http://schemas.openxmlformats.org/drawingml/2006/main" xmlns:r="http://schemas.openxmlformats.org/officeDocument/2006/relationships" xmlns:p="http://schemas.openxmlformats.org/presentationml/2006/main">
+  <p:cSld>
+    <p:spTree>
+      <p:nvGrpSpPr>
+        <p:cNvPr id="1" name=""/>
+        <p:cNvGrpSpPr/>
+        <p:nvPr/>
+      </p:nvGrpSpPr>
+      <p:grpSpPr>
+        <a:xfrm>
+          <a:off x="0" y="0"/>
+          <a:ext cx="0" cy="0"/>
+          <a:chOff x="0" y="0"/>
+          <a:chExt cx="0" cy="0"/>
+        </a:xfrm>
+      </p:grpSpPr>
+      <p:sp>
+        <p:nvSpPr>
+          <p:cNvPr id="2" name="Slide Image Placeholder 1"/>
+          <p:cNvSpPr>
+            <a:spLocks noGrp="1" noRot="1" noChangeAspect="1"/>
+          </p:cNvSpPr>
+          <p:nvPr>
+            <p:ph type="sldImg"/>
+          </p:nvPr>
+        </p:nvSpPr>
+        <p:spPr/>
+      </p:sp>
+      <p:sp>
+        <p:nvSpPr>
+          <p:cNvPr id="3" name="Notes Placeholder 2"/>
+          <p:cNvSpPr>
+            <a:spLocks noGrp="1"/>
+          </p:cNvSpPr>
+          <p:nvPr>
+            <p:ph type="body" idx="1"/>
+          </p:nvPr>
+        </p:nvSpPr>
+        <p:spPr/>
+        <p:txBody>
+          <a:bodyPr/>
+          <a:lstStyle/>
+          <a:p>
+            <a:endParaRPr lang="en-US"/>
+          </a:p>
+        </p:txBody>
+      </p:sp>
+      <p:sp>
+        <p:nvSpPr>
+          <p:cNvPr id="4" name="Slide Number Placeholder 3"/>
+          <p:cNvSpPr>
+            <a:spLocks noGrp="1"/>
+          </p:cNvSpPr>
+          <p:nvPr>
+            <p:ph type="sldNum" sz="quarter" idx="5"/>
+          </p:nvPr>
+        </p:nvSpPr>
+        <p:spPr/>
+        <p:txBody>
+          <a:bodyPr/>
+          <a:lstStyle/>
+          <a:p>
+            <a:fld id="{0E284FBC-5821-4D42-9B7E-1F47A272C6FC}" type="slidenum">
+              <a:rPr lang="en-US" smtClean="0"/>
+              <a:t>18</a:t>
+            </a:fld>
+            <a:endParaRPr lang="en-US"/>
+          </a:p>
+        </p:txBody>
+      </p:sp>
+    </p:spTree>
+    <p:extLst>
+      <p:ext uri="{BB962C8B-B14F-4D97-AF65-F5344CB8AC3E}">
+        <p14:creationId xmlns:p14="http://schemas.microsoft.com/office/powerpoint/2010/main" val="1288233524"/>
+      </p:ext>
+    </p:extLst>
+  </p:cSld>
+  <p:clrMapOvr>
+    <a:masterClrMapping/>
+  </p:clrMapOvr>
+</p:notes>
+</file>
+
+<file path=ppt/notesSlides/notesSlide18.xml><?xml version="1.0" encoding="utf-8"?>
+<p:notes xmlns:a="http://schemas.openxmlformats.org/drawingml/2006/main" xmlns:r="http://schemas.openxmlformats.org/officeDocument/2006/relationships" xmlns:p="http://schemas.openxmlformats.org/presentationml/2006/main">
+  <p:cSld>
+    <p:spTree>
+      <p:nvGrpSpPr>
+        <p:cNvPr id="1" name=""/>
+        <p:cNvGrpSpPr/>
+        <p:nvPr/>
+      </p:nvGrpSpPr>
+      <p:grpSpPr>
+        <a:xfrm>
+          <a:off x="0" y="0"/>
+          <a:ext cx="0" cy="0"/>
+          <a:chOff x="0" y="0"/>
+          <a:chExt cx="0" cy="0"/>
+        </a:xfrm>
+      </p:grpSpPr>
+      <p:sp>
+        <p:nvSpPr>
+          <p:cNvPr id="2" name="Slide Image Placeholder 1"/>
+          <p:cNvSpPr>
+            <a:spLocks noGrp="1" noRot="1" noChangeAspect="1"/>
+          </p:cNvSpPr>
+          <p:nvPr>
+            <p:ph type="sldImg"/>
+          </p:nvPr>
+        </p:nvSpPr>
+        <p:spPr/>
+      </p:sp>
+      <p:sp>
+        <p:nvSpPr>
+          <p:cNvPr id="3" name="Notes Placeholder 2"/>
+          <p:cNvSpPr>
+            <a:spLocks noGrp="1"/>
+          </p:cNvSpPr>
+          <p:nvPr>
+            <p:ph type="body" idx="1"/>
+          </p:nvPr>
+        </p:nvSpPr>
+        <p:spPr/>
+        <p:txBody>
+          <a:bodyPr/>
+          <a:lstStyle/>
+          <a:p>
+            <a:endParaRPr lang="en-US"/>
+          </a:p>
+        </p:txBody>
+      </p:sp>
+      <p:sp>
+        <p:nvSpPr>
+          <p:cNvPr id="4" name="Slide Number Placeholder 3"/>
+          <p:cNvSpPr>
+            <a:spLocks noGrp="1"/>
+          </p:cNvSpPr>
+          <p:nvPr>
+            <p:ph type="sldNum" sz="quarter" idx="5"/>
+          </p:nvPr>
+        </p:nvSpPr>
+        <p:spPr/>
+        <p:txBody>
+          <a:bodyPr/>
+          <a:lstStyle/>
+          <a:p>
+            <a:fld id="{0E284FBC-5821-4D42-9B7E-1F47A272C6FC}" type="slidenum">
+              <a:rPr lang="en-US" smtClean="0"/>
+              <a:t>19</a:t>
+            </a:fld>
+            <a:endParaRPr lang="en-US"/>
+          </a:p>
+        </p:txBody>
+      </p:sp>
+    </p:spTree>
+    <p:extLst>
+      <p:ext uri="{BB962C8B-B14F-4D97-AF65-F5344CB8AC3E}">
         <p14:creationId xmlns:p14="http://schemas.microsoft.com/office/powerpoint/2010/main" val="3624425596"/>
+      </p:ext>
+    </p:extLst>
+  </p:cSld>
+  <p:clrMapOvr>
+    <a:masterClrMapping/>
+  </p:clrMapOvr>
+</p:notes>
+</file>
+
+<file path=ppt/notesSlides/notesSlide19.xml><?xml version="1.0" encoding="utf-8"?>
+<p:notes xmlns:a="http://schemas.openxmlformats.org/drawingml/2006/main" xmlns:r="http://schemas.openxmlformats.org/officeDocument/2006/relationships" xmlns:p="http://schemas.openxmlformats.org/presentationml/2006/main">
+  <p:cSld>
+    <p:spTree>
+      <p:nvGrpSpPr>
+        <p:cNvPr id="1" name=""/>
+        <p:cNvGrpSpPr/>
+        <p:nvPr/>
+      </p:nvGrpSpPr>
+      <p:grpSpPr>
+        <a:xfrm>
+          <a:off x="0" y="0"/>
+          <a:ext cx="0" cy="0"/>
+          <a:chOff x="0" y="0"/>
+          <a:chExt cx="0" cy="0"/>
+        </a:xfrm>
+      </p:grpSpPr>
+      <p:sp>
+        <p:nvSpPr>
+          <p:cNvPr id="2" name="Slide Image Placeholder 1"/>
+          <p:cNvSpPr>
+            <a:spLocks noGrp="1" noRot="1" noChangeAspect="1"/>
+          </p:cNvSpPr>
+          <p:nvPr>
+            <p:ph type="sldImg"/>
+          </p:nvPr>
+        </p:nvSpPr>
+        <p:spPr/>
+      </p:sp>
+      <p:sp>
+        <p:nvSpPr>
+          <p:cNvPr id="3" name="Notes Placeholder 2"/>
+          <p:cNvSpPr>
+            <a:spLocks noGrp="1"/>
+          </p:cNvSpPr>
+          <p:nvPr>
+            <p:ph type="body" idx="1"/>
+          </p:nvPr>
+        </p:nvSpPr>
+        <p:spPr/>
+        <p:txBody>
+          <a:bodyPr/>
+          <a:lstStyle/>
+          <a:p>
+            <a:endParaRPr lang="en-US"/>
+          </a:p>
+        </p:txBody>
+      </p:sp>
+      <p:sp>
+        <p:nvSpPr>
+          <p:cNvPr id="4" name="Slide Number Placeholder 3"/>
+          <p:cNvSpPr>
+            <a:spLocks noGrp="1"/>
+          </p:cNvSpPr>
+          <p:nvPr>
+            <p:ph type="sldNum" sz="quarter" idx="5"/>
+          </p:nvPr>
+        </p:nvSpPr>
+        <p:spPr/>
+        <p:txBody>
+          <a:bodyPr/>
+          <a:lstStyle/>
+          <a:p>
+            <a:fld id="{0E284FBC-5821-4D42-9B7E-1F47A272C6FC}" type="slidenum">
+              <a:rPr lang="en-US" smtClean="0"/>
+              <a:t>20</a:t>
+            </a:fld>
+            <a:endParaRPr lang="en-US"/>
+          </a:p>
+        </p:txBody>
+      </p:sp>
+    </p:spTree>
+    <p:extLst>
+      <p:ext uri="{BB962C8B-B14F-4D97-AF65-F5344CB8AC3E}">
+        <p14:creationId xmlns:p14="http://schemas.microsoft.com/office/powerpoint/2010/main" val="346808418"/>
       </p:ext>
     </p:extLst>
   </p:cSld>
@@ -1222,7 +1738,7 @@
     </p:spTree>
     <p:extLst>
       <p:ext uri="{BB962C8B-B14F-4D97-AF65-F5344CB8AC3E}">
-        <p14:creationId xmlns:p14="http://schemas.microsoft.com/office/powerpoint/2010/main" val="1063442909"/>
+        <p14:creationId xmlns:p14="http://schemas.microsoft.com/office/powerpoint/2010/main" val="3014577843"/>
       </p:ext>
     </p:extLst>
   </p:cSld>
@@ -1306,7 +1822,7 @@
     </p:spTree>
     <p:extLst>
       <p:ext uri="{BB962C8B-B14F-4D97-AF65-F5344CB8AC3E}">
-        <p14:creationId xmlns:p14="http://schemas.microsoft.com/office/powerpoint/2010/main" val="1026942336"/>
+        <p14:creationId xmlns:p14="http://schemas.microsoft.com/office/powerpoint/2010/main" val="1063442909"/>
       </p:ext>
     </p:extLst>
   </p:cSld>
@@ -1390,7 +1906,7 @@
     </p:spTree>
     <p:extLst>
       <p:ext uri="{BB962C8B-B14F-4D97-AF65-F5344CB8AC3E}">
-        <p14:creationId xmlns:p14="http://schemas.microsoft.com/office/powerpoint/2010/main" val="847167902"/>
+        <p14:creationId xmlns:p14="http://schemas.microsoft.com/office/powerpoint/2010/main" val="1026942336"/>
       </p:ext>
     </p:extLst>
   </p:cSld>
@@ -1474,7 +1990,7 @@
     </p:spTree>
     <p:extLst>
       <p:ext uri="{BB962C8B-B14F-4D97-AF65-F5344CB8AC3E}">
-        <p14:creationId xmlns:p14="http://schemas.microsoft.com/office/powerpoint/2010/main" val="1886107847"/>
+        <p14:creationId xmlns:p14="http://schemas.microsoft.com/office/powerpoint/2010/main" val="3030466907"/>
       </p:ext>
     </p:extLst>
   </p:cSld>
@@ -1558,7 +2074,7 @@
     </p:spTree>
     <p:extLst>
       <p:ext uri="{BB962C8B-B14F-4D97-AF65-F5344CB8AC3E}">
-        <p14:creationId xmlns:p14="http://schemas.microsoft.com/office/powerpoint/2010/main" val="417927094"/>
+        <p14:creationId xmlns:p14="http://schemas.microsoft.com/office/powerpoint/2010/main" val="847167902"/>
       </p:ext>
     </p:extLst>
   </p:cSld>
@@ -1642,7 +2158,7 @@
     </p:spTree>
     <p:extLst>
       <p:ext uri="{BB962C8B-B14F-4D97-AF65-F5344CB8AC3E}">
-        <p14:creationId xmlns:p14="http://schemas.microsoft.com/office/powerpoint/2010/main" val="339463266"/>
+        <p14:creationId xmlns:p14="http://schemas.microsoft.com/office/powerpoint/2010/main" val="1886107847"/>
       </p:ext>
     </p:extLst>
   </p:cSld>
@@ -2886,7 +3402,7 @@
           </a:ln>
           <a:extLst>
             <a:ext uri="{FAA26D3D-D897-4be2-8F04-BA451C77F1D7}">
-              <ma14:placeholderFlag xmlns:ma14="http://schemas.microsoft.com/office/mac/drawingml/2011/main" xmlns="" val="1"/>
+              <ma14:placeholderFlag xmlns="" xmlns:ma14="http://schemas.microsoft.com/office/mac/drawingml/2011/main" val="1"/>
             </a:ext>
           </a:extLst>
         </p:spPr>
@@ -4900,7 +5416,7 @@
           </a:ln>
           <a:extLst>
             <a:ext uri="{FAA26D3D-D897-4be2-8F04-BA451C77F1D7}">
-              <ma14:placeholderFlag xmlns:ma14="http://schemas.microsoft.com/office/mac/drawingml/2011/main" xmlns="" val="1"/>
+              <ma14:placeholderFlag xmlns="" xmlns:ma14="http://schemas.microsoft.com/office/mac/drawingml/2011/main" val="1"/>
             </a:ext>
           </a:extLst>
         </p:spPr>
@@ -5619,7 +6135,7 @@
           </a:ln>
           <a:extLst>
             <a:ext uri="{FAA26D3D-D897-4be2-8F04-BA451C77F1D7}">
-              <ma14:placeholderFlag xmlns:ma14="http://schemas.microsoft.com/office/mac/drawingml/2011/main" xmlns="" val="1"/>
+              <ma14:placeholderFlag xmlns="" xmlns:ma14="http://schemas.microsoft.com/office/mac/drawingml/2011/main" val="1"/>
             </a:ext>
           </a:extLst>
         </p:spPr>
@@ -7117,7 +7633,7 @@
               </a14:hiddenLine>
             </a:ext>
             <a:ext uri="{FAA26D3D-D897-4be2-8F04-BA451C77F1D7}">
-              <ma14:placeholderFlag xmlns:ma14="http://schemas.microsoft.com/office/mac/drawingml/2011/main" xmlns="" val="1"/>
+              <ma14:placeholderFlag xmlns="" xmlns:ma14="http://schemas.microsoft.com/office/mac/drawingml/2011/main" val="1"/>
             </a:ext>
           </a:extLst>
         </p:spPr>
@@ -7365,7 +7881,7 @@
               </a14:hiddenLine>
             </a:ext>
             <a:ext uri="{FAA26D3D-D897-4be2-8F04-BA451C77F1D7}">
-              <ma14:placeholderFlag xmlns:ma14="http://schemas.microsoft.com/office/mac/drawingml/2011/main" xmlns="" val="1"/>
+              <ma14:placeholderFlag xmlns="" xmlns:ma14="http://schemas.microsoft.com/office/mac/drawingml/2011/main" val="1"/>
             </a:ext>
           </a:extLst>
         </p:spPr>
@@ -7634,7 +8150,7 @@
               </a14:hiddenLine>
             </a:ext>
             <a:ext uri="{FAA26D3D-D897-4be2-8F04-BA451C77F1D7}">
-              <ma14:placeholderFlag xmlns="" xmlns:ma14="http://schemas.microsoft.com/office/mac/drawingml/2011/main" val="1"/>
+              <ma14:placeholderFlag xmlns:ma14="http://schemas.microsoft.com/office/mac/drawingml/2011/main" xmlns="" val="1"/>
             </a:ext>
           </a:extLst>
         </p:spPr>
@@ -8064,14 +8580,14 @@
           </a:ln>
           <a:extLst>
             <a:ext uri="{909E8E84-426E-40dd-AFC4-6F175D3DCCD1}">
-              <a14:hiddenFill xmlns:a14="http://schemas.microsoft.com/office/drawing/2010/main" xmlns="">
+              <a14:hiddenFill xmlns="" xmlns:a14="http://schemas.microsoft.com/office/drawing/2010/main">
                 <a:solidFill>
                   <a:srgbClr val="FFFFFF"/>
                 </a:solidFill>
               </a14:hiddenFill>
             </a:ext>
             <a:ext uri="{91240B29-F687-4f45-9708-019B960494DF}">
-              <a14:hiddenLine xmlns:a14="http://schemas.microsoft.com/office/drawing/2010/main" xmlns="" w="9525">
+              <a14:hiddenLine xmlns="" xmlns:a14="http://schemas.microsoft.com/office/drawing/2010/main" w="9525">
                 <a:solidFill>
                   <a:srgbClr val="000000"/>
                 </a:solidFill>
@@ -10042,7 +10558,7 @@
           </a:ln>
           <a:extLst>
             <a:ext uri="{FAA26D3D-D897-4be2-8F04-BA451C77F1D7}">
-              <ma14:placeholderFlag xmlns:ma14="http://schemas.microsoft.com/office/mac/drawingml/2011/main" xmlns="" val="1"/>
+              <ma14:placeholderFlag xmlns="" xmlns:ma14="http://schemas.microsoft.com/office/mac/drawingml/2011/main" val="1"/>
             </a:ext>
           </a:extLst>
         </p:spPr>
@@ -11718,7 +12234,7 @@
           </a:ln>
           <a:extLst>
             <a:ext uri="{FAA26D3D-D897-4be2-8F04-BA451C77F1D7}">
-              <ma14:placeholderFlag xmlns:ma14="http://schemas.microsoft.com/office/mac/drawingml/2011/main" xmlns="" val="1"/>
+              <ma14:placeholderFlag xmlns="" xmlns:ma14="http://schemas.microsoft.com/office/mac/drawingml/2011/main" val="1"/>
             </a:ext>
           </a:extLst>
         </p:spPr>
@@ -12312,7 +12828,7 @@
           </a:ln>
           <a:extLst>
             <a:ext uri="{FAA26D3D-D897-4be2-8F04-BA451C77F1D7}">
-              <ma14:placeholderFlag xmlns:ma14="http://schemas.microsoft.com/office/mac/drawingml/2011/main" xmlns="" val="1"/>
+              <ma14:placeholderFlag xmlns="" xmlns:ma14="http://schemas.microsoft.com/office/mac/drawingml/2011/main" val="1"/>
             </a:ext>
           </a:extLst>
         </p:spPr>
@@ -12677,7 +13193,7 @@
           </a:ln>
           <a:extLst>
             <a:ext uri="{FAA26D3D-D897-4be2-8F04-BA451C77F1D7}">
-              <ma14:placeholderFlag xmlns:ma14="http://schemas.microsoft.com/office/mac/drawingml/2011/main" xmlns="" val="1"/>
+              <ma14:placeholderFlag xmlns="" xmlns:ma14="http://schemas.microsoft.com/office/mac/drawingml/2011/main" val="1"/>
             </a:ext>
           </a:extLst>
         </p:spPr>
@@ -13321,7 +13837,7 @@
           </a:ln>
           <a:extLst>
             <a:ext uri="{FAA26D3D-D897-4be2-8F04-BA451C77F1D7}">
-              <ma14:placeholderFlag xmlns:ma14="http://schemas.microsoft.com/office/mac/drawingml/2011/main" xmlns="" val="1"/>
+              <ma14:placeholderFlag xmlns="" xmlns:ma14="http://schemas.microsoft.com/office/mac/drawingml/2011/main" val="1"/>
             </a:ext>
           </a:extLst>
         </p:spPr>
@@ -13568,7 +14084,7 @@
           </a:ln>
           <a:extLst>
             <a:ext uri="{FAA26D3D-D897-4be2-8F04-BA451C77F1D7}">
-              <ma14:placeholderFlag xmlns:ma14="http://schemas.microsoft.com/office/mac/drawingml/2011/main" xmlns="" val="1"/>
+              <ma14:placeholderFlag xmlns="" xmlns:ma14="http://schemas.microsoft.com/office/mac/drawingml/2011/main" val="1"/>
             </a:ext>
           </a:extLst>
         </p:spPr>
@@ -16247,7 +16763,7 @@
           </a:ln>
           <a:extLst>
             <a:ext uri="{FAA26D3D-D897-4be2-8F04-BA451C77F1D7}">
-              <ma14:placeholderFlag xmlns:ma14="http://schemas.microsoft.com/office/mac/drawingml/2011/main" xmlns="" val="1"/>
+              <ma14:placeholderFlag xmlns="" xmlns:ma14="http://schemas.microsoft.com/office/mac/drawingml/2011/main" val="1"/>
             </a:ext>
           </a:extLst>
         </p:spPr>
@@ -16966,7 +17482,7 @@
           </a:ln>
           <a:extLst>
             <a:ext uri="{FAA26D3D-D897-4be2-8F04-BA451C77F1D7}">
-              <ma14:placeholderFlag xmlns:ma14="http://schemas.microsoft.com/office/mac/drawingml/2011/main" xmlns="" val="1"/>
+              <ma14:placeholderFlag xmlns="" xmlns:ma14="http://schemas.microsoft.com/office/mac/drawingml/2011/main" val="1"/>
             </a:ext>
           </a:extLst>
         </p:spPr>
@@ -18082,7 +18598,7 @@
               </a14:hiddenLine>
             </a:ext>
             <a:ext uri="{FAA26D3D-D897-4be2-8F04-BA451C77F1D7}">
-              <ma14:placeholderFlag xmlns:ma14="http://schemas.microsoft.com/office/mac/drawingml/2011/main" xmlns="" val="1"/>
+              <ma14:placeholderFlag xmlns="" xmlns:ma14="http://schemas.microsoft.com/office/mac/drawingml/2011/main" val="1"/>
             </a:ext>
           </a:extLst>
         </p:spPr>
@@ -18351,7 +18867,7 @@
               </a14:hiddenLine>
             </a:ext>
             <a:ext uri="{FAA26D3D-D897-4be2-8F04-BA451C77F1D7}">
-              <ma14:placeholderFlag xmlns="" xmlns:ma14="http://schemas.microsoft.com/office/mac/drawingml/2011/main" val="1"/>
+              <ma14:placeholderFlag xmlns:ma14="http://schemas.microsoft.com/office/mac/drawingml/2011/main" xmlns="" val="1"/>
             </a:ext>
           </a:extLst>
         </p:spPr>
@@ -21900,7 +22416,7 @@
               </a14:hiddenLine>
             </a:ext>
             <a:ext uri="{FAA26D3D-D897-4be2-8F04-BA451C77F1D7}">
-              <ma14:placeholderFlag xmlns:ma14="http://schemas.microsoft.com/office/mac/drawingml/2011/main" xmlns="" val="1"/>
+              <ma14:placeholderFlag xmlns="" xmlns:ma14="http://schemas.microsoft.com/office/mac/drawingml/2011/main" val="1"/>
             </a:ext>
           </a:extLst>
         </p:spPr>
@@ -24476,7 +24992,7 @@
               </a14:hiddenLine>
             </a:ext>
             <a:ext uri="{FAA26D3D-D897-4be2-8F04-BA451C77F1D7}">
-              <ma14:placeholderFlag xmlns:ma14="http://schemas.microsoft.com/office/mac/drawingml/2011/main" xmlns="" val="1"/>
+              <ma14:placeholderFlag xmlns="" xmlns:ma14="http://schemas.microsoft.com/office/mac/drawingml/2011/main" val="1"/>
             </a:ext>
           </a:extLst>
         </p:spPr>
@@ -25983,7 +26499,7 @@
           </a:ln>
           <a:extLst>
             <a:ext uri="{FAA26D3D-D897-4be2-8F04-BA451C77F1D7}">
-              <ma14:placeholderFlag xmlns:ma14="http://schemas.microsoft.com/office/mac/drawingml/2011/main" xmlns="" val="1"/>
+              <ma14:placeholderFlag xmlns="" xmlns:ma14="http://schemas.microsoft.com/office/mac/drawingml/2011/main" val="1"/>
             </a:ext>
           </a:extLst>
         </p:spPr>
@@ -27116,7 +27632,7 @@
           </a:ln>
           <a:extLst>
             <a:ext uri="{FAA26D3D-D897-4be2-8F04-BA451C77F1D7}">
-              <ma14:placeholderFlag xmlns:ma14="http://schemas.microsoft.com/office/mac/drawingml/2011/main" xmlns="" val="1"/>
+              <ma14:placeholderFlag xmlns="" xmlns:ma14="http://schemas.microsoft.com/office/mac/drawingml/2011/main" val="1"/>
             </a:ext>
           </a:extLst>
         </p:spPr>
@@ -27710,7 +28226,7 @@
           </a:ln>
           <a:extLst>
             <a:ext uri="{FAA26D3D-D897-4be2-8F04-BA451C77F1D7}">
-              <ma14:placeholderFlag xmlns:ma14="http://schemas.microsoft.com/office/mac/drawingml/2011/main" xmlns="" val="1"/>
+              <ma14:placeholderFlag xmlns="" xmlns:ma14="http://schemas.microsoft.com/office/mac/drawingml/2011/main" val="1"/>
             </a:ext>
           </a:extLst>
         </p:spPr>
@@ -28369,7 +28885,7 @@
           </a:ln>
           <a:extLst>
             <a:ext uri="{FAA26D3D-D897-4be2-8F04-BA451C77F1D7}">
-              <ma14:placeholderFlag xmlns:ma14="http://schemas.microsoft.com/office/mac/drawingml/2011/main" xmlns="" val="1"/>
+              <ma14:placeholderFlag xmlns="" xmlns:ma14="http://schemas.microsoft.com/office/mac/drawingml/2011/main" val="1"/>
             </a:ext>
           </a:extLst>
         </p:spPr>
@@ -29013,7 +29529,7 @@
           </a:ln>
           <a:extLst>
             <a:ext uri="{FAA26D3D-D897-4be2-8F04-BA451C77F1D7}">
-              <ma14:placeholderFlag xmlns:ma14="http://schemas.microsoft.com/office/mac/drawingml/2011/main" xmlns="" val="1"/>
+              <ma14:placeholderFlag xmlns="" xmlns:ma14="http://schemas.microsoft.com/office/mac/drawingml/2011/main" val="1"/>
             </a:ext>
           </a:extLst>
         </p:spPr>
@@ -29260,7 +29776,7 @@
           </a:ln>
           <a:extLst>
             <a:ext uri="{FAA26D3D-D897-4be2-8F04-BA451C77F1D7}">
-              <ma14:placeholderFlag xmlns:ma14="http://schemas.microsoft.com/office/mac/drawingml/2011/main" xmlns="" val="1"/>
+              <ma14:placeholderFlag xmlns="" xmlns:ma14="http://schemas.microsoft.com/office/mac/drawingml/2011/main" val="1"/>
             </a:ext>
           </a:extLst>
         </p:spPr>
@@ -31274,7 +31790,7 @@
           </a:ln>
           <a:extLst>
             <a:ext uri="{FAA26D3D-D897-4be2-8F04-BA451C77F1D7}">
-              <ma14:placeholderFlag xmlns:ma14="http://schemas.microsoft.com/office/mac/drawingml/2011/main" xmlns="" val="1"/>
+              <ma14:placeholderFlag xmlns="" xmlns:ma14="http://schemas.microsoft.com/office/mac/drawingml/2011/main" val="1"/>
             </a:ext>
           </a:extLst>
         </p:spPr>
@@ -31993,7 +32509,7 @@
           </a:ln>
           <a:extLst>
             <a:ext uri="{FAA26D3D-D897-4be2-8F04-BA451C77F1D7}">
-              <ma14:placeholderFlag xmlns:ma14="http://schemas.microsoft.com/office/mac/drawingml/2011/main" xmlns="" val="1"/>
+              <ma14:placeholderFlag xmlns="" xmlns:ma14="http://schemas.microsoft.com/office/mac/drawingml/2011/main" val="1"/>
             </a:ext>
           </a:extLst>
         </p:spPr>
@@ -33425,7 +33941,7 @@
               </a14:hiddenLine>
             </a:ext>
             <a:ext uri="{FAA26D3D-D897-4be2-8F04-BA451C77F1D7}">
-              <ma14:placeholderFlag xmlns="" xmlns:ma14="http://schemas.microsoft.com/office/mac/drawingml/2011/main" val="1"/>
+              <ma14:placeholderFlag xmlns:ma14="http://schemas.microsoft.com/office/mac/drawingml/2011/main" xmlns="" val="1"/>
             </a:ext>
           </a:extLst>
         </p:spPr>
@@ -33863,7 +34379,7 @@
               </a14:hiddenLine>
             </a:ext>
             <a:ext uri="{FAA26D3D-D897-4be2-8F04-BA451C77F1D7}">
-              <ma14:placeholderFlag xmlns:ma14="http://schemas.microsoft.com/office/mac/drawingml/2011/main" xmlns="" val="1"/>
+              <ma14:placeholderFlag xmlns="" xmlns:ma14="http://schemas.microsoft.com/office/mac/drawingml/2011/main" val="1"/>
             </a:ext>
           </a:extLst>
         </p:spPr>
@@ -36561,7 +37077,7 @@
               </a14:hiddenLine>
             </a:ext>
             <a:ext uri="{FAA26D3D-D897-4be2-8F04-BA451C77F1D7}">
-              <ma14:placeholderFlag xmlns:ma14="http://schemas.microsoft.com/office/mac/drawingml/2011/main" xmlns="" val="1"/>
+              <ma14:placeholderFlag xmlns="" xmlns:ma14="http://schemas.microsoft.com/office/mac/drawingml/2011/main" val="1"/>
             </a:ext>
           </a:extLst>
         </p:spPr>
@@ -40940,7 +41456,7 @@
           </a:ln>
           <a:extLst>
             <a:ext uri="{FAA26D3D-D897-4be2-8F04-BA451C77F1D7}">
-              <ma14:placeholderFlag xmlns:ma14="http://schemas.microsoft.com/office/mac/drawingml/2011/main" xmlns="" val="1"/>
+              <ma14:placeholderFlag xmlns="" xmlns:ma14="http://schemas.microsoft.com/office/mac/drawingml/2011/main" val="1"/>
             </a:ext>
           </a:extLst>
         </p:spPr>
@@ -42073,7 +42589,7 @@
           </a:ln>
           <a:extLst>
             <a:ext uri="{FAA26D3D-D897-4be2-8F04-BA451C77F1D7}">
-              <ma14:placeholderFlag xmlns:ma14="http://schemas.microsoft.com/office/mac/drawingml/2011/main" xmlns="" val="1"/>
+              <ma14:placeholderFlag xmlns="" xmlns:ma14="http://schemas.microsoft.com/office/mac/drawingml/2011/main" val="1"/>
             </a:ext>
           </a:extLst>
         </p:spPr>
@@ -42667,7 +43183,7 @@
           </a:ln>
           <a:extLst>
             <a:ext uri="{FAA26D3D-D897-4be2-8F04-BA451C77F1D7}">
-              <ma14:placeholderFlag xmlns:ma14="http://schemas.microsoft.com/office/mac/drawingml/2011/main" xmlns="" val="1"/>
+              <ma14:placeholderFlag xmlns="" xmlns:ma14="http://schemas.microsoft.com/office/mac/drawingml/2011/main" val="1"/>
             </a:ext>
           </a:extLst>
         </p:spPr>
@@ -43032,7 +43548,7 @@
           </a:ln>
           <a:extLst>
             <a:ext uri="{FAA26D3D-D897-4be2-8F04-BA451C77F1D7}">
-              <ma14:placeholderFlag xmlns:ma14="http://schemas.microsoft.com/office/mac/drawingml/2011/main" xmlns="" val="1"/>
+              <ma14:placeholderFlag xmlns="" xmlns:ma14="http://schemas.microsoft.com/office/mac/drawingml/2011/main" val="1"/>
             </a:ext>
           </a:extLst>
         </p:spPr>
@@ -43676,7 +44192,7 @@
           </a:ln>
           <a:extLst>
             <a:ext uri="{FAA26D3D-D897-4be2-8F04-BA451C77F1D7}">
-              <ma14:placeholderFlag xmlns:ma14="http://schemas.microsoft.com/office/mac/drawingml/2011/main" xmlns="" val="1"/>
+              <ma14:placeholderFlag xmlns="" xmlns:ma14="http://schemas.microsoft.com/office/mac/drawingml/2011/main" val="1"/>
             </a:ext>
           </a:extLst>
         </p:spPr>
@@ -46047,7 +46563,7 @@
           <a:p>
             <a:r>
               <a:rPr lang="en-US" sz="1600" dirty="0"/>
-              <a:t>Maturity Assessment Report</a:t>
+              <a:t>Maturity Assessment Report **</a:t>
             </a:r>
           </a:p>
         </p:txBody>
@@ -46311,6 +46827,60 @@
           </a:p>
         </p:txBody>
       </p:sp>
+      <p:sp>
+        <p:nvSpPr>
+          <p:cNvPr id="3" name="TextBox 2">
+            <a:extLst>
+              <a:ext uri="{FF2B5EF4-FFF2-40B4-BE49-F238E27FC236}">
+                <a16:creationId xmlns:a16="http://schemas.microsoft.com/office/drawing/2014/main" id="{A64896A7-B88B-0926-577D-18CF92EF35FE}"/>
+              </a:ext>
+            </a:extLst>
+          </p:cNvPr>
+          <p:cNvSpPr txBox="1"/>
+          <p:nvPr/>
+        </p:nvSpPr>
+        <p:spPr>
+          <a:xfrm>
+            <a:off x="587046" y="6275973"/>
+            <a:ext cx="7851275" cy="276999"/>
+          </a:xfrm>
+          <a:prstGeom prst="rect">
+            <a:avLst/>
+          </a:prstGeom>
+          <a:noFill/>
+        </p:spPr>
+        <p:txBody>
+          <a:bodyPr wrap="square" lIns="91440" tIns="45720" rIns="91440" bIns="45720" rtlCol="0">
+            <a:spAutoFit/>
+          </a:bodyPr>
+          <a:lstStyle/>
+          <a:p>
+            <a:pPr algn="l"/>
+            <a:r>
+              <a:rPr lang="en-US" sz="1200" dirty="0">
+                <a:latin typeface="+mn-lt"/>
+              </a:rPr>
+              <a:t>** This report is used for </a:t>
+            </a:r>
+            <a:r>
+              <a:rPr lang="en-US" sz="1200" dirty="0">
+                <a:latin typeface="+mn-lt"/>
+                <a:hlinkClick r:id="rId3"/>
+              </a:rPr>
+              <a:t>Hybrid Application Monitoring Use Case</a:t>
+            </a:r>
+            <a:r>
+              <a:rPr lang="en-US" sz="1200" dirty="0">
+                <a:latin typeface="+mn-lt"/>
+              </a:rPr>
+              <a:t> purchased under the Hybrid Application Monitoring SKU.</a:t>
+            </a:r>
+            <a:endParaRPr lang="en-US" sz="1200" u="sng" dirty="0">
+              <a:latin typeface="+mn-lt"/>
+            </a:endParaRPr>
+          </a:p>
+        </p:txBody>
+      </p:sp>
     </p:spTree>
     <p:extLst>
       <p:ext uri="{BB962C8B-B14F-4D97-AF65-F5344CB8AC3E}">
@@ -46357,7 +46927,12 @@
             <p:ph type="title"/>
           </p:nvPr>
         </p:nvSpPr>
-        <p:spPr/>
+        <p:spPr>
+          <a:xfrm>
+            <a:off x="583689" y="455084"/>
+            <a:ext cx="9176537" cy="1164309"/>
+          </a:xfrm>
+        </p:spPr>
         <p:txBody>
           <a:bodyPr/>
           <a:lstStyle/>
@@ -46374,7 +46949,7 @@
                   </a:schemeClr>
                 </a:solidFill>
               </a:rPr>
-              <a:t>Engage</a:t>
+              <a:t>Use</a:t>
             </a:r>
             <a:r>
               <a:rPr lang="en-US" sz="2400" i="1" dirty="0">
@@ -46394,7 +46969,638 @@
                   </a:schemeClr>
                 </a:solidFill>
               </a:rPr>
-              <a:t>has failed health check best-practices</a:t>
+              <a:t>resource and document links. These are the </a:t>
+            </a:r>
+            <a:r>
+              <a:rPr lang="en-US" sz="2400" u="sng" dirty="0"/>
+              <a:t>primary recommendations</a:t>
+            </a:r>
+            <a:r>
+              <a:rPr lang="en-US" sz="2400" dirty="0"/>
+              <a:t> </a:t>
+            </a:r>
+            <a:r>
+              <a:rPr lang="en-US" sz="2400" dirty="0">
+                <a:solidFill>
+                  <a:schemeClr val="bg2">
+                    <a:lumMod val="65000"/>
+                  </a:schemeClr>
+                </a:solidFill>
+              </a:rPr>
+              <a:t>to </a:t>
+            </a:r>
+            <a:r>
+              <a:rPr lang="en-US" sz="2400" u="sng" dirty="0"/>
+              <a:t>pass</a:t>
+            </a:r>
+            <a:r>
+              <a:rPr lang="en-US" sz="2400" dirty="0">
+                <a:solidFill>
+                  <a:schemeClr val="bg2">
+                    <a:lumMod val="65000"/>
+                  </a:schemeClr>
+                </a:solidFill>
+              </a:rPr>
+              <a:t> health checks for the </a:t>
+            </a:r>
+            <a:r>
+              <a:rPr lang="en-US" sz="2400" i="1" u="sng" dirty="0">
+                <a:solidFill>
+                  <a:schemeClr val="bg2">
+                    <a:lumMod val="65000"/>
+                  </a:schemeClr>
+                </a:solidFill>
+              </a:rPr>
+              <a:t>Use</a:t>
+            </a:r>
+            <a:r>
+              <a:rPr lang="en-US" sz="2400" dirty="0">
+                <a:solidFill>
+                  <a:schemeClr val="bg2">
+                    <a:lumMod val="65000"/>
+                  </a:schemeClr>
+                </a:solidFill>
+              </a:rPr>
+              <a:t> pitstop.</a:t>
+            </a:r>
+            <a:endParaRPr lang="en-US" sz="2400" u="sng" dirty="0">
+              <a:solidFill>
+                <a:schemeClr val="bg2">
+                  <a:lumMod val="65000"/>
+                </a:schemeClr>
+              </a:solidFill>
+            </a:endParaRPr>
+          </a:p>
+        </p:txBody>
+      </p:sp>
+      <p:pic>
+        <p:nvPicPr>
+          <p:cNvPr id="4" name="Picture 3">
+            <a:extLst>
+              <a:ext uri="{FF2B5EF4-FFF2-40B4-BE49-F238E27FC236}">
+                <a16:creationId xmlns:a16="http://schemas.microsoft.com/office/drawing/2014/main" id="{954E400C-A9E6-789C-84E9-B86CF70D3E2D}"/>
+              </a:ext>
+            </a:extLst>
+          </p:cNvPr>
+          <p:cNvPicPr>
+            <a:picLocks noChangeAspect="1"/>
+          </p:cNvPicPr>
+          <p:nvPr/>
+        </p:nvPicPr>
+        <p:blipFill>
+          <a:blip r:embed="rId3"/>
+          <a:stretch>
+            <a:fillRect/>
+          </a:stretch>
+        </p:blipFill>
+        <p:spPr>
+          <a:xfrm>
+            <a:off x="9457107" y="-1"/>
+            <a:ext cx="2734894" cy="1619395"/>
+          </a:xfrm>
+          <a:prstGeom prst="rect">
+            <a:avLst/>
+          </a:prstGeom>
+        </p:spPr>
+      </p:pic>
+    </p:spTree>
+    <p:extLst>
+      <p:ext uri="{BB962C8B-B14F-4D97-AF65-F5344CB8AC3E}">
+        <p14:creationId xmlns:p14="http://schemas.microsoft.com/office/powerpoint/2010/main" val="4135586517"/>
+      </p:ext>
+    </p:extLst>
+  </p:cSld>
+  <p:clrMapOvr>
+    <a:masterClrMapping/>
+  </p:clrMapOvr>
+</p:sld>
+</file>
+
+<file path=ppt/slides/slide11.xml><?xml version="1.0" encoding="utf-8"?>
+<p:sld xmlns:a="http://schemas.openxmlformats.org/drawingml/2006/main" xmlns:r="http://schemas.openxmlformats.org/officeDocument/2006/relationships" xmlns:p="http://schemas.openxmlformats.org/presentationml/2006/main">
+  <p:cSld>
+    <p:spTree>
+      <p:nvGrpSpPr>
+        <p:cNvPr id="1" name=""/>
+        <p:cNvGrpSpPr/>
+        <p:nvPr/>
+      </p:nvGrpSpPr>
+      <p:grpSpPr>
+        <a:xfrm>
+          <a:off x="0" y="0"/>
+          <a:ext cx="0" cy="0"/>
+          <a:chOff x="0" y="0"/>
+          <a:chExt cx="0" cy="0"/>
+        </a:xfrm>
+      </p:grpSpPr>
+      <p:sp>
+        <p:nvSpPr>
+          <p:cNvPr id="3" name="Title 2">
+            <a:extLst>
+              <a:ext uri="{FF2B5EF4-FFF2-40B4-BE49-F238E27FC236}">
+                <a16:creationId xmlns:a16="http://schemas.microsoft.com/office/drawing/2014/main" id="{F9BA7272-68AE-FF40-8C45-20569EB44577}"/>
+              </a:ext>
+            </a:extLst>
+          </p:cNvPr>
+          <p:cNvSpPr>
+            <a:spLocks noGrp="1"/>
+          </p:cNvSpPr>
+          <p:nvPr>
+            <p:ph type="title"/>
+          </p:nvPr>
+        </p:nvSpPr>
+        <p:spPr>
+          <a:xfrm>
+            <a:off x="583689" y="455084"/>
+            <a:ext cx="9176537" cy="1164309"/>
+          </a:xfrm>
+        </p:spPr>
+        <p:txBody>
+          <a:bodyPr/>
+          <a:lstStyle/>
+          <a:p>
+            <a:r>
+              <a:rPr lang="en-US" sz="2400" dirty="0"/>
+              <a:t>Pitstop: </a:t>
+            </a:r>
+            <a:r>
+              <a:rPr lang="en-US" sz="2400" i="1" u="sng" dirty="0">
+                <a:solidFill>
+                  <a:schemeClr val="bg2">
+                    <a:lumMod val="65000"/>
+                  </a:schemeClr>
+                </a:solidFill>
+              </a:rPr>
+              <a:t>Use</a:t>
+            </a:r>
+            <a:r>
+              <a:rPr lang="en-US" sz="2400" i="1" dirty="0">
+                <a:solidFill>
+                  <a:schemeClr val="bg2">
+                    <a:lumMod val="65000"/>
+                  </a:schemeClr>
+                </a:solidFill>
+              </a:rPr>
+              <a:t> </a:t>
+            </a:r>
+            <a:r>
+              <a:rPr lang="en-US" sz="2400" dirty="0">
+                <a:solidFill>
+                  <a:schemeClr val="bg2">
+                    <a:lumMod val="65000"/>
+                  </a:schemeClr>
+                </a:solidFill>
+              </a:rPr>
+              <a:t>resource and document links. These are the </a:t>
+            </a:r>
+            <a:r>
+              <a:rPr lang="en-US" sz="2400" u="sng" dirty="0"/>
+              <a:t>secondary recommendations</a:t>
+            </a:r>
+            <a:r>
+              <a:rPr lang="en-US" sz="2400" dirty="0">
+                <a:solidFill>
+                  <a:schemeClr val="bg2">
+                    <a:lumMod val="65000"/>
+                  </a:schemeClr>
+                </a:solidFill>
+              </a:rPr>
+              <a:t> to </a:t>
+            </a:r>
+            <a:r>
+              <a:rPr lang="en-US" sz="2400" u="sng" dirty="0"/>
+              <a:t>improve</a:t>
+            </a:r>
+            <a:r>
+              <a:rPr lang="en-US" sz="2400" dirty="0">
+                <a:solidFill>
+                  <a:schemeClr val="bg2">
+                    <a:lumMod val="65000"/>
+                  </a:schemeClr>
+                </a:solidFill>
+              </a:rPr>
+              <a:t> the quality of instrumentation further.</a:t>
+            </a:r>
+            <a:endParaRPr lang="en-US" sz="2400" u="sng" dirty="0">
+              <a:solidFill>
+                <a:schemeClr val="bg2">
+                  <a:lumMod val="65000"/>
+                </a:schemeClr>
+              </a:solidFill>
+            </a:endParaRPr>
+          </a:p>
+        </p:txBody>
+      </p:sp>
+      <p:pic>
+        <p:nvPicPr>
+          <p:cNvPr id="4" name="Picture 3">
+            <a:extLst>
+              <a:ext uri="{FF2B5EF4-FFF2-40B4-BE49-F238E27FC236}">
+                <a16:creationId xmlns:a16="http://schemas.microsoft.com/office/drawing/2014/main" id="{954E400C-A9E6-789C-84E9-B86CF70D3E2D}"/>
+              </a:ext>
+            </a:extLst>
+          </p:cNvPr>
+          <p:cNvPicPr>
+            <a:picLocks noChangeAspect="1"/>
+          </p:cNvPicPr>
+          <p:nvPr/>
+        </p:nvPicPr>
+        <p:blipFill>
+          <a:blip r:embed="rId3"/>
+          <a:stretch>
+            <a:fillRect/>
+          </a:stretch>
+        </p:blipFill>
+        <p:spPr>
+          <a:xfrm>
+            <a:off x="9457107" y="-1"/>
+            <a:ext cx="2734894" cy="1619395"/>
+          </a:xfrm>
+          <a:prstGeom prst="rect">
+            <a:avLst/>
+          </a:prstGeom>
+        </p:spPr>
+      </p:pic>
+      <p:sp>
+        <p:nvSpPr>
+          <p:cNvPr id="2" name="TextBox 1">
+            <a:extLst>
+              <a:ext uri="{FF2B5EF4-FFF2-40B4-BE49-F238E27FC236}">
+                <a16:creationId xmlns:a16="http://schemas.microsoft.com/office/drawing/2014/main" id="{BFC38B7C-69E4-AE99-7919-2D17A3437C07}"/>
+              </a:ext>
+            </a:extLst>
+          </p:cNvPr>
+          <p:cNvSpPr txBox="1"/>
+          <p:nvPr/>
+        </p:nvSpPr>
+        <p:spPr>
+          <a:xfrm>
+            <a:off x="3160644" y="2395331"/>
+            <a:ext cx="5138530" cy="923330"/>
+          </a:xfrm>
+          <a:prstGeom prst="rect">
+            <a:avLst/>
+          </a:prstGeom>
+          <a:noFill/>
+        </p:spPr>
+        <p:txBody>
+          <a:bodyPr wrap="square" lIns="91440" tIns="45720" rIns="91440" bIns="45720" rtlCol="0">
+            <a:spAutoFit/>
+          </a:bodyPr>
+          <a:lstStyle/>
+          <a:p>
+            <a:pPr algn="l"/>
+            <a:r>
+              <a:rPr lang="en-US" dirty="0">
+                <a:solidFill>
+                  <a:schemeClr val="bg2">
+                    <a:lumMod val="75000"/>
+                  </a:schemeClr>
+                </a:solidFill>
+              </a:rPr>
+              <a:t>There are no </a:t>
+            </a:r>
+            <a:r>
+              <a:rPr lang="en-US" u="sng" dirty="0">
+                <a:solidFill>
+                  <a:schemeClr val="bg2">
+                    <a:lumMod val="75000"/>
+                  </a:schemeClr>
+                </a:solidFill>
+              </a:rPr>
+              <a:t>secondary recommendations</a:t>
+            </a:r>
+            <a:r>
+              <a:rPr lang="en-US" dirty="0">
+                <a:solidFill>
+                  <a:schemeClr val="bg2">
+                    <a:lumMod val="75000"/>
+                  </a:schemeClr>
+                </a:solidFill>
+              </a:rPr>
+              <a:t> available for this Pitstop.  Please consult the </a:t>
+            </a:r>
+            <a:r>
+              <a:rPr lang="en-US" u="sng" dirty="0">
+                <a:solidFill>
+                  <a:schemeClr val="bg2">
+                    <a:lumMod val="75000"/>
+                  </a:schemeClr>
+                </a:solidFill>
+              </a:rPr>
+              <a:t>primary recommendations</a:t>
+            </a:r>
+            <a:r>
+              <a:rPr lang="en-US" dirty="0">
+                <a:solidFill>
+                  <a:schemeClr val="bg2">
+                    <a:lumMod val="75000"/>
+                  </a:schemeClr>
+                </a:solidFill>
+              </a:rPr>
+              <a:t> on the prior slide.  </a:t>
+            </a:r>
+            <a:endParaRPr lang="en-US" dirty="0">
+              <a:solidFill>
+                <a:schemeClr val="bg2">
+                  <a:lumMod val="75000"/>
+                </a:schemeClr>
+              </a:solidFill>
+              <a:latin typeface="+mn-lt"/>
+            </a:endParaRPr>
+          </a:p>
+        </p:txBody>
+      </p:sp>
+    </p:spTree>
+    <p:extLst>
+      <p:ext uri="{BB962C8B-B14F-4D97-AF65-F5344CB8AC3E}">
+        <p14:creationId xmlns:p14="http://schemas.microsoft.com/office/powerpoint/2010/main" val="250474957"/>
+      </p:ext>
+    </p:extLst>
+  </p:cSld>
+  <p:clrMapOvr>
+    <a:masterClrMapping/>
+  </p:clrMapOvr>
+</p:sld>
+</file>
+
+<file path=ppt/slides/slide12.xml><?xml version="1.0" encoding="utf-8"?>
+<p:sld xmlns:a="http://schemas.openxmlformats.org/drawingml/2006/main" xmlns:r="http://schemas.openxmlformats.org/officeDocument/2006/relationships" xmlns:p="http://schemas.openxmlformats.org/presentationml/2006/main">
+  <p:cSld>
+    <p:spTree>
+      <p:nvGrpSpPr>
+        <p:cNvPr id="1" name=""/>
+        <p:cNvGrpSpPr/>
+        <p:nvPr/>
+      </p:nvGrpSpPr>
+      <p:grpSpPr>
+        <a:xfrm>
+          <a:off x="0" y="0"/>
+          <a:ext cx="0" cy="0"/>
+          <a:chOff x="0" y="0"/>
+          <a:chExt cx="0" cy="0"/>
+        </a:xfrm>
+      </p:grpSpPr>
+      <p:sp>
+        <p:nvSpPr>
+          <p:cNvPr id="3" name="Title 2">
+            <a:extLst>
+              <a:ext uri="{FF2B5EF4-FFF2-40B4-BE49-F238E27FC236}">
+                <a16:creationId xmlns:a16="http://schemas.microsoft.com/office/drawing/2014/main" id="{F9BA7272-68AE-FF40-8C45-20569EB44577}"/>
+              </a:ext>
+            </a:extLst>
+          </p:cNvPr>
+          <p:cNvSpPr>
+            <a:spLocks noGrp="1"/>
+          </p:cNvSpPr>
+          <p:nvPr>
+            <p:ph type="title"/>
+          </p:nvPr>
+        </p:nvSpPr>
+        <p:spPr/>
+        <p:txBody>
+          <a:bodyPr/>
+          <a:lstStyle/>
+          <a:p>
+            <a:r>
+              <a:rPr lang="en-US" sz="2400" dirty="0"/>
+              <a:t>Hybrid Application Monitoring </a:t>
+            </a:r>
+            <a:br>
+              <a:rPr lang="en-US" sz="2400" dirty="0"/>
+            </a:br>
+            <a:r>
+              <a:rPr lang="en-US" sz="2400" dirty="0"/>
+              <a:t>Pitstop: </a:t>
+            </a:r>
+            <a:r>
+              <a:rPr lang="en-US" sz="2400" i="1" dirty="0">
+                <a:solidFill>
+                  <a:schemeClr val="bg2">
+                    <a:lumMod val="65000"/>
+                  </a:schemeClr>
+                </a:solidFill>
+              </a:rPr>
+              <a:t>Engage</a:t>
+            </a:r>
+          </a:p>
+        </p:txBody>
+      </p:sp>
+      <p:pic>
+        <p:nvPicPr>
+          <p:cNvPr id="2" name="Picture 1">
+            <a:extLst>
+              <a:ext uri="{FF2B5EF4-FFF2-40B4-BE49-F238E27FC236}">
+                <a16:creationId xmlns:a16="http://schemas.microsoft.com/office/drawing/2014/main" id="{131BC433-9DC1-CE3A-E1C2-BCA842581145}"/>
+              </a:ext>
+            </a:extLst>
+          </p:cNvPr>
+          <p:cNvPicPr>
+            <a:picLocks noChangeAspect="1"/>
+          </p:cNvPicPr>
+          <p:nvPr/>
+        </p:nvPicPr>
+        <p:blipFill>
+          <a:blip r:embed="rId3"/>
+          <a:stretch>
+            <a:fillRect/>
+          </a:stretch>
+        </p:blipFill>
+        <p:spPr>
+          <a:xfrm>
+            <a:off x="9457106" y="0"/>
+            <a:ext cx="2734893" cy="1619395"/>
+          </a:xfrm>
+          <a:prstGeom prst="rect">
+            <a:avLst/>
+          </a:prstGeom>
+        </p:spPr>
+      </p:pic>
+      <p:sp>
+        <p:nvSpPr>
+          <p:cNvPr id="5" name="TextBox 4">
+            <a:extLst>
+              <a:ext uri="{FF2B5EF4-FFF2-40B4-BE49-F238E27FC236}">
+                <a16:creationId xmlns:a16="http://schemas.microsoft.com/office/drawing/2014/main" id="{60AD8280-2AE6-A913-8BA7-DD65D7A433C5}"/>
+              </a:ext>
+            </a:extLst>
+          </p:cNvPr>
+          <p:cNvSpPr txBox="1"/>
+          <p:nvPr/>
+        </p:nvSpPr>
+        <p:spPr>
+          <a:xfrm>
+            <a:off x="9073680" y="6077191"/>
+            <a:ext cx="2948243" cy="215444"/>
+          </a:xfrm>
+          <a:prstGeom prst="rect">
+            <a:avLst/>
+          </a:prstGeom>
+          <a:noFill/>
+        </p:spPr>
+        <p:txBody>
+          <a:bodyPr wrap="none" lIns="91440" tIns="45720" rIns="91440" bIns="45720" rtlCol="0">
+            <a:spAutoFit/>
+          </a:bodyPr>
+          <a:lstStyle/>
+          <a:p>
+            <a:pPr algn="l"/>
+            <a:r>
+              <a:rPr lang="en-US" sz="800" dirty="0">
+                <a:latin typeface="+mn-lt"/>
+              </a:rPr>
+              <a:t>*** see the next page for feedback on health checks </a:t>
+            </a:r>
+            <a:r>
+              <a:rPr lang="en-US" sz="800" u="sng" dirty="0">
+                <a:latin typeface="+mn-lt"/>
+              </a:rPr>
+              <a:t>best practices</a:t>
+            </a:r>
+          </a:p>
+        </p:txBody>
+      </p:sp>
+    </p:spTree>
+    <p:extLst>
+      <p:ext uri="{BB962C8B-B14F-4D97-AF65-F5344CB8AC3E}">
+        <p14:creationId xmlns:p14="http://schemas.microsoft.com/office/powerpoint/2010/main" val="3914242953"/>
+      </p:ext>
+    </p:extLst>
+  </p:cSld>
+  <p:clrMapOvr>
+    <a:masterClrMapping/>
+  </p:clrMapOvr>
+</p:sld>
+</file>
+
+<file path=ppt/slides/slide13.xml><?xml version="1.0" encoding="utf-8"?>
+<p:sld xmlns:a="http://schemas.openxmlformats.org/drawingml/2006/main" xmlns:r="http://schemas.openxmlformats.org/officeDocument/2006/relationships" xmlns:p="http://schemas.openxmlformats.org/presentationml/2006/main">
+  <p:cSld>
+    <p:spTree>
+      <p:nvGrpSpPr>
+        <p:cNvPr id="1" name=""/>
+        <p:cNvGrpSpPr/>
+        <p:nvPr/>
+      </p:nvGrpSpPr>
+      <p:grpSpPr>
+        <a:xfrm>
+          <a:off x="0" y="0"/>
+          <a:ext cx="0" cy="0"/>
+          <a:chOff x="0" y="0"/>
+          <a:chExt cx="0" cy="0"/>
+        </a:xfrm>
+      </p:grpSpPr>
+      <p:sp>
+        <p:nvSpPr>
+          <p:cNvPr id="3" name="Title 2">
+            <a:extLst>
+              <a:ext uri="{FF2B5EF4-FFF2-40B4-BE49-F238E27FC236}">
+                <a16:creationId xmlns:a16="http://schemas.microsoft.com/office/drawing/2014/main" id="{F9BA7272-68AE-FF40-8C45-20569EB44577}"/>
+              </a:ext>
+            </a:extLst>
+          </p:cNvPr>
+          <p:cNvSpPr>
+            <a:spLocks noGrp="1"/>
+          </p:cNvSpPr>
+          <p:nvPr>
+            <p:ph type="title"/>
+          </p:nvPr>
+        </p:nvSpPr>
+        <p:spPr>
+          <a:xfrm>
+            <a:off x="583689" y="455085"/>
+            <a:ext cx="10408990" cy="975783"/>
+          </a:xfrm>
+        </p:spPr>
+        <p:txBody>
+          <a:bodyPr/>
+          <a:lstStyle/>
+          <a:p>
+            <a:r>
+              <a:rPr lang="en-US" sz="2400" dirty="0"/>
+              <a:t>Pitstop: </a:t>
+            </a:r>
+            <a:r>
+              <a:rPr lang="en-US" sz="2400" i="1" u="sng" dirty="0">
+                <a:solidFill>
+                  <a:schemeClr val="bg2">
+                    <a:lumMod val="65000"/>
+                  </a:schemeClr>
+                </a:solidFill>
+              </a:rPr>
+              <a:t>Engage</a:t>
+            </a:r>
+            <a:r>
+              <a:rPr lang="en-US" sz="2400" i="1" dirty="0">
+                <a:solidFill>
+                  <a:schemeClr val="bg2">
+                    <a:lumMod val="65000"/>
+                  </a:schemeClr>
+                </a:solidFill>
+              </a:rPr>
+              <a:t> </a:t>
+            </a:r>
+            <a:r>
+              <a:rPr lang="en-US" sz="2400" dirty="0">
+                <a:solidFill>
+                  <a:schemeClr val="bg2">
+                    <a:lumMod val="65000"/>
+                  </a:schemeClr>
+                </a:solidFill>
+              </a:rPr>
+              <a:t>resource and document links. These are the </a:t>
+            </a:r>
+            <a:r>
+              <a:rPr lang="en-US" sz="2400" u="sng" dirty="0"/>
+              <a:t>primary recommendations</a:t>
+            </a:r>
+            <a:r>
+              <a:rPr lang="en-US" sz="2400" dirty="0"/>
+              <a:t> </a:t>
+            </a:r>
+            <a:r>
+              <a:rPr lang="en-US" sz="2400" dirty="0">
+                <a:solidFill>
+                  <a:schemeClr val="bg2">
+                    <a:lumMod val="65000"/>
+                  </a:schemeClr>
+                </a:solidFill>
+              </a:rPr>
+              <a:t>to </a:t>
+            </a:r>
+            <a:r>
+              <a:rPr lang="en-US" sz="2400" u="sng" dirty="0"/>
+              <a:t>pass</a:t>
+            </a:r>
+            <a:r>
+              <a:rPr lang="en-US" sz="2400" dirty="0">
+                <a:solidFill>
+                  <a:schemeClr val="bg2">
+                    <a:lumMod val="65000"/>
+                  </a:schemeClr>
+                </a:solidFill>
+              </a:rPr>
+              <a:t> health checks for the </a:t>
+            </a:r>
+            <a:r>
+              <a:rPr lang="en-US" sz="2400" i="1" u="sng" dirty="0">
+                <a:solidFill>
+                  <a:schemeClr val="bg2">
+                    <a:lumMod val="65000"/>
+                  </a:schemeClr>
+                </a:solidFill>
+              </a:rPr>
+              <a:t>Engage</a:t>
+            </a:r>
+            <a:r>
+              <a:rPr lang="en-US" sz="2400" dirty="0">
+                <a:solidFill>
+                  <a:schemeClr val="bg2">
+                    <a:lumMod val="65000"/>
+                  </a:schemeClr>
+                </a:solidFill>
+              </a:rPr>
+              <a:t> pitstop</a:t>
             </a:r>
             <a:endParaRPr lang="en-US" sz="2400" u="sng" dirty="0">
               <a:solidFill>
@@ -46449,7 +47655,255 @@
 </p:sld>
 </file>
 
-<file path=ppt/slides/slide11.xml><?xml version="1.0" encoding="utf-8"?>
+<file path=ppt/slides/slide14.xml><?xml version="1.0" encoding="utf-8"?>
+<p:sld xmlns:a="http://schemas.openxmlformats.org/drawingml/2006/main" xmlns:r="http://schemas.openxmlformats.org/officeDocument/2006/relationships" xmlns:p="http://schemas.openxmlformats.org/presentationml/2006/main">
+  <p:cSld>
+    <p:spTree>
+      <p:nvGrpSpPr>
+        <p:cNvPr id="1" name=""/>
+        <p:cNvGrpSpPr/>
+        <p:nvPr/>
+      </p:nvGrpSpPr>
+      <p:grpSpPr>
+        <a:xfrm>
+          <a:off x="0" y="0"/>
+          <a:ext cx="0" cy="0"/>
+          <a:chOff x="0" y="0"/>
+          <a:chExt cx="0" cy="0"/>
+        </a:xfrm>
+      </p:grpSpPr>
+      <p:sp>
+        <p:nvSpPr>
+          <p:cNvPr id="3" name="Title 2">
+            <a:extLst>
+              <a:ext uri="{FF2B5EF4-FFF2-40B4-BE49-F238E27FC236}">
+                <a16:creationId xmlns:a16="http://schemas.microsoft.com/office/drawing/2014/main" id="{F9BA7272-68AE-FF40-8C45-20569EB44577}"/>
+              </a:ext>
+            </a:extLst>
+          </p:cNvPr>
+          <p:cNvSpPr>
+            <a:spLocks noGrp="1"/>
+          </p:cNvSpPr>
+          <p:nvPr>
+            <p:ph type="title"/>
+          </p:nvPr>
+        </p:nvSpPr>
+        <p:spPr>
+          <a:xfrm>
+            <a:off x="583689" y="455085"/>
+            <a:ext cx="10408990" cy="975783"/>
+          </a:xfrm>
+        </p:spPr>
+        <p:txBody>
+          <a:bodyPr/>
+          <a:lstStyle/>
+          <a:p>
+            <a:r>
+              <a:rPr lang="en-US" sz="2400" dirty="0"/>
+              <a:t>Pitstop: </a:t>
+            </a:r>
+            <a:r>
+              <a:rPr lang="en-US" sz="2400" i="1" u="sng" dirty="0">
+                <a:solidFill>
+                  <a:schemeClr val="bg2">
+                    <a:lumMod val="65000"/>
+                  </a:schemeClr>
+                </a:solidFill>
+              </a:rPr>
+              <a:t>Engage</a:t>
+            </a:r>
+            <a:r>
+              <a:rPr lang="en-US" sz="2400" i="1" dirty="0">
+                <a:solidFill>
+                  <a:schemeClr val="bg2">
+                    <a:lumMod val="65000"/>
+                  </a:schemeClr>
+                </a:solidFill>
+              </a:rPr>
+              <a:t> </a:t>
+            </a:r>
+            <a:r>
+              <a:rPr lang="en-US" sz="2400" dirty="0">
+                <a:solidFill>
+                  <a:schemeClr val="bg2">
+                    <a:lumMod val="65000"/>
+                  </a:schemeClr>
+                </a:solidFill>
+              </a:rPr>
+              <a:t>resource and document links. These are the </a:t>
+            </a:r>
+            <a:r>
+              <a:rPr lang="en-US" sz="2400" u="sng" dirty="0"/>
+              <a:t>secondary recommendations</a:t>
+            </a:r>
+            <a:r>
+              <a:rPr lang="en-US" sz="2400" dirty="0">
+                <a:solidFill>
+                  <a:schemeClr val="bg2">
+                    <a:lumMod val="65000"/>
+                  </a:schemeClr>
+                </a:solidFill>
+              </a:rPr>
+              <a:t> to </a:t>
+            </a:r>
+            <a:r>
+              <a:rPr lang="en-US" sz="2400" u="sng" dirty="0"/>
+              <a:t>improve</a:t>
+            </a:r>
+            <a:r>
+              <a:rPr lang="en-US" sz="2400" dirty="0">
+                <a:solidFill>
+                  <a:schemeClr val="bg2">
+                    <a:lumMod val="65000"/>
+                  </a:schemeClr>
+                </a:solidFill>
+              </a:rPr>
+              <a:t> the quality of instrumentation further.</a:t>
+            </a:r>
+            <a:endParaRPr lang="en-US" sz="2400" u="sng" dirty="0">
+              <a:solidFill>
+                <a:schemeClr val="bg2">
+                  <a:lumMod val="65000"/>
+                </a:schemeClr>
+              </a:solidFill>
+            </a:endParaRPr>
+          </a:p>
+        </p:txBody>
+      </p:sp>
+      <p:pic>
+        <p:nvPicPr>
+          <p:cNvPr id="4" name="Picture 3">
+            <a:extLst>
+              <a:ext uri="{FF2B5EF4-FFF2-40B4-BE49-F238E27FC236}">
+                <a16:creationId xmlns:a16="http://schemas.microsoft.com/office/drawing/2014/main" id="{D839C740-C4DF-8F92-A188-9862C9E8076F}"/>
+              </a:ext>
+            </a:extLst>
+          </p:cNvPr>
+          <p:cNvPicPr>
+            <a:picLocks noChangeAspect="1"/>
+          </p:cNvPicPr>
+          <p:nvPr/>
+        </p:nvPicPr>
+        <p:blipFill>
+          <a:blip r:embed="rId3"/>
+          <a:stretch>
+            <a:fillRect/>
+          </a:stretch>
+        </p:blipFill>
+        <p:spPr>
+          <a:xfrm>
+            <a:off x="9457106" y="0"/>
+            <a:ext cx="2734893" cy="1619395"/>
+          </a:xfrm>
+          <a:prstGeom prst="rect">
+            <a:avLst/>
+          </a:prstGeom>
+        </p:spPr>
+      </p:pic>
+      <p:sp>
+        <p:nvSpPr>
+          <p:cNvPr id="2" name="TextBox 1">
+            <a:extLst>
+              <a:ext uri="{FF2B5EF4-FFF2-40B4-BE49-F238E27FC236}">
+                <a16:creationId xmlns:a16="http://schemas.microsoft.com/office/drawing/2014/main" id="{69519F30-32AD-7D4D-5B09-3742F41B0033}"/>
+              </a:ext>
+            </a:extLst>
+          </p:cNvPr>
+          <p:cNvSpPr txBox="1"/>
+          <p:nvPr/>
+        </p:nvSpPr>
+        <p:spPr>
+          <a:xfrm>
+            <a:off x="3160644" y="2395331"/>
+            <a:ext cx="5138530" cy="923330"/>
+          </a:xfrm>
+          <a:prstGeom prst="rect">
+            <a:avLst/>
+          </a:prstGeom>
+          <a:noFill/>
+        </p:spPr>
+        <p:txBody>
+          <a:bodyPr wrap="square" lIns="91440" tIns="45720" rIns="91440" bIns="45720" rtlCol="0">
+            <a:spAutoFit/>
+          </a:bodyPr>
+          <a:lstStyle/>
+          <a:p>
+            <a:pPr algn="l"/>
+            <a:r>
+              <a:rPr lang="en-US" dirty="0">
+                <a:solidFill>
+                  <a:schemeClr val="bg2">
+                    <a:lumMod val="75000"/>
+                  </a:schemeClr>
+                </a:solidFill>
+              </a:rPr>
+              <a:t>There are no </a:t>
+            </a:r>
+            <a:r>
+              <a:rPr lang="en-US" u="sng" dirty="0">
+                <a:solidFill>
+                  <a:schemeClr val="bg2">
+                    <a:lumMod val="75000"/>
+                  </a:schemeClr>
+                </a:solidFill>
+              </a:rPr>
+              <a:t>secondary recommendations</a:t>
+            </a:r>
+            <a:r>
+              <a:rPr lang="en-US" dirty="0">
+                <a:solidFill>
+                  <a:schemeClr val="bg2">
+                    <a:lumMod val="75000"/>
+                  </a:schemeClr>
+                </a:solidFill>
+              </a:rPr>
+              <a:t> available for this Pitstop.  Please consult the </a:t>
+            </a:r>
+            <a:r>
+              <a:rPr lang="en-US" u="sng" dirty="0">
+                <a:solidFill>
+                  <a:schemeClr val="bg2">
+                    <a:lumMod val="75000"/>
+                  </a:schemeClr>
+                </a:solidFill>
+              </a:rPr>
+              <a:t>primary recommendations</a:t>
+            </a:r>
+            <a:r>
+              <a:rPr lang="en-US" dirty="0">
+                <a:solidFill>
+                  <a:schemeClr val="bg2">
+                    <a:lumMod val="75000"/>
+                  </a:schemeClr>
+                </a:solidFill>
+              </a:rPr>
+              <a:t> on the prior slide.  </a:t>
+            </a:r>
+            <a:endParaRPr lang="en-US" dirty="0">
+              <a:solidFill>
+                <a:schemeClr val="bg2">
+                  <a:lumMod val="75000"/>
+                </a:schemeClr>
+              </a:solidFill>
+              <a:latin typeface="+mn-lt"/>
+            </a:endParaRPr>
+          </a:p>
+        </p:txBody>
+      </p:sp>
+    </p:spTree>
+    <p:extLst>
+      <p:ext uri="{BB962C8B-B14F-4D97-AF65-F5344CB8AC3E}">
+        <p14:creationId xmlns:p14="http://schemas.microsoft.com/office/powerpoint/2010/main" val="4048011084"/>
+      </p:ext>
+    </p:extLst>
+  </p:cSld>
+  <p:clrMapOvr>
+    <a:masterClrMapping/>
+  </p:clrMapOvr>
+</p:sld>
+</file>
+
+<file path=ppt/slides/slide15.xml><?xml version="1.0" encoding="utf-8"?>
 <p:sld xmlns:a="http://schemas.openxmlformats.org/drawingml/2006/main" xmlns:r="http://schemas.openxmlformats.org/officeDocument/2006/relationships" xmlns:p="http://schemas.openxmlformats.org/presentationml/2006/main">
   <p:cSld>
     <p:spTree>
@@ -46598,7 +48052,7 @@
 </p:sld>
 </file>
 
-<file path=ppt/slides/slide12.xml><?xml version="1.0" encoding="utf-8"?>
+<file path=ppt/slides/slide16.xml><?xml version="1.0" encoding="utf-8"?>
 <p:sld xmlns:a="http://schemas.openxmlformats.org/drawingml/2006/main" xmlns:r="http://schemas.openxmlformats.org/officeDocument/2006/relationships" xmlns:p="http://schemas.openxmlformats.org/presentationml/2006/main">
   <p:cSld>
     <p:spTree>
@@ -46631,7 +48085,12 @@
             <p:ph type="title"/>
           </p:nvPr>
         </p:nvSpPr>
-        <p:spPr/>
+        <p:spPr>
+          <a:xfrm>
+            <a:off x="583688" y="455085"/>
+            <a:ext cx="10647529" cy="975783"/>
+          </a:xfrm>
+        </p:spPr>
         <p:txBody>
           <a:bodyPr/>
           <a:lstStyle/>
@@ -46668,7 +48127,55 @@
                   </a:schemeClr>
                 </a:solidFill>
               </a:rPr>
-              <a:t>has failed health check best-practices</a:t>
+              <a:t>resource and document links. These are the </a:t>
+            </a:r>
+            <a:r>
+              <a:rPr lang="en-US" sz="2400" u="sng" dirty="0"/>
+              <a:t>primary recommendations</a:t>
+            </a:r>
+            <a:r>
+              <a:rPr lang="en-US" sz="2400" dirty="0">
+                <a:solidFill>
+                  <a:schemeClr val="bg2">
+                    <a:lumMod val="65000"/>
+                  </a:schemeClr>
+                </a:solidFill>
+              </a:rPr>
+              <a:t> to </a:t>
+            </a:r>
+            <a:r>
+              <a:rPr lang="en-US" sz="2400" u="sng" dirty="0"/>
+              <a:t>pass</a:t>
+            </a:r>
+            <a:r>
+              <a:rPr lang="en-US" sz="2400" dirty="0">
+                <a:solidFill>
+                  <a:schemeClr val="bg2">
+                    <a:lumMod val="65000"/>
+                  </a:schemeClr>
+                </a:solidFill>
+              </a:rPr>
+              <a:t> health checks for the </a:t>
+            </a:r>
+            <a:r>
+              <a:rPr lang="en-US" sz="2400" i="1" u="sng" dirty="0">
+                <a:solidFill>
+                  <a:schemeClr val="bg2">
+                    <a:lumMod val="65000"/>
+                  </a:schemeClr>
+                </a:solidFill>
+              </a:rPr>
+              <a:t>Adopt</a:t>
+            </a:r>
+            <a:r>
+              <a:rPr lang="en-US" sz="2400" dirty="0">
+                <a:solidFill>
+                  <a:schemeClr val="bg2">
+                    <a:lumMod val="65000"/>
+                  </a:schemeClr>
+                </a:solidFill>
+              </a:rPr>
+              <a:t> pitstop</a:t>
             </a:r>
             <a:endParaRPr lang="en-US" sz="2400" u="sng" dirty="0">
               <a:solidFill>
@@ -46723,7 +48230,255 @@
 </p:sld>
 </file>
 
-<file path=ppt/slides/slide13.xml><?xml version="1.0" encoding="utf-8"?>
+<file path=ppt/slides/slide17.xml><?xml version="1.0" encoding="utf-8"?>
+<p:sld xmlns:a="http://schemas.openxmlformats.org/drawingml/2006/main" xmlns:r="http://schemas.openxmlformats.org/officeDocument/2006/relationships" xmlns:p="http://schemas.openxmlformats.org/presentationml/2006/main">
+  <p:cSld>
+    <p:spTree>
+      <p:nvGrpSpPr>
+        <p:cNvPr id="1" name=""/>
+        <p:cNvGrpSpPr/>
+        <p:nvPr/>
+      </p:nvGrpSpPr>
+      <p:grpSpPr>
+        <a:xfrm>
+          <a:off x="0" y="0"/>
+          <a:ext cx="0" cy="0"/>
+          <a:chOff x="0" y="0"/>
+          <a:chExt cx="0" cy="0"/>
+        </a:xfrm>
+      </p:grpSpPr>
+      <p:sp>
+        <p:nvSpPr>
+          <p:cNvPr id="3" name="Title 2">
+            <a:extLst>
+              <a:ext uri="{FF2B5EF4-FFF2-40B4-BE49-F238E27FC236}">
+                <a16:creationId xmlns:a16="http://schemas.microsoft.com/office/drawing/2014/main" id="{F9BA7272-68AE-FF40-8C45-20569EB44577}"/>
+              </a:ext>
+            </a:extLst>
+          </p:cNvPr>
+          <p:cNvSpPr>
+            <a:spLocks noGrp="1"/>
+          </p:cNvSpPr>
+          <p:nvPr>
+            <p:ph type="title"/>
+          </p:nvPr>
+        </p:nvSpPr>
+        <p:spPr>
+          <a:xfrm>
+            <a:off x="583688" y="455085"/>
+            <a:ext cx="10647529" cy="975783"/>
+          </a:xfrm>
+        </p:spPr>
+        <p:txBody>
+          <a:bodyPr/>
+          <a:lstStyle/>
+          <a:p>
+            <a:r>
+              <a:rPr lang="en-US" sz="2400" dirty="0"/>
+              <a:t>Pitstop: </a:t>
+            </a:r>
+            <a:r>
+              <a:rPr lang="en-US" sz="2400" i="1" u="sng" dirty="0">
+                <a:solidFill>
+                  <a:schemeClr val="bg2">
+                    <a:lumMod val="65000"/>
+                  </a:schemeClr>
+                </a:solidFill>
+              </a:rPr>
+              <a:t>Adopt</a:t>
+            </a:r>
+            <a:r>
+              <a:rPr lang="en-US" sz="2400" i="1" dirty="0">
+                <a:solidFill>
+                  <a:schemeClr val="bg2">
+                    <a:lumMod val="65000"/>
+                  </a:schemeClr>
+                </a:solidFill>
+              </a:rPr>
+              <a:t> </a:t>
+            </a:r>
+            <a:r>
+              <a:rPr lang="en-US" sz="2400" dirty="0">
+                <a:solidFill>
+                  <a:schemeClr val="bg2">
+                    <a:lumMod val="65000"/>
+                  </a:schemeClr>
+                </a:solidFill>
+              </a:rPr>
+              <a:t>resource and document links. These are the </a:t>
+            </a:r>
+            <a:r>
+              <a:rPr lang="en-US" sz="2400" u="sng" dirty="0"/>
+              <a:t>secondary recommendations</a:t>
+            </a:r>
+            <a:r>
+              <a:rPr lang="en-US" sz="2400" dirty="0">
+                <a:solidFill>
+                  <a:schemeClr val="bg2">
+                    <a:lumMod val="65000"/>
+                  </a:schemeClr>
+                </a:solidFill>
+              </a:rPr>
+              <a:t> to </a:t>
+            </a:r>
+            <a:r>
+              <a:rPr lang="en-US" sz="2400" u="sng" dirty="0"/>
+              <a:t>improve</a:t>
+            </a:r>
+            <a:r>
+              <a:rPr lang="en-US" sz="2400" dirty="0">
+                <a:solidFill>
+                  <a:schemeClr val="bg2">
+                    <a:lumMod val="65000"/>
+                  </a:schemeClr>
+                </a:solidFill>
+              </a:rPr>
+              <a:t> the quality of instrumentation further.</a:t>
+            </a:r>
+            <a:endParaRPr lang="en-US" sz="2400" u="sng" dirty="0">
+              <a:solidFill>
+                <a:schemeClr val="bg2">
+                  <a:lumMod val="65000"/>
+                </a:schemeClr>
+              </a:solidFill>
+            </a:endParaRPr>
+          </a:p>
+        </p:txBody>
+      </p:sp>
+      <p:pic>
+        <p:nvPicPr>
+          <p:cNvPr id="4" name="Picture 3">
+            <a:extLst>
+              <a:ext uri="{FF2B5EF4-FFF2-40B4-BE49-F238E27FC236}">
+                <a16:creationId xmlns:a16="http://schemas.microsoft.com/office/drawing/2014/main" id="{D4ADF4DF-E590-C877-5FE6-F67795C8B0E5}"/>
+              </a:ext>
+            </a:extLst>
+          </p:cNvPr>
+          <p:cNvPicPr>
+            <a:picLocks noChangeAspect="1"/>
+          </p:cNvPicPr>
+          <p:nvPr/>
+        </p:nvPicPr>
+        <p:blipFill>
+          <a:blip r:embed="rId3"/>
+          <a:stretch>
+            <a:fillRect/>
+          </a:stretch>
+        </p:blipFill>
+        <p:spPr>
+          <a:xfrm>
+            <a:off x="9457106" y="0"/>
+            <a:ext cx="2734893" cy="1619395"/>
+          </a:xfrm>
+          <a:prstGeom prst="rect">
+            <a:avLst/>
+          </a:prstGeom>
+        </p:spPr>
+      </p:pic>
+      <p:sp>
+        <p:nvSpPr>
+          <p:cNvPr id="2" name="TextBox 1">
+            <a:extLst>
+              <a:ext uri="{FF2B5EF4-FFF2-40B4-BE49-F238E27FC236}">
+                <a16:creationId xmlns:a16="http://schemas.microsoft.com/office/drawing/2014/main" id="{63A72C7B-2FD1-30DA-9041-1EB9F4BA3736}"/>
+              </a:ext>
+            </a:extLst>
+          </p:cNvPr>
+          <p:cNvSpPr txBox="1"/>
+          <p:nvPr/>
+        </p:nvSpPr>
+        <p:spPr>
+          <a:xfrm>
+            <a:off x="3160644" y="2395331"/>
+            <a:ext cx="5138530" cy="923330"/>
+          </a:xfrm>
+          <a:prstGeom prst="rect">
+            <a:avLst/>
+          </a:prstGeom>
+          <a:noFill/>
+        </p:spPr>
+        <p:txBody>
+          <a:bodyPr wrap="square" lIns="91440" tIns="45720" rIns="91440" bIns="45720" rtlCol="0">
+            <a:spAutoFit/>
+          </a:bodyPr>
+          <a:lstStyle/>
+          <a:p>
+            <a:pPr algn="l"/>
+            <a:r>
+              <a:rPr lang="en-US" dirty="0">
+                <a:solidFill>
+                  <a:schemeClr val="bg2">
+                    <a:lumMod val="75000"/>
+                  </a:schemeClr>
+                </a:solidFill>
+              </a:rPr>
+              <a:t>There are no </a:t>
+            </a:r>
+            <a:r>
+              <a:rPr lang="en-US" u="sng" dirty="0">
+                <a:solidFill>
+                  <a:schemeClr val="bg2">
+                    <a:lumMod val="75000"/>
+                  </a:schemeClr>
+                </a:solidFill>
+              </a:rPr>
+              <a:t>secondary recommendations</a:t>
+            </a:r>
+            <a:r>
+              <a:rPr lang="en-US" dirty="0">
+                <a:solidFill>
+                  <a:schemeClr val="bg2">
+                    <a:lumMod val="75000"/>
+                  </a:schemeClr>
+                </a:solidFill>
+              </a:rPr>
+              <a:t> available for this Pitstop.  Please consult the </a:t>
+            </a:r>
+            <a:r>
+              <a:rPr lang="en-US" u="sng" dirty="0">
+                <a:solidFill>
+                  <a:schemeClr val="bg2">
+                    <a:lumMod val="75000"/>
+                  </a:schemeClr>
+                </a:solidFill>
+              </a:rPr>
+              <a:t>primary recommendations</a:t>
+            </a:r>
+            <a:r>
+              <a:rPr lang="en-US" dirty="0">
+                <a:solidFill>
+                  <a:schemeClr val="bg2">
+                    <a:lumMod val="75000"/>
+                  </a:schemeClr>
+                </a:solidFill>
+              </a:rPr>
+              <a:t> on the prior slide.  </a:t>
+            </a:r>
+            <a:endParaRPr lang="en-US" dirty="0">
+              <a:solidFill>
+                <a:schemeClr val="bg2">
+                  <a:lumMod val="75000"/>
+                </a:schemeClr>
+              </a:solidFill>
+              <a:latin typeface="+mn-lt"/>
+            </a:endParaRPr>
+          </a:p>
+        </p:txBody>
+      </p:sp>
+    </p:spTree>
+    <p:extLst>
+      <p:ext uri="{BB962C8B-B14F-4D97-AF65-F5344CB8AC3E}">
+        <p14:creationId xmlns:p14="http://schemas.microsoft.com/office/powerpoint/2010/main" val="3779698389"/>
+      </p:ext>
+    </p:extLst>
+  </p:cSld>
+  <p:clrMapOvr>
+    <a:masterClrMapping/>
+  </p:clrMapOvr>
+</p:sld>
+</file>
+
+<file path=ppt/slides/slide18.xml><?xml version="1.0" encoding="utf-8"?>
 <p:sld xmlns:a="http://schemas.openxmlformats.org/drawingml/2006/main" xmlns:r="http://schemas.openxmlformats.org/officeDocument/2006/relationships" xmlns:p="http://schemas.openxmlformats.org/presentationml/2006/main">
   <p:cSld>
     <p:spTree>
@@ -46872,7 +48627,7 @@
 </p:sld>
 </file>
 
-<file path=ppt/slides/slide14.xml><?xml version="1.0" encoding="utf-8"?>
+<file path=ppt/slides/slide19.xml><?xml version="1.0" encoding="utf-8"?>
 <p:sld xmlns:a="http://schemas.openxmlformats.org/drawingml/2006/main" xmlns:r="http://schemas.openxmlformats.org/officeDocument/2006/relationships" xmlns:p="http://schemas.openxmlformats.org/presentationml/2006/main">
   <p:cSld>
     <p:spTree>
@@ -46905,7 +48660,12 @@
             <p:ph type="title"/>
           </p:nvPr>
         </p:nvSpPr>
-        <p:spPr/>
+        <p:spPr>
+          <a:xfrm>
+            <a:off x="583689" y="455085"/>
+            <a:ext cx="9723189" cy="996028"/>
+          </a:xfrm>
+        </p:spPr>
         <p:txBody>
           <a:bodyPr/>
           <a:lstStyle/>
@@ -46942,7 +48702,69 @@
                   </a:schemeClr>
                 </a:solidFill>
               </a:rPr>
-              <a:t>has failed health check best-practices</a:t>
+              <a:t>resource and document links. These are the </a:t>
+            </a:r>
+            <a:r>
+              <a:rPr lang="en-US" sz="2400" u="sng" dirty="0"/>
+              <a:t>primary recommendations</a:t>
+            </a:r>
+            <a:r>
+              <a:rPr lang="en-US" sz="2400" dirty="0"/>
+              <a:t> </a:t>
+            </a:r>
+            <a:r>
+              <a:rPr lang="en-US" sz="2400" dirty="0">
+                <a:solidFill>
+                  <a:schemeClr val="bg2">
+                    <a:lumMod val="65000"/>
+                  </a:schemeClr>
+                </a:solidFill>
+              </a:rPr>
+              <a:t>to </a:t>
+            </a:r>
+            <a:r>
+              <a:rPr lang="en-US" sz="2400" u="sng" dirty="0"/>
+              <a:t>pass</a:t>
+            </a:r>
+            <a:r>
+              <a:rPr lang="en-US" sz="2400" dirty="0">
+                <a:solidFill>
+                  <a:schemeClr val="bg2">
+                    <a:lumMod val="65000"/>
+                  </a:schemeClr>
+                </a:solidFill>
+              </a:rPr>
+              <a:t> health checks for the </a:t>
+            </a:r>
+            <a:r>
+              <a:rPr lang="en-US" sz="2400" i="1" u="sng" dirty="0">
+                <a:solidFill>
+                  <a:schemeClr val="bg2">
+                    <a:lumMod val="65000"/>
+                  </a:schemeClr>
+                </a:solidFill>
+              </a:rPr>
+              <a:t>Optimize</a:t>
+            </a:r>
+            <a:r>
+              <a:rPr lang="en-US" sz="2400" i="1" dirty="0">
+                <a:solidFill>
+                  <a:schemeClr val="bg2">
+                    <a:lumMod val="65000"/>
+                  </a:schemeClr>
+                </a:solidFill>
+              </a:rPr>
+              <a:t> </a:t>
+            </a:r>
+            <a:r>
+              <a:rPr lang="en-US" sz="2400" dirty="0">
+                <a:solidFill>
+                  <a:schemeClr val="bg2">
+                    <a:lumMod val="65000"/>
+                  </a:schemeClr>
+                </a:solidFill>
+              </a:rPr>
+              <a:t>pitstop </a:t>
             </a:r>
             <a:endParaRPr lang="en-US" sz="2400" u="sng" dirty="0">
               <a:solidFill>
@@ -46988,36 +48810,6 @@
     <p:extLst>
       <p:ext uri="{BB962C8B-B14F-4D97-AF65-F5344CB8AC3E}">
         <p14:creationId xmlns:p14="http://schemas.microsoft.com/office/powerpoint/2010/main" val="700337039"/>
-      </p:ext>
-    </p:extLst>
-  </p:cSld>
-  <p:clrMapOvr>
-    <a:masterClrMapping/>
-  </p:clrMapOvr>
-</p:sld>
-</file>
-
-<file path=ppt/slides/slide15.xml><?xml version="1.0" encoding="utf-8"?>
-<p:sld xmlns:a="http://schemas.openxmlformats.org/drawingml/2006/main" xmlns:r="http://schemas.openxmlformats.org/officeDocument/2006/relationships" xmlns:p="http://schemas.openxmlformats.org/presentationml/2006/main">
-  <p:cSld>
-    <p:spTree>
-      <p:nvGrpSpPr>
-        <p:cNvPr id="1" name=""/>
-        <p:cNvGrpSpPr/>
-        <p:nvPr/>
-      </p:nvGrpSpPr>
-      <p:grpSpPr>
-        <a:xfrm>
-          <a:off x="0" y="0"/>
-          <a:ext cx="0" cy="0"/>
-          <a:chOff x="0" y="0"/>
-          <a:chExt cx="0" cy="0"/>
-        </a:xfrm>
-      </p:grpSpPr>
-    </p:spTree>
-    <p:extLst>
-      <p:ext uri="{BB962C8B-B14F-4D97-AF65-F5344CB8AC3E}">
-        <p14:creationId xmlns:p14="http://schemas.microsoft.com/office/powerpoint/2010/main" val="2448262891"/>
       </p:ext>
     </p:extLst>
   </p:cSld>
@@ -47399,6 +49191,308 @@
 </p:sld>
 </file>
 
+<file path=ppt/slides/slide20.xml><?xml version="1.0" encoding="utf-8"?>
+<p:sld xmlns:a="http://schemas.openxmlformats.org/drawingml/2006/main" xmlns:r="http://schemas.openxmlformats.org/officeDocument/2006/relationships" xmlns:p="http://schemas.openxmlformats.org/presentationml/2006/main">
+  <p:cSld>
+    <p:spTree>
+      <p:nvGrpSpPr>
+        <p:cNvPr id="1" name=""/>
+        <p:cNvGrpSpPr/>
+        <p:nvPr/>
+      </p:nvGrpSpPr>
+      <p:grpSpPr>
+        <a:xfrm>
+          <a:off x="0" y="0"/>
+          <a:ext cx="0" cy="0"/>
+          <a:chOff x="0" y="0"/>
+          <a:chExt cx="0" cy="0"/>
+        </a:xfrm>
+      </p:grpSpPr>
+      <p:sp>
+        <p:nvSpPr>
+          <p:cNvPr id="3" name="Title 2">
+            <a:extLst>
+              <a:ext uri="{FF2B5EF4-FFF2-40B4-BE49-F238E27FC236}">
+                <a16:creationId xmlns:a16="http://schemas.microsoft.com/office/drawing/2014/main" id="{F9BA7272-68AE-FF40-8C45-20569EB44577}"/>
+              </a:ext>
+            </a:extLst>
+          </p:cNvPr>
+          <p:cNvSpPr>
+            <a:spLocks noGrp="1"/>
+          </p:cNvSpPr>
+          <p:nvPr>
+            <p:ph type="title"/>
+          </p:nvPr>
+        </p:nvSpPr>
+        <p:spPr>
+          <a:xfrm>
+            <a:off x="583689" y="455085"/>
+            <a:ext cx="9017511" cy="996028"/>
+          </a:xfrm>
+        </p:spPr>
+        <p:txBody>
+          <a:bodyPr/>
+          <a:lstStyle/>
+          <a:p>
+            <a:r>
+              <a:rPr lang="en-US" sz="2400" dirty="0"/>
+              <a:t>Pitstop: </a:t>
+            </a:r>
+            <a:r>
+              <a:rPr lang="en-US" sz="2400" i="1" u="sng" dirty="0">
+                <a:solidFill>
+                  <a:schemeClr val="bg2">
+                    <a:lumMod val="65000"/>
+                  </a:schemeClr>
+                </a:solidFill>
+              </a:rPr>
+              <a:t>Optimize</a:t>
+            </a:r>
+            <a:r>
+              <a:rPr lang="en-US" sz="2400" i="1" dirty="0">
+                <a:solidFill>
+                  <a:schemeClr val="bg2">
+                    <a:lumMod val="65000"/>
+                  </a:schemeClr>
+                </a:solidFill>
+              </a:rPr>
+              <a:t> </a:t>
+            </a:r>
+            <a:r>
+              <a:rPr lang="en-US" sz="2400" dirty="0">
+                <a:solidFill>
+                  <a:schemeClr val="bg2">
+                    <a:lumMod val="65000"/>
+                  </a:schemeClr>
+                </a:solidFill>
+              </a:rPr>
+              <a:t>resource and document links. These are the </a:t>
+            </a:r>
+            <a:r>
+              <a:rPr lang="en-US" sz="2400" u="sng" dirty="0"/>
+              <a:t>secondary recommendations</a:t>
+            </a:r>
+            <a:r>
+              <a:rPr lang="en-US" sz="2400" dirty="0"/>
+              <a:t> </a:t>
+            </a:r>
+            <a:r>
+              <a:rPr lang="en-US" sz="2400" dirty="0">
+                <a:solidFill>
+                  <a:schemeClr val="bg2">
+                    <a:lumMod val="65000"/>
+                  </a:schemeClr>
+                </a:solidFill>
+              </a:rPr>
+              <a:t>to further </a:t>
+            </a:r>
+            <a:r>
+              <a:rPr lang="en-US" sz="2400" u="sng" dirty="0"/>
+              <a:t>improve</a:t>
+            </a:r>
+            <a:r>
+              <a:rPr lang="en-US" sz="2400" dirty="0">
+                <a:solidFill>
+                  <a:schemeClr val="bg2">
+                    <a:lumMod val="65000"/>
+                  </a:schemeClr>
+                </a:solidFill>
+              </a:rPr>
+              <a:t> the quality of instrumentation. </a:t>
+            </a:r>
+            <a:endParaRPr lang="en-US" sz="2400" u="sng" dirty="0">
+              <a:solidFill>
+                <a:schemeClr val="bg2">
+                  <a:lumMod val="65000"/>
+                </a:schemeClr>
+              </a:solidFill>
+            </a:endParaRPr>
+          </a:p>
+        </p:txBody>
+      </p:sp>
+      <p:pic>
+        <p:nvPicPr>
+          <p:cNvPr id="4" name="Picture 3">
+            <a:extLst>
+              <a:ext uri="{FF2B5EF4-FFF2-40B4-BE49-F238E27FC236}">
+                <a16:creationId xmlns:a16="http://schemas.microsoft.com/office/drawing/2014/main" id="{CC68BB0B-0397-3C39-02E8-3258B8F19697}"/>
+              </a:ext>
+            </a:extLst>
+          </p:cNvPr>
+          <p:cNvPicPr>
+            <a:picLocks noChangeAspect="1"/>
+          </p:cNvPicPr>
+          <p:nvPr/>
+        </p:nvPicPr>
+        <p:blipFill>
+          <a:blip r:embed="rId3"/>
+          <a:stretch>
+            <a:fillRect/>
+          </a:stretch>
+        </p:blipFill>
+        <p:spPr>
+          <a:xfrm>
+            <a:off x="9458106" y="0"/>
+            <a:ext cx="2733893" cy="1618803"/>
+          </a:xfrm>
+          <a:prstGeom prst="rect">
+            <a:avLst/>
+          </a:prstGeom>
+        </p:spPr>
+      </p:pic>
+      <p:sp>
+        <p:nvSpPr>
+          <p:cNvPr id="2" name="TextBox 1">
+            <a:extLst>
+              <a:ext uri="{FF2B5EF4-FFF2-40B4-BE49-F238E27FC236}">
+                <a16:creationId xmlns:a16="http://schemas.microsoft.com/office/drawing/2014/main" id="{045FDE3A-483F-9BCC-2870-D22AFBDF2443}"/>
+              </a:ext>
+            </a:extLst>
+          </p:cNvPr>
+          <p:cNvSpPr txBox="1"/>
+          <p:nvPr/>
+        </p:nvSpPr>
+        <p:spPr>
+          <a:xfrm>
+            <a:off x="3160644" y="2395331"/>
+            <a:ext cx="5138530" cy="923330"/>
+          </a:xfrm>
+          <a:prstGeom prst="rect">
+            <a:avLst/>
+          </a:prstGeom>
+          <a:noFill/>
+        </p:spPr>
+        <p:txBody>
+          <a:bodyPr wrap="square" lIns="91440" tIns="45720" rIns="91440" bIns="45720" rtlCol="0">
+            <a:spAutoFit/>
+          </a:bodyPr>
+          <a:lstStyle/>
+          <a:p>
+            <a:pPr algn="l"/>
+            <a:r>
+              <a:rPr lang="en-US" dirty="0">
+                <a:solidFill>
+                  <a:schemeClr val="bg2">
+                    <a:lumMod val="75000"/>
+                  </a:schemeClr>
+                </a:solidFill>
+              </a:rPr>
+              <a:t>There are no </a:t>
+            </a:r>
+            <a:r>
+              <a:rPr lang="en-US" u="sng" dirty="0">
+                <a:solidFill>
+                  <a:schemeClr val="bg2">
+                    <a:lumMod val="75000"/>
+                  </a:schemeClr>
+                </a:solidFill>
+              </a:rPr>
+              <a:t>secondary recommendations</a:t>
+            </a:r>
+            <a:r>
+              <a:rPr lang="en-US" dirty="0">
+                <a:solidFill>
+                  <a:schemeClr val="bg2">
+                    <a:lumMod val="75000"/>
+                  </a:schemeClr>
+                </a:solidFill>
+              </a:rPr>
+              <a:t> available for this Pitstop.  Please consult the </a:t>
+            </a:r>
+            <a:r>
+              <a:rPr lang="en-US" u="sng" dirty="0">
+                <a:solidFill>
+                  <a:schemeClr val="bg2">
+                    <a:lumMod val="75000"/>
+                  </a:schemeClr>
+                </a:solidFill>
+              </a:rPr>
+              <a:t>primary recommendations</a:t>
+            </a:r>
+            <a:r>
+              <a:rPr lang="en-US" dirty="0">
+                <a:solidFill>
+                  <a:schemeClr val="bg2">
+                    <a:lumMod val="75000"/>
+                  </a:schemeClr>
+                </a:solidFill>
+              </a:rPr>
+              <a:t> </a:t>
+            </a:r>
+            <a:r>
+              <a:rPr lang="en-US">
+                <a:solidFill>
+                  <a:schemeClr val="bg2">
+                    <a:lumMod val="75000"/>
+                  </a:schemeClr>
+                </a:solidFill>
+              </a:rPr>
+              <a:t>on the prior </a:t>
+            </a:r>
+            <a:r>
+              <a:rPr lang="en-US" dirty="0">
+                <a:solidFill>
+                  <a:schemeClr val="bg2">
+                    <a:lumMod val="75000"/>
+                  </a:schemeClr>
+                </a:solidFill>
+              </a:rPr>
+              <a:t>slide.  </a:t>
+            </a:r>
+            <a:endParaRPr lang="en-US" dirty="0">
+              <a:solidFill>
+                <a:schemeClr val="bg2">
+                  <a:lumMod val="75000"/>
+                </a:schemeClr>
+              </a:solidFill>
+              <a:latin typeface="+mn-lt"/>
+            </a:endParaRPr>
+          </a:p>
+        </p:txBody>
+      </p:sp>
+    </p:spTree>
+    <p:extLst>
+      <p:ext uri="{BB962C8B-B14F-4D97-AF65-F5344CB8AC3E}">
+        <p14:creationId xmlns:p14="http://schemas.microsoft.com/office/powerpoint/2010/main" val="925916626"/>
+      </p:ext>
+    </p:extLst>
+  </p:cSld>
+  <p:clrMapOvr>
+    <a:masterClrMapping/>
+  </p:clrMapOvr>
+</p:sld>
+</file>
+
+<file path=ppt/slides/slide21.xml><?xml version="1.0" encoding="utf-8"?>
+<p:sld xmlns:a="http://schemas.openxmlformats.org/drawingml/2006/main" xmlns:r="http://schemas.openxmlformats.org/officeDocument/2006/relationships" xmlns:p="http://schemas.openxmlformats.org/presentationml/2006/main">
+  <p:cSld>
+    <p:spTree>
+      <p:nvGrpSpPr>
+        <p:cNvPr id="1" name=""/>
+        <p:cNvGrpSpPr/>
+        <p:nvPr/>
+      </p:nvGrpSpPr>
+      <p:grpSpPr>
+        <a:xfrm>
+          <a:off x="0" y="0"/>
+          <a:ext cx="0" cy="0"/>
+          <a:chOff x="0" y="0"/>
+          <a:chExt cx="0" cy="0"/>
+        </a:xfrm>
+      </p:grpSpPr>
+    </p:spTree>
+    <p:extLst>
+      <p:ext uri="{BB962C8B-B14F-4D97-AF65-F5344CB8AC3E}">
+        <p14:creationId xmlns:p14="http://schemas.microsoft.com/office/powerpoint/2010/main" val="2448262891"/>
+      </p:ext>
+    </p:extLst>
+  </p:cSld>
+  <p:clrMapOvr>
+    <a:masterClrMapping/>
+  </p:clrMapOvr>
+</p:sld>
+</file>
+
 <file path=ppt/slides/slide3.xml><?xml version="1.0" encoding="utf-8"?>
 <p:sld xmlns:a="http://schemas.openxmlformats.org/drawingml/2006/main" xmlns:r="http://schemas.openxmlformats.org/officeDocument/2006/relationships" xmlns:p="http://schemas.openxmlformats.org/presentationml/2006/main">
   <p:cSld>
@@ -47581,7 +49675,12 @@
             <p:ph type="title"/>
           </p:nvPr>
         </p:nvSpPr>
-        <p:spPr/>
+        <p:spPr>
+          <a:xfrm>
+            <a:off x="583689" y="406228"/>
+            <a:ext cx="8874418" cy="1202635"/>
+          </a:xfrm>
+        </p:spPr>
         <p:txBody>
           <a:bodyPr/>
           <a:lstStyle/>
@@ -47618,17 +49717,35 @@
                   </a:schemeClr>
                 </a:solidFill>
               </a:rPr>
-              <a:t>resources </a:t>
+              <a:t>resources and documents. These are the </a:t>
             </a:r>
             <a:r>
-              <a:rPr lang="en-US" sz="2400">
+              <a:rPr lang="en-US" sz="2400" u="sng" dirty="0"/>
+              <a:t>primary recommendations</a:t>
+            </a:r>
+            <a:r>
+              <a:rPr lang="en-US" sz="2400" dirty="0">
                 <a:solidFill>
                   <a:schemeClr val="bg2">
                     <a:lumMod val="65000"/>
                   </a:schemeClr>
                 </a:solidFill>
               </a:rPr>
-              <a:t>and documents</a:t>
+              <a:t> to </a:t>
+            </a:r>
+            <a:r>
+              <a:rPr lang="en-US" sz="2400" u="sng" dirty="0"/>
+              <a:t>pass</a:t>
+            </a:r>
+            <a:r>
+              <a:rPr lang="en-US" sz="2400" dirty="0">
+                <a:solidFill>
+                  <a:schemeClr val="bg2">
+                    <a:lumMod val="65000"/>
+                  </a:schemeClr>
+                </a:solidFill>
+              </a:rPr>
+              <a:t> health checks for the Onboard pitstop.</a:t>
             </a:r>
             <a:endParaRPr lang="en-US" sz="2400" u="sng" dirty="0">
               <a:solidFill>
@@ -47716,6 +49833,254 @@
             <p:ph type="title"/>
           </p:nvPr>
         </p:nvSpPr>
+        <p:spPr>
+          <a:xfrm>
+            <a:off x="583688" y="484902"/>
+            <a:ext cx="9047329" cy="975783"/>
+          </a:xfrm>
+        </p:spPr>
+        <p:txBody>
+          <a:bodyPr/>
+          <a:lstStyle/>
+          <a:p>
+            <a:r>
+              <a:rPr lang="en-US" sz="2400" dirty="0"/>
+              <a:t>Pitstop: </a:t>
+            </a:r>
+            <a:r>
+              <a:rPr lang="en-US" sz="2400" i="1" u="sng" dirty="0">
+                <a:solidFill>
+                  <a:schemeClr val="bg2">
+                    <a:lumMod val="65000"/>
+                  </a:schemeClr>
+                </a:solidFill>
+              </a:rPr>
+              <a:t>Onboard</a:t>
+            </a:r>
+            <a:r>
+              <a:rPr lang="en-US" sz="2400" i="1" dirty="0">
+                <a:solidFill>
+                  <a:schemeClr val="bg2">
+                    <a:lumMod val="65000"/>
+                  </a:schemeClr>
+                </a:solidFill>
+              </a:rPr>
+              <a:t> </a:t>
+            </a:r>
+            <a:r>
+              <a:rPr lang="en-US" sz="2400" dirty="0">
+                <a:solidFill>
+                  <a:schemeClr val="bg2">
+                    <a:lumMod val="65000"/>
+                  </a:schemeClr>
+                </a:solidFill>
+              </a:rPr>
+              <a:t>resources and documents. These are the </a:t>
+            </a:r>
+            <a:r>
+              <a:rPr lang="en-US" sz="2400" u="sng" dirty="0"/>
+              <a:t>secondary recommendations</a:t>
+            </a:r>
+            <a:r>
+              <a:rPr lang="en-US" sz="2400" dirty="0">
+                <a:solidFill>
+                  <a:schemeClr val="bg2">
+                    <a:lumMod val="65000"/>
+                  </a:schemeClr>
+                </a:solidFill>
+              </a:rPr>
+              <a:t> to </a:t>
+            </a:r>
+            <a:r>
+              <a:rPr lang="en-US" sz="2400" u="sng" dirty="0"/>
+              <a:t>improve</a:t>
+            </a:r>
+            <a:r>
+              <a:rPr lang="en-US" sz="2400" dirty="0">
+                <a:solidFill>
+                  <a:schemeClr val="bg2">
+                    <a:lumMod val="65000"/>
+                  </a:schemeClr>
+                </a:solidFill>
+              </a:rPr>
+              <a:t> the quality of instrumentation further.</a:t>
+            </a:r>
+            <a:endParaRPr lang="en-US" sz="2400" u="sng" dirty="0">
+              <a:solidFill>
+                <a:schemeClr val="bg2">
+                  <a:lumMod val="65000"/>
+                </a:schemeClr>
+              </a:solidFill>
+            </a:endParaRPr>
+          </a:p>
+        </p:txBody>
+      </p:sp>
+      <p:pic>
+        <p:nvPicPr>
+          <p:cNvPr id="2" name="Picture 1">
+            <a:extLst>
+              <a:ext uri="{FF2B5EF4-FFF2-40B4-BE49-F238E27FC236}">
+                <a16:creationId xmlns:a16="http://schemas.microsoft.com/office/drawing/2014/main" id="{0E588CAB-9BAC-2B7C-7F31-3B044CF51B1B}"/>
+              </a:ext>
+            </a:extLst>
+          </p:cNvPr>
+          <p:cNvPicPr>
+            <a:picLocks noChangeAspect="1"/>
+          </p:cNvPicPr>
+          <p:nvPr/>
+        </p:nvPicPr>
+        <p:blipFill>
+          <a:blip r:embed="rId3"/>
+          <a:stretch>
+            <a:fillRect/>
+          </a:stretch>
+        </p:blipFill>
+        <p:spPr>
+          <a:xfrm>
+            <a:off x="9458107" y="0"/>
+            <a:ext cx="2733893" cy="1618802"/>
+          </a:xfrm>
+          <a:prstGeom prst="rect">
+            <a:avLst/>
+          </a:prstGeom>
+        </p:spPr>
+      </p:pic>
+      <p:sp>
+        <p:nvSpPr>
+          <p:cNvPr id="4" name="TextBox 3">
+            <a:extLst>
+              <a:ext uri="{FF2B5EF4-FFF2-40B4-BE49-F238E27FC236}">
+                <a16:creationId xmlns:a16="http://schemas.microsoft.com/office/drawing/2014/main" id="{80735B6B-C7F8-8BCD-A6CE-559DF8F54ABF}"/>
+              </a:ext>
+            </a:extLst>
+          </p:cNvPr>
+          <p:cNvSpPr txBox="1"/>
+          <p:nvPr/>
+        </p:nvSpPr>
+        <p:spPr>
+          <a:xfrm>
+            <a:off x="3160644" y="2395331"/>
+            <a:ext cx="5138530" cy="923330"/>
+          </a:xfrm>
+          <a:prstGeom prst="rect">
+            <a:avLst/>
+          </a:prstGeom>
+          <a:noFill/>
+        </p:spPr>
+        <p:txBody>
+          <a:bodyPr wrap="square" lIns="91440" tIns="45720" rIns="91440" bIns="45720" rtlCol="0">
+            <a:spAutoFit/>
+          </a:bodyPr>
+          <a:lstStyle/>
+          <a:p>
+            <a:pPr algn="l"/>
+            <a:r>
+              <a:rPr lang="en-US" dirty="0">
+                <a:solidFill>
+                  <a:schemeClr val="bg2">
+                    <a:lumMod val="75000"/>
+                  </a:schemeClr>
+                </a:solidFill>
+              </a:rPr>
+              <a:t>There are no </a:t>
+            </a:r>
+            <a:r>
+              <a:rPr lang="en-US" u="sng" dirty="0">
+                <a:solidFill>
+                  <a:schemeClr val="bg2">
+                    <a:lumMod val="75000"/>
+                  </a:schemeClr>
+                </a:solidFill>
+              </a:rPr>
+              <a:t>secondary recommendations</a:t>
+            </a:r>
+            <a:r>
+              <a:rPr lang="en-US" dirty="0">
+                <a:solidFill>
+                  <a:schemeClr val="bg2">
+                    <a:lumMod val="75000"/>
+                  </a:schemeClr>
+                </a:solidFill>
+              </a:rPr>
+              <a:t> available for this Pitstop.  Please consult the </a:t>
+            </a:r>
+            <a:r>
+              <a:rPr lang="en-US" u="sng" dirty="0">
+                <a:solidFill>
+                  <a:schemeClr val="bg2">
+                    <a:lumMod val="75000"/>
+                  </a:schemeClr>
+                </a:solidFill>
+              </a:rPr>
+              <a:t>primary recommendations</a:t>
+            </a:r>
+            <a:r>
+              <a:rPr lang="en-US" dirty="0">
+                <a:solidFill>
+                  <a:schemeClr val="bg2">
+                    <a:lumMod val="75000"/>
+                  </a:schemeClr>
+                </a:solidFill>
+              </a:rPr>
+              <a:t> on the prior slide.  </a:t>
+            </a:r>
+            <a:endParaRPr lang="en-US" dirty="0">
+              <a:solidFill>
+                <a:schemeClr val="bg2">
+                  <a:lumMod val="75000"/>
+                </a:schemeClr>
+              </a:solidFill>
+              <a:latin typeface="+mn-lt"/>
+            </a:endParaRPr>
+          </a:p>
+        </p:txBody>
+      </p:sp>
+    </p:spTree>
+    <p:extLst>
+      <p:ext uri="{BB962C8B-B14F-4D97-AF65-F5344CB8AC3E}">
+        <p14:creationId xmlns:p14="http://schemas.microsoft.com/office/powerpoint/2010/main" val="2404492384"/>
+      </p:ext>
+    </p:extLst>
+  </p:cSld>
+  <p:clrMapOvr>
+    <a:masterClrMapping/>
+  </p:clrMapOvr>
+</p:sld>
+</file>
+
+<file path=ppt/slides/slide6.xml><?xml version="1.0" encoding="utf-8"?>
+<p:sld xmlns:a="http://schemas.openxmlformats.org/drawingml/2006/main" xmlns:r="http://schemas.openxmlformats.org/officeDocument/2006/relationships" xmlns:p="http://schemas.openxmlformats.org/presentationml/2006/main">
+  <p:cSld>
+    <p:spTree>
+      <p:nvGrpSpPr>
+        <p:cNvPr id="1" name=""/>
+        <p:cNvGrpSpPr/>
+        <p:nvPr/>
+      </p:nvGrpSpPr>
+      <p:grpSpPr>
+        <a:xfrm>
+          <a:off x="0" y="0"/>
+          <a:ext cx="0" cy="0"/>
+          <a:chOff x="0" y="0"/>
+          <a:chExt cx="0" cy="0"/>
+        </a:xfrm>
+      </p:grpSpPr>
+      <p:sp>
+        <p:nvSpPr>
+          <p:cNvPr id="3" name="Title 2">
+            <a:extLst>
+              <a:ext uri="{FF2B5EF4-FFF2-40B4-BE49-F238E27FC236}">
+                <a16:creationId xmlns:a16="http://schemas.microsoft.com/office/drawing/2014/main" id="{F9BA7272-68AE-FF40-8C45-20569EB44577}"/>
+              </a:ext>
+            </a:extLst>
+          </p:cNvPr>
+          <p:cNvSpPr>
+            <a:spLocks noGrp="1"/>
+          </p:cNvSpPr>
+          <p:nvPr>
+            <p:ph type="title"/>
+          </p:nvPr>
+        </p:nvSpPr>
         <p:spPr/>
         <p:txBody>
           <a:bodyPr/>
@@ -47832,7 +50197,7 @@
 </p:sld>
 </file>
 
-<file path=ppt/slides/slide6.xml><?xml version="1.0" encoding="utf-8"?>
+<file path=ppt/slides/slide7.xml><?xml version="1.0" encoding="utf-8"?>
 <p:sld xmlns:a="http://schemas.openxmlformats.org/drawingml/2006/main" xmlns:r="http://schemas.openxmlformats.org/officeDocument/2006/relationships" xmlns:p="http://schemas.openxmlformats.org/presentationml/2006/main">
   <p:cSld>
     <p:spTree>
@@ -47865,7 +50230,12 @@
             <p:ph type="title"/>
           </p:nvPr>
         </p:nvSpPr>
-        <p:spPr/>
+        <p:spPr>
+          <a:xfrm>
+            <a:off x="583689" y="455085"/>
+            <a:ext cx="8729276" cy="975783"/>
+          </a:xfrm>
+        </p:spPr>
         <p:txBody>
           <a:bodyPr/>
           <a:lstStyle/>
@@ -47902,7 +50272,59 @@
                   </a:schemeClr>
                 </a:solidFill>
               </a:rPr>
-              <a:t>has failed health check best-practices</a:t>
+              <a:t>resource and document links. These are the </a:t>
+            </a:r>
+            <a:r>
+              <a:rPr lang="en-US" sz="2400" u="sng" dirty="0"/>
+              <a:t>primary recommendations</a:t>
+            </a:r>
+            <a:r>
+              <a:rPr lang="en-US" sz="2400" dirty="0"/>
+              <a:t> </a:t>
+            </a:r>
+            <a:r>
+              <a:rPr lang="en-US" sz="2400" dirty="0">
+                <a:solidFill>
+                  <a:schemeClr val="bg2">
+                    <a:lumMod val="65000"/>
+                  </a:schemeClr>
+                </a:solidFill>
+              </a:rPr>
+              <a:t>to </a:t>
+            </a:r>
+            <a:r>
+              <a:rPr lang="en-US" sz="2400" u="sng" dirty="0"/>
+              <a:t>pass</a:t>
+            </a:r>
+            <a:r>
+              <a:rPr lang="en-US" sz="2400" dirty="0">
+                <a:solidFill>
+                  <a:schemeClr val="bg2">
+                    <a:lumMod val="65000"/>
+                  </a:schemeClr>
+                </a:solidFill>
+              </a:rPr>
+              <a:t> health checks for the </a:t>
+            </a:r>
+            <a:r>
+              <a:rPr lang="en-US" sz="2400" i="1" u="sng" dirty="0">
+                <a:solidFill>
+                  <a:schemeClr val="bg2">
+                    <a:lumMod val="65000"/>
+                  </a:schemeClr>
+                </a:solidFill>
+              </a:rPr>
+              <a:t>Implement</a:t>
+            </a:r>
+            <a:r>
+              <a:rPr lang="en-US" sz="2400" dirty="0">
+                <a:solidFill>
+                  <a:schemeClr val="bg2">
+                    <a:lumMod val="65000"/>
+                  </a:schemeClr>
+                </a:solidFill>
+              </a:rPr>
+              <a:t> pitstop.</a:t>
             </a:r>
             <a:endParaRPr lang="en-US" sz="2400" u="sng" dirty="0">
               <a:solidFill>
@@ -47957,7 +50379,259 @@
 </p:sld>
 </file>
 
-<file path=ppt/slides/slide7.xml><?xml version="1.0" encoding="utf-8"?>
+<file path=ppt/slides/slide8.xml><?xml version="1.0" encoding="utf-8"?>
+<p:sld xmlns:a="http://schemas.openxmlformats.org/drawingml/2006/main" xmlns:r="http://schemas.openxmlformats.org/officeDocument/2006/relationships" xmlns:p="http://schemas.openxmlformats.org/presentationml/2006/main">
+  <p:cSld>
+    <p:spTree>
+      <p:nvGrpSpPr>
+        <p:cNvPr id="1" name=""/>
+        <p:cNvGrpSpPr/>
+        <p:nvPr/>
+      </p:nvGrpSpPr>
+      <p:grpSpPr>
+        <a:xfrm>
+          <a:off x="0" y="0"/>
+          <a:ext cx="0" cy="0"/>
+          <a:chOff x="0" y="0"/>
+          <a:chExt cx="0" cy="0"/>
+        </a:xfrm>
+      </p:grpSpPr>
+      <p:sp>
+        <p:nvSpPr>
+          <p:cNvPr id="3" name="Title 2">
+            <a:extLst>
+              <a:ext uri="{FF2B5EF4-FFF2-40B4-BE49-F238E27FC236}">
+                <a16:creationId xmlns:a16="http://schemas.microsoft.com/office/drawing/2014/main" id="{F9BA7272-68AE-FF40-8C45-20569EB44577}"/>
+              </a:ext>
+            </a:extLst>
+          </p:cNvPr>
+          <p:cNvSpPr>
+            <a:spLocks noGrp="1"/>
+          </p:cNvSpPr>
+          <p:nvPr>
+            <p:ph type="title"/>
+          </p:nvPr>
+        </p:nvSpPr>
+        <p:spPr>
+          <a:xfrm>
+            <a:off x="583689" y="455085"/>
+            <a:ext cx="8873418" cy="1164310"/>
+          </a:xfrm>
+        </p:spPr>
+        <p:txBody>
+          <a:bodyPr/>
+          <a:lstStyle/>
+          <a:p>
+            <a:r>
+              <a:rPr lang="en-US" sz="2400" dirty="0"/>
+              <a:t>Pitstop: </a:t>
+            </a:r>
+            <a:r>
+              <a:rPr lang="en-US" sz="2400" i="1" u="sng" dirty="0">
+                <a:solidFill>
+                  <a:schemeClr val="bg2">
+                    <a:lumMod val="65000"/>
+                  </a:schemeClr>
+                </a:solidFill>
+              </a:rPr>
+              <a:t>Implement</a:t>
+            </a:r>
+            <a:r>
+              <a:rPr lang="en-US" sz="2400" i="1" dirty="0">
+                <a:solidFill>
+                  <a:schemeClr val="bg2">
+                    <a:lumMod val="65000"/>
+                  </a:schemeClr>
+                </a:solidFill>
+              </a:rPr>
+              <a:t> </a:t>
+            </a:r>
+            <a:r>
+              <a:rPr lang="en-US" sz="2400" dirty="0">
+                <a:solidFill>
+                  <a:schemeClr val="bg2">
+                    <a:lumMod val="65000"/>
+                  </a:schemeClr>
+                </a:solidFill>
+              </a:rPr>
+              <a:t>resource and document links. These are the </a:t>
+            </a:r>
+            <a:r>
+              <a:rPr lang="en-US" sz="2400" u="sng" dirty="0"/>
+              <a:t>secondary recommendations</a:t>
+            </a:r>
+            <a:r>
+              <a:rPr lang="en-US" sz="2400" dirty="0"/>
+              <a:t> </a:t>
+            </a:r>
+            <a:r>
+              <a:rPr lang="en-US" sz="2400" dirty="0">
+                <a:solidFill>
+                  <a:schemeClr val="bg2">
+                    <a:lumMod val="65000"/>
+                  </a:schemeClr>
+                </a:solidFill>
+              </a:rPr>
+              <a:t>to </a:t>
+            </a:r>
+            <a:r>
+              <a:rPr lang="en-US" sz="2400" u="sng" dirty="0"/>
+              <a:t>improve</a:t>
+            </a:r>
+            <a:r>
+              <a:rPr lang="en-US" sz="2400" dirty="0">
+                <a:solidFill>
+                  <a:schemeClr val="bg2">
+                    <a:lumMod val="65000"/>
+                  </a:schemeClr>
+                </a:solidFill>
+              </a:rPr>
+              <a:t> the quality of instrumentation further.</a:t>
+            </a:r>
+            <a:endParaRPr lang="en-US" sz="2400" u="sng" dirty="0">
+              <a:solidFill>
+                <a:schemeClr val="bg2">
+                  <a:lumMod val="65000"/>
+                </a:schemeClr>
+              </a:solidFill>
+            </a:endParaRPr>
+          </a:p>
+        </p:txBody>
+      </p:sp>
+      <p:pic>
+        <p:nvPicPr>
+          <p:cNvPr id="4" name="Picture 3">
+            <a:extLst>
+              <a:ext uri="{FF2B5EF4-FFF2-40B4-BE49-F238E27FC236}">
+                <a16:creationId xmlns:a16="http://schemas.microsoft.com/office/drawing/2014/main" id="{CC7E5ECC-9D8D-EC66-1C17-E4D8FD9F87BA}"/>
+              </a:ext>
+            </a:extLst>
+          </p:cNvPr>
+          <p:cNvPicPr>
+            <a:picLocks noChangeAspect="1"/>
+          </p:cNvPicPr>
+          <p:nvPr/>
+        </p:nvPicPr>
+        <p:blipFill>
+          <a:blip r:embed="rId3"/>
+          <a:stretch>
+            <a:fillRect/>
+          </a:stretch>
+        </p:blipFill>
+        <p:spPr>
+          <a:xfrm>
+            <a:off x="9457106" y="0"/>
+            <a:ext cx="2734893" cy="1619395"/>
+          </a:xfrm>
+          <a:prstGeom prst="rect">
+            <a:avLst/>
+          </a:prstGeom>
+        </p:spPr>
+      </p:pic>
+      <p:sp>
+        <p:nvSpPr>
+          <p:cNvPr id="2" name="TextBox 1">
+            <a:extLst>
+              <a:ext uri="{FF2B5EF4-FFF2-40B4-BE49-F238E27FC236}">
+                <a16:creationId xmlns:a16="http://schemas.microsoft.com/office/drawing/2014/main" id="{2A6A81E9-EF9E-B866-5F82-6DD937003CD3}"/>
+              </a:ext>
+            </a:extLst>
+          </p:cNvPr>
+          <p:cNvSpPr txBox="1"/>
+          <p:nvPr/>
+        </p:nvSpPr>
+        <p:spPr>
+          <a:xfrm>
+            <a:off x="3160644" y="2395331"/>
+            <a:ext cx="5138530" cy="923330"/>
+          </a:xfrm>
+          <a:prstGeom prst="rect">
+            <a:avLst/>
+          </a:prstGeom>
+          <a:noFill/>
+        </p:spPr>
+        <p:txBody>
+          <a:bodyPr wrap="square" lIns="91440" tIns="45720" rIns="91440" bIns="45720" rtlCol="0">
+            <a:spAutoFit/>
+          </a:bodyPr>
+          <a:lstStyle/>
+          <a:p>
+            <a:pPr algn="l"/>
+            <a:r>
+              <a:rPr lang="en-US" dirty="0">
+                <a:solidFill>
+                  <a:schemeClr val="bg2">
+                    <a:lumMod val="75000"/>
+                  </a:schemeClr>
+                </a:solidFill>
+              </a:rPr>
+              <a:t>There are no </a:t>
+            </a:r>
+            <a:r>
+              <a:rPr lang="en-US" u="sng" dirty="0">
+                <a:solidFill>
+                  <a:schemeClr val="bg2">
+                    <a:lumMod val="75000"/>
+                  </a:schemeClr>
+                </a:solidFill>
+              </a:rPr>
+              <a:t>secondary recommendations</a:t>
+            </a:r>
+            <a:r>
+              <a:rPr lang="en-US" dirty="0">
+                <a:solidFill>
+                  <a:schemeClr val="bg2">
+                    <a:lumMod val="75000"/>
+                  </a:schemeClr>
+                </a:solidFill>
+              </a:rPr>
+              <a:t> available for this Pitstop.  Please consult the </a:t>
+            </a:r>
+            <a:r>
+              <a:rPr lang="en-US" u="sng" dirty="0">
+                <a:solidFill>
+                  <a:schemeClr val="bg2">
+                    <a:lumMod val="75000"/>
+                  </a:schemeClr>
+                </a:solidFill>
+              </a:rPr>
+              <a:t>primary recommendations</a:t>
+            </a:r>
+            <a:r>
+              <a:rPr lang="en-US" dirty="0">
+                <a:solidFill>
+                  <a:schemeClr val="bg2">
+                    <a:lumMod val="75000"/>
+                  </a:schemeClr>
+                </a:solidFill>
+              </a:rPr>
+              <a:t> on the prior slide.  </a:t>
+            </a:r>
+            <a:endParaRPr lang="en-US" dirty="0">
+              <a:solidFill>
+                <a:schemeClr val="bg2">
+                  <a:lumMod val="75000"/>
+                </a:schemeClr>
+              </a:solidFill>
+              <a:latin typeface="+mn-lt"/>
+            </a:endParaRPr>
+          </a:p>
+        </p:txBody>
+      </p:sp>
+    </p:spTree>
+    <p:extLst>
+      <p:ext uri="{BB962C8B-B14F-4D97-AF65-F5344CB8AC3E}">
+        <p14:creationId xmlns:p14="http://schemas.microsoft.com/office/powerpoint/2010/main" val="2904848948"/>
+      </p:ext>
+    </p:extLst>
+  </p:cSld>
+  <p:clrMapOvr>
+    <a:masterClrMapping/>
+  </p:clrMapOvr>
+</p:sld>
+</file>
+
+<file path=ppt/slides/slide9.xml><?xml version="1.0" encoding="utf-8"?>
 <p:sld xmlns:a="http://schemas.openxmlformats.org/drawingml/2006/main" xmlns:r="http://schemas.openxmlformats.org/officeDocument/2006/relationships" xmlns:p="http://schemas.openxmlformats.org/presentationml/2006/main">
   <p:cSld>
     <p:spTree>
@@ -48097,280 +50771,6 @@
     <p:extLst>
       <p:ext uri="{BB962C8B-B14F-4D97-AF65-F5344CB8AC3E}">
         <p14:creationId xmlns:p14="http://schemas.microsoft.com/office/powerpoint/2010/main" val="3699044360"/>
-      </p:ext>
-    </p:extLst>
-  </p:cSld>
-  <p:clrMapOvr>
-    <a:masterClrMapping/>
-  </p:clrMapOvr>
-</p:sld>
-</file>
-
-<file path=ppt/slides/slide8.xml><?xml version="1.0" encoding="utf-8"?>
-<p:sld xmlns:a="http://schemas.openxmlformats.org/drawingml/2006/main" xmlns:r="http://schemas.openxmlformats.org/officeDocument/2006/relationships" xmlns:p="http://schemas.openxmlformats.org/presentationml/2006/main">
-  <p:cSld>
-    <p:spTree>
-      <p:nvGrpSpPr>
-        <p:cNvPr id="1" name=""/>
-        <p:cNvGrpSpPr/>
-        <p:nvPr/>
-      </p:nvGrpSpPr>
-      <p:grpSpPr>
-        <a:xfrm>
-          <a:off x="0" y="0"/>
-          <a:ext cx="0" cy="0"/>
-          <a:chOff x="0" y="0"/>
-          <a:chExt cx="0" cy="0"/>
-        </a:xfrm>
-      </p:grpSpPr>
-      <p:sp>
-        <p:nvSpPr>
-          <p:cNvPr id="3" name="Title 2">
-            <a:extLst>
-              <a:ext uri="{FF2B5EF4-FFF2-40B4-BE49-F238E27FC236}">
-                <a16:creationId xmlns:a16="http://schemas.microsoft.com/office/drawing/2014/main" id="{F9BA7272-68AE-FF40-8C45-20569EB44577}"/>
-              </a:ext>
-            </a:extLst>
-          </p:cNvPr>
-          <p:cNvSpPr>
-            <a:spLocks noGrp="1"/>
-          </p:cNvSpPr>
-          <p:nvPr>
-            <p:ph type="title"/>
-          </p:nvPr>
-        </p:nvSpPr>
-        <p:spPr/>
-        <p:txBody>
-          <a:bodyPr/>
-          <a:lstStyle/>
-          <a:p>
-            <a:r>
-              <a:rPr lang="en-US" sz="2400" dirty="0"/>
-              <a:t>Pitstop: </a:t>
-            </a:r>
-            <a:r>
-              <a:rPr lang="en-US" sz="2400" i="1" u="sng" dirty="0">
-                <a:solidFill>
-                  <a:schemeClr val="bg2">
-                    <a:lumMod val="65000"/>
-                  </a:schemeClr>
-                </a:solidFill>
-              </a:rPr>
-              <a:t>Use</a:t>
-            </a:r>
-            <a:r>
-              <a:rPr lang="en-US" sz="2400" i="1" dirty="0">
-                <a:solidFill>
-                  <a:schemeClr val="bg2">
-                    <a:lumMod val="65000"/>
-                  </a:schemeClr>
-                </a:solidFill>
-              </a:rPr>
-              <a:t> </a:t>
-            </a:r>
-            <a:r>
-              <a:rPr lang="en-US" sz="2400" dirty="0">
-                <a:solidFill>
-                  <a:schemeClr val="bg2">
-                    <a:lumMod val="65000"/>
-                  </a:schemeClr>
-                </a:solidFill>
-              </a:rPr>
-              <a:t>has failed health check best-practices</a:t>
-            </a:r>
-            <a:endParaRPr lang="en-US" sz="2400" u="sng" dirty="0">
-              <a:solidFill>
-                <a:schemeClr val="bg2">
-                  <a:lumMod val="65000"/>
-                </a:schemeClr>
-              </a:solidFill>
-            </a:endParaRPr>
-          </a:p>
-        </p:txBody>
-      </p:sp>
-      <p:pic>
-        <p:nvPicPr>
-          <p:cNvPr id="4" name="Picture 3">
-            <a:extLst>
-              <a:ext uri="{FF2B5EF4-FFF2-40B4-BE49-F238E27FC236}">
-                <a16:creationId xmlns:a16="http://schemas.microsoft.com/office/drawing/2014/main" id="{954E400C-A9E6-789C-84E9-B86CF70D3E2D}"/>
-              </a:ext>
-            </a:extLst>
-          </p:cNvPr>
-          <p:cNvPicPr>
-            <a:picLocks noChangeAspect="1"/>
-          </p:cNvPicPr>
-          <p:nvPr/>
-        </p:nvPicPr>
-        <p:blipFill>
-          <a:blip r:embed="rId3"/>
-          <a:stretch>
-            <a:fillRect/>
-          </a:stretch>
-        </p:blipFill>
-        <p:spPr>
-          <a:xfrm>
-            <a:off x="9457107" y="-1"/>
-            <a:ext cx="2734894" cy="1619395"/>
-          </a:xfrm>
-          <a:prstGeom prst="rect">
-            <a:avLst/>
-          </a:prstGeom>
-        </p:spPr>
-      </p:pic>
-    </p:spTree>
-    <p:extLst>
-      <p:ext uri="{BB962C8B-B14F-4D97-AF65-F5344CB8AC3E}">
-        <p14:creationId xmlns:p14="http://schemas.microsoft.com/office/powerpoint/2010/main" val="4135586517"/>
-      </p:ext>
-    </p:extLst>
-  </p:cSld>
-  <p:clrMapOvr>
-    <a:masterClrMapping/>
-  </p:clrMapOvr>
-</p:sld>
-</file>
-
-<file path=ppt/slides/slide9.xml><?xml version="1.0" encoding="utf-8"?>
-<p:sld xmlns:a="http://schemas.openxmlformats.org/drawingml/2006/main" xmlns:r="http://schemas.openxmlformats.org/officeDocument/2006/relationships" xmlns:p="http://schemas.openxmlformats.org/presentationml/2006/main">
-  <p:cSld>
-    <p:spTree>
-      <p:nvGrpSpPr>
-        <p:cNvPr id="1" name=""/>
-        <p:cNvGrpSpPr/>
-        <p:nvPr/>
-      </p:nvGrpSpPr>
-      <p:grpSpPr>
-        <a:xfrm>
-          <a:off x="0" y="0"/>
-          <a:ext cx="0" cy="0"/>
-          <a:chOff x="0" y="0"/>
-          <a:chExt cx="0" cy="0"/>
-        </a:xfrm>
-      </p:grpSpPr>
-      <p:sp>
-        <p:nvSpPr>
-          <p:cNvPr id="3" name="Title 2">
-            <a:extLst>
-              <a:ext uri="{FF2B5EF4-FFF2-40B4-BE49-F238E27FC236}">
-                <a16:creationId xmlns:a16="http://schemas.microsoft.com/office/drawing/2014/main" id="{F9BA7272-68AE-FF40-8C45-20569EB44577}"/>
-              </a:ext>
-            </a:extLst>
-          </p:cNvPr>
-          <p:cNvSpPr>
-            <a:spLocks noGrp="1"/>
-          </p:cNvSpPr>
-          <p:nvPr>
-            <p:ph type="title"/>
-          </p:nvPr>
-        </p:nvSpPr>
-        <p:spPr/>
-        <p:txBody>
-          <a:bodyPr/>
-          <a:lstStyle/>
-          <a:p>
-            <a:r>
-              <a:rPr lang="en-US" sz="2400" dirty="0"/>
-              <a:t>Hybrid Application Monitoring </a:t>
-            </a:r>
-            <a:br>
-              <a:rPr lang="en-US" sz="2400" dirty="0"/>
-            </a:br>
-            <a:r>
-              <a:rPr lang="en-US" sz="2400" dirty="0"/>
-              <a:t>Pitstop: </a:t>
-            </a:r>
-            <a:r>
-              <a:rPr lang="en-US" sz="2400" i="1" dirty="0">
-                <a:solidFill>
-                  <a:schemeClr val="bg2">
-                    <a:lumMod val="65000"/>
-                  </a:schemeClr>
-                </a:solidFill>
-              </a:rPr>
-              <a:t>Engage</a:t>
-            </a:r>
-          </a:p>
-        </p:txBody>
-      </p:sp>
-      <p:pic>
-        <p:nvPicPr>
-          <p:cNvPr id="2" name="Picture 1">
-            <a:extLst>
-              <a:ext uri="{FF2B5EF4-FFF2-40B4-BE49-F238E27FC236}">
-                <a16:creationId xmlns:a16="http://schemas.microsoft.com/office/drawing/2014/main" id="{131BC433-9DC1-CE3A-E1C2-BCA842581145}"/>
-              </a:ext>
-            </a:extLst>
-          </p:cNvPr>
-          <p:cNvPicPr>
-            <a:picLocks noChangeAspect="1"/>
-          </p:cNvPicPr>
-          <p:nvPr/>
-        </p:nvPicPr>
-        <p:blipFill>
-          <a:blip r:embed="rId3"/>
-          <a:stretch>
-            <a:fillRect/>
-          </a:stretch>
-        </p:blipFill>
-        <p:spPr>
-          <a:xfrm>
-            <a:off x="9457106" y="0"/>
-            <a:ext cx="2734893" cy="1619395"/>
-          </a:xfrm>
-          <a:prstGeom prst="rect">
-            <a:avLst/>
-          </a:prstGeom>
-        </p:spPr>
-      </p:pic>
-      <p:sp>
-        <p:nvSpPr>
-          <p:cNvPr id="5" name="TextBox 4">
-            <a:extLst>
-              <a:ext uri="{FF2B5EF4-FFF2-40B4-BE49-F238E27FC236}">
-                <a16:creationId xmlns:a16="http://schemas.microsoft.com/office/drawing/2014/main" id="{60AD8280-2AE6-A913-8BA7-DD65D7A433C5}"/>
-              </a:ext>
-            </a:extLst>
-          </p:cNvPr>
-          <p:cNvSpPr txBox="1"/>
-          <p:nvPr/>
-        </p:nvSpPr>
-        <p:spPr>
-          <a:xfrm>
-            <a:off x="9073680" y="6077191"/>
-            <a:ext cx="2948243" cy="215444"/>
-          </a:xfrm>
-          <a:prstGeom prst="rect">
-            <a:avLst/>
-          </a:prstGeom>
-          <a:noFill/>
-        </p:spPr>
-        <p:txBody>
-          <a:bodyPr wrap="none" lIns="91440" tIns="45720" rIns="91440" bIns="45720" rtlCol="0">
-            <a:spAutoFit/>
-          </a:bodyPr>
-          <a:lstStyle/>
-          <a:p>
-            <a:pPr algn="l"/>
-            <a:r>
-              <a:rPr lang="en-US" sz="800" dirty="0">
-                <a:latin typeface="+mn-lt"/>
-              </a:rPr>
-              <a:t>*** see the next page for feedback on health checks </a:t>
-            </a:r>
-            <a:r>
-              <a:rPr lang="en-US" sz="800" u="sng" dirty="0">
-                <a:latin typeface="+mn-lt"/>
-              </a:rPr>
-              <a:t>best practices</a:t>
-            </a:r>
-          </a:p>
-        </p:txBody>
-      </p:sp>
-    </p:spTree>
-    <p:extLst>
-      <p:ext uri="{BB962C8B-B14F-4D97-AF65-F5344CB8AC3E}">
-        <p14:creationId xmlns:p14="http://schemas.microsoft.com/office/powerpoint/2010/main" val="3914242953"/>
       </p:ext>
     </p:extLst>
   </p:cSld>
@@ -49537,6 +51937,15 @@
 </file>
 
 <file path=customXml/item1.xml><?xml version="1.0" encoding="utf-8"?>
+<?mso-contentType ?>
+<FormTemplates xmlns="http://schemas.microsoft.com/sharepoint/v3/contenttype/forms">
+  <Display>DocumentLibraryForm</Display>
+  <Edit>DocumentLibraryForm</Edit>
+  <New>DocumentLibraryForm</New>
+</FormTemplates>
+</file>
+
+<file path=customXml/item2.xml><?xml version="1.0" encoding="utf-8"?>
 <ct:contentTypeSchema xmlns:ct="http://schemas.microsoft.com/office/2006/metadata/contentType" xmlns:ma="http://schemas.microsoft.com/office/2006/metadata/properties/metaAttributes" ct:_="" ma:_="" ma:contentTypeName="Document" ma:contentTypeID="0x01010016638FBC164A6C4987893577CA81BDCE" ma:contentTypeVersion="12" ma:contentTypeDescription="Create a new document." ma:contentTypeScope="" ma:versionID="ad216d817d9e9210cab45cf1c00ab7cf">
   <xsd:schema xmlns:xsd="http://www.w3.org/2001/XMLSchema" xmlns:xs="http://www.w3.org/2001/XMLSchema" xmlns:p="http://schemas.microsoft.com/office/2006/metadata/properties" xmlns:ns2="c068e80e-f499-4ba4-b97d-8eb81f7bf0a4" xmlns:ns3="d78665ad-f783-4f30-b3cb-b870e5173973" targetNamespace="http://schemas.microsoft.com/office/2006/metadata/properties" ma:root="true" ma:fieldsID="b03d820719e6014dead3958bf2973f6f" ns2:_="" ns3:_="">
     <xsd:import namespace="c068e80e-f499-4ba4-b97d-8eb81f7bf0a4"/>
@@ -49753,15 +52162,6 @@
 </ct:contentTypeSchema>
 </file>
 
-<file path=customXml/item2.xml><?xml version="1.0" encoding="utf-8"?>
-<?mso-contentType ?>
-<FormTemplates xmlns="http://schemas.microsoft.com/sharepoint/v3/contenttype/forms">
-  <Display>DocumentLibraryForm</Display>
-  <Edit>DocumentLibraryForm</Edit>
-  <New>DocumentLibraryForm</New>
-</FormTemplates>
-</file>
-
 <file path=customXml/item3.xml><?xml version="1.0" encoding="utf-8"?>
 <p:properties xmlns:p="http://schemas.microsoft.com/office/2006/metadata/properties" xmlns:xsi="http://www.w3.org/2001/XMLSchema-instance" xmlns:pc="http://schemas.microsoft.com/office/infopath/2007/PartnerControls">
   <documentManagement>
@@ -49781,6 +52181,14 @@
 </file>
 
 <file path=customXml/itemProps1.xml><?xml version="1.0" encoding="utf-8"?>
+<ds:datastoreItem xmlns:ds="http://schemas.openxmlformats.org/officeDocument/2006/customXml" ds:itemID="{2D849882-45D9-49DF-83E9-35AEA65C5DA4}">
+  <ds:schemaRefs>
+    <ds:schemaRef ds:uri="http://schemas.microsoft.com/sharepoint/v3/contenttype/forms"/>
+  </ds:schemaRefs>
+</ds:datastoreItem>
+</file>
+
+<file path=customXml/itemProps2.xml><?xml version="1.0" encoding="utf-8"?>
 <ds:datastoreItem xmlns:ds="http://schemas.openxmlformats.org/officeDocument/2006/customXml" ds:itemID="{BFF5C609-47B2-4E38-98DE-50447A64B0AF}">
   <ds:schemaRefs>
     <ds:schemaRef ds:uri="http://schemas.microsoft.com/office/2006/metadata/contentType"/>
@@ -49795,14 +52203,6 @@
     <ds:schemaRef ds:uri="http://purl.org/dc/elements/1.1/"/>
     <ds:schemaRef ds:uri="http://purl.org/dc/terms/"/>
     <ds:schemaRef ds:uri="http://schemas.microsoft.com/internal/obd"/>
-  </ds:schemaRefs>
-</ds:datastoreItem>
-</file>
-
-<file path=customXml/itemProps2.xml><?xml version="1.0" encoding="utf-8"?>
-<ds:datastoreItem xmlns:ds="http://schemas.openxmlformats.org/officeDocument/2006/customXml" ds:itemID="{2D849882-45D9-49DF-83E9-35AEA65C5DA4}">
-  <ds:schemaRefs>
-    <ds:schemaRef ds:uri="http://schemas.microsoft.com/sharepoint/v3/contenttype/forms"/>
   </ds:schemaRefs>
 </ds:datastoreItem>
 </file>

</xml_diff>

<commit_message>
Add secondary recommendations to HAM report (#122)
* closed l#121 - Hybrid App Monitoring Health-check improvement - add secondary health checks
</commit_message>
<xml_diff>
--- a/backend/resources/pptAssets/HybridApplicationMonitoringUseCase_template.pptx
+++ b/backend/resources/pptAssets/HybridApplicationMonitoringUseCase_template.pptx
@@ -7,24 +7,30 @@
     <p:sldMasterId id="2147483869" r:id="rId6"/>
   </p:sldMasterIdLst>
   <p:notesMasterIdLst>
-    <p:notesMasterId r:id="rId22"/>
+    <p:notesMasterId r:id="rId28"/>
   </p:notesMasterIdLst>
   <p:sldIdLst>
     <p:sldId id="500" r:id="rId7"/>
     <p:sldId id="2142533203" r:id="rId8"/>
     <p:sldId id="2142533204" r:id="rId9"/>
     <p:sldId id="2142533211" r:id="rId10"/>
-    <p:sldId id="2142533205" r:id="rId11"/>
-    <p:sldId id="2142533212" r:id="rId12"/>
-    <p:sldId id="2142533206" r:id="rId13"/>
-    <p:sldId id="2142533213" r:id="rId14"/>
-    <p:sldId id="2142533207" r:id="rId15"/>
-    <p:sldId id="2142533214" r:id="rId16"/>
-    <p:sldId id="2142533208" r:id="rId17"/>
-    <p:sldId id="2142533215" r:id="rId18"/>
-    <p:sldId id="2142533209" r:id="rId19"/>
-    <p:sldId id="2142533216" r:id="rId20"/>
-    <p:sldId id="290" r:id="rId21"/>
+    <p:sldId id="2142533217" r:id="rId11"/>
+    <p:sldId id="2142533205" r:id="rId12"/>
+    <p:sldId id="2142533212" r:id="rId13"/>
+    <p:sldId id="2142533218" r:id="rId14"/>
+    <p:sldId id="2142533206" r:id="rId15"/>
+    <p:sldId id="2142533213" r:id="rId16"/>
+    <p:sldId id="2142533219" r:id="rId17"/>
+    <p:sldId id="2142533207" r:id="rId18"/>
+    <p:sldId id="2142533214" r:id="rId19"/>
+    <p:sldId id="2142533220" r:id="rId20"/>
+    <p:sldId id="2142533208" r:id="rId21"/>
+    <p:sldId id="2142533215" r:id="rId22"/>
+    <p:sldId id="2142533221" r:id="rId23"/>
+    <p:sldId id="2142533209" r:id="rId24"/>
+    <p:sldId id="2142533216" r:id="rId25"/>
+    <p:sldId id="2142533222" r:id="rId26"/>
+    <p:sldId id="290" r:id="rId27"/>
   </p:sldIdLst>
   <p:sldSz cx="12192000" cy="6858000"/>
   <p:notesSz cx="6858000" cy="9144000"/>
@@ -136,36 +142,42 @@
           <p14:sldIdLst>
             <p14:sldId id="2142533204"/>
             <p14:sldId id="2142533211"/>
+            <p14:sldId id="2142533217"/>
           </p14:sldIdLst>
         </p14:section>
         <p14:section name="Implement" id="{C9D6BEB2-5654-4E49-A520-CFA5B82DC996}">
           <p14:sldIdLst>
             <p14:sldId id="2142533205"/>
             <p14:sldId id="2142533212"/>
+            <p14:sldId id="2142533218"/>
           </p14:sldIdLst>
         </p14:section>
         <p14:section name="Use" id="{DF726D2A-B63E-DC49-AFAB-89735CBC81C5}">
           <p14:sldIdLst>
             <p14:sldId id="2142533206"/>
             <p14:sldId id="2142533213"/>
+            <p14:sldId id="2142533219"/>
           </p14:sldIdLst>
         </p14:section>
         <p14:section name="Engage" id="{7DC08C9C-A605-4F4E-9E48-9F8FB78341D2}">
           <p14:sldIdLst>
             <p14:sldId id="2142533207"/>
             <p14:sldId id="2142533214"/>
+            <p14:sldId id="2142533220"/>
           </p14:sldIdLst>
         </p14:section>
         <p14:section name="Adopt" id="{DA3DE0CE-60A9-9544-A6DD-3A3B4524C955}">
           <p14:sldIdLst>
             <p14:sldId id="2142533208"/>
             <p14:sldId id="2142533215"/>
+            <p14:sldId id="2142533221"/>
           </p14:sldIdLst>
         </p14:section>
         <p14:section name="Optimize" id="{1F9DEA62-2586-1D47-9AD6-98B9589BD6A6}">
           <p14:sldIdLst>
             <p14:sldId id="2142533209"/>
             <p14:sldId id="2142533216"/>
+            <p14:sldId id="2142533222"/>
           </p14:sldIdLst>
         </p14:section>
         <p14:section name="Recommendation" id="{7158982D-EDD8-AD4C-995D-4209A00D6863}">
@@ -293,7 +305,7 @@
           <a:p>
             <a:fld id="{702657A2-7B7A-174B-A542-3B4C9FC943CD}" type="datetimeFigureOut">
               <a:rPr lang="en-US" smtClean="0"/>
-              <a:t>5/3/23</a:t>
+              <a:t>6/12/23</a:t>
             </a:fld>
             <a:endParaRPr lang="en-US"/>
           </a:p>
@@ -718,7 +730,7 @@
     </p:spTree>
     <p:extLst>
       <p:ext uri="{BB962C8B-B14F-4D97-AF65-F5344CB8AC3E}">
-        <p14:creationId xmlns:p14="http://schemas.microsoft.com/office/powerpoint/2010/main" val="1382294296"/>
+        <p14:creationId xmlns:p14="http://schemas.microsoft.com/office/powerpoint/2010/main" val="468375408"/>
       </p:ext>
     </p:extLst>
   </p:cSld>
@@ -802,7 +814,7 @@
     </p:spTree>
     <p:extLst>
       <p:ext uri="{BB962C8B-B14F-4D97-AF65-F5344CB8AC3E}">
-        <p14:creationId xmlns:p14="http://schemas.microsoft.com/office/powerpoint/2010/main" val="865599475"/>
+        <p14:creationId xmlns:p14="http://schemas.microsoft.com/office/powerpoint/2010/main" val="417927094"/>
       </p:ext>
     </p:extLst>
   </p:cSld>
@@ -886,7 +898,7 @@
     </p:spTree>
     <p:extLst>
       <p:ext uri="{BB962C8B-B14F-4D97-AF65-F5344CB8AC3E}">
-        <p14:creationId xmlns:p14="http://schemas.microsoft.com/office/powerpoint/2010/main" val="1288233524"/>
+        <p14:creationId xmlns:p14="http://schemas.microsoft.com/office/powerpoint/2010/main" val="339463266"/>
       </p:ext>
     </p:extLst>
   </p:cSld>
@@ -970,7 +982,511 @@
     </p:spTree>
     <p:extLst>
       <p:ext uri="{BB962C8B-B14F-4D97-AF65-F5344CB8AC3E}">
+        <p14:creationId xmlns:p14="http://schemas.microsoft.com/office/powerpoint/2010/main" val="28975582"/>
+      </p:ext>
+    </p:extLst>
+  </p:cSld>
+  <p:clrMapOvr>
+    <a:masterClrMapping/>
+  </p:clrMapOvr>
+</p:notes>
+</file>
+
+<file path=ppt/notesSlides/notesSlide14.xml><?xml version="1.0" encoding="utf-8"?>
+<p:notes xmlns:a="http://schemas.openxmlformats.org/drawingml/2006/main" xmlns:r="http://schemas.openxmlformats.org/officeDocument/2006/relationships" xmlns:p="http://schemas.openxmlformats.org/presentationml/2006/main">
+  <p:cSld>
+    <p:spTree>
+      <p:nvGrpSpPr>
+        <p:cNvPr id="1" name=""/>
+        <p:cNvGrpSpPr/>
+        <p:nvPr/>
+      </p:nvGrpSpPr>
+      <p:grpSpPr>
+        <a:xfrm>
+          <a:off x="0" y="0"/>
+          <a:ext cx="0" cy="0"/>
+          <a:chOff x="0" y="0"/>
+          <a:chExt cx="0" cy="0"/>
+        </a:xfrm>
+      </p:grpSpPr>
+      <p:sp>
+        <p:nvSpPr>
+          <p:cNvPr id="2" name="Slide Image Placeholder 1"/>
+          <p:cNvSpPr>
+            <a:spLocks noGrp="1" noRot="1" noChangeAspect="1"/>
+          </p:cNvSpPr>
+          <p:nvPr>
+            <p:ph type="sldImg"/>
+          </p:nvPr>
+        </p:nvSpPr>
+        <p:spPr/>
+      </p:sp>
+      <p:sp>
+        <p:nvSpPr>
+          <p:cNvPr id="3" name="Notes Placeholder 2"/>
+          <p:cNvSpPr>
+            <a:spLocks noGrp="1"/>
+          </p:cNvSpPr>
+          <p:nvPr>
+            <p:ph type="body" idx="1"/>
+          </p:nvPr>
+        </p:nvSpPr>
+        <p:spPr/>
+        <p:txBody>
+          <a:bodyPr/>
+          <a:lstStyle/>
+          <a:p>
+            <a:endParaRPr lang="en-US"/>
+          </a:p>
+        </p:txBody>
+      </p:sp>
+      <p:sp>
+        <p:nvSpPr>
+          <p:cNvPr id="4" name="Slide Number Placeholder 3"/>
+          <p:cNvSpPr>
+            <a:spLocks noGrp="1"/>
+          </p:cNvSpPr>
+          <p:nvPr>
+            <p:ph type="sldNum" sz="quarter" idx="5"/>
+          </p:nvPr>
+        </p:nvSpPr>
+        <p:spPr/>
+        <p:txBody>
+          <a:bodyPr/>
+          <a:lstStyle/>
+          <a:p>
+            <a:fld id="{0E284FBC-5821-4D42-9B7E-1F47A272C6FC}" type="slidenum">
+              <a:rPr lang="en-US" smtClean="0"/>
+              <a:t>15</a:t>
+            </a:fld>
+            <a:endParaRPr lang="en-US"/>
+          </a:p>
+        </p:txBody>
+      </p:sp>
+    </p:spTree>
+    <p:extLst>
+      <p:ext uri="{BB962C8B-B14F-4D97-AF65-F5344CB8AC3E}">
+        <p14:creationId xmlns:p14="http://schemas.microsoft.com/office/powerpoint/2010/main" val="1382294296"/>
+      </p:ext>
+    </p:extLst>
+  </p:cSld>
+  <p:clrMapOvr>
+    <a:masterClrMapping/>
+  </p:clrMapOvr>
+</p:notes>
+</file>
+
+<file path=ppt/notesSlides/notesSlide15.xml><?xml version="1.0" encoding="utf-8"?>
+<p:notes xmlns:a="http://schemas.openxmlformats.org/drawingml/2006/main" xmlns:r="http://schemas.openxmlformats.org/officeDocument/2006/relationships" xmlns:p="http://schemas.openxmlformats.org/presentationml/2006/main">
+  <p:cSld>
+    <p:spTree>
+      <p:nvGrpSpPr>
+        <p:cNvPr id="1" name=""/>
+        <p:cNvGrpSpPr/>
+        <p:nvPr/>
+      </p:nvGrpSpPr>
+      <p:grpSpPr>
+        <a:xfrm>
+          <a:off x="0" y="0"/>
+          <a:ext cx="0" cy="0"/>
+          <a:chOff x="0" y="0"/>
+          <a:chExt cx="0" cy="0"/>
+        </a:xfrm>
+      </p:grpSpPr>
+      <p:sp>
+        <p:nvSpPr>
+          <p:cNvPr id="2" name="Slide Image Placeholder 1"/>
+          <p:cNvSpPr>
+            <a:spLocks noGrp="1" noRot="1" noChangeAspect="1"/>
+          </p:cNvSpPr>
+          <p:nvPr>
+            <p:ph type="sldImg"/>
+          </p:nvPr>
+        </p:nvSpPr>
+        <p:spPr/>
+      </p:sp>
+      <p:sp>
+        <p:nvSpPr>
+          <p:cNvPr id="3" name="Notes Placeholder 2"/>
+          <p:cNvSpPr>
+            <a:spLocks noGrp="1"/>
+          </p:cNvSpPr>
+          <p:nvPr>
+            <p:ph type="body" idx="1"/>
+          </p:nvPr>
+        </p:nvSpPr>
+        <p:spPr/>
+        <p:txBody>
+          <a:bodyPr/>
+          <a:lstStyle/>
+          <a:p>
+            <a:endParaRPr lang="en-US"/>
+          </a:p>
+        </p:txBody>
+      </p:sp>
+      <p:sp>
+        <p:nvSpPr>
+          <p:cNvPr id="4" name="Slide Number Placeholder 3"/>
+          <p:cNvSpPr>
+            <a:spLocks noGrp="1"/>
+          </p:cNvSpPr>
+          <p:nvPr>
+            <p:ph type="sldNum" sz="quarter" idx="5"/>
+          </p:nvPr>
+        </p:nvSpPr>
+        <p:spPr/>
+        <p:txBody>
+          <a:bodyPr/>
+          <a:lstStyle/>
+          <a:p>
+            <a:fld id="{0E284FBC-5821-4D42-9B7E-1F47A272C6FC}" type="slidenum">
+              <a:rPr lang="en-US" smtClean="0"/>
+              <a:t>16</a:t>
+            </a:fld>
+            <a:endParaRPr lang="en-US"/>
+          </a:p>
+        </p:txBody>
+      </p:sp>
+    </p:spTree>
+    <p:extLst>
+      <p:ext uri="{BB962C8B-B14F-4D97-AF65-F5344CB8AC3E}">
+        <p14:creationId xmlns:p14="http://schemas.microsoft.com/office/powerpoint/2010/main" val="865599475"/>
+      </p:ext>
+    </p:extLst>
+  </p:cSld>
+  <p:clrMapOvr>
+    <a:masterClrMapping/>
+  </p:clrMapOvr>
+</p:notes>
+</file>
+
+<file path=ppt/notesSlides/notesSlide16.xml><?xml version="1.0" encoding="utf-8"?>
+<p:notes xmlns:a="http://schemas.openxmlformats.org/drawingml/2006/main" xmlns:r="http://schemas.openxmlformats.org/officeDocument/2006/relationships" xmlns:p="http://schemas.openxmlformats.org/presentationml/2006/main">
+  <p:cSld>
+    <p:spTree>
+      <p:nvGrpSpPr>
+        <p:cNvPr id="1" name=""/>
+        <p:cNvGrpSpPr/>
+        <p:nvPr/>
+      </p:nvGrpSpPr>
+      <p:grpSpPr>
+        <a:xfrm>
+          <a:off x="0" y="0"/>
+          <a:ext cx="0" cy="0"/>
+          <a:chOff x="0" y="0"/>
+          <a:chExt cx="0" cy="0"/>
+        </a:xfrm>
+      </p:grpSpPr>
+      <p:sp>
+        <p:nvSpPr>
+          <p:cNvPr id="2" name="Slide Image Placeholder 1"/>
+          <p:cNvSpPr>
+            <a:spLocks noGrp="1" noRot="1" noChangeAspect="1"/>
+          </p:cNvSpPr>
+          <p:nvPr>
+            <p:ph type="sldImg"/>
+          </p:nvPr>
+        </p:nvSpPr>
+        <p:spPr/>
+      </p:sp>
+      <p:sp>
+        <p:nvSpPr>
+          <p:cNvPr id="3" name="Notes Placeholder 2"/>
+          <p:cNvSpPr>
+            <a:spLocks noGrp="1"/>
+          </p:cNvSpPr>
+          <p:nvPr>
+            <p:ph type="body" idx="1"/>
+          </p:nvPr>
+        </p:nvSpPr>
+        <p:spPr/>
+        <p:txBody>
+          <a:bodyPr/>
+          <a:lstStyle/>
+          <a:p>
+            <a:endParaRPr lang="en-US"/>
+          </a:p>
+        </p:txBody>
+      </p:sp>
+      <p:sp>
+        <p:nvSpPr>
+          <p:cNvPr id="4" name="Slide Number Placeholder 3"/>
+          <p:cNvSpPr>
+            <a:spLocks noGrp="1"/>
+          </p:cNvSpPr>
+          <p:nvPr>
+            <p:ph type="sldNum" sz="quarter" idx="5"/>
+          </p:nvPr>
+        </p:nvSpPr>
+        <p:spPr/>
+        <p:txBody>
+          <a:bodyPr/>
+          <a:lstStyle/>
+          <a:p>
+            <a:fld id="{0E284FBC-5821-4D42-9B7E-1F47A272C6FC}" type="slidenum">
+              <a:rPr lang="en-US" smtClean="0"/>
+              <a:t>17</a:t>
+            </a:fld>
+            <a:endParaRPr lang="en-US"/>
+          </a:p>
+        </p:txBody>
+      </p:sp>
+    </p:spTree>
+    <p:extLst>
+      <p:ext uri="{BB962C8B-B14F-4D97-AF65-F5344CB8AC3E}">
+        <p14:creationId xmlns:p14="http://schemas.microsoft.com/office/powerpoint/2010/main" val="1185824358"/>
+      </p:ext>
+    </p:extLst>
+  </p:cSld>
+  <p:clrMapOvr>
+    <a:masterClrMapping/>
+  </p:clrMapOvr>
+</p:notes>
+</file>
+
+<file path=ppt/notesSlides/notesSlide17.xml><?xml version="1.0" encoding="utf-8"?>
+<p:notes xmlns:a="http://schemas.openxmlformats.org/drawingml/2006/main" xmlns:r="http://schemas.openxmlformats.org/officeDocument/2006/relationships" xmlns:p="http://schemas.openxmlformats.org/presentationml/2006/main">
+  <p:cSld>
+    <p:spTree>
+      <p:nvGrpSpPr>
+        <p:cNvPr id="1" name=""/>
+        <p:cNvGrpSpPr/>
+        <p:nvPr/>
+      </p:nvGrpSpPr>
+      <p:grpSpPr>
+        <a:xfrm>
+          <a:off x="0" y="0"/>
+          <a:ext cx="0" cy="0"/>
+          <a:chOff x="0" y="0"/>
+          <a:chExt cx="0" cy="0"/>
+        </a:xfrm>
+      </p:grpSpPr>
+      <p:sp>
+        <p:nvSpPr>
+          <p:cNvPr id="2" name="Slide Image Placeholder 1"/>
+          <p:cNvSpPr>
+            <a:spLocks noGrp="1" noRot="1" noChangeAspect="1"/>
+          </p:cNvSpPr>
+          <p:nvPr>
+            <p:ph type="sldImg"/>
+          </p:nvPr>
+        </p:nvSpPr>
+        <p:spPr/>
+      </p:sp>
+      <p:sp>
+        <p:nvSpPr>
+          <p:cNvPr id="3" name="Notes Placeholder 2"/>
+          <p:cNvSpPr>
+            <a:spLocks noGrp="1"/>
+          </p:cNvSpPr>
+          <p:nvPr>
+            <p:ph type="body" idx="1"/>
+          </p:nvPr>
+        </p:nvSpPr>
+        <p:spPr/>
+        <p:txBody>
+          <a:bodyPr/>
+          <a:lstStyle/>
+          <a:p>
+            <a:endParaRPr lang="en-US"/>
+          </a:p>
+        </p:txBody>
+      </p:sp>
+      <p:sp>
+        <p:nvSpPr>
+          <p:cNvPr id="4" name="Slide Number Placeholder 3"/>
+          <p:cNvSpPr>
+            <a:spLocks noGrp="1"/>
+          </p:cNvSpPr>
+          <p:nvPr>
+            <p:ph type="sldNum" sz="quarter" idx="5"/>
+          </p:nvPr>
+        </p:nvSpPr>
+        <p:spPr/>
+        <p:txBody>
+          <a:bodyPr/>
+          <a:lstStyle/>
+          <a:p>
+            <a:fld id="{0E284FBC-5821-4D42-9B7E-1F47A272C6FC}" type="slidenum">
+              <a:rPr lang="en-US" smtClean="0"/>
+              <a:t>18</a:t>
+            </a:fld>
+            <a:endParaRPr lang="en-US"/>
+          </a:p>
+        </p:txBody>
+      </p:sp>
+    </p:spTree>
+    <p:extLst>
+      <p:ext uri="{BB962C8B-B14F-4D97-AF65-F5344CB8AC3E}">
+        <p14:creationId xmlns:p14="http://schemas.microsoft.com/office/powerpoint/2010/main" val="1288233524"/>
+      </p:ext>
+    </p:extLst>
+  </p:cSld>
+  <p:clrMapOvr>
+    <a:masterClrMapping/>
+  </p:clrMapOvr>
+</p:notes>
+</file>
+
+<file path=ppt/notesSlides/notesSlide18.xml><?xml version="1.0" encoding="utf-8"?>
+<p:notes xmlns:a="http://schemas.openxmlformats.org/drawingml/2006/main" xmlns:r="http://schemas.openxmlformats.org/officeDocument/2006/relationships" xmlns:p="http://schemas.openxmlformats.org/presentationml/2006/main">
+  <p:cSld>
+    <p:spTree>
+      <p:nvGrpSpPr>
+        <p:cNvPr id="1" name=""/>
+        <p:cNvGrpSpPr/>
+        <p:nvPr/>
+      </p:nvGrpSpPr>
+      <p:grpSpPr>
+        <a:xfrm>
+          <a:off x="0" y="0"/>
+          <a:ext cx="0" cy="0"/>
+          <a:chOff x="0" y="0"/>
+          <a:chExt cx="0" cy="0"/>
+        </a:xfrm>
+      </p:grpSpPr>
+      <p:sp>
+        <p:nvSpPr>
+          <p:cNvPr id="2" name="Slide Image Placeholder 1"/>
+          <p:cNvSpPr>
+            <a:spLocks noGrp="1" noRot="1" noChangeAspect="1"/>
+          </p:cNvSpPr>
+          <p:nvPr>
+            <p:ph type="sldImg"/>
+          </p:nvPr>
+        </p:nvSpPr>
+        <p:spPr/>
+      </p:sp>
+      <p:sp>
+        <p:nvSpPr>
+          <p:cNvPr id="3" name="Notes Placeholder 2"/>
+          <p:cNvSpPr>
+            <a:spLocks noGrp="1"/>
+          </p:cNvSpPr>
+          <p:nvPr>
+            <p:ph type="body" idx="1"/>
+          </p:nvPr>
+        </p:nvSpPr>
+        <p:spPr/>
+        <p:txBody>
+          <a:bodyPr/>
+          <a:lstStyle/>
+          <a:p>
+            <a:endParaRPr lang="en-US"/>
+          </a:p>
+        </p:txBody>
+      </p:sp>
+      <p:sp>
+        <p:nvSpPr>
+          <p:cNvPr id="4" name="Slide Number Placeholder 3"/>
+          <p:cNvSpPr>
+            <a:spLocks noGrp="1"/>
+          </p:cNvSpPr>
+          <p:nvPr>
+            <p:ph type="sldNum" sz="quarter" idx="5"/>
+          </p:nvPr>
+        </p:nvSpPr>
+        <p:spPr/>
+        <p:txBody>
+          <a:bodyPr/>
+          <a:lstStyle/>
+          <a:p>
+            <a:fld id="{0E284FBC-5821-4D42-9B7E-1F47A272C6FC}" type="slidenum">
+              <a:rPr lang="en-US" smtClean="0"/>
+              <a:t>19</a:t>
+            </a:fld>
+            <a:endParaRPr lang="en-US"/>
+          </a:p>
+        </p:txBody>
+      </p:sp>
+    </p:spTree>
+    <p:extLst>
+      <p:ext uri="{BB962C8B-B14F-4D97-AF65-F5344CB8AC3E}">
         <p14:creationId xmlns:p14="http://schemas.microsoft.com/office/powerpoint/2010/main" val="3624425596"/>
+      </p:ext>
+    </p:extLst>
+  </p:cSld>
+  <p:clrMapOvr>
+    <a:masterClrMapping/>
+  </p:clrMapOvr>
+</p:notes>
+</file>
+
+<file path=ppt/notesSlides/notesSlide19.xml><?xml version="1.0" encoding="utf-8"?>
+<p:notes xmlns:a="http://schemas.openxmlformats.org/drawingml/2006/main" xmlns:r="http://schemas.openxmlformats.org/officeDocument/2006/relationships" xmlns:p="http://schemas.openxmlformats.org/presentationml/2006/main">
+  <p:cSld>
+    <p:spTree>
+      <p:nvGrpSpPr>
+        <p:cNvPr id="1" name=""/>
+        <p:cNvGrpSpPr/>
+        <p:nvPr/>
+      </p:nvGrpSpPr>
+      <p:grpSpPr>
+        <a:xfrm>
+          <a:off x="0" y="0"/>
+          <a:ext cx="0" cy="0"/>
+          <a:chOff x="0" y="0"/>
+          <a:chExt cx="0" cy="0"/>
+        </a:xfrm>
+      </p:grpSpPr>
+      <p:sp>
+        <p:nvSpPr>
+          <p:cNvPr id="2" name="Slide Image Placeholder 1"/>
+          <p:cNvSpPr>
+            <a:spLocks noGrp="1" noRot="1" noChangeAspect="1"/>
+          </p:cNvSpPr>
+          <p:nvPr>
+            <p:ph type="sldImg"/>
+          </p:nvPr>
+        </p:nvSpPr>
+        <p:spPr/>
+      </p:sp>
+      <p:sp>
+        <p:nvSpPr>
+          <p:cNvPr id="3" name="Notes Placeholder 2"/>
+          <p:cNvSpPr>
+            <a:spLocks noGrp="1"/>
+          </p:cNvSpPr>
+          <p:nvPr>
+            <p:ph type="body" idx="1"/>
+          </p:nvPr>
+        </p:nvSpPr>
+        <p:spPr/>
+        <p:txBody>
+          <a:bodyPr/>
+          <a:lstStyle/>
+          <a:p>
+            <a:endParaRPr lang="en-US"/>
+          </a:p>
+        </p:txBody>
+      </p:sp>
+      <p:sp>
+        <p:nvSpPr>
+          <p:cNvPr id="4" name="Slide Number Placeholder 3"/>
+          <p:cNvSpPr>
+            <a:spLocks noGrp="1"/>
+          </p:cNvSpPr>
+          <p:nvPr>
+            <p:ph type="sldNum" sz="quarter" idx="5"/>
+          </p:nvPr>
+        </p:nvSpPr>
+        <p:spPr/>
+        <p:txBody>
+          <a:bodyPr/>
+          <a:lstStyle/>
+          <a:p>
+            <a:fld id="{0E284FBC-5821-4D42-9B7E-1F47A272C6FC}" type="slidenum">
+              <a:rPr lang="en-US" smtClean="0"/>
+              <a:t>20</a:t>
+            </a:fld>
+            <a:endParaRPr lang="en-US"/>
+          </a:p>
+        </p:txBody>
+      </p:sp>
+    </p:spTree>
+    <p:extLst>
+      <p:ext uri="{BB962C8B-B14F-4D97-AF65-F5344CB8AC3E}">
+        <p14:creationId xmlns:p14="http://schemas.microsoft.com/office/powerpoint/2010/main" val="346808418"/>
       </p:ext>
     </p:extLst>
   </p:cSld>
@@ -1222,7 +1738,7 @@
     </p:spTree>
     <p:extLst>
       <p:ext uri="{BB962C8B-B14F-4D97-AF65-F5344CB8AC3E}">
-        <p14:creationId xmlns:p14="http://schemas.microsoft.com/office/powerpoint/2010/main" val="1063442909"/>
+        <p14:creationId xmlns:p14="http://schemas.microsoft.com/office/powerpoint/2010/main" val="3014577843"/>
       </p:ext>
     </p:extLst>
   </p:cSld>
@@ -1306,7 +1822,7 @@
     </p:spTree>
     <p:extLst>
       <p:ext uri="{BB962C8B-B14F-4D97-AF65-F5344CB8AC3E}">
-        <p14:creationId xmlns:p14="http://schemas.microsoft.com/office/powerpoint/2010/main" val="1026942336"/>
+        <p14:creationId xmlns:p14="http://schemas.microsoft.com/office/powerpoint/2010/main" val="1063442909"/>
       </p:ext>
     </p:extLst>
   </p:cSld>
@@ -1390,7 +1906,7 @@
     </p:spTree>
     <p:extLst>
       <p:ext uri="{BB962C8B-B14F-4D97-AF65-F5344CB8AC3E}">
-        <p14:creationId xmlns:p14="http://schemas.microsoft.com/office/powerpoint/2010/main" val="847167902"/>
+        <p14:creationId xmlns:p14="http://schemas.microsoft.com/office/powerpoint/2010/main" val="1026942336"/>
       </p:ext>
     </p:extLst>
   </p:cSld>
@@ -1474,7 +1990,7 @@
     </p:spTree>
     <p:extLst>
       <p:ext uri="{BB962C8B-B14F-4D97-AF65-F5344CB8AC3E}">
-        <p14:creationId xmlns:p14="http://schemas.microsoft.com/office/powerpoint/2010/main" val="1886107847"/>
+        <p14:creationId xmlns:p14="http://schemas.microsoft.com/office/powerpoint/2010/main" val="3030466907"/>
       </p:ext>
     </p:extLst>
   </p:cSld>
@@ -1558,7 +2074,7 @@
     </p:spTree>
     <p:extLst>
       <p:ext uri="{BB962C8B-B14F-4D97-AF65-F5344CB8AC3E}">
-        <p14:creationId xmlns:p14="http://schemas.microsoft.com/office/powerpoint/2010/main" val="417927094"/>
+        <p14:creationId xmlns:p14="http://schemas.microsoft.com/office/powerpoint/2010/main" val="847167902"/>
       </p:ext>
     </p:extLst>
   </p:cSld>
@@ -1642,7 +2158,7 @@
     </p:spTree>
     <p:extLst>
       <p:ext uri="{BB962C8B-B14F-4D97-AF65-F5344CB8AC3E}">
-        <p14:creationId xmlns:p14="http://schemas.microsoft.com/office/powerpoint/2010/main" val="339463266"/>
+        <p14:creationId xmlns:p14="http://schemas.microsoft.com/office/powerpoint/2010/main" val="1886107847"/>
       </p:ext>
     </p:extLst>
   </p:cSld>
@@ -2886,7 +3402,7 @@
           </a:ln>
           <a:extLst>
             <a:ext uri="{FAA26D3D-D897-4be2-8F04-BA451C77F1D7}">
-              <ma14:placeholderFlag xmlns:ma14="http://schemas.microsoft.com/office/mac/drawingml/2011/main" xmlns="" val="1"/>
+              <ma14:placeholderFlag xmlns="" xmlns:ma14="http://schemas.microsoft.com/office/mac/drawingml/2011/main" val="1"/>
             </a:ext>
           </a:extLst>
         </p:spPr>
@@ -4900,7 +5416,7 @@
           </a:ln>
           <a:extLst>
             <a:ext uri="{FAA26D3D-D897-4be2-8F04-BA451C77F1D7}">
-              <ma14:placeholderFlag xmlns:ma14="http://schemas.microsoft.com/office/mac/drawingml/2011/main" xmlns="" val="1"/>
+              <ma14:placeholderFlag xmlns="" xmlns:ma14="http://schemas.microsoft.com/office/mac/drawingml/2011/main" val="1"/>
             </a:ext>
           </a:extLst>
         </p:spPr>
@@ -5619,7 +6135,7 @@
           </a:ln>
           <a:extLst>
             <a:ext uri="{FAA26D3D-D897-4be2-8F04-BA451C77F1D7}">
-              <ma14:placeholderFlag xmlns:ma14="http://schemas.microsoft.com/office/mac/drawingml/2011/main" xmlns="" val="1"/>
+              <ma14:placeholderFlag xmlns="" xmlns:ma14="http://schemas.microsoft.com/office/mac/drawingml/2011/main" val="1"/>
             </a:ext>
           </a:extLst>
         </p:spPr>
@@ -7117,7 +7633,7 @@
               </a14:hiddenLine>
             </a:ext>
             <a:ext uri="{FAA26D3D-D897-4be2-8F04-BA451C77F1D7}">
-              <ma14:placeholderFlag xmlns:ma14="http://schemas.microsoft.com/office/mac/drawingml/2011/main" xmlns="" val="1"/>
+              <ma14:placeholderFlag xmlns="" xmlns:ma14="http://schemas.microsoft.com/office/mac/drawingml/2011/main" val="1"/>
             </a:ext>
           </a:extLst>
         </p:spPr>
@@ -7365,7 +7881,7 @@
               </a14:hiddenLine>
             </a:ext>
             <a:ext uri="{FAA26D3D-D897-4be2-8F04-BA451C77F1D7}">
-              <ma14:placeholderFlag xmlns:ma14="http://schemas.microsoft.com/office/mac/drawingml/2011/main" xmlns="" val="1"/>
+              <ma14:placeholderFlag xmlns="" xmlns:ma14="http://schemas.microsoft.com/office/mac/drawingml/2011/main" val="1"/>
             </a:ext>
           </a:extLst>
         </p:spPr>
@@ -7634,7 +8150,7 @@
               </a14:hiddenLine>
             </a:ext>
             <a:ext uri="{FAA26D3D-D897-4be2-8F04-BA451C77F1D7}">
-              <ma14:placeholderFlag xmlns="" xmlns:ma14="http://schemas.microsoft.com/office/mac/drawingml/2011/main" val="1"/>
+              <ma14:placeholderFlag xmlns:ma14="http://schemas.microsoft.com/office/mac/drawingml/2011/main" xmlns="" val="1"/>
             </a:ext>
           </a:extLst>
         </p:spPr>
@@ -8064,14 +8580,14 @@
           </a:ln>
           <a:extLst>
             <a:ext uri="{909E8E84-426E-40dd-AFC4-6F175D3DCCD1}">
-              <a14:hiddenFill xmlns:a14="http://schemas.microsoft.com/office/drawing/2010/main" xmlns="">
+              <a14:hiddenFill xmlns="" xmlns:a14="http://schemas.microsoft.com/office/drawing/2010/main">
                 <a:solidFill>
                   <a:srgbClr val="FFFFFF"/>
                 </a:solidFill>
               </a14:hiddenFill>
             </a:ext>
             <a:ext uri="{91240B29-F687-4f45-9708-019B960494DF}">
-              <a14:hiddenLine xmlns:a14="http://schemas.microsoft.com/office/drawing/2010/main" xmlns="" w="9525">
+              <a14:hiddenLine xmlns="" xmlns:a14="http://schemas.microsoft.com/office/drawing/2010/main" w="9525">
                 <a:solidFill>
                   <a:srgbClr val="000000"/>
                 </a:solidFill>
@@ -10042,7 +10558,7 @@
           </a:ln>
           <a:extLst>
             <a:ext uri="{FAA26D3D-D897-4be2-8F04-BA451C77F1D7}">
-              <ma14:placeholderFlag xmlns:ma14="http://schemas.microsoft.com/office/mac/drawingml/2011/main" xmlns="" val="1"/>
+              <ma14:placeholderFlag xmlns="" xmlns:ma14="http://schemas.microsoft.com/office/mac/drawingml/2011/main" val="1"/>
             </a:ext>
           </a:extLst>
         </p:spPr>
@@ -11718,7 +12234,7 @@
           </a:ln>
           <a:extLst>
             <a:ext uri="{FAA26D3D-D897-4be2-8F04-BA451C77F1D7}">
-              <ma14:placeholderFlag xmlns:ma14="http://schemas.microsoft.com/office/mac/drawingml/2011/main" xmlns="" val="1"/>
+              <ma14:placeholderFlag xmlns="" xmlns:ma14="http://schemas.microsoft.com/office/mac/drawingml/2011/main" val="1"/>
             </a:ext>
           </a:extLst>
         </p:spPr>
@@ -12312,7 +12828,7 @@
           </a:ln>
           <a:extLst>
             <a:ext uri="{FAA26D3D-D897-4be2-8F04-BA451C77F1D7}">
-              <ma14:placeholderFlag xmlns:ma14="http://schemas.microsoft.com/office/mac/drawingml/2011/main" xmlns="" val="1"/>
+              <ma14:placeholderFlag xmlns="" xmlns:ma14="http://schemas.microsoft.com/office/mac/drawingml/2011/main" val="1"/>
             </a:ext>
           </a:extLst>
         </p:spPr>
@@ -12677,7 +13193,7 @@
           </a:ln>
           <a:extLst>
             <a:ext uri="{FAA26D3D-D897-4be2-8F04-BA451C77F1D7}">
-              <ma14:placeholderFlag xmlns:ma14="http://schemas.microsoft.com/office/mac/drawingml/2011/main" xmlns="" val="1"/>
+              <ma14:placeholderFlag xmlns="" xmlns:ma14="http://schemas.microsoft.com/office/mac/drawingml/2011/main" val="1"/>
             </a:ext>
           </a:extLst>
         </p:spPr>
@@ -13321,7 +13837,7 @@
           </a:ln>
           <a:extLst>
             <a:ext uri="{FAA26D3D-D897-4be2-8F04-BA451C77F1D7}">
-              <ma14:placeholderFlag xmlns:ma14="http://schemas.microsoft.com/office/mac/drawingml/2011/main" xmlns="" val="1"/>
+              <ma14:placeholderFlag xmlns="" xmlns:ma14="http://schemas.microsoft.com/office/mac/drawingml/2011/main" val="1"/>
             </a:ext>
           </a:extLst>
         </p:spPr>
@@ -13568,7 +14084,7 @@
           </a:ln>
           <a:extLst>
             <a:ext uri="{FAA26D3D-D897-4be2-8F04-BA451C77F1D7}">
-              <ma14:placeholderFlag xmlns:ma14="http://schemas.microsoft.com/office/mac/drawingml/2011/main" xmlns="" val="1"/>
+              <ma14:placeholderFlag xmlns="" xmlns:ma14="http://schemas.microsoft.com/office/mac/drawingml/2011/main" val="1"/>
             </a:ext>
           </a:extLst>
         </p:spPr>
@@ -16247,7 +16763,7 @@
           </a:ln>
           <a:extLst>
             <a:ext uri="{FAA26D3D-D897-4be2-8F04-BA451C77F1D7}">
-              <ma14:placeholderFlag xmlns:ma14="http://schemas.microsoft.com/office/mac/drawingml/2011/main" xmlns="" val="1"/>
+              <ma14:placeholderFlag xmlns="" xmlns:ma14="http://schemas.microsoft.com/office/mac/drawingml/2011/main" val="1"/>
             </a:ext>
           </a:extLst>
         </p:spPr>
@@ -16966,7 +17482,7 @@
           </a:ln>
           <a:extLst>
             <a:ext uri="{FAA26D3D-D897-4be2-8F04-BA451C77F1D7}">
-              <ma14:placeholderFlag xmlns:ma14="http://schemas.microsoft.com/office/mac/drawingml/2011/main" xmlns="" val="1"/>
+              <ma14:placeholderFlag xmlns="" xmlns:ma14="http://schemas.microsoft.com/office/mac/drawingml/2011/main" val="1"/>
             </a:ext>
           </a:extLst>
         </p:spPr>
@@ -18082,7 +18598,7 @@
               </a14:hiddenLine>
             </a:ext>
             <a:ext uri="{FAA26D3D-D897-4be2-8F04-BA451C77F1D7}">
-              <ma14:placeholderFlag xmlns:ma14="http://schemas.microsoft.com/office/mac/drawingml/2011/main" xmlns="" val="1"/>
+              <ma14:placeholderFlag xmlns="" xmlns:ma14="http://schemas.microsoft.com/office/mac/drawingml/2011/main" val="1"/>
             </a:ext>
           </a:extLst>
         </p:spPr>
@@ -18351,7 +18867,7 @@
               </a14:hiddenLine>
             </a:ext>
             <a:ext uri="{FAA26D3D-D897-4be2-8F04-BA451C77F1D7}">
-              <ma14:placeholderFlag xmlns="" xmlns:ma14="http://schemas.microsoft.com/office/mac/drawingml/2011/main" val="1"/>
+              <ma14:placeholderFlag xmlns:ma14="http://schemas.microsoft.com/office/mac/drawingml/2011/main" xmlns="" val="1"/>
             </a:ext>
           </a:extLst>
         </p:spPr>
@@ -21900,7 +22416,7 @@
               </a14:hiddenLine>
             </a:ext>
             <a:ext uri="{FAA26D3D-D897-4be2-8F04-BA451C77F1D7}">
-              <ma14:placeholderFlag xmlns:ma14="http://schemas.microsoft.com/office/mac/drawingml/2011/main" xmlns="" val="1"/>
+              <ma14:placeholderFlag xmlns="" xmlns:ma14="http://schemas.microsoft.com/office/mac/drawingml/2011/main" val="1"/>
             </a:ext>
           </a:extLst>
         </p:spPr>
@@ -24476,7 +24992,7 @@
               </a14:hiddenLine>
             </a:ext>
             <a:ext uri="{FAA26D3D-D897-4be2-8F04-BA451C77F1D7}">
-              <ma14:placeholderFlag xmlns:ma14="http://schemas.microsoft.com/office/mac/drawingml/2011/main" xmlns="" val="1"/>
+              <ma14:placeholderFlag xmlns="" xmlns:ma14="http://schemas.microsoft.com/office/mac/drawingml/2011/main" val="1"/>
             </a:ext>
           </a:extLst>
         </p:spPr>
@@ -25983,7 +26499,7 @@
           </a:ln>
           <a:extLst>
             <a:ext uri="{FAA26D3D-D897-4be2-8F04-BA451C77F1D7}">
-              <ma14:placeholderFlag xmlns:ma14="http://schemas.microsoft.com/office/mac/drawingml/2011/main" xmlns="" val="1"/>
+              <ma14:placeholderFlag xmlns="" xmlns:ma14="http://schemas.microsoft.com/office/mac/drawingml/2011/main" val="1"/>
             </a:ext>
           </a:extLst>
         </p:spPr>
@@ -27116,7 +27632,7 @@
           </a:ln>
           <a:extLst>
             <a:ext uri="{FAA26D3D-D897-4be2-8F04-BA451C77F1D7}">
-              <ma14:placeholderFlag xmlns:ma14="http://schemas.microsoft.com/office/mac/drawingml/2011/main" xmlns="" val="1"/>
+              <ma14:placeholderFlag xmlns="" xmlns:ma14="http://schemas.microsoft.com/office/mac/drawingml/2011/main" val="1"/>
             </a:ext>
           </a:extLst>
         </p:spPr>
@@ -27710,7 +28226,7 @@
           </a:ln>
           <a:extLst>
             <a:ext uri="{FAA26D3D-D897-4be2-8F04-BA451C77F1D7}">
-              <ma14:placeholderFlag xmlns:ma14="http://schemas.microsoft.com/office/mac/drawingml/2011/main" xmlns="" val="1"/>
+              <ma14:placeholderFlag xmlns="" xmlns:ma14="http://schemas.microsoft.com/office/mac/drawingml/2011/main" val="1"/>
             </a:ext>
           </a:extLst>
         </p:spPr>
@@ -28369,7 +28885,7 @@
           </a:ln>
           <a:extLst>
             <a:ext uri="{FAA26D3D-D897-4be2-8F04-BA451C77F1D7}">
-              <ma14:placeholderFlag xmlns:ma14="http://schemas.microsoft.com/office/mac/drawingml/2011/main" xmlns="" val="1"/>
+              <ma14:placeholderFlag xmlns="" xmlns:ma14="http://schemas.microsoft.com/office/mac/drawingml/2011/main" val="1"/>
             </a:ext>
           </a:extLst>
         </p:spPr>
@@ -29013,7 +29529,7 @@
           </a:ln>
           <a:extLst>
             <a:ext uri="{FAA26D3D-D897-4be2-8F04-BA451C77F1D7}">
-              <ma14:placeholderFlag xmlns:ma14="http://schemas.microsoft.com/office/mac/drawingml/2011/main" xmlns="" val="1"/>
+              <ma14:placeholderFlag xmlns="" xmlns:ma14="http://schemas.microsoft.com/office/mac/drawingml/2011/main" val="1"/>
             </a:ext>
           </a:extLst>
         </p:spPr>
@@ -29260,7 +29776,7 @@
           </a:ln>
           <a:extLst>
             <a:ext uri="{FAA26D3D-D897-4be2-8F04-BA451C77F1D7}">
-              <ma14:placeholderFlag xmlns:ma14="http://schemas.microsoft.com/office/mac/drawingml/2011/main" xmlns="" val="1"/>
+              <ma14:placeholderFlag xmlns="" xmlns:ma14="http://schemas.microsoft.com/office/mac/drawingml/2011/main" val="1"/>
             </a:ext>
           </a:extLst>
         </p:spPr>
@@ -31274,7 +31790,7 @@
           </a:ln>
           <a:extLst>
             <a:ext uri="{FAA26D3D-D897-4be2-8F04-BA451C77F1D7}">
-              <ma14:placeholderFlag xmlns:ma14="http://schemas.microsoft.com/office/mac/drawingml/2011/main" xmlns="" val="1"/>
+              <ma14:placeholderFlag xmlns="" xmlns:ma14="http://schemas.microsoft.com/office/mac/drawingml/2011/main" val="1"/>
             </a:ext>
           </a:extLst>
         </p:spPr>
@@ -31993,7 +32509,7 @@
           </a:ln>
           <a:extLst>
             <a:ext uri="{FAA26D3D-D897-4be2-8F04-BA451C77F1D7}">
-              <ma14:placeholderFlag xmlns:ma14="http://schemas.microsoft.com/office/mac/drawingml/2011/main" xmlns="" val="1"/>
+              <ma14:placeholderFlag xmlns="" xmlns:ma14="http://schemas.microsoft.com/office/mac/drawingml/2011/main" val="1"/>
             </a:ext>
           </a:extLst>
         </p:spPr>
@@ -33425,7 +33941,7 @@
               </a14:hiddenLine>
             </a:ext>
             <a:ext uri="{FAA26D3D-D897-4be2-8F04-BA451C77F1D7}">
-              <ma14:placeholderFlag xmlns="" xmlns:ma14="http://schemas.microsoft.com/office/mac/drawingml/2011/main" val="1"/>
+              <ma14:placeholderFlag xmlns:ma14="http://schemas.microsoft.com/office/mac/drawingml/2011/main" xmlns="" val="1"/>
             </a:ext>
           </a:extLst>
         </p:spPr>
@@ -33863,7 +34379,7 @@
               </a14:hiddenLine>
             </a:ext>
             <a:ext uri="{FAA26D3D-D897-4be2-8F04-BA451C77F1D7}">
-              <ma14:placeholderFlag xmlns:ma14="http://schemas.microsoft.com/office/mac/drawingml/2011/main" xmlns="" val="1"/>
+              <ma14:placeholderFlag xmlns="" xmlns:ma14="http://schemas.microsoft.com/office/mac/drawingml/2011/main" val="1"/>
             </a:ext>
           </a:extLst>
         </p:spPr>
@@ -36561,7 +37077,7 @@
               </a14:hiddenLine>
             </a:ext>
             <a:ext uri="{FAA26D3D-D897-4be2-8F04-BA451C77F1D7}">
-              <ma14:placeholderFlag xmlns:ma14="http://schemas.microsoft.com/office/mac/drawingml/2011/main" xmlns="" val="1"/>
+              <ma14:placeholderFlag xmlns="" xmlns:ma14="http://schemas.microsoft.com/office/mac/drawingml/2011/main" val="1"/>
             </a:ext>
           </a:extLst>
         </p:spPr>
@@ -40940,7 +41456,7 @@
           </a:ln>
           <a:extLst>
             <a:ext uri="{FAA26D3D-D897-4be2-8F04-BA451C77F1D7}">
-              <ma14:placeholderFlag xmlns:ma14="http://schemas.microsoft.com/office/mac/drawingml/2011/main" xmlns="" val="1"/>
+              <ma14:placeholderFlag xmlns="" xmlns:ma14="http://schemas.microsoft.com/office/mac/drawingml/2011/main" val="1"/>
             </a:ext>
           </a:extLst>
         </p:spPr>
@@ -42073,7 +42589,7 @@
           </a:ln>
           <a:extLst>
             <a:ext uri="{FAA26D3D-D897-4be2-8F04-BA451C77F1D7}">
-              <ma14:placeholderFlag xmlns:ma14="http://schemas.microsoft.com/office/mac/drawingml/2011/main" xmlns="" val="1"/>
+              <ma14:placeholderFlag xmlns="" xmlns:ma14="http://schemas.microsoft.com/office/mac/drawingml/2011/main" val="1"/>
             </a:ext>
           </a:extLst>
         </p:spPr>
@@ -42667,7 +43183,7 @@
           </a:ln>
           <a:extLst>
             <a:ext uri="{FAA26D3D-D897-4be2-8F04-BA451C77F1D7}">
-              <ma14:placeholderFlag xmlns:ma14="http://schemas.microsoft.com/office/mac/drawingml/2011/main" xmlns="" val="1"/>
+              <ma14:placeholderFlag xmlns="" xmlns:ma14="http://schemas.microsoft.com/office/mac/drawingml/2011/main" val="1"/>
             </a:ext>
           </a:extLst>
         </p:spPr>
@@ -43032,7 +43548,7 @@
           </a:ln>
           <a:extLst>
             <a:ext uri="{FAA26D3D-D897-4be2-8F04-BA451C77F1D7}">
-              <ma14:placeholderFlag xmlns:ma14="http://schemas.microsoft.com/office/mac/drawingml/2011/main" xmlns="" val="1"/>
+              <ma14:placeholderFlag xmlns="" xmlns:ma14="http://schemas.microsoft.com/office/mac/drawingml/2011/main" val="1"/>
             </a:ext>
           </a:extLst>
         </p:spPr>
@@ -43676,7 +44192,7 @@
           </a:ln>
           <a:extLst>
             <a:ext uri="{FAA26D3D-D897-4be2-8F04-BA451C77F1D7}">
-              <ma14:placeholderFlag xmlns:ma14="http://schemas.microsoft.com/office/mac/drawingml/2011/main" xmlns="" val="1"/>
+              <ma14:placeholderFlag xmlns="" xmlns:ma14="http://schemas.microsoft.com/office/mac/drawingml/2011/main" val="1"/>
             </a:ext>
           </a:extLst>
         </p:spPr>
@@ -46047,7 +46563,7 @@
           <a:p>
             <a:r>
               <a:rPr lang="en-US" sz="1600" dirty="0"/>
-              <a:t>Maturity Assessment Report</a:t>
+              <a:t>Maturity Assessment Report **</a:t>
             </a:r>
           </a:p>
         </p:txBody>
@@ -46311,6 +46827,60 @@
           </a:p>
         </p:txBody>
       </p:sp>
+      <p:sp>
+        <p:nvSpPr>
+          <p:cNvPr id="3" name="TextBox 2">
+            <a:extLst>
+              <a:ext uri="{FF2B5EF4-FFF2-40B4-BE49-F238E27FC236}">
+                <a16:creationId xmlns:a16="http://schemas.microsoft.com/office/drawing/2014/main" id="{A64896A7-B88B-0926-577D-18CF92EF35FE}"/>
+              </a:ext>
+            </a:extLst>
+          </p:cNvPr>
+          <p:cNvSpPr txBox="1"/>
+          <p:nvPr/>
+        </p:nvSpPr>
+        <p:spPr>
+          <a:xfrm>
+            <a:off x="587046" y="6275973"/>
+            <a:ext cx="7851275" cy="276999"/>
+          </a:xfrm>
+          <a:prstGeom prst="rect">
+            <a:avLst/>
+          </a:prstGeom>
+          <a:noFill/>
+        </p:spPr>
+        <p:txBody>
+          <a:bodyPr wrap="square" lIns="91440" tIns="45720" rIns="91440" bIns="45720" rtlCol="0">
+            <a:spAutoFit/>
+          </a:bodyPr>
+          <a:lstStyle/>
+          <a:p>
+            <a:pPr algn="l"/>
+            <a:r>
+              <a:rPr lang="en-US" sz="1200" dirty="0">
+                <a:latin typeface="+mn-lt"/>
+              </a:rPr>
+              <a:t>** This report is used for </a:t>
+            </a:r>
+            <a:r>
+              <a:rPr lang="en-US" sz="1200" dirty="0">
+                <a:latin typeface="+mn-lt"/>
+                <a:hlinkClick r:id="rId3"/>
+              </a:rPr>
+              <a:t>Hybrid Application Monitoring Use Case</a:t>
+            </a:r>
+            <a:r>
+              <a:rPr lang="en-US" sz="1200" dirty="0">
+                <a:latin typeface="+mn-lt"/>
+              </a:rPr>
+              <a:t> purchased under the Hybrid Application Monitoring SKU.</a:t>
+            </a:r>
+            <a:endParaRPr lang="en-US" sz="1200" u="sng" dirty="0">
+              <a:latin typeface="+mn-lt"/>
+            </a:endParaRPr>
+          </a:p>
+        </p:txBody>
+      </p:sp>
     </p:spTree>
     <p:extLst>
       <p:ext uri="{BB962C8B-B14F-4D97-AF65-F5344CB8AC3E}">
@@ -46357,7 +46927,12 @@
             <p:ph type="title"/>
           </p:nvPr>
         </p:nvSpPr>
-        <p:spPr/>
+        <p:spPr>
+          <a:xfrm>
+            <a:off x="583689" y="455084"/>
+            <a:ext cx="9176537" cy="1164309"/>
+          </a:xfrm>
+        </p:spPr>
         <p:txBody>
           <a:bodyPr/>
           <a:lstStyle/>
@@ -46374,7 +46949,7 @@
                   </a:schemeClr>
                 </a:solidFill>
               </a:rPr>
-              <a:t>Engage</a:t>
+              <a:t>Use</a:t>
             </a:r>
             <a:r>
               <a:rPr lang="en-US" sz="2400" i="1" dirty="0">
@@ -46394,7 +46969,638 @@
                   </a:schemeClr>
                 </a:solidFill>
               </a:rPr>
-              <a:t>has failed health check best-practices</a:t>
+              <a:t>resource and document links. These are the </a:t>
+            </a:r>
+            <a:r>
+              <a:rPr lang="en-US" sz="2400" u="sng" dirty="0"/>
+              <a:t>primary recommendations</a:t>
+            </a:r>
+            <a:r>
+              <a:rPr lang="en-US" sz="2400" dirty="0"/>
+              <a:t> </a:t>
+            </a:r>
+            <a:r>
+              <a:rPr lang="en-US" sz="2400" dirty="0">
+                <a:solidFill>
+                  <a:schemeClr val="bg2">
+                    <a:lumMod val="65000"/>
+                  </a:schemeClr>
+                </a:solidFill>
+              </a:rPr>
+              <a:t>to </a:t>
+            </a:r>
+            <a:r>
+              <a:rPr lang="en-US" sz="2400" u="sng" dirty="0"/>
+              <a:t>pass</a:t>
+            </a:r>
+            <a:r>
+              <a:rPr lang="en-US" sz="2400" dirty="0">
+                <a:solidFill>
+                  <a:schemeClr val="bg2">
+                    <a:lumMod val="65000"/>
+                  </a:schemeClr>
+                </a:solidFill>
+              </a:rPr>
+              <a:t> health checks for the </a:t>
+            </a:r>
+            <a:r>
+              <a:rPr lang="en-US" sz="2400" i="1" u="sng" dirty="0">
+                <a:solidFill>
+                  <a:schemeClr val="bg2">
+                    <a:lumMod val="65000"/>
+                  </a:schemeClr>
+                </a:solidFill>
+              </a:rPr>
+              <a:t>Use</a:t>
+            </a:r>
+            <a:r>
+              <a:rPr lang="en-US" sz="2400" dirty="0">
+                <a:solidFill>
+                  <a:schemeClr val="bg2">
+                    <a:lumMod val="65000"/>
+                  </a:schemeClr>
+                </a:solidFill>
+              </a:rPr>
+              <a:t> pitstop.</a:t>
+            </a:r>
+            <a:endParaRPr lang="en-US" sz="2400" u="sng" dirty="0">
+              <a:solidFill>
+                <a:schemeClr val="bg2">
+                  <a:lumMod val="65000"/>
+                </a:schemeClr>
+              </a:solidFill>
+            </a:endParaRPr>
+          </a:p>
+        </p:txBody>
+      </p:sp>
+      <p:pic>
+        <p:nvPicPr>
+          <p:cNvPr id="4" name="Picture 3">
+            <a:extLst>
+              <a:ext uri="{FF2B5EF4-FFF2-40B4-BE49-F238E27FC236}">
+                <a16:creationId xmlns:a16="http://schemas.microsoft.com/office/drawing/2014/main" id="{954E400C-A9E6-789C-84E9-B86CF70D3E2D}"/>
+              </a:ext>
+            </a:extLst>
+          </p:cNvPr>
+          <p:cNvPicPr>
+            <a:picLocks noChangeAspect="1"/>
+          </p:cNvPicPr>
+          <p:nvPr/>
+        </p:nvPicPr>
+        <p:blipFill>
+          <a:blip r:embed="rId3"/>
+          <a:stretch>
+            <a:fillRect/>
+          </a:stretch>
+        </p:blipFill>
+        <p:spPr>
+          <a:xfrm>
+            <a:off x="9457107" y="-1"/>
+            <a:ext cx="2734894" cy="1619395"/>
+          </a:xfrm>
+          <a:prstGeom prst="rect">
+            <a:avLst/>
+          </a:prstGeom>
+        </p:spPr>
+      </p:pic>
+    </p:spTree>
+    <p:extLst>
+      <p:ext uri="{BB962C8B-B14F-4D97-AF65-F5344CB8AC3E}">
+        <p14:creationId xmlns:p14="http://schemas.microsoft.com/office/powerpoint/2010/main" val="4135586517"/>
+      </p:ext>
+    </p:extLst>
+  </p:cSld>
+  <p:clrMapOvr>
+    <a:masterClrMapping/>
+  </p:clrMapOvr>
+</p:sld>
+</file>
+
+<file path=ppt/slides/slide11.xml><?xml version="1.0" encoding="utf-8"?>
+<p:sld xmlns:a="http://schemas.openxmlformats.org/drawingml/2006/main" xmlns:r="http://schemas.openxmlformats.org/officeDocument/2006/relationships" xmlns:p="http://schemas.openxmlformats.org/presentationml/2006/main">
+  <p:cSld>
+    <p:spTree>
+      <p:nvGrpSpPr>
+        <p:cNvPr id="1" name=""/>
+        <p:cNvGrpSpPr/>
+        <p:nvPr/>
+      </p:nvGrpSpPr>
+      <p:grpSpPr>
+        <a:xfrm>
+          <a:off x="0" y="0"/>
+          <a:ext cx="0" cy="0"/>
+          <a:chOff x="0" y="0"/>
+          <a:chExt cx="0" cy="0"/>
+        </a:xfrm>
+      </p:grpSpPr>
+      <p:sp>
+        <p:nvSpPr>
+          <p:cNvPr id="3" name="Title 2">
+            <a:extLst>
+              <a:ext uri="{FF2B5EF4-FFF2-40B4-BE49-F238E27FC236}">
+                <a16:creationId xmlns:a16="http://schemas.microsoft.com/office/drawing/2014/main" id="{F9BA7272-68AE-FF40-8C45-20569EB44577}"/>
+              </a:ext>
+            </a:extLst>
+          </p:cNvPr>
+          <p:cNvSpPr>
+            <a:spLocks noGrp="1"/>
+          </p:cNvSpPr>
+          <p:nvPr>
+            <p:ph type="title"/>
+          </p:nvPr>
+        </p:nvSpPr>
+        <p:spPr>
+          <a:xfrm>
+            <a:off x="583689" y="455084"/>
+            <a:ext cx="9176537" cy="1164309"/>
+          </a:xfrm>
+        </p:spPr>
+        <p:txBody>
+          <a:bodyPr/>
+          <a:lstStyle/>
+          <a:p>
+            <a:r>
+              <a:rPr lang="en-US" sz="2400" dirty="0"/>
+              <a:t>Pitstop: </a:t>
+            </a:r>
+            <a:r>
+              <a:rPr lang="en-US" sz="2400" i="1" u="sng" dirty="0">
+                <a:solidFill>
+                  <a:schemeClr val="bg2">
+                    <a:lumMod val="65000"/>
+                  </a:schemeClr>
+                </a:solidFill>
+              </a:rPr>
+              <a:t>Use</a:t>
+            </a:r>
+            <a:r>
+              <a:rPr lang="en-US" sz="2400" i="1" dirty="0">
+                <a:solidFill>
+                  <a:schemeClr val="bg2">
+                    <a:lumMod val="65000"/>
+                  </a:schemeClr>
+                </a:solidFill>
+              </a:rPr>
+              <a:t> </a:t>
+            </a:r>
+            <a:r>
+              <a:rPr lang="en-US" sz="2400" dirty="0">
+                <a:solidFill>
+                  <a:schemeClr val="bg2">
+                    <a:lumMod val="65000"/>
+                  </a:schemeClr>
+                </a:solidFill>
+              </a:rPr>
+              <a:t>resource and document links. These are the </a:t>
+            </a:r>
+            <a:r>
+              <a:rPr lang="en-US" sz="2400" u="sng" dirty="0"/>
+              <a:t>secondary recommendations</a:t>
+            </a:r>
+            <a:r>
+              <a:rPr lang="en-US" sz="2400" dirty="0">
+                <a:solidFill>
+                  <a:schemeClr val="bg2">
+                    <a:lumMod val="65000"/>
+                  </a:schemeClr>
+                </a:solidFill>
+              </a:rPr>
+              <a:t> to </a:t>
+            </a:r>
+            <a:r>
+              <a:rPr lang="en-US" sz="2400" u="sng" dirty="0"/>
+              <a:t>improve</a:t>
+            </a:r>
+            <a:r>
+              <a:rPr lang="en-US" sz="2400" dirty="0">
+                <a:solidFill>
+                  <a:schemeClr val="bg2">
+                    <a:lumMod val="65000"/>
+                  </a:schemeClr>
+                </a:solidFill>
+              </a:rPr>
+              <a:t> the quality of instrumentation further.</a:t>
+            </a:r>
+            <a:endParaRPr lang="en-US" sz="2400" u="sng" dirty="0">
+              <a:solidFill>
+                <a:schemeClr val="bg2">
+                  <a:lumMod val="65000"/>
+                </a:schemeClr>
+              </a:solidFill>
+            </a:endParaRPr>
+          </a:p>
+        </p:txBody>
+      </p:sp>
+      <p:pic>
+        <p:nvPicPr>
+          <p:cNvPr id="4" name="Picture 3">
+            <a:extLst>
+              <a:ext uri="{FF2B5EF4-FFF2-40B4-BE49-F238E27FC236}">
+                <a16:creationId xmlns:a16="http://schemas.microsoft.com/office/drawing/2014/main" id="{954E400C-A9E6-789C-84E9-B86CF70D3E2D}"/>
+              </a:ext>
+            </a:extLst>
+          </p:cNvPr>
+          <p:cNvPicPr>
+            <a:picLocks noChangeAspect="1"/>
+          </p:cNvPicPr>
+          <p:nvPr/>
+        </p:nvPicPr>
+        <p:blipFill>
+          <a:blip r:embed="rId3"/>
+          <a:stretch>
+            <a:fillRect/>
+          </a:stretch>
+        </p:blipFill>
+        <p:spPr>
+          <a:xfrm>
+            <a:off x="9457107" y="-1"/>
+            <a:ext cx="2734894" cy="1619395"/>
+          </a:xfrm>
+          <a:prstGeom prst="rect">
+            <a:avLst/>
+          </a:prstGeom>
+        </p:spPr>
+      </p:pic>
+      <p:sp>
+        <p:nvSpPr>
+          <p:cNvPr id="2" name="TextBox 1">
+            <a:extLst>
+              <a:ext uri="{FF2B5EF4-FFF2-40B4-BE49-F238E27FC236}">
+                <a16:creationId xmlns:a16="http://schemas.microsoft.com/office/drawing/2014/main" id="{BFC38B7C-69E4-AE99-7919-2D17A3437C07}"/>
+              </a:ext>
+            </a:extLst>
+          </p:cNvPr>
+          <p:cNvSpPr txBox="1"/>
+          <p:nvPr/>
+        </p:nvSpPr>
+        <p:spPr>
+          <a:xfrm>
+            <a:off x="3160644" y="2395331"/>
+            <a:ext cx="5138530" cy="923330"/>
+          </a:xfrm>
+          <a:prstGeom prst="rect">
+            <a:avLst/>
+          </a:prstGeom>
+          <a:noFill/>
+        </p:spPr>
+        <p:txBody>
+          <a:bodyPr wrap="square" lIns="91440" tIns="45720" rIns="91440" bIns="45720" rtlCol="0">
+            <a:spAutoFit/>
+          </a:bodyPr>
+          <a:lstStyle/>
+          <a:p>
+            <a:pPr algn="l"/>
+            <a:r>
+              <a:rPr lang="en-US" dirty="0">
+                <a:solidFill>
+                  <a:schemeClr val="bg2">
+                    <a:lumMod val="75000"/>
+                  </a:schemeClr>
+                </a:solidFill>
+              </a:rPr>
+              <a:t>There are no </a:t>
+            </a:r>
+            <a:r>
+              <a:rPr lang="en-US" u="sng" dirty="0">
+                <a:solidFill>
+                  <a:schemeClr val="bg2">
+                    <a:lumMod val="75000"/>
+                  </a:schemeClr>
+                </a:solidFill>
+              </a:rPr>
+              <a:t>secondary recommendations</a:t>
+            </a:r>
+            <a:r>
+              <a:rPr lang="en-US" dirty="0">
+                <a:solidFill>
+                  <a:schemeClr val="bg2">
+                    <a:lumMod val="75000"/>
+                  </a:schemeClr>
+                </a:solidFill>
+              </a:rPr>
+              <a:t> available for this Pitstop.  Please consult the </a:t>
+            </a:r>
+            <a:r>
+              <a:rPr lang="en-US" u="sng" dirty="0">
+                <a:solidFill>
+                  <a:schemeClr val="bg2">
+                    <a:lumMod val="75000"/>
+                  </a:schemeClr>
+                </a:solidFill>
+              </a:rPr>
+              <a:t>primary recommendations</a:t>
+            </a:r>
+            <a:r>
+              <a:rPr lang="en-US" dirty="0">
+                <a:solidFill>
+                  <a:schemeClr val="bg2">
+                    <a:lumMod val="75000"/>
+                  </a:schemeClr>
+                </a:solidFill>
+              </a:rPr>
+              <a:t> on the prior slide.  </a:t>
+            </a:r>
+            <a:endParaRPr lang="en-US" dirty="0">
+              <a:solidFill>
+                <a:schemeClr val="bg2">
+                  <a:lumMod val="75000"/>
+                </a:schemeClr>
+              </a:solidFill>
+              <a:latin typeface="+mn-lt"/>
+            </a:endParaRPr>
+          </a:p>
+        </p:txBody>
+      </p:sp>
+    </p:spTree>
+    <p:extLst>
+      <p:ext uri="{BB962C8B-B14F-4D97-AF65-F5344CB8AC3E}">
+        <p14:creationId xmlns:p14="http://schemas.microsoft.com/office/powerpoint/2010/main" val="250474957"/>
+      </p:ext>
+    </p:extLst>
+  </p:cSld>
+  <p:clrMapOvr>
+    <a:masterClrMapping/>
+  </p:clrMapOvr>
+</p:sld>
+</file>
+
+<file path=ppt/slides/slide12.xml><?xml version="1.0" encoding="utf-8"?>
+<p:sld xmlns:a="http://schemas.openxmlformats.org/drawingml/2006/main" xmlns:r="http://schemas.openxmlformats.org/officeDocument/2006/relationships" xmlns:p="http://schemas.openxmlformats.org/presentationml/2006/main">
+  <p:cSld>
+    <p:spTree>
+      <p:nvGrpSpPr>
+        <p:cNvPr id="1" name=""/>
+        <p:cNvGrpSpPr/>
+        <p:nvPr/>
+      </p:nvGrpSpPr>
+      <p:grpSpPr>
+        <a:xfrm>
+          <a:off x="0" y="0"/>
+          <a:ext cx="0" cy="0"/>
+          <a:chOff x="0" y="0"/>
+          <a:chExt cx="0" cy="0"/>
+        </a:xfrm>
+      </p:grpSpPr>
+      <p:sp>
+        <p:nvSpPr>
+          <p:cNvPr id="3" name="Title 2">
+            <a:extLst>
+              <a:ext uri="{FF2B5EF4-FFF2-40B4-BE49-F238E27FC236}">
+                <a16:creationId xmlns:a16="http://schemas.microsoft.com/office/drawing/2014/main" id="{F9BA7272-68AE-FF40-8C45-20569EB44577}"/>
+              </a:ext>
+            </a:extLst>
+          </p:cNvPr>
+          <p:cNvSpPr>
+            <a:spLocks noGrp="1"/>
+          </p:cNvSpPr>
+          <p:nvPr>
+            <p:ph type="title"/>
+          </p:nvPr>
+        </p:nvSpPr>
+        <p:spPr/>
+        <p:txBody>
+          <a:bodyPr/>
+          <a:lstStyle/>
+          <a:p>
+            <a:r>
+              <a:rPr lang="en-US" sz="2400" dirty="0"/>
+              <a:t>Hybrid Application Monitoring </a:t>
+            </a:r>
+            <a:br>
+              <a:rPr lang="en-US" sz="2400" dirty="0"/>
+            </a:br>
+            <a:r>
+              <a:rPr lang="en-US" sz="2400" dirty="0"/>
+              <a:t>Pitstop: </a:t>
+            </a:r>
+            <a:r>
+              <a:rPr lang="en-US" sz="2400" i="1" dirty="0">
+                <a:solidFill>
+                  <a:schemeClr val="bg2">
+                    <a:lumMod val="65000"/>
+                  </a:schemeClr>
+                </a:solidFill>
+              </a:rPr>
+              <a:t>Engage</a:t>
+            </a:r>
+          </a:p>
+        </p:txBody>
+      </p:sp>
+      <p:pic>
+        <p:nvPicPr>
+          <p:cNvPr id="2" name="Picture 1">
+            <a:extLst>
+              <a:ext uri="{FF2B5EF4-FFF2-40B4-BE49-F238E27FC236}">
+                <a16:creationId xmlns:a16="http://schemas.microsoft.com/office/drawing/2014/main" id="{131BC433-9DC1-CE3A-E1C2-BCA842581145}"/>
+              </a:ext>
+            </a:extLst>
+          </p:cNvPr>
+          <p:cNvPicPr>
+            <a:picLocks noChangeAspect="1"/>
+          </p:cNvPicPr>
+          <p:nvPr/>
+        </p:nvPicPr>
+        <p:blipFill>
+          <a:blip r:embed="rId3"/>
+          <a:stretch>
+            <a:fillRect/>
+          </a:stretch>
+        </p:blipFill>
+        <p:spPr>
+          <a:xfrm>
+            <a:off x="9457106" y="0"/>
+            <a:ext cx="2734893" cy="1619395"/>
+          </a:xfrm>
+          <a:prstGeom prst="rect">
+            <a:avLst/>
+          </a:prstGeom>
+        </p:spPr>
+      </p:pic>
+      <p:sp>
+        <p:nvSpPr>
+          <p:cNvPr id="5" name="TextBox 4">
+            <a:extLst>
+              <a:ext uri="{FF2B5EF4-FFF2-40B4-BE49-F238E27FC236}">
+                <a16:creationId xmlns:a16="http://schemas.microsoft.com/office/drawing/2014/main" id="{60AD8280-2AE6-A913-8BA7-DD65D7A433C5}"/>
+              </a:ext>
+            </a:extLst>
+          </p:cNvPr>
+          <p:cNvSpPr txBox="1"/>
+          <p:nvPr/>
+        </p:nvSpPr>
+        <p:spPr>
+          <a:xfrm>
+            <a:off x="9073680" y="6077191"/>
+            <a:ext cx="2948243" cy="215444"/>
+          </a:xfrm>
+          <a:prstGeom prst="rect">
+            <a:avLst/>
+          </a:prstGeom>
+          <a:noFill/>
+        </p:spPr>
+        <p:txBody>
+          <a:bodyPr wrap="none" lIns="91440" tIns="45720" rIns="91440" bIns="45720" rtlCol="0">
+            <a:spAutoFit/>
+          </a:bodyPr>
+          <a:lstStyle/>
+          <a:p>
+            <a:pPr algn="l"/>
+            <a:r>
+              <a:rPr lang="en-US" sz="800" dirty="0">
+                <a:latin typeface="+mn-lt"/>
+              </a:rPr>
+              <a:t>*** see the next page for feedback on health checks </a:t>
+            </a:r>
+            <a:r>
+              <a:rPr lang="en-US" sz="800" u="sng" dirty="0">
+                <a:latin typeface="+mn-lt"/>
+              </a:rPr>
+              <a:t>best practices</a:t>
+            </a:r>
+          </a:p>
+        </p:txBody>
+      </p:sp>
+    </p:spTree>
+    <p:extLst>
+      <p:ext uri="{BB962C8B-B14F-4D97-AF65-F5344CB8AC3E}">
+        <p14:creationId xmlns:p14="http://schemas.microsoft.com/office/powerpoint/2010/main" val="3914242953"/>
+      </p:ext>
+    </p:extLst>
+  </p:cSld>
+  <p:clrMapOvr>
+    <a:masterClrMapping/>
+  </p:clrMapOvr>
+</p:sld>
+</file>
+
+<file path=ppt/slides/slide13.xml><?xml version="1.0" encoding="utf-8"?>
+<p:sld xmlns:a="http://schemas.openxmlformats.org/drawingml/2006/main" xmlns:r="http://schemas.openxmlformats.org/officeDocument/2006/relationships" xmlns:p="http://schemas.openxmlformats.org/presentationml/2006/main">
+  <p:cSld>
+    <p:spTree>
+      <p:nvGrpSpPr>
+        <p:cNvPr id="1" name=""/>
+        <p:cNvGrpSpPr/>
+        <p:nvPr/>
+      </p:nvGrpSpPr>
+      <p:grpSpPr>
+        <a:xfrm>
+          <a:off x="0" y="0"/>
+          <a:ext cx="0" cy="0"/>
+          <a:chOff x="0" y="0"/>
+          <a:chExt cx="0" cy="0"/>
+        </a:xfrm>
+      </p:grpSpPr>
+      <p:sp>
+        <p:nvSpPr>
+          <p:cNvPr id="3" name="Title 2">
+            <a:extLst>
+              <a:ext uri="{FF2B5EF4-FFF2-40B4-BE49-F238E27FC236}">
+                <a16:creationId xmlns:a16="http://schemas.microsoft.com/office/drawing/2014/main" id="{F9BA7272-68AE-FF40-8C45-20569EB44577}"/>
+              </a:ext>
+            </a:extLst>
+          </p:cNvPr>
+          <p:cNvSpPr>
+            <a:spLocks noGrp="1"/>
+          </p:cNvSpPr>
+          <p:nvPr>
+            <p:ph type="title"/>
+          </p:nvPr>
+        </p:nvSpPr>
+        <p:spPr>
+          <a:xfrm>
+            <a:off x="583689" y="455085"/>
+            <a:ext cx="10408990" cy="975783"/>
+          </a:xfrm>
+        </p:spPr>
+        <p:txBody>
+          <a:bodyPr/>
+          <a:lstStyle/>
+          <a:p>
+            <a:r>
+              <a:rPr lang="en-US" sz="2400" dirty="0"/>
+              <a:t>Pitstop: </a:t>
+            </a:r>
+            <a:r>
+              <a:rPr lang="en-US" sz="2400" i="1" u="sng" dirty="0">
+                <a:solidFill>
+                  <a:schemeClr val="bg2">
+                    <a:lumMod val="65000"/>
+                  </a:schemeClr>
+                </a:solidFill>
+              </a:rPr>
+              <a:t>Engage</a:t>
+            </a:r>
+            <a:r>
+              <a:rPr lang="en-US" sz="2400" i="1" dirty="0">
+                <a:solidFill>
+                  <a:schemeClr val="bg2">
+                    <a:lumMod val="65000"/>
+                  </a:schemeClr>
+                </a:solidFill>
+              </a:rPr>
+              <a:t> </a:t>
+            </a:r>
+            <a:r>
+              <a:rPr lang="en-US" sz="2400" dirty="0">
+                <a:solidFill>
+                  <a:schemeClr val="bg2">
+                    <a:lumMod val="65000"/>
+                  </a:schemeClr>
+                </a:solidFill>
+              </a:rPr>
+              <a:t>resource and document links. These are the </a:t>
+            </a:r>
+            <a:r>
+              <a:rPr lang="en-US" sz="2400" u="sng" dirty="0"/>
+              <a:t>primary recommendations</a:t>
+            </a:r>
+            <a:r>
+              <a:rPr lang="en-US" sz="2400" dirty="0"/>
+              <a:t> </a:t>
+            </a:r>
+            <a:r>
+              <a:rPr lang="en-US" sz="2400" dirty="0">
+                <a:solidFill>
+                  <a:schemeClr val="bg2">
+                    <a:lumMod val="65000"/>
+                  </a:schemeClr>
+                </a:solidFill>
+              </a:rPr>
+              <a:t>to </a:t>
+            </a:r>
+            <a:r>
+              <a:rPr lang="en-US" sz="2400" u="sng" dirty="0"/>
+              <a:t>pass</a:t>
+            </a:r>
+            <a:r>
+              <a:rPr lang="en-US" sz="2400" dirty="0">
+                <a:solidFill>
+                  <a:schemeClr val="bg2">
+                    <a:lumMod val="65000"/>
+                  </a:schemeClr>
+                </a:solidFill>
+              </a:rPr>
+              <a:t> health checks for the </a:t>
+            </a:r>
+            <a:r>
+              <a:rPr lang="en-US" sz="2400" i="1" u="sng" dirty="0">
+                <a:solidFill>
+                  <a:schemeClr val="bg2">
+                    <a:lumMod val="65000"/>
+                  </a:schemeClr>
+                </a:solidFill>
+              </a:rPr>
+              <a:t>Engage</a:t>
+            </a:r>
+            <a:r>
+              <a:rPr lang="en-US" sz="2400" dirty="0">
+                <a:solidFill>
+                  <a:schemeClr val="bg2">
+                    <a:lumMod val="65000"/>
+                  </a:schemeClr>
+                </a:solidFill>
+              </a:rPr>
+              <a:t> pitstop</a:t>
             </a:r>
             <a:endParaRPr lang="en-US" sz="2400" u="sng" dirty="0">
               <a:solidFill>
@@ -46449,7 +47655,255 @@
 </p:sld>
 </file>
 
-<file path=ppt/slides/slide11.xml><?xml version="1.0" encoding="utf-8"?>
+<file path=ppt/slides/slide14.xml><?xml version="1.0" encoding="utf-8"?>
+<p:sld xmlns:a="http://schemas.openxmlformats.org/drawingml/2006/main" xmlns:r="http://schemas.openxmlformats.org/officeDocument/2006/relationships" xmlns:p="http://schemas.openxmlformats.org/presentationml/2006/main">
+  <p:cSld>
+    <p:spTree>
+      <p:nvGrpSpPr>
+        <p:cNvPr id="1" name=""/>
+        <p:cNvGrpSpPr/>
+        <p:nvPr/>
+      </p:nvGrpSpPr>
+      <p:grpSpPr>
+        <a:xfrm>
+          <a:off x="0" y="0"/>
+          <a:ext cx="0" cy="0"/>
+          <a:chOff x="0" y="0"/>
+          <a:chExt cx="0" cy="0"/>
+        </a:xfrm>
+      </p:grpSpPr>
+      <p:sp>
+        <p:nvSpPr>
+          <p:cNvPr id="3" name="Title 2">
+            <a:extLst>
+              <a:ext uri="{FF2B5EF4-FFF2-40B4-BE49-F238E27FC236}">
+                <a16:creationId xmlns:a16="http://schemas.microsoft.com/office/drawing/2014/main" id="{F9BA7272-68AE-FF40-8C45-20569EB44577}"/>
+              </a:ext>
+            </a:extLst>
+          </p:cNvPr>
+          <p:cNvSpPr>
+            <a:spLocks noGrp="1"/>
+          </p:cNvSpPr>
+          <p:nvPr>
+            <p:ph type="title"/>
+          </p:nvPr>
+        </p:nvSpPr>
+        <p:spPr>
+          <a:xfrm>
+            <a:off x="583689" y="455085"/>
+            <a:ext cx="10408990" cy="975783"/>
+          </a:xfrm>
+        </p:spPr>
+        <p:txBody>
+          <a:bodyPr/>
+          <a:lstStyle/>
+          <a:p>
+            <a:r>
+              <a:rPr lang="en-US" sz="2400" dirty="0"/>
+              <a:t>Pitstop: </a:t>
+            </a:r>
+            <a:r>
+              <a:rPr lang="en-US" sz="2400" i="1" u="sng" dirty="0">
+                <a:solidFill>
+                  <a:schemeClr val="bg2">
+                    <a:lumMod val="65000"/>
+                  </a:schemeClr>
+                </a:solidFill>
+              </a:rPr>
+              <a:t>Engage</a:t>
+            </a:r>
+            <a:r>
+              <a:rPr lang="en-US" sz="2400" i="1" dirty="0">
+                <a:solidFill>
+                  <a:schemeClr val="bg2">
+                    <a:lumMod val="65000"/>
+                  </a:schemeClr>
+                </a:solidFill>
+              </a:rPr>
+              <a:t> </a:t>
+            </a:r>
+            <a:r>
+              <a:rPr lang="en-US" sz="2400" dirty="0">
+                <a:solidFill>
+                  <a:schemeClr val="bg2">
+                    <a:lumMod val="65000"/>
+                  </a:schemeClr>
+                </a:solidFill>
+              </a:rPr>
+              <a:t>resource and document links. These are the </a:t>
+            </a:r>
+            <a:r>
+              <a:rPr lang="en-US" sz="2400" u="sng" dirty="0"/>
+              <a:t>secondary recommendations</a:t>
+            </a:r>
+            <a:r>
+              <a:rPr lang="en-US" sz="2400" dirty="0">
+                <a:solidFill>
+                  <a:schemeClr val="bg2">
+                    <a:lumMod val="65000"/>
+                  </a:schemeClr>
+                </a:solidFill>
+              </a:rPr>
+              <a:t> to </a:t>
+            </a:r>
+            <a:r>
+              <a:rPr lang="en-US" sz="2400" u="sng" dirty="0"/>
+              <a:t>improve</a:t>
+            </a:r>
+            <a:r>
+              <a:rPr lang="en-US" sz="2400" dirty="0">
+                <a:solidFill>
+                  <a:schemeClr val="bg2">
+                    <a:lumMod val="65000"/>
+                  </a:schemeClr>
+                </a:solidFill>
+              </a:rPr>
+              <a:t> the quality of instrumentation further.</a:t>
+            </a:r>
+            <a:endParaRPr lang="en-US" sz="2400" u="sng" dirty="0">
+              <a:solidFill>
+                <a:schemeClr val="bg2">
+                  <a:lumMod val="65000"/>
+                </a:schemeClr>
+              </a:solidFill>
+            </a:endParaRPr>
+          </a:p>
+        </p:txBody>
+      </p:sp>
+      <p:pic>
+        <p:nvPicPr>
+          <p:cNvPr id="4" name="Picture 3">
+            <a:extLst>
+              <a:ext uri="{FF2B5EF4-FFF2-40B4-BE49-F238E27FC236}">
+                <a16:creationId xmlns:a16="http://schemas.microsoft.com/office/drawing/2014/main" id="{D839C740-C4DF-8F92-A188-9862C9E8076F}"/>
+              </a:ext>
+            </a:extLst>
+          </p:cNvPr>
+          <p:cNvPicPr>
+            <a:picLocks noChangeAspect="1"/>
+          </p:cNvPicPr>
+          <p:nvPr/>
+        </p:nvPicPr>
+        <p:blipFill>
+          <a:blip r:embed="rId3"/>
+          <a:stretch>
+            <a:fillRect/>
+          </a:stretch>
+        </p:blipFill>
+        <p:spPr>
+          <a:xfrm>
+            <a:off x="9457106" y="0"/>
+            <a:ext cx="2734893" cy="1619395"/>
+          </a:xfrm>
+          <a:prstGeom prst="rect">
+            <a:avLst/>
+          </a:prstGeom>
+        </p:spPr>
+      </p:pic>
+      <p:sp>
+        <p:nvSpPr>
+          <p:cNvPr id="2" name="TextBox 1">
+            <a:extLst>
+              <a:ext uri="{FF2B5EF4-FFF2-40B4-BE49-F238E27FC236}">
+                <a16:creationId xmlns:a16="http://schemas.microsoft.com/office/drawing/2014/main" id="{69519F30-32AD-7D4D-5B09-3742F41B0033}"/>
+              </a:ext>
+            </a:extLst>
+          </p:cNvPr>
+          <p:cNvSpPr txBox="1"/>
+          <p:nvPr/>
+        </p:nvSpPr>
+        <p:spPr>
+          <a:xfrm>
+            <a:off x="3160644" y="2395331"/>
+            <a:ext cx="5138530" cy="923330"/>
+          </a:xfrm>
+          <a:prstGeom prst="rect">
+            <a:avLst/>
+          </a:prstGeom>
+          <a:noFill/>
+        </p:spPr>
+        <p:txBody>
+          <a:bodyPr wrap="square" lIns="91440" tIns="45720" rIns="91440" bIns="45720" rtlCol="0">
+            <a:spAutoFit/>
+          </a:bodyPr>
+          <a:lstStyle/>
+          <a:p>
+            <a:pPr algn="l"/>
+            <a:r>
+              <a:rPr lang="en-US" dirty="0">
+                <a:solidFill>
+                  <a:schemeClr val="bg2">
+                    <a:lumMod val="75000"/>
+                  </a:schemeClr>
+                </a:solidFill>
+              </a:rPr>
+              <a:t>There are no </a:t>
+            </a:r>
+            <a:r>
+              <a:rPr lang="en-US" u="sng" dirty="0">
+                <a:solidFill>
+                  <a:schemeClr val="bg2">
+                    <a:lumMod val="75000"/>
+                  </a:schemeClr>
+                </a:solidFill>
+              </a:rPr>
+              <a:t>secondary recommendations</a:t>
+            </a:r>
+            <a:r>
+              <a:rPr lang="en-US" dirty="0">
+                <a:solidFill>
+                  <a:schemeClr val="bg2">
+                    <a:lumMod val="75000"/>
+                  </a:schemeClr>
+                </a:solidFill>
+              </a:rPr>
+              <a:t> available for this Pitstop.  Please consult the </a:t>
+            </a:r>
+            <a:r>
+              <a:rPr lang="en-US" u="sng" dirty="0">
+                <a:solidFill>
+                  <a:schemeClr val="bg2">
+                    <a:lumMod val="75000"/>
+                  </a:schemeClr>
+                </a:solidFill>
+              </a:rPr>
+              <a:t>primary recommendations</a:t>
+            </a:r>
+            <a:r>
+              <a:rPr lang="en-US" dirty="0">
+                <a:solidFill>
+                  <a:schemeClr val="bg2">
+                    <a:lumMod val="75000"/>
+                  </a:schemeClr>
+                </a:solidFill>
+              </a:rPr>
+              <a:t> on the prior slide.  </a:t>
+            </a:r>
+            <a:endParaRPr lang="en-US" dirty="0">
+              <a:solidFill>
+                <a:schemeClr val="bg2">
+                  <a:lumMod val="75000"/>
+                </a:schemeClr>
+              </a:solidFill>
+              <a:latin typeface="+mn-lt"/>
+            </a:endParaRPr>
+          </a:p>
+        </p:txBody>
+      </p:sp>
+    </p:spTree>
+    <p:extLst>
+      <p:ext uri="{BB962C8B-B14F-4D97-AF65-F5344CB8AC3E}">
+        <p14:creationId xmlns:p14="http://schemas.microsoft.com/office/powerpoint/2010/main" val="4048011084"/>
+      </p:ext>
+    </p:extLst>
+  </p:cSld>
+  <p:clrMapOvr>
+    <a:masterClrMapping/>
+  </p:clrMapOvr>
+</p:sld>
+</file>
+
+<file path=ppt/slides/slide15.xml><?xml version="1.0" encoding="utf-8"?>
 <p:sld xmlns:a="http://schemas.openxmlformats.org/drawingml/2006/main" xmlns:r="http://schemas.openxmlformats.org/officeDocument/2006/relationships" xmlns:p="http://schemas.openxmlformats.org/presentationml/2006/main">
   <p:cSld>
     <p:spTree>
@@ -46598,7 +48052,7 @@
 </p:sld>
 </file>
 
-<file path=ppt/slides/slide12.xml><?xml version="1.0" encoding="utf-8"?>
+<file path=ppt/slides/slide16.xml><?xml version="1.0" encoding="utf-8"?>
 <p:sld xmlns:a="http://schemas.openxmlformats.org/drawingml/2006/main" xmlns:r="http://schemas.openxmlformats.org/officeDocument/2006/relationships" xmlns:p="http://schemas.openxmlformats.org/presentationml/2006/main">
   <p:cSld>
     <p:spTree>
@@ -46631,7 +48085,12 @@
             <p:ph type="title"/>
           </p:nvPr>
         </p:nvSpPr>
-        <p:spPr/>
+        <p:spPr>
+          <a:xfrm>
+            <a:off x="583688" y="455085"/>
+            <a:ext cx="10647529" cy="975783"/>
+          </a:xfrm>
+        </p:spPr>
         <p:txBody>
           <a:bodyPr/>
           <a:lstStyle/>
@@ -46668,7 +48127,55 @@
                   </a:schemeClr>
                 </a:solidFill>
               </a:rPr>
-              <a:t>has failed health check best-practices</a:t>
+              <a:t>resource and document links. These are the </a:t>
+            </a:r>
+            <a:r>
+              <a:rPr lang="en-US" sz="2400" u="sng" dirty="0"/>
+              <a:t>primary recommendations</a:t>
+            </a:r>
+            <a:r>
+              <a:rPr lang="en-US" sz="2400" dirty="0">
+                <a:solidFill>
+                  <a:schemeClr val="bg2">
+                    <a:lumMod val="65000"/>
+                  </a:schemeClr>
+                </a:solidFill>
+              </a:rPr>
+              <a:t> to </a:t>
+            </a:r>
+            <a:r>
+              <a:rPr lang="en-US" sz="2400" u="sng" dirty="0"/>
+              <a:t>pass</a:t>
+            </a:r>
+            <a:r>
+              <a:rPr lang="en-US" sz="2400" dirty="0">
+                <a:solidFill>
+                  <a:schemeClr val="bg2">
+                    <a:lumMod val="65000"/>
+                  </a:schemeClr>
+                </a:solidFill>
+              </a:rPr>
+              <a:t> health checks for the </a:t>
+            </a:r>
+            <a:r>
+              <a:rPr lang="en-US" sz="2400" i="1" u="sng" dirty="0">
+                <a:solidFill>
+                  <a:schemeClr val="bg2">
+                    <a:lumMod val="65000"/>
+                  </a:schemeClr>
+                </a:solidFill>
+              </a:rPr>
+              <a:t>Adopt</a:t>
+            </a:r>
+            <a:r>
+              <a:rPr lang="en-US" sz="2400" dirty="0">
+                <a:solidFill>
+                  <a:schemeClr val="bg2">
+                    <a:lumMod val="65000"/>
+                  </a:schemeClr>
+                </a:solidFill>
+              </a:rPr>
+              <a:t> pitstop</a:t>
             </a:r>
             <a:endParaRPr lang="en-US" sz="2400" u="sng" dirty="0">
               <a:solidFill>
@@ -46723,7 +48230,255 @@
 </p:sld>
 </file>
 
-<file path=ppt/slides/slide13.xml><?xml version="1.0" encoding="utf-8"?>
+<file path=ppt/slides/slide17.xml><?xml version="1.0" encoding="utf-8"?>
+<p:sld xmlns:a="http://schemas.openxmlformats.org/drawingml/2006/main" xmlns:r="http://schemas.openxmlformats.org/officeDocument/2006/relationships" xmlns:p="http://schemas.openxmlformats.org/presentationml/2006/main">
+  <p:cSld>
+    <p:spTree>
+      <p:nvGrpSpPr>
+        <p:cNvPr id="1" name=""/>
+        <p:cNvGrpSpPr/>
+        <p:nvPr/>
+      </p:nvGrpSpPr>
+      <p:grpSpPr>
+        <a:xfrm>
+          <a:off x="0" y="0"/>
+          <a:ext cx="0" cy="0"/>
+          <a:chOff x="0" y="0"/>
+          <a:chExt cx="0" cy="0"/>
+        </a:xfrm>
+      </p:grpSpPr>
+      <p:sp>
+        <p:nvSpPr>
+          <p:cNvPr id="3" name="Title 2">
+            <a:extLst>
+              <a:ext uri="{FF2B5EF4-FFF2-40B4-BE49-F238E27FC236}">
+                <a16:creationId xmlns:a16="http://schemas.microsoft.com/office/drawing/2014/main" id="{F9BA7272-68AE-FF40-8C45-20569EB44577}"/>
+              </a:ext>
+            </a:extLst>
+          </p:cNvPr>
+          <p:cNvSpPr>
+            <a:spLocks noGrp="1"/>
+          </p:cNvSpPr>
+          <p:nvPr>
+            <p:ph type="title"/>
+          </p:nvPr>
+        </p:nvSpPr>
+        <p:spPr>
+          <a:xfrm>
+            <a:off x="583688" y="455085"/>
+            <a:ext cx="10647529" cy="975783"/>
+          </a:xfrm>
+        </p:spPr>
+        <p:txBody>
+          <a:bodyPr/>
+          <a:lstStyle/>
+          <a:p>
+            <a:r>
+              <a:rPr lang="en-US" sz="2400" dirty="0"/>
+              <a:t>Pitstop: </a:t>
+            </a:r>
+            <a:r>
+              <a:rPr lang="en-US" sz="2400" i="1" u="sng" dirty="0">
+                <a:solidFill>
+                  <a:schemeClr val="bg2">
+                    <a:lumMod val="65000"/>
+                  </a:schemeClr>
+                </a:solidFill>
+              </a:rPr>
+              <a:t>Adopt</a:t>
+            </a:r>
+            <a:r>
+              <a:rPr lang="en-US" sz="2400" i="1" dirty="0">
+                <a:solidFill>
+                  <a:schemeClr val="bg2">
+                    <a:lumMod val="65000"/>
+                  </a:schemeClr>
+                </a:solidFill>
+              </a:rPr>
+              <a:t> </a:t>
+            </a:r>
+            <a:r>
+              <a:rPr lang="en-US" sz="2400" dirty="0">
+                <a:solidFill>
+                  <a:schemeClr val="bg2">
+                    <a:lumMod val="65000"/>
+                  </a:schemeClr>
+                </a:solidFill>
+              </a:rPr>
+              <a:t>resource and document links. These are the </a:t>
+            </a:r>
+            <a:r>
+              <a:rPr lang="en-US" sz="2400" u="sng" dirty="0"/>
+              <a:t>secondary recommendations</a:t>
+            </a:r>
+            <a:r>
+              <a:rPr lang="en-US" sz="2400" dirty="0">
+                <a:solidFill>
+                  <a:schemeClr val="bg2">
+                    <a:lumMod val="65000"/>
+                  </a:schemeClr>
+                </a:solidFill>
+              </a:rPr>
+              <a:t> to </a:t>
+            </a:r>
+            <a:r>
+              <a:rPr lang="en-US" sz="2400" u="sng" dirty="0"/>
+              <a:t>improve</a:t>
+            </a:r>
+            <a:r>
+              <a:rPr lang="en-US" sz="2400" dirty="0">
+                <a:solidFill>
+                  <a:schemeClr val="bg2">
+                    <a:lumMod val="65000"/>
+                  </a:schemeClr>
+                </a:solidFill>
+              </a:rPr>
+              <a:t> the quality of instrumentation further.</a:t>
+            </a:r>
+            <a:endParaRPr lang="en-US" sz="2400" u="sng" dirty="0">
+              <a:solidFill>
+                <a:schemeClr val="bg2">
+                  <a:lumMod val="65000"/>
+                </a:schemeClr>
+              </a:solidFill>
+            </a:endParaRPr>
+          </a:p>
+        </p:txBody>
+      </p:sp>
+      <p:pic>
+        <p:nvPicPr>
+          <p:cNvPr id="4" name="Picture 3">
+            <a:extLst>
+              <a:ext uri="{FF2B5EF4-FFF2-40B4-BE49-F238E27FC236}">
+                <a16:creationId xmlns:a16="http://schemas.microsoft.com/office/drawing/2014/main" id="{D4ADF4DF-E590-C877-5FE6-F67795C8B0E5}"/>
+              </a:ext>
+            </a:extLst>
+          </p:cNvPr>
+          <p:cNvPicPr>
+            <a:picLocks noChangeAspect="1"/>
+          </p:cNvPicPr>
+          <p:nvPr/>
+        </p:nvPicPr>
+        <p:blipFill>
+          <a:blip r:embed="rId3"/>
+          <a:stretch>
+            <a:fillRect/>
+          </a:stretch>
+        </p:blipFill>
+        <p:spPr>
+          <a:xfrm>
+            <a:off x="9457106" y="0"/>
+            <a:ext cx="2734893" cy="1619395"/>
+          </a:xfrm>
+          <a:prstGeom prst="rect">
+            <a:avLst/>
+          </a:prstGeom>
+        </p:spPr>
+      </p:pic>
+      <p:sp>
+        <p:nvSpPr>
+          <p:cNvPr id="2" name="TextBox 1">
+            <a:extLst>
+              <a:ext uri="{FF2B5EF4-FFF2-40B4-BE49-F238E27FC236}">
+                <a16:creationId xmlns:a16="http://schemas.microsoft.com/office/drawing/2014/main" id="{63A72C7B-2FD1-30DA-9041-1EB9F4BA3736}"/>
+              </a:ext>
+            </a:extLst>
+          </p:cNvPr>
+          <p:cNvSpPr txBox="1"/>
+          <p:nvPr/>
+        </p:nvSpPr>
+        <p:spPr>
+          <a:xfrm>
+            <a:off x="3160644" y="2395331"/>
+            <a:ext cx="5138530" cy="923330"/>
+          </a:xfrm>
+          <a:prstGeom prst="rect">
+            <a:avLst/>
+          </a:prstGeom>
+          <a:noFill/>
+        </p:spPr>
+        <p:txBody>
+          <a:bodyPr wrap="square" lIns="91440" tIns="45720" rIns="91440" bIns="45720" rtlCol="0">
+            <a:spAutoFit/>
+          </a:bodyPr>
+          <a:lstStyle/>
+          <a:p>
+            <a:pPr algn="l"/>
+            <a:r>
+              <a:rPr lang="en-US" dirty="0">
+                <a:solidFill>
+                  <a:schemeClr val="bg2">
+                    <a:lumMod val="75000"/>
+                  </a:schemeClr>
+                </a:solidFill>
+              </a:rPr>
+              <a:t>There are no </a:t>
+            </a:r>
+            <a:r>
+              <a:rPr lang="en-US" u="sng" dirty="0">
+                <a:solidFill>
+                  <a:schemeClr val="bg2">
+                    <a:lumMod val="75000"/>
+                  </a:schemeClr>
+                </a:solidFill>
+              </a:rPr>
+              <a:t>secondary recommendations</a:t>
+            </a:r>
+            <a:r>
+              <a:rPr lang="en-US" dirty="0">
+                <a:solidFill>
+                  <a:schemeClr val="bg2">
+                    <a:lumMod val="75000"/>
+                  </a:schemeClr>
+                </a:solidFill>
+              </a:rPr>
+              <a:t> available for this Pitstop.  Please consult the </a:t>
+            </a:r>
+            <a:r>
+              <a:rPr lang="en-US" u="sng" dirty="0">
+                <a:solidFill>
+                  <a:schemeClr val="bg2">
+                    <a:lumMod val="75000"/>
+                  </a:schemeClr>
+                </a:solidFill>
+              </a:rPr>
+              <a:t>primary recommendations</a:t>
+            </a:r>
+            <a:r>
+              <a:rPr lang="en-US" dirty="0">
+                <a:solidFill>
+                  <a:schemeClr val="bg2">
+                    <a:lumMod val="75000"/>
+                  </a:schemeClr>
+                </a:solidFill>
+              </a:rPr>
+              <a:t> on the prior slide.  </a:t>
+            </a:r>
+            <a:endParaRPr lang="en-US" dirty="0">
+              <a:solidFill>
+                <a:schemeClr val="bg2">
+                  <a:lumMod val="75000"/>
+                </a:schemeClr>
+              </a:solidFill>
+              <a:latin typeface="+mn-lt"/>
+            </a:endParaRPr>
+          </a:p>
+        </p:txBody>
+      </p:sp>
+    </p:spTree>
+    <p:extLst>
+      <p:ext uri="{BB962C8B-B14F-4D97-AF65-F5344CB8AC3E}">
+        <p14:creationId xmlns:p14="http://schemas.microsoft.com/office/powerpoint/2010/main" val="3779698389"/>
+      </p:ext>
+    </p:extLst>
+  </p:cSld>
+  <p:clrMapOvr>
+    <a:masterClrMapping/>
+  </p:clrMapOvr>
+</p:sld>
+</file>
+
+<file path=ppt/slides/slide18.xml><?xml version="1.0" encoding="utf-8"?>
 <p:sld xmlns:a="http://schemas.openxmlformats.org/drawingml/2006/main" xmlns:r="http://schemas.openxmlformats.org/officeDocument/2006/relationships" xmlns:p="http://schemas.openxmlformats.org/presentationml/2006/main">
   <p:cSld>
     <p:spTree>
@@ -46872,7 +48627,7 @@
 </p:sld>
 </file>
 
-<file path=ppt/slides/slide14.xml><?xml version="1.0" encoding="utf-8"?>
+<file path=ppt/slides/slide19.xml><?xml version="1.0" encoding="utf-8"?>
 <p:sld xmlns:a="http://schemas.openxmlformats.org/drawingml/2006/main" xmlns:r="http://schemas.openxmlformats.org/officeDocument/2006/relationships" xmlns:p="http://schemas.openxmlformats.org/presentationml/2006/main">
   <p:cSld>
     <p:spTree>
@@ -46905,7 +48660,12 @@
             <p:ph type="title"/>
           </p:nvPr>
         </p:nvSpPr>
-        <p:spPr/>
+        <p:spPr>
+          <a:xfrm>
+            <a:off x="583689" y="455085"/>
+            <a:ext cx="9723189" cy="996028"/>
+          </a:xfrm>
+        </p:spPr>
         <p:txBody>
           <a:bodyPr/>
           <a:lstStyle/>
@@ -46942,7 +48702,69 @@
                   </a:schemeClr>
                 </a:solidFill>
               </a:rPr>
-              <a:t>has failed health check best-practices</a:t>
+              <a:t>resource and document links. These are the </a:t>
+            </a:r>
+            <a:r>
+              <a:rPr lang="en-US" sz="2400" u="sng" dirty="0"/>
+              <a:t>primary recommendations</a:t>
+            </a:r>
+            <a:r>
+              <a:rPr lang="en-US" sz="2400" dirty="0"/>
+              <a:t> </a:t>
+            </a:r>
+            <a:r>
+              <a:rPr lang="en-US" sz="2400" dirty="0">
+                <a:solidFill>
+                  <a:schemeClr val="bg2">
+                    <a:lumMod val="65000"/>
+                  </a:schemeClr>
+                </a:solidFill>
+              </a:rPr>
+              <a:t>to </a:t>
+            </a:r>
+            <a:r>
+              <a:rPr lang="en-US" sz="2400" u="sng" dirty="0"/>
+              <a:t>pass</a:t>
+            </a:r>
+            <a:r>
+              <a:rPr lang="en-US" sz="2400" dirty="0">
+                <a:solidFill>
+                  <a:schemeClr val="bg2">
+                    <a:lumMod val="65000"/>
+                  </a:schemeClr>
+                </a:solidFill>
+              </a:rPr>
+              <a:t> health checks for the </a:t>
+            </a:r>
+            <a:r>
+              <a:rPr lang="en-US" sz="2400" i="1" u="sng" dirty="0">
+                <a:solidFill>
+                  <a:schemeClr val="bg2">
+                    <a:lumMod val="65000"/>
+                  </a:schemeClr>
+                </a:solidFill>
+              </a:rPr>
+              <a:t>Optimize</a:t>
+            </a:r>
+            <a:r>
+              <a:rPr lang="en-US" sz="2400" i="1" dirty="0">
+                <a:solidFill>
+                  <a:schemeClr val="bg2">
+                    <a:lumMod val="65000"/>
+                  </a:schemeClr>
+                </a:solidFill>
+              </a:rPr>
+              <a:t> </a:t>
+            </a:r>
+            <a:r>
+              <a:rPr lang="en-US" sz="2400" dirty="0">
+                <a:solidFill>
+                  <a:schemeClr val="bg2">
+                    <a:lumMod val="65000"/>
+                  </a:schemeClr>
+                </a:solidFill>
+              </a:rPr>
+              <a:t>pitstop </a:t>
             </a:r>
             <a:endParaRPr lang="en-US" sz="2400" u="sng" dirty="0">
               <a:solidFill>
@@ -46988,36 +48810,6 @@
     <p:extLst>
       <p:ext uri="{BB962C8B-B14F-4D97-AF65-F5344CB8AC3E}">
         <p14:creationId xmlns:p14="http://schemas.microsoft.com/office/powerpoint/2010/main" val="700337039"/>
-      </p:ext>
-    </p:extLst>
-  </p:cSld>
-  <p:clrMapOvr>
-    <a:masterClrMapping/>
-  </p:clrMapOvr>
-</p:sld>
-</file>
-
-<file path=ppt/slides/slide15.xml><?xml version="1.0" encoding="utf-8"?>
-<p:sld xmlns:a="http://schemas.openxmlformats.org/drawingml/2006/main" xmlns:r="http://schemas.openxmlformats.org/officeDocument/2006/relationships" xmlns:p="http://schemas.openxmlformats.org/presentationml/2006/main">
-  <p:cSld>
-    <p:spTree>
-      <p:nvGrpSpPr>
-        <p:cNvPr id="1" name=""/>
-        <p:cNvGrpSpPr/>
-        <p:nvPr/>
-      </p:nvGrpSpPr>
-      <p:grpSpPr>
-        <a:xfrm>
-          <a:off x="0" y="0"/>
-          <a:ext cx="0" cy="0"/>
-          <a:chOff x="0" y="0"/>
-          <a:chExt cx="0" cy="0"/>
-        </a:xfrm>
-      </p:grpSpPr>
-    </p:spTree>
-    <p:extLst>
-      <p:ext uri="{BB962C8B-B14F-4D97-AF65-F5344CB8AC3E}">
-        <p14:creationId xmlns:p14="http://schemas.microsoft.com/office/powerpoint/2010/main" val="2448262891"/>
       </p:ext>
     </p:extLst>
   </p:cSld>
@@ -47399,6 +49191,308 @@
 </p:sld>
 </file>
 
+<file path=ppt/slides/slide20.xml><?xml version="1.0" encoding="utf-8"?>
+<p:sld xmlns:a="http://schemas.openxmlformats.org/drawingml/2006/main" xmlns:r="http://schemas.openxmlformats.org/officeDocument/2006/relationships" xmlns:p="http://schemas.openxmlformats.org/presentationml/2006/main">
+  <p:cSld>
+    <p:spTree>
+      <p:nvGrpSpPr>
+        <p:cNvPr id="1" name=""/>
+        <p:cNvGrpSpPr/>
+        <p:nvPr/>
+      </p:nvGrpSpPr>
+      <p:grpSpPr>
+        <a:xfrm>
+          <a:off x="0" y="0"/>
+          <a:ext cx="0" cy="0"/>
+          <a:chOff x="0" y="0"/>
+          <a:chExt cx="0" cy="0"/>
+        </a:xfrm>
+      </p:grpSpPr>
+      <p:sp>
+        <p:nvSpPr>
+          <p:cNvPr id="3" name="Title 2">
+            <a:extLst>
+              <a:ext uri="{FF2B5EF4-FFF2-40B4-BE49-F238E27FC236}">
+                <a16:creationId xmlns:a16="http://schemas.microsoft.com/office/drawing/2014/main" id="{F9BA7272-68AE-FF40-8C45-20569EB44577}"/>
+              </a:ext>
+            </a:extLst>
+          </p:cNvPr>
+          <p:cNvSpPr>
+            <a:spLocks noGrp="1"/>
+          </p:cNvSpPr>
+          <p:nvPr>
+            <p:ph type="title"/>
+          </p:nvPr>
+        </p:nvSpPr>
+        <p:spPr>
+          <a:xfrm>
+            <a:off x="583689" y="455085"/>
+            <a:ext cx="9017511" cy="996028"/>
+          </a:xfrm>
+        </p:spPr>
+        <p:txBody>
+          <a:bodyPr/>
+          <a:lstStyle/>
+          <a:p>
+            <a:r>
+              <a:rPr lang="en-US" sz="2400" dirty="0"/>
+              <a:t>Pitstop: </a:t>
+            </a:r>
+            <a:r>
+              <a:rPr lang="en-US" sz="2400" i="1" u="sng" dirty="0">
+                <a:solidFill>
+                  <a:schemeClr val="bg2">
+                    <a:lumMod val="65000"/>
+                  </a:schemeClr>
+                </a:solidFill>
+              </a:rPr>
+              <a:t>Optimize</a:t>
+            </a:r>
+            <a:r>
+              <a:rPr lang="en-US" sz="2400" i="1" dirty="0">
+                <a:solidFill>
+                  <a:schemeClr val="bg2">
+                    <a:lumMod val="65000"/>
+                  </a:schemeClr>
+                </a:solidFill>
+              </a:rPr>
+              <a:t> </a:t>
+            </a:r>
+            <a:r>
+              <a:rPr lang="en-US" sz="2400" dirty="0">
+                <a:solidFill>
+                  <a:schemeClr val="bg2">
+                    <a:lumMod val="65000"/>
+                  </a:schemeClr>
+                </a:solidFill>
+              </a:rPr>
+              <a:t>resource and document links. These are the </a:t>
+            </a:r>
+            <a:r>
+              <a:rPr lang="en-US" sz="2400" u="sng" dirty="0"/>
+              <a:t>secondary recommendations</a:t>
+            </a:r>
+            <a:r>
+              <a:rPr lang="en-US" sz="2400" dirty="0"/>
+              <a:t> </a:t>
+            </a:r>
+            <a:r>
+              <a:rPr lang="en-US" sz="2400" dirty="0">
+                <a:solidFill>
+                  <a:schemeClr val="bg2">
+                    <a:lumMod val="65000"/>
+                  </a:schemeClr>
+                </a:solidFill>
+              </a:rPr>
+              <a:t>to further </a:t>
+            </a:r>
+            <a:r>
+              <a:rPr lang="en-US" sz="2400" u="sng" dirty="0"/>
+              <a:t>improve</a:t>
+            </a:r>
+            <a:r>
+              <a:rPr lang="en-US" sz="2400" dirty="0">
+                <a:solidFill>
+                  <a:schemeClr val="bg2">
+                    <a:lumMod val="65000"/>
+                  </a:schemeClr>
+                </a:solidFill>
+              </a:rPr>
+              <a:t> the quality of instrumentation. </a:t>
+            </a:r>
+            <a:endParaRPr lang="en-US" sz="2400" u="sng" dirty="0">
+              <a:solidFill>
+                <a:schemeClr val="bg2">
+                  <a:lumMod val="65000"/>
+                </a:schemeClr>
+              </a:solidFill>
+            </a:endParaRPr>
+          </a:p>
+        </p:txBody>
+      </p:sp>
+      <p:pic>
+        <p:nvPicPr>
+          <p:cNvPr id="4" name="Picture 3">
+            <a:extLst>
+              <a:ext uri="{FF2B5EF4-FFF2-40B4-BE49-F238E27FC236}">
+                <a16:creationId xmlns:a16="http://schemas.microsoft.com/office/drawing/2014/main" id="{CC68BB0B-0397-3C39-02E8-3258B8F19697}"/>
+              </a:ext>
+            </a:extLst>
+          </p:cNvPr>
+          <p:cNvPicPr>
+            <a:picLocks noChangeAspect="1"/>
+          </p:cNvPicPr>
+          <p:nvPr/>
+        </p:nvPicPr>
+        <p:blipFill>
+          <a:blip r:embed="rId3"/>
+          <a:stretch>
+            <a:fillRect/>
+          </a:stretch>
+        </p:blipFill>
+        <p:spPr>
+          <a:xfrm>
+            <a:off x="9458106" y="0"/>
+            <a:ext cx="2733893" cy="1618803"/>
+          </a:xfrm>
+          <a:prstGeom prst="rect">
+            <a:avLst/>
+          </a:prstGeom>
+        </p:spPr>
+      </p:pic>
+      <p:sp>
+        <p:nvSpPr>
+          <p:cNvPr id="2" name="TextBox 1">
+            <a:extLst>
+              <a:ext uri="{FF2B5EF4-FFF2-40B4-BE49-F238E27FC236}">
+                <a16:creationId xmlns:a16="http://schemas.microsoft.com/office/drawing/2014/main" id="{045FDE3A-483F-9BCC-2870-D22AFBDF2443}"/>
+              </a:ext>
+            </a:extLst>
+          </p:cNvPr>
+          <p:cNvSpPr txBox="1"/>
+          <p:nvPr/>
+        </p:nvSpPr>
+        <p:spPr>
+          <a:xfrm>
+            <a:off x="3160644" y="2395331"/>
+            <a:ext cx="5138530" cy="923330"/>
+          </a:xfrm>
+          <a:prstGeom prst="rect">
+            <a:avLst/>
+          </a:prstGeom>
+          <a:noFill/>
+        </p:spPr>
+        <p:txBody>
+          <a:bodyPr wrap="square" lIns="91440" tIns="45720" rIns="91440" bIns="45720" rtlCol="0">
+            <a:spAutoFit/>
+          </a:bodyPr>
+          <a:lstStyle/>
+          <a:p>
+            <a:pPr algn="l"/>
+            <a:r>
+              <a:rPr lang="en-US" dirty="0">
+                <a:solidFill>
+                  <a:schemeClr val="bg2">
+                    <a:lumMod val="75000"/>
+                  </a:schemeClr>
+                </a:solidFill>
+              </a:rPr>
+              <a:t>There are no </a:t>
+            </a:r>
+            <a:r>
+              <a:rPr lang="en-US" u="sng" dirty="0">
+                <a:solidFill>
+                  <a:schemeClr val="bg2">
+                    <a:lumMod val="75000"/>
+                  </a:schemeClr>
+                </a:solidFill>
+              </a:rPr>
+              <a:t>secondary recommendations</a:t>
+            </a:r>
+            <a:r>
+              <a:rPr lang="en-US" dirty="0">
+                <a:solidFill>
+                  <a:schemeClr val="bg2">
+                    <a:lumMod val="75000"/>
+                  </a:schemeClr>
+                </a:solidFill>
+              </a:rPr>
+              <a:t> available for this Pitstop.  Please consult the </a:t>
+            </a:r>
+            <a:r>
+              <a:rPr lang="en-US" u="sng" dirty="0">
+                <a:solidFill>
+                  <a:schemeClr val="bg2">
+                    <a:lumMod val="75000"/>
+                  </a:schemeClr>
+                </a:solidFill>
+              </a:rPr>
+              <a:t>primary recommendations</a:t>
+            </a:r>
+            <a:r>
+              <a:rPr lang="en-US" dirty="0">
+                <a:solidFill>
+                  <a:schemeClr val="bg2">
+                    <a:lumMod val="75000"/>
+                  </a:schemeClr>
+                </a:solidFill>
+              </a:rPr>
+              <a:t> </a:t>
+            </a:r>
+            <a:r>
+              <a:rPr lang="en-US">
+                <a:solidFill>
+                  <a:schemeClr val="bg2">
+                    <a:lumMod val="75000"/>
+                  </a:schemeClr>
+                </a:solidFill>
+              </a:rPr>
+              <a:t>on the prior </a:t>
+            </a:r>
+            <a:r>
+              <a:rPr lang="en-US" dirty="0">
+                <a:solidFill>
+                  <a:schemeClr val="bg2">
+                    <a:lumMod val="75000"/>
+                  </a:schemeClr>
+                </a:solidFill>
+              </a:rPr>
+              <a:t>slide.  </a:t>
+            </a:r>
+            <a:endParaRPr lang="en-US" dirty="0">
+              <a:solidFill>
+                <a:schemeClr val="bg2">
+                  <a:lumMod val="75000"/>
+                </a:schemeClr>
+              </a:solidFill>
+              <a:latin typeface="+mn-lt"/>
+            </a:endParaRPr>
+          </a:p>
+        </p:txBody>
+      </p:sp>
+    </p:spTree>
+    <p:extLst>
+      <p:ext uri="{BB962C8B-B14F-4D97-AF65-F5344CB8AC3E}">
+        <p14:creationId xmlns:p14="http://schemas.microsoft.com/office/powerpoint/2010/main" val="925916626"/>
+      </p:ext>
+    </p:extLst>
+  </p:cSld>
+  <p:clrMapOvr>
+    <a:masterClrMapping/>
+  </p:clrMapOvr>
+</p:sld>
+</file>
+
+<file path=ppt/slides/slide21.xml><?xml version="1.0" encoding="utf-8"?>
+<p:sld xmlns:a="http://schemas.openxmlformats.org/drawingml/2006/main" xmlns:r="http://schemas.openxmlformats.org/officeDocument/2006/relationships" xmlns:p="http://schemas.openxmlformats.org/presentationml/2006/main">
+  <p:cSld>
+    <p:spTree>
+      <p:nvGrpSpPr>
+        <p:cNvPr id="1" name=""/>
+        <p:cNvGrpSpPr/>
+        <p:nvPr/>
+      </p:nvGrpSpPr>
+      <p:grpSpPr>
+        <a:xfrm>
+          <a:off x="0" y="0"/>
+          <a:ext cx="0" cy="0"/>
+          <a:chOff x="0" y="0"/>
+          <a:chExt cx="0" cy="0"/>
+        </a:xfrm>
+      </p:grpSpPr>
+    </p:spTree>
+    <p:extLst>
+      <p:ext uri="{BB962C8B-B14F-4D97-AF65-F5344CB8AC3E}">
+        <p14:creationId xmlns:p14="http://schemas.microsoft.com/office/powerpoint/2010/main" val="2448262891"/>
+      </p:ext>
+    </p:extLst>
+  </p:cSld>
+  <p:clrMapOvr>
+    <a:masterClrMapping/>
+  </p:clrMapOvr>
+</p:sld>
+</file>
+
 <file path=ppt/slides/slide3.xml><?xml version="1.0" encoding="utf-8"?>
 <p:sld xmlns:a="http://schemas.openxmlformats.org/drawingml/2006/main" xmlns:r="http://schemas.openxmlformats.org/officeDocument/2006/relationships" xmlns:p="http://schemas.openxmlformats.org/presentationml/2006/main">
   <p:cSld>
@@ -47581,7 +49675,12 @@
             <p:ph type="title"/>
           </p:nvPr>
         </p:nvSpPr>
-        <p:spPr/>
+        <p:spPr>
+          <a:xfrm>
+            <a:off x="583689" y="406228"/>
+            <a:ext cx="8874418" cy="1202635"/>
+          </a:xfrm>
+        </p:spPr>
         <p:txBody>
           <a:bodyPr/>
           <a:lstStyle/>
@@ -47618,17 +49717,35 @@
                   </a:schemeClr>
                 </a:solidFill>
               </a:rPr>
-              <a:t>resources </a:t>
+              <a:t>resources and documents. These are the </a:t>
             </a:r>
             <a:r>
-              <a:rPr lang="en-US" sz="2400">
+              <a:rPr lang="en-US" sz="2400" u="sng" dirty="0"/>
+              <a:t>primary recommendations</a:t>
+            </a:r>
+            <a:r>
+              <a:rPr lang="en-US" sz="2400" dirty="0">
                 <a:solidFill>
                   <a:schemeClr val="bg2">
                     <a:lumMod val="65000"/>
                   </a:schemeClr>
                 </a:solidFill>
               </a:rPr>
-              <a:t>and documents</a:t>
+              <a:t> to </a:t>
+            </a:r>
+            <a:r>
+              <a:rPr lang="en-US" sz="2400" u="sng" dirty="0"/>
+              <a:t>pass</a:t>
+            </a:r>
+            <a:r>
+              <a:rPr lang="en-US" sz="2400" dirty="0">
+                <a:solidFill>
+                  <a:schemeClr val="bg2">
+                    <a:lumMod val="65000"/>
+                  </a:schemeClr>
+                </a:solidFill>
+              </a:rPr>
+              <a:t> health checks for the Onboard pitstop.</a:t>
             </a:r>
             <a:endParaRPr lang="en-US" sz="2400" u="sng" dirty="0">
               <a:solidFill>
@@ -47716,6 +49833,254 @@
             <p:ph type="title"/>
           </p:nvPr>
         </p:nvSpPr>
+        <p:spPr>
+          <a:xfrm>
+            <a:off x="583688" y="484902"/>
+            <a:ext cx="9047329" cy="975783"/>
+          </a:xfrm>
+        </p:spPr>
+        <p:txBody>
+          <a:bodyPr/>
+          <a:lstStyle/>
+          <a:p>
+            <a:r>
+              <a:rPr lang="en-US" sz="2400" dirty="0"/>
+              <a:t>Pitstop: </a:t>
+            </a:r>
+            <a:r>
+              <a:rPr lang="en-US" sz="2400" i="1" u="sng" dirty="0">
+                <a:solidFill>
+                  <a:schemeClr val="bg2">
+                    <a:lumMod val="65000"/>
+                  </a:schemeClr>
+                </a:solidFill>
+              </a:rPr>
+              <a:t>Onboard</a:t>
+            </a:r>
+            <a:r>
+              <a:rPr lang="en-US" sz="2400" i="1" dirty="0">
+                <a:solidFill>
+                  <a:schemeClr val="bg2">
+                    <a:lumMod val="65000"/>
+                  </a:schemeClr>
+                </a:solidFill>
+              </a:rPr>
+              <a:t> </a:t>
+            </a:r>
+            <a:r>
+              <a:rPr lang="en-US" sz="2400" dirty="0">
+                <a:solidFill>
+                  <a:schemeClr val="bg2">
+                    <a:lumMod val="65000"/>
+                  </a:schemeClr>
+                </a:solidFill>
+              </a:rPr>
+              <a:t>resources and documents. These are the </a:t>
+            </a:r>
+            <a:r>
+              <a:rPr lang="en-US" sz="2400" u="sng" dirty="0"/>
+              <a:t>secondary recommendations</a:t>
+            </a:r>
+            <a:r>
+              <a:rPr lang="en-US" sz="2400" dirty="0">
+                <a:solidFill>
+                  <a:schemeClr val="bg2">
+                    <a:lumMod val="65000"/>
+                  </a:schemeClr>
+                </a:solidFill>
+              </a:rPr>
+              <a:t> to </a:t>
+            </a:r>
+            <a:r>
+              <a:rPr lang="en-US" sz="2400" u="sng" dirty="0"/>
+              <a:t>improve</a:t>
+            </a:r>
+            <a:r>
+              <a:rPr lang="en-US" sz="2400" dirty="0">
+                <a:solidFill>
+                  <a:schemeClr val="bg2">
+                    <a:lumMod val="65000"/>
+                  </a:schemeClr>
+                </a:solidFill>
+              </a:rPr>
+              <a:t> the quality of instrumentation further.</a:t>
+            </a:r>
+            <a:endParaRPr lang="en-US" sz="2400" u="sng" dirty="0">
+              <a:solidFill>
+                <a:schemeClr val="bg2">
+                  <a:lumMod val="65000"/>
+                </a:schemeClr>
+              </a:solidFill>
+            </a:endParaRPr>
+          </a:p>
+        </p:txBody>
+      </p:sp>
+      <p:pic>
+        <p:nvPicPr>
+          <p:cNvPr id="2" name="Picture 1">
+            <a:extLst>
+              <a:ext uri="{FF2B5EF4-FFF2-40B4-BE49-F238E27FC236}">
+                <a16:creationId xmlns:a16="http://schemas.microsoft.com/office/drawing/2014/main" id="{0E588CAB-9BAC-2B7C-7F31-3B044CF51B1B}"/>
+              </a:ext>
+            </a:extLst>
+          </p:cNvPr>
+          <p:cNvPicPr>
+            <a:picLocks noChangeAspect="1"/>
+          </p:cNvPicPr>
+          <p:nvPr/>
+        </p:nvPicPr>
+        <p:blipFill>
+          <a:blip r:embed="rId3"/>
+          <a:stretch>
+            <a:fillRect/>
+          </a:stretch>
+        </p:blipFill>
+        <p:spPr>
+          <a:xfrm>
+            <a:off x="9458107" y="0"/>
+            <a:ext cx="2733893" cy="1618802"/>
+          </a:xfrm>
+          <a:prstGeom prst="rect">
+            <a:avLst/>
+          </a:prstGeom>
+        </p:spPr>
+      </p:pic>
+      <p:sp>
+        <p:nvSpPr>
+          <p:cNvPr id="4" name="TextBox 3">
+            <a:extLst>
+              <a:ext uri="{FF2B5EF4-FFF2-40B4-BE49-F238E27FC236}">
+                <a16:creationId xmlns:a16="http://schemas.microsoft.com/office/drawing/2014/main" id="{80735B6B-C7F8-8BCD-A6CE-559DF8F54ABF}"/>
+              </a:ext>
+            </a:extLst>
+          </p:cNvPr>
+          <p:cNvSpPr txBox="1"/>
+          <p:nvPr/>
+        </p:nvSpPr>
+        <p:spPr>
+          <a:xfrm>
+            <a:off x="3160644" y="2395331"/>
+            <a:ext cx="5138530" cy="923330"/>
+          </a:xfrm>
+          <a:prstGeom prst="rect">
+            <a:avLst/>
+          </a:prstGeom>
+          <a:noFill/>
+        </p:spPr>
+        <p:txBody>
+          <a:bodyPr wrap="square" lIns="91440" tIns="45720" rIns="91440" bIns="45720" rtlCol="0">
+            <a:spAutoFit/>
+          </a:bodyPr>
+          <a:lstStyle/>
+          <a:p>
+            <a:pPr algn="l"/>
+            <a:r>
+              <a:rPr lang="en-US" dirty="0">
+                <a:solidFill>
+                  <a:schemeClr val="bg2">
+                    <a:lumMod val="75000"/>
+                  </a:schemeClr>
+                </a:solidFill>
+              </a:rPr>
+              <a:t>There are no </a:t>
+            </a:r>
+            <a:r>
+              <a:rPr lang="en-US" u="sng" dirty="0">
+                <a:solidFill>
+                  <a:schemeClr val="bg2">
+                    <a:lumMod val="75000"/>
+                  </a:schemeClr>
+                </a:solidFill>
+              </a:rPr>
+              <a:t>secondary recommendations</a:t>
+            </a:r>
+            <a:r>
+              <a:rPr lang="en-US" dirty="0">
+                <a:solidFill>
+                  <a:schemeClr val="bg2">
+                    <a:lumMod val="75000"/>
+                  </a:schemeClr>
+                </a:solidFill>
+              </a:rPr>
+              <a:t> available for this Pitstop.  Please consult the </a:t>
+            </a:r>
+            <a:r>
+              <a:rPr lang="en-US" u="sng" dirty="0">
+                <a:solidFill>
+                  <a:schemeClr val="bg2">
+                    <a:lumMod val="75000"/>
+                  </a:schemeClr>
+                </a:solidFill>
+              </a:rPr>
+              <a:t>primary recommendations</a:t>
+            </a:r>
+            <a:r>
+              <a:rPr lang="en-US" dirty="0">
+                <a:solidFill>
+                  <a:schemeClr val="bg2">
+                    <a:lumMod val="75000"/>
+                  </a:schemeClr>
+                </a:solidFill>
+              </a:rPr>
+              <a:t> on the prior slide.  </a:t>
+            </a:r>
+            <a:endParaRPr lang="en-US" dirty="0">
+              <a:solidFill>
+                <a:schemeClr val="bg2">
+                  <a:lumMod val="75000"/>
+                </a:schemeClr>
+              </a:solidFill>
+              <a:latin typeface="+mn-lt"/>
+            </a:endParaRPr>
+          </a:p>
+        </p:txBody>
+      </p:sp>
+    </p:spTree>
+    <p:extLst>
+      <p:ext uri="{BB962C8B-B14F-4D97-AF65-F5344CB8AC3E}">
+        <p14:creationId xmlns:p14="http://schemas.microsoft.com/office/powerpoint/2010/main" val="2404492384"/>
+      </p:ext>
+    </p:extLst>
+  </p:cSld>
+  <p:clrMapOvr>
+    <a:masterClrMapping/>
+  </p:clrMapOvr>
+</p:sld>
+</file>
+
+<file path=ppt/slides/slide6.xml><?xml version="1.0" encoding="utf-8"?>
+<p:sld xmlns:a="http://schemas.openxmlformats.org/drawingml/2006/main" xmlns:r="http://schemas.openxmlformats.org/officeDocument/2006/relationships" xmlns:p="http://schemas.openxmlformats.org/presentationml/2006/main">
+  <p:cSld>
+    <p:spTree>
+      <p:nvGrpSpPr>
+        <p:cNvPr id="1" name=""/>
+        <p:cNvGrpSpPr/>
+        <p:nvPr/>
+      </p:nvGrpSpPr>
+      <p:grpSpPr>
+        <a:xfrm>
+          <a:off x="0" y="0"/>
+          <a:ext cx="0" cy="0"/>
+          <a:chOff x="0" y="0"/>
+          <a:chExt cx="0" cy="0"/>
+        </a:xfrm>
+      </p:grpSpPr>
+      <p:sp>
+        <p:nvSpPr>
+          <p:cNvPr id="3" name="Title 2">
+            <a:extLst>
+              <a:ext uri="{FF2B5EF4-FFF2-40B4-BE49-F238E27FC236}">
+                <a16:creationId xmlns:a16="http://schemas.microsoft.com/office/drawing/2014/main" id="{F9BA7272-68AE-FF40-8C45-20569EB44577}"/>
+              </a:ext>
+            </a:extLst>
+          </p:cNvPr>
+          <p:cNvSpPr>
+            <a:spLocks noGrp="1"/>
+          </p:cNvSpPr>
+          <p:nvPr>
+            <p:ph type="title"/>
+          </p:nvPr>
+        </p:nvSpPr>
         <p:spPr/>
         <p:txBody>
           <a:bodyPr/>
@@ -47832,7 +50197,7 @@
 </p:sld>
 </file>
 
-<file path=ppt/slides/slide6.xml><?xml version="1.0" encoding="utf-8"?>
+<file path=ppt/slides/slide7.xml><?xml version="1.0" encoding="utf-8"?>
 <p:sld xmlns:a="http://schemas.openxmlformats.org/drawingml/2006/main" xmlns:r="http://schemas.openxmlformats.org/officeDocument/2006/relationships" xmlns:p="http://schemas.openxmlformats.org/presentationml/2006/main">
   <p:cSld>
     <p:spTree>
@@ -47865,7 +50230,12 @@
             <p:ph type="title"/>
           </p:nvPr>
         </p:nvSpPr>
-        <p:spPr/>
+        <p:spPr>
+          <a:xfrm>
+            <a:off x="583689" y="455085"/>
+            <a:ext cx="8729276" cy="975783"/>
+          </a:xfrm>
+        </p:spPr>
         <p:txBody>
           <a:bodyPr/>
           <a:lstStyle/>
@@ -47902,7 +50272,59 @@
                   </a:schemeClr>
                 </a:solidFill>
               </a:rPr>
-              <a:t>has failed health check best-practices</a:t>
+              <a:t>resource and document links. These are the </a:t>
+            </a:r>
+            <a:r>
+              <a:rPr lang="en-US" sz="2400" u="sng" dirty="0"/>
+              <a:t>primary recommendations</a:t>
+            </a:r>
+            <a:r>
+              <a:rPr lang="en-US" sz="2400" dirty="0"/>
+              <a:t> </a:t>
+            </a:r>
+            <a:r>
+              <a:rPr lang="en-US" sz="2400" dirty="0">
+                <a:solidFill>
+                  <a:schemeClr val="bg2">
+                    <a:lumMod val="65000"/>
+                  </a:schemeClr>
+                </a:solidFill>
+              </a:rPr>
+              <a:t>to </a:t>
+            </a:r>
+            <a:r>
+              <a:rPr lang="en-US" sz="2400" u="sng" dirty="0"/>
+              <a:t>pass</a:t>
+            </a:r>
+            <a:r>
+              <a:rPr lang="en-US" sz="2400" dirty="0">
+                <a:solidFill>
+                  <a:schemeClr val="bg2">
+                    <a:lumMod val="65000"/>
+                  </a:schemeClr>
+                </a:solidFill>
+              </a:rPr>
+              <a:t> health checks for the </a:t>
+            </a:r>
+            <a:r>
+              <a:rPr lang="en-US" sz="2400" i="1" u="sng" dirty="0">
+                <a:solidFill>
+                  <a:schemeClr val="bg2">
+                    <a:lumMod val="65000"/>
+                  </a:schemeClr>
+                </a:solidFill>
+              </a:rPr>
+              <a:t>Implement</a:t>
+            </a:r>
+            <a:r>
+              <a:rPr lang="en-US" sz="2400" dirty="0">
+                <a:solidFill>
+                  <a:schemeClr val="bg2">
+                    <a:lumMod val="65000"/>
+                  </a:schemeClr>
+                </a:solidFill>
+              </a:rPr>
+              <a:t> pitstop.</a:t>
             </a:r>
             <a:endParaRPr lang="en-US" sz="2400" u="sng" dirty="0">
               <a:solidFill>
@@ -47957,7 +50379,259 @@
 </p:sld>
 </file>
 
-<file path=ppt/slides/slide7.xml><?xml version="1.0" encoding="utf-8"?>
+<file path=ppt/slides/slide8.xml><?xml version="1.0" encoding="utf-8"?>
+<p:sld xmlns:a="http://schemas.openxmlformats.org/drawingml/2006/main" xmlns:r="http://schemas.openxmlformats.org/officeDocument/2006/relationships" xmlns:p="http://schemas.openxmlformats.org/presentationml/2006/main">
+  <p:cSld>
+    <p:spTree>
+      <p:nvGrpSpPr>
+        <p:cNvPr id="1" name=""/>
+        <p:cNvGrpSpPr/>
+        <p:nvPr/>
+      </p:nvGrpSpPr>
+      <p:grpSpPr>
+        <a:xfrm>
+          <a:off x="0" y="0"/>
+          <a:ext cx="0" cy="0"/>
+          <a:chOff x="0" y="0"/>
+          <a:chExt cx="0" cy="0"/>
+        </a:xfrm>
+      </p:grpSpPr>
+      <p:sp>
+        <p:nvSpPr>
+          <p:cNvPr id="3" name="Title 2">
+            <a:extLst>
+              <a:ext uri="{FF2B5EF4-FFF2-40B4-BE49-F238E27FC236}">
+                <a16:creationId xmlns:a16="http://schemas.microsoft.com/office/drawing/2014/main" id="{F9BA7272-68AE-FF40-8C45-20569EB44577}"/>
+              </a:ext>
+            </a:extLst>
+          </p:cNvPr>
+          <p:cNvSpPr>
+            <a:spLocks noGrp="1"/>
+          </p:cNvSpPr>
+          <p:nvPr>
+            <p:ph type="title"/>
+          </p:nvPr>
+        </p:nvSpPr>
+        <p:spPr>
+          <a:xfrm>
+            <a:off x="583689" y="455085"/>
+            <a:ext cx="8873418" cy="1164310"/>
+          </a:xfrm>
+        </p:spPr>
+        <p:txBody>
+          <a:bodyPr/>
+          <a:lstStyle/>
+          <a:p>
+            <a:r>
+              <a:rPr lang="en-US" sz="2400" dirty="0"/>
+              <a:t>Pitstop: </a:t>
+            </a:r>
+            <a:r>
+              <a:rPr lang="en-US" sz="2400" i="1" u="sng" dirty="0">
+                <a:solidFill>
+                  <a:schemeClr val="bg2">
+                    <a:lumMod val="65000"/>
+                  </a:schemeClr>
+                </a:solidFill>
+              </a:rPr>
+              <a:t>Implement</a:t>
+            </a:r>
+            <a:r>
+              <a:rPr lang="en-US" sz="2400" i="1" dirty="0">
+                <a:solidFill>
+                  <a:schemeClr val="bg2">
+                    <a:lumMod val="65000"/>
+                  </a:schemeClr>
+                </a:solidFill>
+              </a:rPr>
+              <a:t> </a:t>
+            </a:r>
+            <a:r>
+              <a:rPr lang="en-US" sz="2400" dirty="0">
+                <a:solidFill>
+                  <a:schemeClr val="bg2">
+                    <a:lumMod val="65000"/>
+                  </a:schemeClr>
+                </a:solidFill>
+              </a:rPr>
+              <a:t>resource and document links. These are the </a:t>
+            </a:r>
+            <a:r>
+              <a:rPr lang="en-US" sz="2400" u="sng" dirty="0"/>
+              <a:t>secondary recommendations</a:t>
+            </a:r>
+            <a:r>
+              <a:rPr lang="en-US" sz="2400" dirty="0"/>
+              <a:t> </a:t>
+            </a:r>
+            <a:r>
+              <a:rPr lang="en-US" sz="2400" dirty="0">
+                <a:solidFill>
+                  <a:schemeClr val="bg2">
+                    <a:lumMod val="65000"/>
+                  </a:schemeClr>
+                </a:solidFill>
+              </a:rPr>
+              <a:t>to </a:t>
+            </a:r>
+            <a:r>
+              <a:rPr lang="en-US" sz="2400" u="sng" dirty="0"/>
+              <a:t>improve</a:t>
+            </a:r>
+            <a:r>
+              <a:rPr lang="en-US" sz="2400" dirty="0">
+                <a:solidFill>
+                  <a:schemeClr val="bg2">
+                    <a:lumMod val="65000"/>
+                  </a:schemeClr>
+                </a:solidFill>
+              </a:rPr>
+              <a:t> the quality of instrumentation further.</a:t>
+            </a:r>
+            <a:endParaRPr lang="en-US" sz="2400" u="sng" dirty="0">
+              <a:solidFill>
+                <a:schemeClr val="bg2">
+                  <a:lumMod val="65000"/>
+                </a:schemeClr>
+              </a:solidFill>
+            </a:endParaRPr>
+          </a:p>
+        </p:txBody>
+      </p:sp>
+      <p:pic>
+        <p:nvPicPr>
+          <p:cNvPr id="4" name="Picture 3">
+            <a:extLst>
+              <a:ext uri="{FF2B5EF4-FFF2-40B4-BE49-F238E27FC236}">
+                <a16:creationId xmlns:a16="http://schemas.microsoft.com/office/drawing/2014/main" id="{CC7E5ECC-9D8D-EC66-1C17-E4D8FD9F87BA}"/>
+              </a:ext>
+            </a:extLst>
+          </p:cNvPr>
+          <p:cNvPicPr>
+            <a:picLocks noChangeAspect="1"/>
+          </p:cNvPicPr>
+          <p:nvPr/>
+        </p:nvPicPr>
+        <p:blipFill>
+          <a:blip r:embed="rId3"/>
+          <a:stretch>
+            <a:fillRect/>
+          </a:stretch>
+        </p:blipFill>
+        <p:spPr>
+          <a:xfrm>
+            <a:off x="9457106" y="0"/>
+            <a:ext cx="2734893" cy="1619395"/>
+          </a:xfrm>
+          <a:prstGeom prst="rect">
+            <a:avLst/>
+          </a:prstGeom>
+        </p:spPr>
+      </p:pic>
+      <p:sp>
+        <p:nvSpPr>
+          <p:cNvPr id="2" name="TextBox 1">
+            <a:extLst>
+              <a:ext uri="{FF2B5EF4-FFF2-40B4-BE49-F238E27FC236}">
+                <a16:creationId xmlns:a16="http://schemas.microsoft.com/office/drawing/2014/main" id="{2A6A81E9-EF9E-B866-5F82-6DD937003CD3}"/>
+              </a:ext>
+            </a:extLst>
+          </p:cNvPr>
+          <p:cNvSpPr txBox="1"/>
+          <p:nvPr/>
+        </p:nvSpPr>
+        <p:spPr>
+          <a:xfrm>
+            <a:off x="3160644" y="2395331"/>
+            <a:ext cx="5138530" cy="923330"/>
+          </a:xfrm>
+          <a:prstGeom prst="rect">
+            <a:avLst/>
+          </a:prstGeom>
+          <a:noFill/>
+        </p:spPr>
+        <p:txBody>
+          <a:bodyPr wrap="square" lIns="91440" tIns="45720" rIns="91440" bIns="45720" rtlCol="0">
+            <a:spAutoFit/>
+          </a:bodyPr>
+          <a:lstStyle/>
+          <a:p>
+            <a:pPr algn="l"/>
+            <a:r>
+              <a:rPr lang="en-US" dirty="0">
+                <a:solidFill>
+                  <a:schemeClr val="bg2">
+                    <a:lumMod val="75000"/>
+                  </a:schemeClr>
+                </a:solidFill>
+              </a:rPr>
+              <a:t>There are no </a:t>
+            </a:r>
+            <a:r>
+              <a:rPr lang="en-US" u="sng" dirty="0">
+                <a:solidFill>
+                  <a:schemeClr val="bg2">
+                    <a:lumMod val="75000"/>
+                  </a:schemeClr>
+                </a:solidFill>
+              </a:rPr>
+              <a:t>secondary recommendations</a:t>
+            </a:r>
+            <a:r>
+              <a:rPr lang="en-US" dirty="0">
+                <a:solidFill>
+                  <a:schemeClr val="bg2">
+                    <a:lumMod val="75000"/>
+                  </a:schemeClr>
+                </a:solidFill>
+              </a:rPr>
+              <a:t> available for this Pitstop.  Please consult the </a:t>
+            </a:r>
+            <a:r>
+              <a:rPr lang="en-US" u="sng" dirty="0">
+                <a:solidFill>
+                  <a:schemeClr val="bg2">
+                    <a:lumMod val="75000"/>
+                  </a:schemeClr>
+                </a:solidFill>
+              </a:rPr>
+              <a:t>primary recommendations</a:t>
+            </a:r>
+            <a:r>
+              <a:rPr lang="en-US" dirty="0">
+                <a:solidFill>
+                  <a:schemeClr val="bg2">
+                    <a:lumMod val="75000"/>
+                  </a:schemeClr>
+                </a:solidFill>
+              </a:rPr>
+              <a:t> on the prior slide.  </a:t>
+            </a:r>
+            <a:endParaRPr lang="en-US" dirty="0">
+              <a:solidFill>
+                <a:schemeClr val="bg2">
+                  <a:lumMod val="75000"/>
+                </a:schemeClr>
+              </a:solidFill>
+              <a:latin typeface="+mn-lt"/>
+            </a:endParaRPr>
+          </a:p>
+        </p:txBody>
+      </p:sp>
+    </p:spTree>
+    <p:extLst>
+      <p:ext uri="{BB962C8B-B14F-4D97-AF65-F5344CB8AC3E}">
+        <p14:creationId xmlns:p14="http://schemas.microsoft.com/office/powerpoint/2010/main" val="2904848948"/>
+      </p:ext>
+    </p:extLst>
+  </p:cSld>
+  <p:clrMapOvr>
+    <a:masterClrMapping/>
+  </p:clrMapOvr>
+</p:sld>
+</file>
+
+<file path=ppt/slides/slide9.xml><?xml version="1.0" encoding="utf-8"?>
 <p:sld xmlns:a="http://schemas.openxmlformats.org/drawingml/2006/main" xmlns:r="http://schemas.openxmlformats.org/officeDocument/2006/relationships" xmlns:p="http://schemas.openxmlformats.org/presentationml/2006/main">
   <p:cSld>
     <p:spTree>
@@ -48097,280 +50771,6 @@
     <p:extLst>
       <p:ext uri="{BB962C8B-B14F-4D97-AF65-F5344CB8AC3E}">
         <p14:creationId xmlns:p14="http://schemas.microsoft.com/office/powerpoint/2010/main" val="3699044360"/>
-      </p:ext>
-    </p:extLst>
-  </p:cSld>
-  <p:clrMapOvr>
-    <a:masterClrMapping/>
-  </p:clrMapOvr>
-</p:sld>
-</file>
-
-<file path=ppt/slides/slide8.xml><?xml version="1.0" encoding="utf-8"?>
-<p:sld xmlns:a="http://schemas.openxmlformats.org/drawingml/2006/main" xmlns:r="http://schemas.openxmlformats.org/officeDocument/2006/relationships" xmlns:p="http://schemas.openxmlformats.org/presentationml/2006/main">
-  <p:cSld>
-    <p:spTree>
-      <p:nvGrpSpPr>
-        <p:cNvPr id="1" name=""/>
-        <p:cNvGrpSpPr/>
-        <p:nvPr/>
-      </p:nvGrpSpPr>
-      <p:grpSpPr>
-        <a:xfrm>
-          <a:off x="0" y="0"/>
-          <a:ext cx="0" cy="0"/>
-          <a:chOff x="0" y="0"/>
-          <a:chExt cx="0" cy="0"/>
-        </a:xfrm>
-      </p:grpSpPr>
-      <p:sp>
-        <p:nvSpPr>
-          <p:cNvPr id="3" name="Title 2">
-            <a:extLst>
-              <a:ext uri="{FF2B5EF4-FFF2-40B4-BE49-F238E27FC236}">
-                <a16:creationId xmlns:a16="http://schemas.microsoft.com/office/drawing/2014/main" id="{F9BA7272-68AE-FF40-8C45-20569EB44577}"/>
-              </a:ext>
-            </a:extLst>
-          </p:cNvPr>
-          <p:cNvSpPr>
-            <a:spLocks noGrp="1"/>
-          </p:cNvSpPr>
-          <p:nvPr>
-            <p:ph type="title"/>
-          </p:nvPr>
-        </p:nvSpPr>
-        <p:spPr/>
-        <p:txBody>
-          <a:bodyPr/>
-          <a:lstStyle/>
-          <a:p>
-            <a:r>
-              <a:rPr lang="en-US" sz="2400" dirty="0"/>
-              <a:t>Pitstop: </a:t>
-            </a:r>
-            <a:r>
-              <a:rPr lang="en-US" sz="2400" i="1" u="sng" dirty="0">
-                <a:solidFill>
-                  <a:schemeClr val="bg2">
-                    <a:lumMod val="65000"/>
-                  </a:schemeClr>
-                </a:solidFill>
-              </a:rPr>
-              <a:t>Use</a:t>
-            </a:r>
-            <a:r>
-              <a:rPr lang="en-US" sz="2400" i="1" dirty="0">
-                <a:solidFill>
-                  <a:schemeClr val="bg2">
-                    <a:lumMod val="65000"/>
-                  </a:schemeClr>
-                </a:solidFill>
-              </a:rPr>
-              <a:t> </a:t>
-            </a:r>
-            <a:r>
-              <a:rPr lang="en-US" sz="2400" dirty="0">
-                <a:solidFill>
-                  <a:schemeClr val="bg2">
-                    <a:lumMod val="65000"/>
-                  </a:schemeClr>
-                </a:solidFill>
-              </a:rPr>
-              <a:t>has failed health check best-practices</a:t>
-            </a:r>
-            <a:endParaRPr lang="en-US" sz="2400" u="sng" dirty="0">
-              <a:solidFill>
-                <a:schemeClr val="bg2">
-                  <a:lumMod val="65000"/>
-                </a:schemeClr>
-              </a:solidFill>
-            </a:endParaRPr>
-          </a:p>
-        </p:txBody>
-      </p:sp>
-      <p:pic>
-        <p:nvPicPr>
-          <p:cNvPr id="4" name="Picture 3">
-            <a:extLst>
-              <a:ext uri="{FF2B5EF4-FFF2-40B4-BE49-F238E27FC236}">
-                <a16:creationId xmlns:a16="http://schemas.microsoft.com/office/drawing/2014/main" id="{954E400C-A9E6-789C-84E9-B86CF70D3E2D}"/>
-              </a:ext>
-            </a:extLst>
-          </p:cNvPr>
-          <p:cNvPicPr>
-            <a:picLocks noChangeAspect="1"/>
-          </p:cNvPicPr>
-          <p:nvPr/>
-        </p:nvPicPr>
-        <p:blipFill>
-          <a:blip r:embed="rId3"/>
-          <a:stretch>
-            <a:fillRect/>
-          </a:stretch>
-        </p:blipFill>
-        <p:spPr>
-          <a:xfrm>
-            <a:off x="9457107" y="-1"/>
-            <a:ext cx="2734894" cy="1619395"/>
-          </a:xfrm>
-          <a:prstGeom prst="rect">
-            <a:avLst/>
-          </a:prstGeom>
-        </p:spPr>
-      </p:pic>
-    </p:spTree>
-    <p:extLst>
-      <p:ext uri="{BB962C8B-B14F-4D97-AF65-F5344CB8AC3E}">
-        <p14:creationId xmlns:p14="http://schemas.microsoft.com/office/powerpoint/2010/main" val="4135586517"/>
-      </p:ext>
-    </p:extLst>
-  </p:cSld>
-  <p:clrMapOvr>
-    <a:masterClrMapping/>
-  </p:clrMapOvr>
-</p:sld>
-</file>
-
-<file path=ppt/slides/slide9.xml><?xml version="1.0" encoding="utf-8"?>
-<p:sld xmlns:a="http://schemas.openxmlformats.org/drawingml/2006/main" xmlns:r="http://schemas.openxmlformats.org/officeDocument/2006/relationships" xmlns:p="http://schemas.openxmlformats.org/presentationml/2006/main">
-  <p:cSld>
-    <p:spTree>
-      <p:nvGrpSpPr>
-        <p:cNvPr id="1" name=""/>
-        <p:cNvGrpSpPr/>
-        <p:nvPr/>
-      </p:nvGrpSpPr>
-      <p:grpSpPr>
-        <a:xfrm>
-          <a:off x="0" y="0"/>
-          <a:ext cx="0" cy="0"/>
-          <a:chOff x="0" y="0"/>
-          <a:chExt cx="0" cy="0"/>
-        </a:xfrm>
-      </p:grpSpPr>
-      <p:sp>
-        <p:nvSpPr>
-          <p:cNvPr id="3" name="Title 2">
-            <a:extLst>
-              <a:ext uri="{FF2B5EF4-FFF2-40B4-BE49-F238E27FC236}">
-                <a16:creationId xmlns:a16="http://schemas.microsoft.com/office/drawing/2014/main" id="{F9BA7272-68AE-FF40-8C45-20569EB44577}"/>
-              </a:ext>
-            </a:extLst>
-          </p:cNvPr>
-          <p:cNvSpPr>
-            <a:spLocks noGrp="1"/>
-          </p:cNvSpPr>
-          <p:nvPr>
-            <p:ph type="title"/>
-          </p:nvPr>
-        </p:nvSpPr>
-        <p:spPr/>
-        <p:txBody>
-          <a:bodyPr/>
-          <a:lstStyle/>
-          <a:p>
-            <a:r>
-              <a:rPr lang="en-US" sz="2400" dirty="0"/>
-              <a:t>Hybrid Application Monitoring </a:t>
-            </a:r>
-            <a:br>
-              <a:rPr lang="en-US" sz="2400" dirty="0"/>
-            </a:br>
-            <a:r>
-              <a:rPr lang="en-US" sz="2400" dirty="0"/>
-              <a:t>Pitstop: </a:t>
-            </a:r>
-            <a:r>
-              <a:rPr lang="en-US" sz="2400" i="1" dirty="0">
-                <a:solidFill>
-                  <a:schemeClr val="bg2">
-                    <a:lumMod val="65000"/>
-                  </a:schemeClr>
-                </a:solidFill>
-              </a:rPr>
-              <a:t>Engage</a:t>
-            </a:r>
-          </a:p>
-        </p:txBody>
-      </p:sp>
-      <p:pic>
-        <p:nvPicPr>
-          <p:cNvPr id="2" name="Picture 1">
-            <a:extLst>
-              <a:ext uri="{FF2B5EF4-FFF2-40B4-BE49-F238E27FC236}">
-                <a16:creationId xmlns:a16="http://schemas.microsoft.com/office/drawing/2014/main" id="{131BC433-9DC1-CE3A-E1C2-BCA842581145}"/>
-              </a:ext>
-            </a:extLst>
-          </p:cNvPr>
-          <p:cNvPicPr>
-            <a:picLocks noChangeAspect="1"/>
-          </p:cNvPicPr>
-          <p:nvPr/>
-        </p:nvPicPr>
-        <p:blipFill>
-          <a:blip r:embed="rId3"/>
-          <a:stretch>
-            <a:fillRect/>
-          </a:stretch>
-        </p:blipFill>
-        <p:spPr>
-          <a:xfrm>
-            <a:off x="9457106" y="0"/>
-            <a:ext cx="2734893" cy="1619395"/>
-          </a:xfrm>
-          <a:prstGeom prst="rect">
-            <a:avLst/>
-          </a:prstGeom>
-        </p:spPr>
-      </p:pic>
-      <p:sp>
-        <p:nvSpPr>
-          <p:cNvPr id="5" name="TextBox 4">
-            <a:extLst>
-              <a:ext uri="{FF2B5EF4-FFF2-40B4-BE49-F238E27FC236}">
-                <a16:creationId xmlns:a16="http://schemas.microsoft.com/office/drawing/2014/main" id="{60AD8280-2AE6-A913-8BA7-DD65D7A433C5}"/>
-              </a:ext>
-            </a:extLst>
-          </p:cNvPr>
-          <p:cNvSpPr txBox="1"/>
-          <p:nvPr/>
-        </p:nvSpPr>
-        <p:spPr>
-          <a:xfrm>
-            <a:off x="9073680" y="6077191"/>
-            <a:ext cx="2948243" cy="215444"/>
-          </a:xfrm>
-          <a:prstGeom prst="rect">
-            <a:avLst/>
-          </a:prstGeom>
-          <a:noFill/>
-        </p:spPr>
-        <p:txBody>
-          <a:bodyPr wrap="none" lIns="91440" tIns="45720" rIns="91440" bIns="45720" rtlCol="0">
-            <a:spAutoFit/>
-          </a:bodyPr>
-          <a:lstStyle/>
-          <a:p>
-            <a:pPr algn="l"/>
-            <a:r>
-              <a:rPr lang="en-US" sz="800" dirty="0">
-                <a:latin typeface="+mn-lt"/>
-              </a:rPr>
-              <a:t>*** see the next page for feedback on health checks </a:t>
-            </a:r>
-            <a:r>
-              <a:rPr lang="en-US" sz="800" u="sng" dirty="0">
-                <a:latin typeface="+mn-lt"/>
-              </a:rPr>
-              <a:t>best practices</a:t>
-            </a:r>
-          </a:p>
-        </p:txBody>
-      </p:sp>
-    </p:spTree>
-    <p:extLst>
-      <p:ext uri="{BB962C8B-B14F-4D97-AF65-F5344CB8AC3E}">
-        <p14:creationId xmlns:p14="http://schemas.microsoft.com/office/powerpoint/2010/main" val="3914242953"/>
       </p:ext>
     </p:extLst>
   </p:cSld>
@@ -49537,6 +51937,15 @@
 </file>
 
 <file path=customXml/item1.xml><?xml version="1.0" encoding="utf-8"?>
+<?mso-contentType ?>
+<FormTemplates xmlns="http://schemas.microsoft.com/sharepoint/v3/contenttype/forms">
+  <Display>DocumentLibraryForm</Display>
+  <Edit>DocumentLibraryForm</Edit>
+  <New>DocumentLibraryForm</New>
+</FormTemplates>
+</file>
+
+<file path=customXml/item2.xml><?xml version="1.0" encoding="utf-8"?>
 <ct:contentTypeSchema xmlns:ct="http://schemas.microsoft.com/office/2006/metadata/contentType" xmlns:ma="http://schemas.microsoft.com/office/2006/metadata/properties/metaAttributes" ct:_="" ma:_="" ma:contentTypeName="Document" ma:contentTypeID="0x01010016638FBC164A6C4987893577CA81BDCE" ma:contentTypeVersion="12" ma:contentTypeDescription="Create a new document." ma:contentTypeScope="" ma:versionID="ad216d817d9e9210cab45cf1c00ab7cf">
   <xsd:schema xmlns:xsd="http://www.w3.org/2001/XMLSchema" xmlns:xs="http://www.w3.org/2001/XMLSchema" xmlns:p="http://schemas.microsoft.com/office/2006/metadata/properties" xmlns:ns2="c068e80e-f499-4ba4-b97d-8eb81f7bf0a4" xmlns:ns3="d78665ad-f783-4f30-b3cb-b870e5173973" targetNamespace="http://schemas.microsoft.com/office/2006/metadata/properties" ma:root="true" ma:fieldsID="b03d820719e6014dead3958bf2973f6f" ns2:_="" ns3:_="">
     <xsd:import namespace="c068e80e-f499-4ba4-b97d-8eb81f7bf0a4"/>
@@ -49753,15 +52162,6 @@
 </ct:contentTypeSchema>
 </file>
 
-<file path=customXml/item2.xml><?xml version="1.0" encoding="utf-8"?>
-<?mso-contentType ?>
-<FormTemplates xmlns="http://schemas.microsoft.com/sharepoint/v3/contenttype/forms">
-  <Display>DocumentLibraryForm</Display>
-  <Edit>DocumentLibraryForm</Edit>
-  <New>DocumentLibraryForm</New>
-</FormTemplates>
-</file>
-
 <file path=customXml/item3.xml><?xml version="1.0" encoding="utf-8"?>
 <p:properties xmlns:p="http://schemas.microsoft.com/office/2006/metadata/properties" xmlns:xsi="http://www.w3.org/2001/XMLSchema-instance" xmlns:pc="http://schemas.microsoft.com/office/infopath/2007/PartnerControls">
   <documentManagement>
@@ -49781,6 +52181,14 @@
 </file>
 
 <file path=customXml/itemProps1.xml><?xml version="1.0" encoding="utf-8"?>
+<ds:datastoreItem xmlns:ds="http://schemas.openxmlformats.org/officeDocument/2006/customXml" ds:itemID="{2D849882-45D9-49DF-83E9-35AEA65C5DA4}">
+  <ds:schemaRefs>
+    <ds:schemaRef ds:uri="http://schemas.microsoft.com/sharepoint/v3/contenttype/forms"/>
+  </ds:schemaRefs>
+</ds:datastoreItem>
+</file>
+
+<file path=customXml/itemProps2.xml><?xml version="1.0" encoding="utf-8"?>
 <ds:datastoreItem xmlns:ds="http://schemas.openxmlformats.org/officeDocument/2006/customXml" ds:itemID="{BFF5C609-47B2-4E38-98DE-50447A64B0AF}">
   <ds:schemaRefs>
     <ds:schemaRef ds:uri="http://schemas.microsoft.com/office/2006/metadata/contentType"/>
@@ -49795,14 +52203,6 @@
     <ds:schemaRef ds:uri="http://purl.org/dc/elements/1.1/"/>
     <ds:schemaRef ds:uri="http://purl.org/dc/terms/"/>
     <ds:schemaRef ds:uri="http://schemas.microsoft.com/internal/obd"/>
-  </ds:schemaRefs>
-</ds:datastoreItem>
-</file>
-
-<file path=customXml/itemProps2.xml><?xml version="1.0" encoding="utf-8"?>
-<ds:datastoreItem xmlns:ds="http://schemas.openxmlformats.org/officeDocument/2006/customXml" ds:itemID="{2D849882-45D9-49DF-83E9-35AEA65C5DA4}">
-  <ds:schemaRefs>
-    <ds:schemaRef ds:uri="http://schemas.microsoft.com/sharepoint/v3/contenttype/forms"/>
   </ds:schemaRefs>
 </ds:datastoreItem>
 </file>

</xml_diff>